<commit_message>
Formatted and corrected the first two blocks
</commit_message>
<xml_diff>
--- a/Poster/Poster_Team_55.pptx
+++ b/Poster/Poster_Team_55.pptx
@@ -104,6 +104,11 @@
       </a:defRPr>
     </a:lvl9pPr>
   </p:defaultTextStyle>
+  <p:extLst>
+    <p:ext uri="{EFAFB233-063F-42B5-8137-9DF3F51BA10A}">
+      <p15:sldGuideLst xmlns:p15="http://schemas.microsoft.com/office/powerpoint/2012/main"/>
+    </p:ext>
+  </p:extLst>
 </p:presentation>
 </file>
 
@@ -238,7 +243,7 @@
           <a:p>
             <a:fld id="{B080005E-6FBA-574A-8FE4-9107E485CAF7}" type="datetimeFigureOut">
               <a:rPr lang="en-US" smtClean="0"/>
-              <a:t>2/2/18</a:t>
+              <a:t>2/3/18</a:t>
             </a:fld>
             <a:endParaRPr lang="en-US"/>
           </a:p>
@@ -408,7 +413,7 @@
           <a:p>
             <a:fld id="{B080005E-6FBA-574A-8FE4-9107E485CAF7}" type="datetimeFigureOut">
               <a:rPr lang="en-US" smtClean="0"/>
-              <a:t>2/2/18</a:t>
+              <a:t>2/3/18</a:t>
             </a:fld>
             <a:endParaRPr lang="en-US"/>
           </a:p>
@@ -588,7 +593,7 @@
           <a:p>
             <a:fld id="{B080005E-6FBA-574A-8FE4-9107E485CAF7}" type="datetimeFigureOut">
               <a:rPr lang="en-US" smtClean="0"/>
-              <a:t>2/2/18</a:t>
+              <a:t>2/3/18</a:t>
             </a:fld>
             <a:endParaRPr lang="en-US"/>
           </a:p>
@@ -1034,7 +1039,7 @@
           <a:p>
             <a:fld id="{B080005E-6FBA-574A-8FE4-9107E485CAF7}" type="datetimeFigureOut">
               <a:rPr lang="en-US" smtClean="0"/>
-              <a:t>2/2/18</a:t>
+              <a:t>2/3/18</a:t>
             </a:fld>
             <a:endParaRPr lang="en-US"/>
           </a:p>
@@ -1278,7 +1283,7 @@
           <a:p>
             <a:fld id="{B080005E-6FBA-574A-8FE4-9107E485CAF7}" type="datetimeFigureOut">
               <a:rPr lang="en-US" smtClean="0"/>
-              <a:t>2/2/18</a:t>
+              <a:t>2/3/18</a:t>
             </a:fld>
             <a:endParaRPr lang="en-US"/>
           </a:p>
@@ -1510,7 +1515,7 @@
           <a:p>
             <a:fld id="{B080005E-6FBA-574A-8FE4-9107E485CAF7}" type="datetimeFigureOut">
               <a:rPr lang="en-US" smtClean="0"/>
-              <a:t>2/2/18</a:t>
+              <a:t>2/3/18</a:t>
             </a:fld>
             <a:endParaRPr lang="en-US"/>
           </a:p>
@@ -1877,7 +1882,7 @@
           <a:p>
             <a:fld id="{B080005E-6FBA-574A-8FE4-9107E485CAF7}" type="datetimeFigureOut">
               <a:rPr lang="en-US" smtClean="0"/>
-              <a:t>2/2/18</a:t>
+              <a:t>2/3/18</a:t>
             </a:fld>
             <a:endParaRPr lang="en-US"/>
           </a:p>
@@ -1995,7 +2000,7 @@
           <a:p>
             <a:fld id="{B080005E-6FBA-574A-8FE4-9107E485CAF7}" type="datetimeFigureOut">
               <a:rPr lang="en-US" smtClean="0"/>
-              <a:t>2/2/18</a:t>
+              <a:t>2/3/18</a:t>
             </a:fld>
             <a:endParaRPr lang="en-US"/>
           </a:p>
@@ -2090,7 +2095,7 @@
           <a:p>
             <a:fld id="{B080005E-6FBA-574A-8FE4-9107E485CAF7}" type="datetimeFigureOut">
               <a:rPr lang="en-US" smtClean="0"/>
-              <a:t>2/2/18</a:t>
+              <a:t>2/3/18</a:t>
             </a:fld>
             <a:endParaRPr lang="en-US"/>
           </a:p>
@@ -2367,7 +2372,7 @@
           <a:p>
             <a:fld id="{B080005E-6FBA-574A-8FE4-9107E485CAF7}" type="datetimeFigureOut">
               <a:rPr lang="en-US" smtClean="0"/>
-              <a:t>2/2/18</a:t>
+              <a:t>2/3/18</a:t>
             </a:fld>
             <a:endParaRPr lang="en-US"/>
           </a:p>
@@ -2624,7 +2629,7 @@
           <a:p>
             <a:fld id="{B080005E-6FBA-574A-8FE4-9107E485CAF7}" type="datetimeFigureOut">
               <a:rPr lang="en-US" smtClean="0"/>
-              <a:t>2/2/18</a:t>
+              <a:t>2/3/18</a:t>
             </a:fld>
             <a:endParaRPr lang="en-US"/>
           </a:p>
@@ -2837,7 +2842,7 @@
           <a:p>
             <a:fld id="{B080005E-6FBA-574A-8FE4-9107E485CAF7}" type="datetimeFigureOut">
               <a:rPr lang="en-US" smtClean="0"/>
-              <a:t>2/2/18</a:t>
+              <a:t>2/3/18</a:t>
             </a:fld>
             <a:endParaRPr lang="en-US"/>
           </a:p>
@@ -3252,7 +3257,7 @@
         <p:spPr>
           <a:xfrm>
             <a:off x="7549847" y="420730"/>
-            <a:ext cx="27951883" cy="2007216"/>
+            <a:ext cx="27951883" cy="2395015"/>
           </a:xfrm>
           <a:prstGeom prst="rect">
             <a:avLst/>
@@ -3293,6 +3298,93 @@
                 <a:cs typeface="Lato Light"/>
               </a:rPr>
               <a:t>Predict attribute labels for restaurants to write fake reviews</a:t>
+            </a:r>
+          </a:p>
+          <a:p>
+            <a:pPr algn="ctr">
+              <a:lnSpc>
+                <a:spcPct val="90000"/>
+              </a:lnSpc>
+            </a:pPr>
+            <a:r>
+              <a:rPr lang="en-US" sz="2800" b="1" dirty="0" err="1">
+                <a:solidFill>
+                  <a:srgbClr val="0170AD"/>
+                </a:solidFill>
+                <a:latin typeface="Lato Light"/>
+                <a:cs typeface="Lato Light"/>
+              </a:rPr>
+              <a:t>Arda</a:t>
+            </a:r>
+            <a:r>
+              <a:rPr lang="en-US" sz="2800" b="1" dirty="0">
+                <a:solidFill>
+                  <a:srgbClr val="0170AD"/>
+                </a:solidFill>
+                <a:latin typeface="Lato Light"/>
+                <a:cs typeface="Lato Light"/>
+              </a:rPr>
+              <a:t> </a:t>
+            </a:r>
+            <a:r>
+              <a:rPr lang="en-US" sz="2800" b="1" dirty="0" err="1">
+                <a:solidFill>
+                  <a:srgbClr val="0170AD"/>
+                </a:solidFill>
+                <a:latin typeface="Lato Light"/>
+                <a:cs typeface="Lato Light"/>
+              </a:rPr>
+              <a:t>Özdere</a:t>
+            </a:r>
+            <a:r>
+              <a:rPr lang="en-US" sz="2800" b="1" dirty="0">
+                <a:solidFill>
+                  <a:srgbClr val="0170AD"/>
+                </a:solidFill>
+                <a:latin typeface="Lato Light"/>
+                <a:cs typeface="Lato Light"/>
+              </a:rPr>
+              <a:t>     </a:t>
+            </a:r>
+            <a:r>
+              <a:rPr lang="en-US" sz="2800" b="1" dirty="0" err="1">
+                <a:solidFill>
+                  <a:srgbClr val="0170AD"/>
+                </a:solidFill>
+                <a:latin typeface="Lato Light"/>
+                <a:cs typeface="Lato Light"/>
+              </a:rPr>
+              <a:t>Sahin</a:t>
+            </a:r>
+            <a:r>
+              <a:rPr lang="en-US" sz="2800" b="1" dirty="0">
+                <a:solidFill>
+                  <a:srgbClr val="0170AD"/>
+                </a:solidFill>
+                <a:latin typeface="Lato Light"/>
+                <a:cs typeface="Lato Light"/>
+              </a:rPr>
+              <a:t> </a:t>
+            </a:r>
+            <a:r>
+              <a:rPr lang="en-US" sz="2800" b="1" dirty="0" err="1">
+                <a:solidFill>
+                  <a:srgbClr val="0170AD"/>
+                </a:solidFill>
+                <a:latin typeface="Lato Light"/>
+                <a:cs typeface="Lato Light"/>
+              </a:rPr>
+              <a:t>Haydar</a:t>
+            </a:r>
+            <a:r>
+              <a:rPr lang="en-US" sz="2800" b="1" dirty="0">
+                <a:solidFill>
+                  <a:srgbClr val="0170AD"/>
+                </a:solidFill>
+                <a:latin typeface="Lato Light"/>
+                <a:cs typeface="Lato Light"/>
+              </a:rPr>
+              <a:t>     Sebastian Muhle</a:t>
             </a:r>
           </a:p>
         </p:txBody>
@@ -3707,8 +3799,8 @@
         </p:nvSpPr>
         <p:spPr>
           <a:xfrm>
-            <a:off x="919343" y="6273266"/>
-            <a:ext cx="11987765" cy="6352488"/>
+            <a:off x="919343" y="5456784"/>
+            <a:ext cx="9901057" cy="6352488"/>
           </a:xfrm>
           <a:prstGeom prst="rect">
             <a:avLst/>
@@ -3726,7 +3818,7 @@
           </a:extLst>
         </p:spPr>
         <p:txBody>
-          <a:bodyPr wrap="square" lIns="0" tIns="0" rIns="0" bIns="0" numCol="1" anchor="ctr">
+          <a:bodyPr wrap="square" lIns="0" tIns="0" rIns="0" bIns="0" numCol="1" anchor="t">
             <a:noAutofit/>
           </a:bodyPr>
           <a:lstStyle>
@@ -3765,7 +3857,7 @@
                 <a:ea typeface="Lato Light"/>
                 <a:cs typeface="Lato Light"/>
               </a:rPr>
-              <a:t>We want to compare the Inception v3 architecture to the </a:t>
+              <a:t>We want to compare the performance of the Inception v3 architecture to performance of the </a:t>
             </a:r>
             <a:r>
               <a:rPr lang="en-US" sz="2400" b="1" dirty="0" err="1">
@@ -3787,7 +3879,7 @@
                 <a:ea typeface="Lato Light"/>
                 <a:cs typeface="Lato Light"/>
               </a:rPr>
-              <a:t> architecture, performance wise. As Francois </a:t>
+              <a:t> performance. As Francois </a:t>
             </a:r>
             <a:r>
               <a:rPr lang="en-US" sz="2400" b="1" dirty="0" err="1">
@@ -3853,7 +3945,7 @@
                 <a:ea typeface="Lato Light"/>
                 <a:cs typeface="Lato Light"/>
               </a:rPr>
-              <a:t>[3] was 4.3% better on Google’s internal dataset JFT. He suggests that ”This may be due to the fact that Inception V3 was developed with a focus on ImageNet and may thus be by design over-fit to this specific task.” In our project, we want to use the </a:t>
+              <a:t> was 4.3% better on Google’s internal dataset JFT. He suggests that ”This may be due to the fact that Inception V3 was developed with a focus on ImageNet and may thus be by design over-fit to this specific task.” In our project, we want to use the </a:t>
             </a:r>
             <a:r>
               <a:rPr lang="en-US" sz="2400" b="1" dirty="0" err="1">
@@ -3894,8 +3986,8 @@
         </p:nvSpPr>
         <p:spPr>
           <a:xfrm>
-            <a:off x="14911754" y="6318021"/>
-            <a:ext cx="14384215" cy="6352488"/>
+            <a:off x="16575259" y="5456784"/>
+            <a:ext cx="9901058" cy="6352488"/>
           </a:xfrm>
           <a:prstGeom prst="rect">
             <a:avLst/>
@@ -3913,7 +4005,7 @@
           </a:extLst>
         </p:spPr>
         <p:txBody>
-          <a:bodyPr wrap="square" lIns="0" tIns="0" rIns="0" bIns="0" numCol="1" anchor="ctr">
+          <a:bodyPr wrap="square" lIns="0" tIns="0" rIns="0" bIns="0" numCol="1" anchor="t">
             <a:noAutofit/>
           </a:bodyPr>
           <a:lstStyle>
@@ -3944,6 +4036,17 @@
               </a:defRPr>
             </a:pPr>
             <a:r>
+              <a:rPr lang="en-US" sz="2400" b="1" dirty="0">
+                <a:solidFill>
+                  <a:srgbClr val="0170AD"/>
+                </a:solidFill>
+                <a:latin typeface="Lato Light"/>
+                <a:ea typeface="Lato Light"/>
+                <a:cs typeface="Lato Light"/>
+              </a:rPr>
+              <a:t>The </a:t>
+            </a:r>
+            <a:r>
               <a:rPr lang="en-US" sz="2400" b="1" dirty="0" err="1">
                 <a:solidFill>
                   <a:srgbClr val="0170AD"/>
@@ -3985,7 +4088,7 @@
                 <a:ea typeface="Lato Light"/>
                 <a:cs typeface="Lato Light"/>
               </a:rPr>
-              <a:t> Competition so there already exist benchmarks. Since, the challenge was finished in April 2016, the participants only used </a:t>
+              <a:t> Competition so there already exist benchmarks. Since the challenge was finished in April 2016, the participants only used </a:t>
             </a:r>
             <a:r>
               <a:rPr lang="en-US" sz="2400" b="1" dirty="0" err="1">
@@ -4049,7 +4152,7 @@
                 <a:ea typeface="Lato Light"/>
                 <a:cs typeface="Lato Light"/>
               </a:rPr>
-              <a:t>Researchers from the University of Chicago have already written a paper on how to write very convincing fake re- views for restaurants using RNN. In their method, they used specific meta data about the restaurant like the name of their dishes to produce the fake review. With our approach we want to use the generated multiple labels from our CNN to write these reviews. In this way, we hope we can use image information about the restaurant to make the fake reviews even more convincing.</a:t>
+              <a:t>Researchers from the University of Chicago have already written a paper on how to write very convincing fake reviews for restaurants using RNN. In their method, they used specific metadata about the restaurant like the name of their dishes to produce the fake review. With our approach, we want to use the generated multiple labels from our CNN to write these reviews. In this way, we hope we can use image data about the restaurant to make the fake reviews even more convincing.</a:t>
             </a:r>
           </a:p>
         </p:txBody>

</xml_diff>

<commit_message>
Added the dataset part
</commit_message>
<xml_diff>
--- a/Poster/Poster_Team_55.pptx
+++ b/Poster/Poster_Team_55.pptx
@@ -3477,7 +3477,7 @@
         </p:blipFill>
         <p:spPr>
           <a:xfrm>
-            <a:off x="38353999" y="739728"/>
+            <a:off x="919343" y="420730"/>
             <a:ext cx="3075781" cy="1621020"/>
           </a:xfrm>
           <a:prstGeom prst="rect">
@@ -3499,7 +3499,7 @@
         </p:nvSpPr>
         <p:spPr>
           <a:xfrm>
-            <a:off x="16575259" y="3130997"/>
+            <a:off x="11624730" y="3130997"/>
             <a:ext cx="9901057" cy="2010535"/>
           </a:xfrm>
           <a:prstGeom prst="rect">
@@ -3559,7 +3559,67 @@
         </p:nvSpPr>
         <p:spPr>
           <a:xfrm>
-            <a:off x="31528723" y="3130997"/>
+            <a:off x="22353352" y="3130997"/>
+            <a:ext cx="12061455" cy="2010535"/>
+          </a:xfrm>
+          <a:prstGeom prst="rect">
+            <a:avLst/>
+          </a:prstGeom>
+          <a:solidFill>
+            <a:srgbClr val="0170AD"/>
+          </a:solidFill>
+          <a:ln>
+            <a:noFill/>
+          </a:ln>
+          <a:effectLst/>
+        </p:spPr>
+        <p:style>
+          <a:lnRef idx="1">
+            <a:schemeClr val="accent1"/>
+          </a:lnRef>
+          <a:fillRef idx="3">
+            <a:schemeClr val="accent1"/>
+          </a:fillRef>
+          <a:effectRef idx="2">
+            <a:schemeClr val="accent1"/>
+          </a:effectRef>
+          <a:fontRef idx="minor">
+            <a:schemeClr val="lt1"/>
+          </a:fontRef>
+        </p:style>
+        <p:txBody>
+          <a:bodyPr lIns="243852" tIns="121926" rIns="243852" bIns="121926" rtlCol="0" anchor="ctr"/>
+          <a:lstStyle/>
+          <a:p>
+            <a:pPr algn="ctr"/>
+            <a:r>
+              <a:rPr lang="en-US" sz="7200" b="1" dirty="0">
+                <a:solidFill>
+                  <a:srgbClr val="FFFFFF"/>
+                </a:solidFill>
+                <a:latin typeface="Lato Light"/>
+                <a:cs typeface="Lato Light"/>
+              </a:rPr>
+              <a:t>Datasets</a:t>
+            </a:r>
+          </a:p>
+        </p:txBody>
+      </p:sp>
+      <p:sp>
+        <p:nvSpPr>
+          <p:cNvPr id="16" name="Rectangle 11">
+            <a:extLst>
+              <a:ext uri="{FF2B5EF4-FFF2-40B4-BE49-F238E27FC236}">
+                <a16:creationId xmlns:a16="http://schemas.microsoft.com/office/drawing/2014/main" id="{EB0E2462-ABD5-874A-A109-24FE85DDAE13}"/>
+              </a:ext>
+            </a:extLst>
+          </p:cNvPr>
+          <p:cNvSpPr/>
+          <p:nvPr/>
+        </p:nvSpPr>
+        <p:spPr>
+          <a:xfrm>
+            <a:off x="919343" y="13237398"/>
             <a:ext cx="9901057" cy="2010535"/>
           </a:xfrm>
           <a:prstGeom prst="rect">
@@ -3600,17 +3660,17 @@
                 <a:latin typeface="Lato Light"/>
                 <a:cs typeface="Lato Light"/>
               </a:rPr>
-              <a:t>Datasets</a:t>
-            </a:r>
-          </a:p>
-        </p:txBody>
-      </p:sp>
-      <p:sp>
-        <p:nvSpPr>
-          <p:cNvPr id="16" name="Rectangle 11">
+              <a:t>Methodology</a:t>
+            </a:r>
+          </a:p>
+        </p:txBody>
+      </p:sp>
+      <p:sp>
+        <p:nvSpPr>
+          <p:cNvPr id="17" name="Rectangle 11">
             <a:extLst>
               <a:ext uri="{FF2B5EF4-FFF2-40B4-BE49-F238E27FC236}">
-                <a16:creationId xmlns:a16="http://schemas.microsoft.com/office/drawing/2014/main" id="{EB0E2462-ABD5-874A-A109-24FE85DDAE13}"/>
+                <a16:creationId xmlns:a16="http://schemas.microsoft.com/office/drawing/2014/main" id="{680317AF-DA48-FA43-98F8-57C8AB19B6D7}"/>
               </a:ext>
             </a:extLst>
           </p:cNvPr>
@@ -3619,7 +3679,7 @@
         </p:nvSpPr>
         <p:spPr>
           <a:xfrm>
-            <a:off x="919343" y="13846998"/>
+            <a:off x="16575259" y="13237398"/>
             <a:ext cx="9901057" cy="2010535"/>
           </a:xfrm>
           <a:prstGeom prst="rect">
@@ -3660,17 +3720,17 @@
                 <a:latin typeface="Lato Light"/>
                 <a:cs typeface="Lato Light"/>
               </a:rPr>
-              <a:t>Methodology</a:t>
-            </a:r>
-          </a:p>
-        </p:txBody>
-      </p:sp>
-      <p:sp>
-        <p:nvSpPr>
-          <p:cNvPr id="17" name="Rectangle 11">
+              <a:t>Outcome</a:t>
+            </a:r>
+          </a:p>
+        </p:txBody>
+      </p:sp>
+      <p:sp>
+        <p:nvSpPr>
+          <p:cNvPr id="18" name="Rectangle 11">
             <a:extLst>
               <a:ext uri="{FF2B5EF4-FFF2-40B4-BE49-F238E27FC236}">
-                <a16:creationId xmlns:a16="http://schemas.microsoft.com/office/drawing/2014/main" id="{680317AF-DA48-FA43-98F8-57C8AB19B6D7}"/>
+                <a16:creationId xmlns:a16="http://schemas.microsoft.com/office/drawing/2014/main" id="{E0078958-4A97-0C40-9233-EB4C3A568278}"/>
               </a:ext>
             </a:extLst>
           </p:cNvPr>
@@ -3679,7 +3739,7 @@
         </p:nvSpPr>
         <p:spPr>
           <a:xfrm>
-            <a:off x="16575259" y="13846998"/>
+            <a:off x="31528722" y="13237398"/>
             <a:ext cx="9901057" cy="2010535"/>
           </a:xfrm>
           <a:prstGeom prst="rect">
@@ -3720,66 +3780,6 @@
                 <a:latin typeface="Lato Light"/>
                 <a:cs typeface="Lato Light"/>
               </a:rPr>
-              <a:t>Outcome</a:t>
-            </a:r>
-          </a:p>
-        </p:txBody>
-      </p:sp>
-      <p:sp>
-        <p:nvSpPr>
-          <p:cNvPr id="18" name="Rectangle 11">
-            <a:extLst>
-              <a:ext uri="{FF2B5EF4-FFF2-40B4-BE49-F238E27FC236}">
-                <a16:creationId xmlns:a16="http://schemas.microsoft.com/office/drawing/2014/main" id="{E0078958-4A97-0C40-9233-EB4C3A568278}"/>
-              </a:ext>
-            </a:extLst>
-          </p:cNvPr>
-          <p:cNvSpPr/>
-          <p:nvPr/>
-        </p:nvSpPr>
-        <p:spPr>
-          <a:xfrm>
-            <a:off x="31528722" y="13846998"/>
-            <a:ext cx="9901057" cy="2010535"/>
-          </a:xfrm>
-          <a:prstGeom prst="rect">
-            <a:avLst/>
-          </a:prstGeom>
-          <a:solidFill>
-            <a:srgbClr val="0170AD"/>
-          </a:solidFill>
-          <a:ln>
-            <a:noFill/>
-          </a:ln>
-          <a:effectLst/>
-        </p:spPr>
-        <p:style>
-          <a:lnRef idx="1">
-            <a:schemeClr val="accent1"/>
-          </a:lnRef>
-          <a:fillRef idx="3">
-            <a:schemeClr val="accent1"/>
-          </a:fillRef>
-          <a:effectRef idx="2">
-            <a:schemeClr val="accent1"/>
-          </a:effectRef>
-          <a:fontRef idx="minor">
-            <a:schemeClr val="lt1"/>
-          </a:fontRef>
-        </p:style>
-        <p:txBody>
-          <a:bodyPr lIns="243852" tIns="121926" rIns="243852" bIns="121926" rtlCol="0" anchor="ctr"/>
-          <a:lstStyle/>
-          <a:p>
-            <a:pPr algn="ctr"/>
-            <a:r>
-              <a:rPr lang="en-US" sz="7200" b="1" dirty="0">
-                <a:solidFill>
-                  <a:srgbClr val="FFFFFF"/>
-                </a:solidFill>
-                <a:latin typeface="Lato Light"/>
-                <a:cs typeface="Lato Light"/>
-              </a:rPr>
               <a:t>Learnings</a:t>
             </a:r>
           </a:p>
@@ -3842,6 +3842,12 @@
           </a:lstStyle>
           <a:p>
             <a:pPr lvl="0" algn="just">
+              <a:lnSpc>
+                <a:spcPct val="100000"/>
+              </a:lnSpc>
+              <a:spcBef>
+                <a:spcPts val="0"/>
+              </a:spcBef>
               <a:defRPr sz="1800">
                 <a:solidFill>
                   <a:srgbClr val="000000"/>
@@ -3857,7 +3863,7 @@
                 <a:ea typeface="Lato Light"/>
                 <a:cs typeface="Lato Light"/>
               </a:rPr>
-              <a:t>We want to compare the performance of the Inception v3 architecture to performance of the </a:t>
+              <a:t>We want to compare the performance of the Inception v3 architecture to the performance of the </a:t>
             </a:r>
             <a:r>
               <a:rPr lang="en-US" sz="2400" b="1" dirty="0" err="1">
@@ -3879,7 +3885,7 @@
                 <a:ea typeface="Lato Light"/>
                 <a:cs typeface="Lato Light"/>
               </a:rPr>
-              <a:t> performance. As Francois </a:t>
+              <a:t> architecture. As Francois </a:t>
             </a:r>
             <a:r>
               <a:rPr lang="en-US" sz="2400" b="1" dirty="0" err="1">
@@ -3986,7 +3992,7 @@
         </p:nvSpPr>
         <p:spPr>
           <a:xfrm>
-            <a:off x="16575259" y="5456784"/>
+            <a:off x="11624730" y="5456784"/>
             <a:ext cx="9901058" cy="6352488"/>
           </a:xfrm>
           <a:prstGeom prst="rect">
@@ -4029,6 +4035,12 @@
           </a:lstStyle>
           <a:p>
             <a:pPr lvl="0" algn="just">
+              <a:lnSpc>
+                <a:spcPct val="100000"/>
+              </a:lnSpc>
+              <a:spcBef>
+                <a:spcPts val="0"/>
+              </a:spcBef>
               <a:defRPr sz="1800">
                 <a:solidFill>
                   <a:srgbClr val="000000"/>
@@ -4110,7 +4122,7 @@
                 <a:ea typeface="Lato Light"/>
                 <a:cs typeface="Lato Light"/>
               </a:rPr>
-              <a:t> and Inception v3 architectures. We didn’t find any later examples on the internet of people using </a:t>
+              <a:t> and Inception v3 architectures. We didn’t find any later examples on the internet of people using the </a:t>
             </a:r>
             <a:r>
               <a:rPr lang="en-US" sz="2400" b="1" dirty="0" err="1">
@@ -4137,6 +4149,9 @@
           </a:p>
           <a:p>
             <a:pPr lvl="0" algn="just">
+              <a:lnSpc>
+                <a:spcPct val="100000"/>
+              </a:lnSpc>
               <a:defRPr sz="1800">
                 <a:solidFill>
                   <a:srgbClr val="000000"/>
@@ -4152,7 +4167,1034 @@
                 <a:ea typeface="Lato Light"/>
                 <a:cs typeface="Lato Light"/>
               </a:rPr>
-              <a:t>Researchers from the University of Chicago have already written a paper on how to write very convincing fake reviews for restaurants using RNN. In their method, they used specific metadata about the restaurant like the name of their dishes to produce the fake review. With our approach, we want to use the generated multiple labels from our CNN to write these reviews. In this way, we hope we can use image data about the restaurant to make the fake reviews even more convincing.</a:t>
+              <a:t>Researchers from the University of Chicago have already written a paper on how to write very convincing fake reviews for restaurants using RNNs. In their method, they used specific metadata about the restaurant like the name of their dishes to produce the fake review. With our approach, we want to use the generated multiple labels from our CNN to write these reviews. In this way, we hope we can use image data about the restaurant to make the fake reviews even more convincing.</a:t>
+            </a:r>
+          </a:p>
+        </p:txBody>
+      </p:sp>
+      <p:sp>
+        <p:nvSpPr>
+          <p:cNvPr id="19" name="Shape 188">
+            <a:extLst>
+              <a:ext uri="{FF2B5EF4-FFF2-40B4-BE49-F238E27FC236}">
+                <a16:creationId xmlns:a16="http://schemas.microsoft.com/office/drawing/2014/main" id="{8E0224FA-7916-2C4C-9512-133BC4A692B1}"/>
+              </a:ext>
+            </a:extLst>
+          </p:cNvPr>
+          <p:cNvSpPr/>
+          <p:nvPr/>
+        </p:nvSpPr>
+        <p:spPr>
+          <a:xfrm>
+            <a:off x="22353352" y="5456784"/>
+            <a:ext cx="9901058" cy="4462133"/>
+          </a:xfrm>
+          <a:prstGeom prst="rect">
+            <a:avLst/>
+          </a:prstGeom>
+          <a:noFill/>
+          <a:ln w="12700" cap="flat">
+            <a:noFill/>
+            <a:miter lim="400000"/>
+          </a:ln>
+          <a:effectLst/>
+          <a:extLst>
+            <a:ext uri="{C572A759-6A51-4108-AA02-DFA0A04FC94B}">
+              <ma14:wrappingTextBoxFlag xmlns:ma14="http://schemas.microsoft.com/office/mac/drawingml/2011/main" xmlns="" val="1"/>
+            </a:ext>
+          </a:extLst>
+        </p:spPr>
+        <p:txBody>
+          <a:bodyPr wrap="square" lIns="0" tIns="0" rIns="0" bIns="0" numCol="1" anchor="t">
+            <a:noAutofit/>
+          </a:bodyPr>
+          <a:lstStyle>
+            <a:lvl1pPr algn="l" defTabSz="584200">
+              <a:lnSpc>
+                <a:spcPct val="110000"/>
+              </a:lnSpc>
+              <a:spcBef>
+                <a:spcPts val="3000"/>
+              </a:spcBef>
+              <a:defRPr sz="2000">
+                <a:solidFill>
+                  <a:srgbClr val="4C4C4C"/>
+                </a:solidFill>
+                <a:latin typeface="Helvetica Neue Light"/>
+                <a:ea typeface="Helvetica Neue Light"/>
+                <a:cs typeface="Helvetica Neue Light"/>
+                <a:sym typeface="Helvetica Neue Light"/>
+              </a:defRPr>
+            </a:lvl1pPr>
+          </a:lstStyle>
+          <a:p>
+            <a:pPr lvl="0" algn="just">
+              <a:lnSpc>
+                <a:spcPct val="100000"/>
+              </a:lnSpc>
+              <a:defRPr sz="1800">
+                <a:solidFill>
+                  <a:srgbClr val="000000"/>
+                </a:solidFill>
+              </a:defRPr>
+            </a:pPr>
+            <a:r>
+              <a:rPr lang="en-US" sz="2400" b="1" dirty="0">
+                <a:solidFill>
+                  <a:srgbClr val="0170AD"/>
+                </a:solidFill>
+                <a:latin typeface="Lato Light"/>
+                <a:ea typeface="Lato Light"/>
+                <a:cs typeface="Lato Light"/>
+              </a:rPr>
+              <a:t>Yelp Restaurant Photos</a:t>
+            </a:r>
+          </a:p>
+          <a:p>
+            <a:pPr marL="342900" lvl="0" indent="-342900" algn="just">
+              <a:lnSpc>
+                <a:spcPct val="100000"/>
+              </a:lnSpc>
+              <a:spcBef>
+                <a:spcPts val="0"/>
+              </a:spcBef>
+              <a:buFont typeface="Arial" panose="020B0604020202020204" pitchFamily="34" charset="0"/>
+              <a:buChar char="•"/>
+              <a:defRPr sz="1800">
+                <a:solidFill>
+                  <a:srgbClr val="000000"/>
+                </a:solidFill>
+              </a:defRPr>
+            </a:pPr>
+            <a:r>
+              <a:rPr lang="en-US" sz="2400" b="1" dirty="0">
+                <a:solidFill>
+                  <a:srgbClr val="0170AD"/>
+                </a:solidFill>
+                <a:latin typeface="Lato Light"/>
+                <a:ea typeface="Lato Light"/>
+                <a:cs typeface="Lato Light"/>
+              </a:rPr>
+              <a:t>~235k images of 2000 different restaurants</a:t>
+            </a:r>
+          </a:p>
+          <a:p>
+            <a:pPr marL="342900" lvl="0" indent="-342900" algn="just">
+              <a:lnSpc>
+                <a:spcPct val="100000"/>
+              </a:lnSpc>
+              <a:spcBef>
+                <a:spcPts val="0"/>
+              </a:spcBef>
+              <a:buFont typeface="Arial" panose="020B0604020202020204" pitchFamily="34" charset="0"/>
+              <a:buChar char="•"/>
+              <a:defRPr sz="1800">
+                <a:solidFill>
+                  <a:srgbClr val="000000"/>
+                </a:solidFill>
+              </a:defRPr>
+            </a:pPr>
+            <a:r>
+              <a:rPr lang="en-US" sz="2400" b="1" dirty="0">
+                <a:solidFill>
+                  <a:srgbClr val="0170AD"/>
+                </a:solidFill>
+                <a:latin typeface="Lato Light"/>
+                <a:ea typeface="Lato Light"/>
+                <a:cs typeface="Lato Light"/>
+              </a:rPr>
+              <a:t>Average pics per restaurant  ~ 117,5; Range from 1 to 3000</a:t>
+            </a:r>
+          </a:p>
+          <a:p>
+            <a:pPr marL="342900" lvl="0" indent="-342900" algn="just">
+              <a:lnSpc>
+                <a:spcPct val="100000"/>
+              </a:lnSpc>
+              <a:spcBef>
+                <a:spcPts val="0"/>
+              </a:spcBef>
+              <a:buFont typeface="Arial" panose="020B0604020202020204" pitchFamily="34" charset="0"/>
+              <a:buChar char="•"/>
+              <a:defRPr sz="1800">
+                <a:solidFill>
+                  <a:srgbClr val="000000"/>
+                </a:solidFill>
+              </a:defRPr>
+            </a:pPr>
+            <a:r>
+              <a:rPr lang="en-US" sz="2400" b="1" dirty="0">
+                <a:solidFill>
+                  <a:srgbClr val="0170AD"/>
+                </a:solidFill>
+                <a:latin typeface="Lato Light"/>
+                <a:ea typeface="Lato Light"/>
+                <a:cs typeface="Lato Light"/>
+              </a:rPr>
+              <a:t>Multi-label classification problem with 9 different labels</a:t>
+            </a:r>
+          </a:p>
+          <a:p>
+            <a:pPr marL="342900" lvl="0" indent="-342900" algn="just">
+              <a:lnSpc>
+                <a:spcPct val="100000"/>
+              </a:lnSpc>
+              <a:spcBef>
+                <a:spcPts val="0"/>
+              </a:spcBef>
+              <a:buFont typeface="Arial" panose="020B0604020202020204" pitchFamily="34" charset="0"/>
+              <a:buChar char="•"/>
+              <a:defRPr sz="1800">
+                <a:solidFill>
+                  <a:srgbClr val="000000"/>
+                </a:solidFill>
+              </a:defRPr>
+            </a:pPr>
+            <a:r>
+              <a:rPr lang="en-US" sz="2400" b="1" dirty="0">
+                <a:solidFill>
+                  <a:srgbClr val="0170AD"/>
+                </a:solidFill>
+                <a:latin typeface="Lato Light"/>
+                <a:ea typeface="Lato Light"/>
+                <a:cs typeface="Lato Light"/>
+              </a:rPr>
+              <a:t>0: good for lunch; 1: good for dinner; 2: takes reservations; 3: outdoor seating; 4: is expensive; 5: has alcohol; 6: has table service; 7: ambience is classy; 8: good for kids</a:t>
+            </a:r>
+          </a:p>
+          <a:p>
+            <a:pPr marL="342900" lvl="0" indent="-342900" algn="just">
+              <a:lnSpc>
+                <a:spcPct val="100000"/>
+              </a:lnSpc>
+              <a:spcBef>
+                <a:spcPts val="0"/>
+              </a:spcBef>
+              <a:buFont typeface="Arial" panose="020B0604020202020204" pitchFamily="34" charset="0"/>
+              <a:buChar char="•"/>
+              <a:defRPr sz="1800">
+                <a:solidFill>
+                  <a:srgbClr val="000000"/>
+                </a:solidFill>
+              </a:defRPr>
+            </a:pPr>
+            <a:endParaRPr lang="en-US" sz="2400" b="1" dirty="0">
+              <a:solidFill>
+                <a:srgbClr val="0170AD"/>
+              </a:solidFill>
+              <a:latin typeface="Lato Light"/>
+              <a:ea typeface="Lato Light"/>
+              <a:cs typeface="Lato Light"/>
+            </a:endParaRPr>
+          </a:p>
+          <a:p>
+            <a:pPr lvl="0" algn="just">
+              <a:lnSpc>
+                <a:spcPct val="100000"/>
+              </a:lnSpc>
+              <a:spcBef>
+                <a:spcPts val="0"/>
+              </a:spcBef>
+              <a:defRPr sz="1800">
+                <a:solidFill>
+                  <a:srgbClr val="000000"/>
+                </a:solidFill>
+              </a:defRPr>
+            </a:pPr>
+            <a:r>
+              <a:rPr lang="en-US" sz="2400" b="1" dirty="0">
+                <a:solidFill>
+                  <a:srgbClr val="0170AD"/>
+                </a:solidFill>
+                <a:latin typeface="Lato Light"/>
+                <a:ea typeface="Lato Light"/>
+                <a:cs typeface="Lato Light"/>
+              </a:rPr>
+              <a:t>Yelp Reviews</a:t>
+            </a:r>
+          </a:p>
+          <a:p>
+            <a:pPr marL="342900" lvl="0" indent="-342900" algn="just">
+              <a:lnSpc>
+                <a:spcPct val="100000"/>
+              </a:lnSpc>
+              <a:spcBef>
+                <a:spcPts val="0"/>
+              </a:spcBef>
+              <a:buFont typeface="Arial" panose="020B0604020202020204" pitchFamily="34" charset="0"/>
+              <a:buChar char="•"/>
+              <a:defRPr sz="1800">
+                <a:solidFill>
+                  <a:srgbClr val="000000"/>
+                </a:solidFill>
+              </a:defRPr>
+            </a:pPr>
+            <a:r>
+              <a:rPr lang="en-US" sz="2400" b="1" dirty="0">
+                <a:solidFill>
+                  <a:srgbClr val="0170AD"/>
+                </a:solidFill>
+                <a:latin typeface="Lato Light"/>
+                <a:ea typeface="Lato Light"/>
+                <a:cs typeface="Lato Light"/>
+              </a:rPr>
+              <a:t>2.225k reviews for 77.5k businesses written by 500k different users</a:t>
+            </a:r>
+          </a:p>
+          <a:p>
+            <a:pPr marL="342900" lvl="0" indent="-342900" algn="just">
+              <a:lnSpc>
+                <a:spcPct val="100000"/>
+              </a:lnSpc>
+              <a:spcBef>
+                <a:spcPts val="0"/>
+              </a:spcBef>
+              <a:buFont typeface="Arial" panose="020B0604020202020204" pitchFamily="34" charset="0"/>
+              <a:buChar char="•"/>
+              <a:defRPr sz="1800">
+                <a:solidFill>
+                  <a:srgbClr val="000000"/>
+                </a:solidFill>
+              </a:defRPr>
+            </a:pPr>
+            <a:r>
+              <a:rPr lang="en-US" sz="2400" b="1" dirty="0">
+                <a:solidFill>
+                  <a:srgbClr val="0170AD"/>
+                </a:solidFill>
+                <a:latin typeface="Lato Light"/>
+                <a:ea typeface="Lato Light"/>
+                <a:cs typeface="Lato Light"/>
+              </a:rPr>
+              <a:t>Several different languages</a:t>
+            </a:r>
+          </a:p>
+          <a:p>
+            <a:pPr lvl="0" algn="just">
+              <a:lnSpc>
+                <a:spcPct val="100000"/>
+              </a:lnSpc>
+              <a:spcBef>
+                <a:spcPts val="0"/>
+              </a:spcBef>
+              <a:defRPr sz="1800">
+                <a:solidFill>
+                  <a:srgbClr val="000000"/>
+                </a:solidFill>
+              </a:defRPr>
+            </a:pPr>
+            <a:endParaRPr lang="en-US" sz="2400" b="1" dirty="0">
+              <a:solidFill>
+                <a:srgbClr val="0170AD"/>
+              </a:solidFill>
+              <a:latin typeface="Lato Light"/>
+              <a:ea typeface="Lato Light"/>
+              <a:cs typeface="Lato Light"/>
+            </a:endParaRPr>
+          </a:p>
+        </p:txBody>
+      </p:sp>
+      <p:pic>
+        <p:nvPicPr>
+          <p:cNvPr id="7" name="Grafik 6">
+            <a:extLst>
+              <a:ext uri="{FF2B5EF4-FFF2-40B4-BE49-F238E27FC236}">
+                <a16:creationId xmlns:a16="http://schemas.microsoft.com/office/drawing/2014/main" id="{FA491ECD-CAA5-414B-9469-EBBD02424E0C}"/>
+              </a:ext>
+            </a:extLst>
+          </p:cNvPr>
+          <p:cNvPicPr>
+            <a:picLocks noChangeAspect="1"/>
+          </p:cNvPicPr>
+          <p:nvPr/>
+        </p:nvPicPr>
+        <p:blipFill>
+          <a:blip r:embed="rId3">
+            <a:extLst>
+              <a:ext uri="{28A0092B-C50C-407E-A947-70E740481C1C}">
+                <a14:useLocalDpi xmlns:a14="http://schemas.microsoft.com/office/drawing/2010/main" val="0"/>
+              </a:ext>
+            </a:extLst>
+          </a:blip>
+          <a:stretch>
+            <a:fillRect/>
+          </a:stretch>
+        </p:blipFill>
+        <p:spPr>
+          <a:xfrm>
+            <a:off x="38912753" y="2738686"/>
+            <a:ext cx="3175000" cy="2374900"/>
+          </a:xfrm>
+          <a:prstGeom prst="rect">
+            <a:avLst/>
+          </a:prstGeom>
+        </p:spPr>
+      </p:pic>
+      <p:pic>
+        <p:nvPicPr>
+          <p:cNvPr id="11" name="Grafik 10">
+            <a:extLst>
+              <a:ext uri="{FF2B5EF4-FFF2-40B4-BE49-F238E27FC236}">
+                <a16:creationId xmlns:a16="http://schemas.microsoft.com/office/drawing/2014/main" id="{34728E59-1FB1-9045-8256-441CCD51C19A}"/>
+              </a:ext>
+            </a:extLst>
+          </p:cNvPr>
+          <p:cNvPicPr>
+            <a:picLocks noChangeAspect="1"/>
+          </p:cNvPicPr>
+          <p:nvPr/>
+        </p:nvPicPr>
+        <p:blipFill>
+          <a:blip r:embed="rId4">
+            <a:extLst>
+              <a:ext uri="{28A0092B-C50C-407E-A947-70E740481C1C}">
+                <a14:useLocalDpi xmlns:a14="http://schemas.microsoft.com/office/drawing/2010/main" val="0"/>
+              </a:ext>
+            </a:extLst>
+          </a:blip>
+          <a:stretch>
+            <a:fillRect/>
+          </a:stretch>
+        </p:blipFill>
+        <p:spPr>
+          <a:xfrm>
+            <a:off x="35076280" y="5848267"/>
+            <a:ext cx="3175000" cy="2286000"/>
+          </a:xfrm>
+          <a:prstGeom prst="rect">
+            <a:avLst/>
+          </a:prstGeom>
+        </p:spPr>
+      </p:pic>
+      <p:pic>
+        <p:nvPicPr>
+          <p:cNvPr id="23" name="Grafik 22">
+            <a:extLst>
+              <a:ext uri="{FF2B5EF4-FFF2-40B4-BE49-F238E27FC236}">
+                <a16:creationId xmlns:a16="http://schemas.microsoft.com/office/drawing/2014/main" id="{C4854C0F-608A-C84B-95F8-2A96CF060A3B}"/>
+              </a:ext>
+            </a:extLst>
+          </p:cNvPr>
+          <p:cNvPicPr>
+            <a:picLocks noChangeAspect="1"/>
+          </p:cNvPicPr>
+          <p:nvPr/>
+        </p:nvPicPr>
+        <p:blipFill>
+          <a:blip r:embed="rId5">
+            <a:extLst>
+              <a:ext uri="{28A0092B-C50C-407E-A947-70E740481C1C}">
+                <a14:useLocalDpi xmlns:a14="http://schemas.microsoft.com/office/drawing/2010/main" val="0"/>
+              </a:ext>
+            </a:extLst>
+          </a:blip>
+          <a:stretch>
+            <a:fillRect/>
+          </a:stretch>
+        </p:blipFill>
+        <p:spPr>
+          <a:xfrm>
+            <a:off x="38912753" y="5759367"/>
+            <a:ext cx="3175000" cy="2374900"/>
+          </a:xfrm>
+          <a:prstGeom prst="rect">
+            <a:avLst/>
+          </a:prstGeom>
+        </p:spPr>
+      </p:pic>
+      <p:pic>
+        <p:nvPicPr>
+          <p:cNvPr id="25" name="Grafik 24">
+            <a:extLst>
+              <a:ext uri="{FF2B5EF4-FFF2-40B4-BE49-F238E27FC236}">
+                <a16:creationId xmlns:a16="http://schemas.microsoft.com/office/drawing/2014/main" id="{440B2301-0954-974B-876B-BA6AFC9AEA55}"/>
+              </a:ext>
+            </a:extLst>
+          </p:cNvPr>
+          <p:cNvPicPr>
+            <a:picLocks noChangeAspect="1"/>
+          </p:cNvPicPr>
+          <p:nvPr/>
+        </p:nvPicPr>
+        <p:blipFill>
+          <a:blip r:embed="rId6">
+            <a:extLst>
+              <a:ext uri="{28A0092B-C50C-407E-A947-70E740481C1C}">
+                <a14:useLocalDpi xmlns:a14="http://schemas.microsoft.com/office/drawing/2010/main" val="0"/>
+              </a:ext>
+            </a:extLst>
+          </a:blip>
+          <a:stretch>
+            <a:fillRect/>
+          </a:stretch>
+        </p:blipFill>
+        <p:spPr>
+          <a:xfrm>
+            <a:off x="35501730" y="2518576"/>
+            <a:ext cx="2324100" cy="3175000"/>
+          </a:xfrm>
+          <a:prstGeom prst="rect">
+            <a:avLst/>
+          </a:prstGeom>
+        </p:spPr>
+      </p:pic>
+      <p:sp>
+        <p:nvSpPr>
+          <p:cNvPr id="26" name="Shape 188">
+            <a:extLst>
+              <a:ext uri="{FF2B5EF4-FFF2-40B4-BE49-F238E27FC236}">
+                <a16:creationId xmlns:a16="http://schemas.microsoft.com/office/drawing/2014/main" id="{E4233908-0CCE-EA43-BDAC-517FA70DBE68}"/>
+              </a:ext>
+            </a:extLst>
+          </p:cNvPr>
+          <p:cNvSpPr/>
+          <p:nvPr/>
+        </p:nvSpPr>
+        <p:spPr>
+          <a:xfrm>
+            <a:off x="35501730" y="8408984"/>
+            <a:ext cx="6353500" cy="525073"/>
+          </a:xfrm>
+          <a:prstGeom prst="rect">
+            <a:avLst/>
+          </a:prstGeom>
+          <a:noFill/>
+          <a:ln w="12700" cap="flat">
+            <a:noFill/>
+            <a:miter lim="400000"/>
+          </a:ln>
+          <a:effectLst/>
+          <a:extLst>
+            <a:ext uri="{C572A759-6A51-4108-AA02-DFA0A04FC94B}">
+              <ma14:wrappingTextBoxFlag xmlns:ma14="http://schemas.microsoft.com/office/mac/drawingml/2011/main" xmlns="" val="1"/>
+            </a:ext>
+          </a:extLst>
+        </p:spPr>
+        <p:txBody>
+          <a:bodyPr wrap="square" lIns="0" tIns="0" rIns="0" bIns="0" numCol="1" anchor="t">
+            <a:noAutofit/>
+          </a:bodyPr>
+          <a:lstStyle>
+            <a:lvl1pPr algn="l" defTabSz="584200">
+              <a:lnSpc>
+                <a:spcPct val="110000"/>
+              </a:lnSpc>
+              <a:spcBef>
+                <a:spcPts val="3000"/>
+              </a:spcBef>
+              <a:defRPr sz="2000">
+                <a:solidFill>
+                  <a:srgbClr val="4C4C4C"/>
+                </a:solidFill>
+                <a:latin typeface="Helvetica Neue Light"/>
+                <a:ea typeface="Helvetica Neue Light"/>
+                <a:cs typeface="Helvetica Neue Light"/>
+                <a:sym typeface="Helvetica Neue Light"/>
+              </a:defRPr>
+            </a:lvl1pPr>
+          </a:lstStyle>
+          <a:p>
+            <a:pPr lvl="0" algn="ctr">
+              <a:lnSpc>
+                <a:spcPct val="100000"/>
+              </a:lnSpc>
+              <a:defRPr sz="1800">
+                <a:solidFill>
+                  <a:srgbClr val="000000"/>
+                </a:solidFill>
+              </a:defRPr>
+            </a:pPr>
+            <a:r>
+              <a:rPr lang="en-US" sz="2400" b="1" dirty="0">
+                <a:solidFill>
+                  <a:srgbClr val="0170AD"/>
+                </a:solidFill>
+                <a:latin typeface="Lato Light"/>
+                <a:ea typeface="Lato Light"/>
+                <a:cs typeface="Lato Light"/>
+              </a:rPr>
+              <a:t>Business ID: 1001 Labels: 0 1 6 8</a:t>
+            </a:r>
+          </a:p>
+        </p:txBody>
+      </p:sp>
+      <p:pic>
+        <p:nvPicPr>
+          <p:cNvPr id="28" name="Grafik 27">
+            <a:extLst>
+              <a:ext uri="{FF2B5EF4-FFF2-40B4-BE49-F238E27FC236}">
+                <a16:creationId xmlns:a16="http://schemas.microsoft.com/office/drawing/2014/main" id="{255E3A66-594E-554E-8716-DA267F5EAA5D}"/>
+              </a:ext>
+            </a:extLst>
+          </p:cNvPr>
+          <p:cNvPicPr>
+            <a:picLocks noChangeAspect="1"/>
+          </p:cNvPicPr>
+          <p:nvPr/>
+        </p:nvPicPr>
+        <p:blipFill>
+          <a:blip r:embed="rId7">
+            <a:extLst>
+              <a:ext uri="{28A0092B-C50C-407E-A947-70E740481C1C}">
+                <a14:useLocalDpi xmlns:a14="http://schemas.microsoft.com/office/drawing/2010/main" val="0"/>
+              </a:ext>
+            </a:extLst>
+          </a:blip>
+          <a:stretch>
+            <a:fillRect/>
+          </a:stretch>
+        </p:blipFill>
+        <p:spPr>
+          <a:xfrm>
+            <a:off x="36238330" y="9131788"/>
+            <a:ext cx="3175000" cy="3175000"/>
+          </a:xfrm>
+          <a:prstGeom prst="rect">
+            <a:avLst/>
+          </a:prstGeom>
+        </p:spPr>
+      </p:pic>
+      <p:pic>
+        <p:nvPicPr>
+          <p:cNvPr id="30" name="Grafik 29">
+            <a:extLst>
+              <a:ext uri="{FF2B5EF4-FFF2-40B4-BE49-F238E27FC236}">
+                <a16:creationId xmlns:a16="http://schemas.microsoft.com/office/drawing/2014/main" id="{7F8214CE-83CB-4A4E-9D61-D6D8B656866E}"/>
+              </a:ext>
+            </a:extLst>
+          </p:cNvPr>
+          <p:cNvPicPr>
+            <a:picLocks noChangeAspect="1"/>
+          </p:cNvPicPr>
+          <p:nvPr/>
+        </p:nvPicPr>
+        <p:blipFill>
+          <a:blip r:embed="rId8">
+            <a:extLst>
+              <a:ext uri="{28A0092B-C50C-407E-A947-70E740481C1C}">
+                <a14:useLocalDpi xmlns:a14="http://schemas.microsoft.com/office/drawing/2010/main" val="0"/>
+              </a:ext>
+            </a:extLst>
+          </a:blip>
+          <a:stretch>
+            <a:fillRect/>
+          </a:stretch>
+        </p:blipFill>
+        <p:spPr>
+          <a:xfrm>
+            <a:off x="39712853" y="9131788"/>
+            <a:ext cx="2374900" cy="3175000"/>
+          </a:xfrm>
+          <a:prstGeom prst="rect">
+            <a:avLst/>
+          </a:prstGeom>
+        </p:spPr>
+      </p:pic>
+      <p:pic>
+        <p:nvPicPr>
+          <p:cNvPr id="32" name="Grafik 31">
+            <a:extLst>
+              <a:ext uri="{FF2B5EF4-FFF2-40B4-BE49-F238E27FC236}">
+                <a16:creationId xmlns:a16="http://schemas.microsoft.com/office/drawing/2014/main" id="{C5B661F8-84DA-6A41-AA1A-A8F7075F75EE}"/>
+              </a:ext>
+            </a:extLst>
+          </p:cNvPr>
+          <p:cNvPicPr>
+            <a:picLocks noChangeAspect="1"/>
+          </p:cNvPicPr>
+          <p:nvPr/>
+        </p:nvPicPr>
+        <p:blipFill>
+          <a:blip r:embed="rId9">
+            <a:extLst>
+              <a:ext uri="{28A0092B-C50C-407E-A947-70E740481C1C}">
+                <a14:useLocalDpi xmlns:a14="http://schemas.microsoft.com/office/drawing/2010/main" val="0"/>
+              </a:ext>
+            </a:extLst>
+          </a:blip>
+          <a:stretch>
+            <a:fillRect/>
+          </a:stretch>
+        </p:blipFill>
+        <p:spPr>
+          <a:xfrm>
+            <a:off x="33563907" y="9131788"/>
+            <a:ext cx="2374900" cy="3175000"/>
+          </a:xfrm>
+          <a:prstGeom prst="rect">
+            <a:avLst/>
+          </a:prstGeom>
+        </p:spPr>
+      </p:pic>
+      <p:sp>
+        <p:nvSpPr>
+          <p:cNvPr id="33" name="Shape 188">
+            <a:extLst>
+              <a:ext uri="{FF2B5EF4-FFF2-40B4-BE49-F238E27FC236}">
+                <a16:creationId xmlns:a16="http://schemas.microsoft.com/office/drawing/2014/main" id="{EDF06DD5-9FD2-5940-818E-D1093E04983D}"/>
+              </a:ext>
+            </a:extLst>
+          </p:cNvPr>
+          <p:cNvSpPr/>
+          <p:nvPr/>
+        </p:nvSpPr>
+        <p:spPr>
+          <a:xfrm>
+            <a:off x="35076280" y="12581505"/>
+            <a:ext cx="6353500" cy="525073"/>
+          </a:xfrm>
+          <a:prstGeom prst="rect">
+            <a:avLst/>
+          </a:prstGeom>
+          <a:noFill/>
+          <a:ln w="12700" cap="flat">
+            <a:noFill/>
+            <a:miter lim="400000"/>
+          </a:ln>
+          <a:effectLst/>
+          <a:extLst>
+            <a:ext uri="{C572A759-6A51-4108-AA02-DFA0A04FC94B}">
+              <ma14:wrappingTextBoxFlag xmlns:ma14="http://schemas.microsoft.com/office/mac/drawingml/2011/main" xmlns="" val="1"/>
+            </a:ext>
+          </a:extLst>
+        </p:spPr>
+        <p:txBody>
+          <a:bodyPr wrap="square" lIns="0" tIns="0" rIns="0" bIns="0" numCol="1" anchor="t">
+            <a:noAutofit/>
+          </a:bodyPr>
+          <a:lstStyle>
+            <a:lvl1pPr algn="l" defTabSz="584200">
+              <a:lnSpc>
+                <a:spcPct val="110000"/>
+              </a:lnSpc>
+              <a:spcBef>
+                <a:spcPts val="3000"/>
+              </a:spcBef>
+              <a:defRPr sz="2000">
+                <a:solidFill>
+                  <a:srgbClr val="4C4C4C"/>
+                </a:solidFill>
+                <a:latin typeface="Helvetica Neue Light"/>
+                <a:ea typeface="Helvetica Neue Light"/>
+                <a:cs typeface="Helvetica Neue Light"/>
+                <a:sym typeface="Helvetica Neue Light"/>
+              </a:defRPr>
+            </a:lvl1pPr>
+          </a:lstStyle>
+          <a:p>
+            <a:pPr lvl="0" algn="ctr">
+              <a:lnSpc>
+                <a:spcPct val="100000"/>
+              </a:lnSpc>
+              <a:defRPr sz="1800">
+                <a:solidFill>
+                  <a:srgbClr val="000000"/>
+                </a:solidFill>
+              </a:defRPr>
+            </a:pPr>
+            <a:r>
+              <a:rPr lang="en-US" sz="2400" b="1" dirty="0">
+                <a:solidFill>
+                  <a:srgbClr val="0170AD"/>
+                </a:solidFill>
+                <a:latin typeface="Lato Light"/>
+                <a:ea typeface="Lato Light"/>
+                <a:cs typeface="Lato Light"/>
+              </a:rPr>
+              <a:t>Business ID: 1000 Labels: 1 2 3 4 5 6 7</a:t>
+            </a:r>
+          </a:p>
+        </p:txBody>
+      </p:sp>
+      <p:sp>
+        <p:nvSpPr>
+          <p:cNvPr id="35" name="Shape 188">
+            <a:extLst>
+              <a:ext uri="{FF2B5EF4-FFF2-40B4-BE49-F238E27FC236}">
+                <a16:creationId xmlns:a16="http://schemas.microsoft.com/office/drawing/2014/main" id="{57E391D6-1F9B-E94E-A224-0D597E2FCEB5}"/>
+              </a:ext>
+            </a:extLst>
+          </p:cNvPr>
+          <p:cNvSpPr/>
+          <p:nvPr/>
+        </p:nvSpPr>
+        <p:spPr>
+          <a:xfrm>
+            <a:off x="22360408" y="11323182"/>
+            <a:ext cx="9175370" cy="1541286"/>
+          </a:xfrm>
+          <a:prstGeom prst="rect">
+            <a:avLst/>
+          </a:prstGeom>
+          <a:noFill/>
+          <a:ln w="12700" cap="flat">
+            <a:noFill/>
+            <a:miter lim="400000"/>
+          </a:ln>
+          <a:effectLst/>
+          <a:extLst>
+            <a:ext uri="{C572A759-6A51-4108-AA02-DFA0A04FC94B}">
+              <ma14:wrappingTextBoxFlag xmlns:ma14="http://schemas.microsoft.com/office/mac/drawingml/2011/main" xmlns="" val="1"/>
+            </a:ext>
+          </a:extLst>
+        </p:spPr>
+        <p:txBody>
+          <a:bodyPr wrap="square" lIns="0" tIns="0" rIns="0" bIns="0" numCol="1" anchor="t">
+            <a:noAutofit/>
+          </a:bodyPr>
+          <a:lstStyle>
+            <a:lvl1pPr algn="l" defTabSz="584200">
+              <a:lnSpc>
+                <a:spcPct val="110000"/>
+              </a:lnSpc>
+              <a:spcBef>
+                <a:spcPts val="3000"/>
+              </a:spcBef>
+              <a:defRPr sz="2000">
+                <a:solidFill>
+                  <a:srgbClr val="4C4C4C"/>
+                </a:solidFill>
+                <a:latin typeface="Helvetica Neue Light"/>
+                <a:ea typeface="Helvetica Neue Light"/>
+                <a:cs typeface="Helvetica Neue Light"/>
+                <a:sym typeface="Helvetica Neue Light"/>
+              </a:defRPr>
+            </a:lvl1pPr>
+          </a:lstStyle>
+          <a:p>
+            <a:pPr lvl="0" algn="just">
+              <a:lnSpc>
+                <a:spcPct val="100000"/>
+              </a:lnSpc>
+              <a:spcBef>
+                <a:spcPts val="0"/>
+              </a:spcBef>
+              <a:defRPr sz="1800">
+                <a:solidFill>
+                  <a:srgbClr val="000000"/>
+                </a:solidFill>
+              </a:defRPr>
+            </a:pPr>
+            <a:r>
+              <a:rPr lang="en-US" sz="2400" b="1" i="1" dirty="0">
+                <a:solidFill>
+                  <a:srgbClr val="0170AD"/>
+                </a:solidFill>
+                <a:latin typeface="Lato Light"/>
+                <a:ea typeface="Lato Light"/>
+                <a:cs typeface="Lato Light"/>
+              </a:rPr>
+              <a:t>"By far the best burrito and salsa I have ever had. This place is way across town from where I live but </a:t>
+            </a:r>
+            <a:r>
+              <a:rPr lang="en-US" sz="2400" b="1" i="1" dirty="0" err="1">
+                <a:solidFill>
+                  <a:srgbClr val="0170AD"/>
+                </a:solidFill>
+                <a:latin typeface="Lato Light"/>
+                <a:ea typeface="Lato Light"/>
+                <a:cs typeface="Lato Light"/>
+              </a:rPr>
+              <a:t>i</a:t>
+            </a:r>
+            <a:r>
+              <a:rPr lang="en-US" sz="2400" b="1" i="1" dirty="0">
+                <a:solidFill>
+                  <a:srgbClr val="0170AD"/>
+                </a:solidFill>
+                <a:latin typeface="Lato Light"/>
+                <a:ea typeface="Lato Light"/>
+                <a:cs typeface="Lato Light"/>
+              </a:rPr>
+              <a:t> go there just to get my burritos, yes if I'm </a:t>
+            </a:r>
+            <a:r>
+              <a:rPr lang="en-US" sz="2400" b="1" i="1" dirty="0" err="1">
+                <a:solidFill>
+                  <a:srgbClr val="0170AD"/>
+                </a:solidFill>
+                <a:latin typeface="Lato Light"/>
+                <a:ea typeface="Lato Light"/>
+                <a:cs typeface="Lato Light"/>
+              </a:rPr>
+              <a:t>gonna</a:t>
+            </a:r>
+            <a:r>
+              <a:rPr lang="en-US" sz="2400" b="1" i="1" dirty="0">
+                <a:solidFill>
+                  <a:srgbClr val="0170AD"/>
+                </a:solidFill>
+                <a:latin typeface="Lato Light"/>
+                <a:ea typeface="Lato Light"/>
+                <a:cs typeface="Lato Light"/>
+              </a:rPr>
+              <a:t> go across town I better get two burritos to go.”</a:t>
+            </a:r>
+          </a:p>
+        </p:txBody>
+      </p:sp>
+      <p:sp>
+        <p:nvSpPr>
+          <p:cNvPr id="36" name="Shape 188">
+            <a:extLst>
+              <a:ext uri="{FF2B5EF4-FFF2-40B4-BE49-F238E27FC236}">
+                <a16:creationId xmlns:a16="http://schemas.microsoft.com/office/drawing/2014/main" id="{18B4394C-D960-5F45-A89E-517815FB1821}"/>
+              </a:ext>
+            </a:extLst>
+          </p:cNvPr>
+          <p:cNvSpPr/>
+          <p:nvPr/>
+        </p:nvSpPr>
+        <p:spPr>
+          <a:xfrm>
+            <a:off x="27765511" y="9777789"/>
+            <a:ext cx="4122964" cy="1294383"/>
+          </a:xfrm>
+          <a:prstGeom prst="rect">
+            <a:avLst/>
+          </a:prstGeom>
+          <a:noFill/>
+          <a:ln w="12700" cap="flat">
+            <a:noFill/>
+            <a:miter lim="400000"/>
+          </a:ln>
+          <a:effectLst/>
+          <a:extLst>
+            <a:ext uri="{C572A759-6A51-4108-AA02-DFA0A04FC94B}">
+              <ma14:wrappingTextBoxFlag xmlns:ma14="http://schemas.microsoft.com/office/mac/drawingml/2011/main" xmlns="" val="1"/>
+            </a:ext>
+          </a:extLst>
+        </p:spPr>
+        <p:txBody>
+          <a:bodyPr wrap="square" lIns="0" tIns="0" rIns="0" bIns="0" numCol="1" anchor="t">
+            <a:noAutofit/>
+          </a:bodyPr>
+          <a:lstStyle>
+            <a:lvl1pPr algn="l" defTabSz="584200">
+              <a:lnSpc>
+                <a:spcPct val="110000"/>
+              </a:lnSpc>
+              <a:spcBef>
+                <a:spcPts val="3000"/>
+              </a:spcBef>
+              <a:defRPr sz="2000">
+                <a:solidFill>
+                  <a:srgbClr val="4C4C4C"/>
+                </a:solidFill>
+                <a:latin typeface="Helvetica Neue Light"/>
+                <a:ea typeface="Helvetica Neue Light"/>
+                <a:cs typeface="Helvetica Neue Light"/>
+                <a:sym typeface="Helvetica Neue Light"/>
+              </a:defRPr>
+            </a:lvl1pPr>
+          </a:lstStyle>
+          <a:p>
+            <a:pPr lvl="0" algn="just">
+              <a:lnSpc>
+                <a:spcPct val="100000"/>
+              </a:lnSpc>
+              <a:spcBef>
+                <a:spcPts val="0"/>
+              </a:spcBef>
+              <a:defRPr sz="1800">
+                <a:solidFill>
+                  <a:srgbClr val="000000"/>
+                </a:solidFill>
+              </a:defRPr>
+            </a:pPr>
+            <a:r>
+              <a:rPr lang="en-US" sz="2400" b="1" i="1" dirty="0">
+                <a:solidFill>
+                  <a:srgbClr val="0170AD"/>
+                </a:solidFill>
+                <a:latin typeface="Lato Light"/>
+                <a:ea typeface="Lato Light"/>
+                <a:cs typeface="Lato Light"/>
+              </a:rPr>
+              <a:t>"Love the veggie patties, when they are available...haven't really eaten anything else there."</a:t>
+            </a:r>
+          </a:p>
+        </p:txBody>
+      </p:sp>
+      <p:sp>
+        <p:nvSpPr>
+          <p:cNvPr id="37" name="Shape 188">
+            <a:extLst>
+              <a:ext uri="{FF2B5EF4-FFF2-40B4-BE49-F238E27FC236}">
+                <a16:creationId xmlns:a16="http://schemas.microsoft.com/office/drawing/2014/main" id="{B5B2C976-8AC6-5D4D-B704-EFD2BE4DA265}"/>
+              </a:ext>
+            </a:extLst>
+          </p:cNvPr>
+          <p:cNvSpPr/>
+          <p:nvPr/>
+        </p:nvSpPr>
+        <p:spPr>
+          <a:xfrm>
+            <a:off x="22360408" y="9736037"/>
+            <a:ext cx="4470657" cy="1600741"/>
+          </a:xfrm>
+          <a:prstGeom prst="rect">
+            <a:avLst/>
+          </a:prstGeom>
+          <a:noFill/>
+          <a:ln w="12700" cap="flat">
+            <a:noFill/>
+            <a:miter lim="400000"/>
+          </a:ln>
+          <a:effectLst/>
+          <a:extLst>
+            <a:ext uri="{C572A759-6A51-4108-AA02-DFA0A04FC94B}">
+              <ma14:wrappingTextBoxFlag xmlns:ma14="http://schemas.microsoft.com/office/mac/drawingml/2011/main" xmlns="" val="1"/>
+            </a:ext>
+          </a:extLst>
+        </p:spPr>
+        <p:txBody>
+          <a:bodyPr wrap="square" lIns="0" tIns="0" rIns="0" bIns="0" numCol="1" anchor="t">
+            <a:noAutofit/>
+          </a:bodyPr>
+          <a:lstStyle>
+            <a:lvl1pPr algn="l" defTabSz="584200">
+              <a:lnSpc>
+                <a:spcPct val="110000"/>
+              </a:lnSpc>
+              <a:spcBef>
+                <a:spcPts val="3000"/>
+              </a:spcBef>
+              <a:defRPr sz="2000">
+                <a:solidFill>
+                  <a:srgbClr val="4C4C4C"/>
+                </a:solidFill>
+                <a:latin typeface="Helvetica Neue Light"/>
+                <a:ea typeface="Helvetica Neue Light"/>
+                <a:cs typeface="Helvetica Neue Light"/>
+                <a:sym typeface="Helvetica Neue Light"/>
+              </a:defRPr>
+            </a:lvl1pPr>
+          </a:lstStyle>
+          <a:p>
+            <a:pPr lvl="0">
+              <a:lnSpc>
+                <a:spcPct val="100000"/>
+              </a:lnSpc>
+              <a:spcBef>
+                <a:spcPts val="0"/>
+              </a:spcBef>
+              <a:defRPr sz="1800">
+                <a:solidFill>
+                  <a:srgbClr val="000000"/>
+                </a:solidFill>
+              </a:defRPr>
+            </a:pPr>
+            <a:r>
+              <a:rPr lang="en-US" sz="2400" b="1" i="1" dirty="0">
+                <a:solidFill>
+                  <a:srgbClr val="0170AD"/>
+                </a:solidFill>
+                <a:latin typeface="Lato Light"/>
+                <a:ea typeface="Lato Light"/>
+                <a:cs typeface="Lato Light"/>
+              </a:rPr>
+              <a:t>"Awesome meal.  Very willing to make adjustments and recommendations. Would come back here in a heartbeat."</a:t>
             </a:r>
           </a:p>
         </p:txBody>

</xml_diff>

<commit_message>
Added the training part for the CNN
</commit_message>
<xml_diff>
--- a/Poster/Poster_Team_55.pptx
+++ b/Poster/Poster_Team_55.pptx
@@ -110,6 +110,32 @@
     </p:ext>
   </p:extLst>
 </p:presentation>
+</file>
+
+<file path=ppt/commentAuthors.xml><?xml version="1.0" encoding="utf-8"?>
+<p:cmAuthorLst xmlns:a="http://schemas.openxmlformats.org/drawingml/2006/main" xmlns:r="http://schemas.openxmlformats.org/officeDocument/2006/relationships" xmlns:p="http://schemas.openxmlformats.org/presentationml/2006/main">
+  <p:cmAuthor id="1" name="Sebastian Muhle" initials="SM" lastIdx="1" clrIdx="0">
+    <p:extLst>
+      <p:ext uri="{19B8F6BF-5375-455C-9EA6-DF929625EA0E}">
+        <p15:presenceInfo xmlns:p15="http://schemas.microsoft.com/office/powerpoint/2012/main" userId="a5c9cdf4c06dbaa6" providerId="Windows Live"/>
+      </p:ext>
+    </p:extLst>
+  </p:cmAuthor>
+</p:cmAuthorLst>
+</file>
+
+<file path=ppt/comments/comment1.xml><?xml version="1.0" encoding="utf-8"?>
+<p:cmLst xmlns:a="http://schemas.openxmlformats.org/drawingml/2006/main" xmlns:r="http://schemas.openxmlformats.org/officeDocument/2006/relationships" xmlns:p="http://schemas.openxmlformats.org/presentationml/2006/main">
+  <p:cm authorId="1" dt="2018-02-03T22:56:44.549" idx="1">
+    <p:pos x="6372" y="12825"/>
+    <p:text>sounds like a question they might ask</p:text>
+    <p:extLst>
+      <p:ext uri="{C676402C-5697-4E1C-873F-D02D1690AC5C}">
+        <p15:threadingInfo xmlns:p15="http://schemas.microsoft.com/office/powerpoint/2012/main" timeZoneBias="-60"/>
+      </p:ext>
+    </p:extLst>
+  </p:cm>
+</p:cmLst>
 </file>
 
 <file path=ppt/slideLayouts/slideLayout1.xml><?xml version="1.0" encoding="utf-8"?>
@@ -3477,7 +3503,7 @@
         </p:blipFill>
         <p:spPr>
           <a:xfrm>
-            <a:off x="919343" y="420730"/>
+            <a:off x="919342" y="897556"/>
             <a:ext cx="3075781" cy="1621020"/>
           </a:xfrm>
           <a:prstGeom prst="rect">
@@ -3540,7 +3566,7 @@
                 <a:latin typeface="Lato Light"/>
                 <a:cs typeface="Lato Light"/>
               </a:rPr>
-              <a:t>Related work</a:t>
+              <a:t>Related Work</a:t>
             </a:r>
           </a:p>
         </p:txBody>
@@ -3619,7 +3645,67 @@
         </p:nvSpPr>
         <p:spPr>
           <a:xfrm>
-            <a:off x="919343" y="13237398"/>
+            <a:off x="919343" y="10980905"/>
+            <a:ext cx="19765633" cy="2010535"/>
+          </a:xfrm>
+          <a:prstGeom prst="rect">
+            <a:avLst/>
+          </a:prstGeom>
+          <a:solidFill>
+            <a:srgbClr val="0170AD"/>
+          </a:solidFill>
+          <a:ln>
+            <a:noFill/>
+          </a:ln>
+          <a:effectLst/>
+        </p:spPr>
+        <p:style>
+          <a:lnRef idx="1">
+            <a:schemeClr val="accent1"/>
+          </a:lnRef>
+          <a:fillRef idx="3">
+            <a:schemeClr val="accent1"/>
+          </a:fillRef>
+          <a:effectRef idx="2">
+            <a:schemeClr val="accent1"/>
+          </a:effectRef>
+          <a:fontRef idx="minor">
+            <a:schemeClr val="lt1"/>
+          </a:fontRef>
+        </p:style>
+        <p:txBody>
+          <a:bodyPr lIns="243852" tIns="121926" rIns="243852" bIns="121926" rtlCol="0" anchor="ctr"/>
+          <a:lstStyle/>
+          <a:p>
+            <a:pPr algn="ctr"/>
+            <a:r>
+              <a:rPr lang="en-US" sz="7200" b="1" dirty="0">
+                <a:solidFill>
+                  <a:srgbClr val="FFFFFF"/>
+                </a:solidFill>
+                <a:latin typeface="Lato Light"/>
+                <a:cs typeface="Lato Light"/>
+              </a:rPr>
+              <a:t>Methodology</a:t>
+            </a:r>
+          </a:p>
+        </p:txBody>
+      </p:sp>
+      <p:sp>
+        <p:nvSpPr>
+          <p:cNvPr id="17" name="Rectangle 11">
+            <a:extLst>
+              <a:ext uri="{FF2B5EF4-FFF2-40B4-BE49-F238E27FC236}">
+                <a16:creationId xmlns:a16="http://schemas.microsoft.com/office/drawing/2014/main" id="{680317AF-DA48-FA43-98F8-57C8AB19B6D7}"/>
+              </a:ext>
+            </a:extLst>
+          </p:cNvPr>
+          <p:cNvSpPr/>
+          <p:nvPr/>
+        </p:nvSpPr>
+        <p:spPr>
+          <a:xfrm>
+            <a:off x="21705079" y="13237398"/>
             <a:ext cx="9901057" cy="2010535"/>
           </a:xfrm>
           <a:prstGeom prst="rect">
@@ -3660,17 +3746,17 @@
                 <a:latin typeface="Lato Light"/>
                 <a:cs typeface="Lato Light"/>
               </a:rPr>
-              <a:t>Methodology</a:t>
-            </a:r>
-          </a:p>
-        </p:txBody>
-      </p:sp>
-      <p:sp>
-        <p:nvSpPr>
-          <p:cNvPr id="17" name="Rectangle 11">
+              <a:t>Outcome</a:t>
+            </a:r>
+          </a:p>
+        </p:txBody>
+      </p:sp>
+      <p:sp>
+        <p:nvSpPr>
+          <p:cNvPr id="18" name="Rectangle 11">
             <a:extLst>
               <a:ext uri="{FF2B5EF4-FFF2-40B4-BE49-F238E27FC236}">
-                <a16:creationId xmlns:a16="http://schemas.microsoft.com/office/drawing/2014/main" id="{680317AF-DA48-FA43-98F8-57C8AB19B6D7}"/>
+                <a16:creationId xmlns:a16="http://schemas.microsoft.com/office/drawing/2014/main" id="{E0078958-4A97-0C40-9233-EB4C3A568278}"/>
               </a:ext>
             </a:extLst>
           </p:cNvPr>
@@ -3679,7 +3765,7 @@
         </p:nvSpPr>
         <p:spPr>
           <a:xfrm>
-            <a:off x="16575259" y="13237398"/>
+            <a:off x="32260416" y="13237398"/>
             <a:ext cx="9901057" cy="2010535"/>
           </a:xfrm>
           <a:prstGeom prst="rect">
@@ -3720,66 +3806,6 @@
                 <a:latin typeface="Lato Light"/>
                 <a:cs typeface="Lato Light"/>
               </a:rPr>
-              <a:t>Outcome</a:t>
-            </a:r>
-          </a:p>
-        </p:txBody>
-      </p:sp>
-      <p:sp>
-        <p:nvSpPr>
-          <p:cNvPr id="18" name="Rectangle 11">
-            <a:extLst>
-              <a:ext uri="{FF2B5EF4-FFF2-40B4-BE49-F238E27FC236}">
-                <a16:creationId xmlns:a16="http://schemas.microsoft.com/office/drawing/2014/main" id="{E0078958-4A97-0C40-9233-EB4C3A568278}"/>
-              </a:ext>
-            </a:extLst>
-          </p:cNvPr>
-          <p:cNvSpPr/>
-          <p:nvPr/>
-        </p:nvSpPr>
-        <p:spPr>
-          <a:xfrm>
-            <a:off x="31528722" y="13237398"/>
-            <a:ext cx="9901057" cy="2010535"/>
-          </a:xfrm>
-          <a:prstGeom prst="rect">
-            <a:avLst/>
-          </a:prstGeom>
-          <a:solidFill>
-            <a:srgbClr val="0170AD"/>
-          </a:solidFill>
-          <a:ln>
-            <a:noFill/>
-          </a:ln>
-          <a:effectLst/>
-        </p:spPr>
-        <p:style>
-          <a:lnRef idx="1">
-            <a:schemeClr val="accent1"/>
-          </a:lnRef>
-          <a:fillRef idx="3">
-            <a:schemeClr val="accent1"/>
-          </a:fillRef>
-          <a:effectRef idx="2">
-            <a:schemeClr val="accent1"/>
-          </a:effectRef>
-          <a:fontRef idx="minor">
-            <a:schemeClr val="lt1"/>
-          </a:fontRef>
-        </p:style>
-        <p:txBody>
-          <a:bodyPr lIns="243852" tIns="121926" rIns="243852" bIns="121926" rtlCol="0" anchor="ctr"/>
-          <a:lstStyle/>
-          <a:p>
-            <a:pPr algn="ctr"/>
-            <a:r>
-              <a:rPr lang="en-US" sz="7200" b="1" dirty="0">
-                <a:solidFill>
-                  <a:srgbClr val="FFFFFF"/>
-                </a:solidFill>
-                <a:latin typeface="Lato Light"/>
-                <a:cs typeface="Lato Light"/>
-              </a:rPr>
               <a:t>Learnings</a:t>
             </a:r>
           </a:p>
@@ -3800,7 +3826,7 @@
         <p:spPr>
           <a:xfrm>
             <a:off x="919343" y="5456784"/>
-            <a:ext cx="9901057" cy="6352488"/>
+            <a:ext cx="9901057" cy="4713128"/>
           </a:xfrm>
           <a:prstGeom prst="rect">
             <a:avLst/>
@@ -3993,7 +4019,7 @@
         <p:spPr>
           <a:xfrm>
             <a:off x="11624730" y="5456784"/>
-            <a:ext cx="9901058" cy="6352488"/>
+            <a:ext cx="9901058" cy="4989665"/>
           </a:xfrm>
           <a:prstGeom prst="rect">
             <a:avLst/>
@@ -5195,6 +5221,1163 @@
                 <a:cs typeface="Lato Light"/>
               </a:rPr>
               <a:t>"Awesome meal.  Very willing to make adjustments and recommendations. Would come back here in a heartbeat."</a:t>
+            </a:r>
+          </a:p>
+        </p:txBody>
+      </p:sp>
+      <p:sp>
+        <p:nvSpPr>
+          <p:cNvPr id="38" name="Textfeld 37">
+            <a:extLst>
+              <a:ext uri="{FF2B5EF4-FFF2-40B4-BE49-F238E27FC236}">
+                <a16:creationId xmlns:a16="http://schemas.microsoft.com/office/drawing/2014/main" id="{AE64ACE4-B692-A544-BA8A-C5E0E90AF04A}"/>
+              </a:ext>
+            </a:extLst>
+          </p:cNvPr>
+          <p:cNvSpPr txBox="1"/>
+          <p:nvPr/>
+        </p:nvSpPr>
+        <p:spPr>
+          <a:xfrm>
+            <a:off x="31333440" y="25725120"/>
+            <a:ext cx="4366901" cy="1154932"/>
+          </a:xfrm>
+          <a:prstGeom prst="rect">
+            <a:avLst/>
+          </a:prstGeom>
+          <a:noFill/>
+        </p:spPr>
+        <p:txBody>
+          <a:bodyPr wrap="none" rtlCol="0">
+            <a:spAutoFit/>
+          </a:bodyPr>
+          <a:lstStyle/>
+          <a:p>
+            <a:r>
+              <a:rPr lang="en-US" dirty="0"/>
+              <a:t>GitHub Link</a:t>
+            </a:r>
+          </a:p>
+        </p:txBody>
+      </p:sp>
+      <p:sp>
+        <p:nvSpPr>
+          <p:cNvPr id="45" name="Shape 188">
+            <a:extLst>
+              <a:ext uri="{FF2B5EF4-FFF2-40B4-BE49-F238E27FC236}">
+                <a16:creationId xmlns:a16="http://schemas.microsoft.com/office/drawing/2014/main" id="{2B66D671-13B7-7243-AE53-A86986A52895}"/>
+              </a:ext>
+            </a:extLst>
+          </p:cNvPr>
+          <p:cNvSpPr/>
+          <p:nvPr/>
+        </p:nvSpPr>
+        <p:spPr>
+          <a:xfrm>
+            <a:off x="2116322" y="13525896"/>
+            <a:ext cx="6353500" cy="525073"/>
+          </a:xfrm>
+          <a:prstGeom prst="rect">
+            <a:avLst/>
+          </a:prstGeom>
+          <a:noFill/>
+          <a:ln w="12700" cap="flat">
+            <a:noFill/>
+            <a:miter lim="400000"/>
+          </a:ln>
+          <a:effectLst/>
+          <a:extLst>
+            <a:ext uri="{C572A759-6A51-4108-AA02-DFA0A04FC94B}">
+              <ma14:wrappingTextBoxFlag xmlns:ma14="http://schemas.microsoft.com/office/mac/drawingml/2011/main" xmlns="" val="1"/>
+            </a:ext>
+          </a:extLst>
+        </p:spPr>
+        <p:txBody>
+          <a:bodyPr wrap="square" lIns="0" tIns="0" rIns="0" bIns="0" numCol="1" anchor="t">
+            <a:noAutofit/>
+          </a:bodyPr>
+          <a:lstStyle>
+            <a:lvl1pPr algn="l" defTabSz="584200">
+              <a:lnSpc>
+                <a:spcPct val="110000"/>
+              </a:lnSpc>
+              <a:spcBef>
+                <a:spcPts val="3000"/>
+              </a:spcBef>
+              <a:defRPr sz="2000">
+                <a:solidFill>
+                  <a:srgbClr val="4C4C4C"/>
+                </a:solidFill>
+                <a:latin typeface="Helvetica Neue Light"/>
+                <a:ea typeface="Helvetica Neue Light"/>
+                <a:cs typeface="Helvetica Neue Light"/>
+                <a:sym typeface="Helvetica Neue Light"/>
+              </a:defRPr>
+            </a:lvl1pPr>
+          </a:lstStyle>
+          <a:p>
+            <a:pPr lvl="0" algn="ctr">
+              <a:lnSpc>
+                <a:spcPct val="100000"/>
+              </a:lnSpc>
+              <a:defRPr sz="1800">
+                <a:solidFill>
+                  <a:srgbClr val="000000"/>
+                </a:solidFill>
+              </a:defRPr>
+            </a:pPr>
+            <a:r>
+              <a:rPr lang="en-US" sz="4000" b="1" dirty="0">
+                <a:solidFill>
+                  <a:srgbClr val="0170AD"/>
+                </a:solidFill>
+                <a:latin typeface="Lato Light"/>
+                <a:ea typeface="Lato Light"/>
+                <a:cs typeface="Lato Light"/>
+              </a:rPr>
+              <a:t>CNN - Photo Classification</a:t>
+            </a:r>
+          </a:p>
+        </p:txBody>
+      </p:sp>
+      <p:sp>
+        <p:nvSpPr>
+          <p:cNvPr id="46" name="Shape 188">
+            <a:extLst>
+              <a:ext uri="{FF2B5EF4-FFF2-40B4-BE49-F238E27FC236}">
+                <a16:creationId xmlns:a16="http://schemas.microsoft.com/office/drawing/2014/main" id="{03672BFA-9B86-1443-A9BD-B48A64905BA0}"/>
+              </a:ext>
+            </a:extLst>
+          </p:cNvPr>
+          <p:cNvSpPr/>
+          <p:nvPr/>
+        </p:nvSpPr>
+        <p:spPr>
+          <a:xfrm>
+            <a:off x="12159988" y="13525896"/>
+            <a:ext cx="7555368" cy="525073"/>
+          </a:xfrm>
+          <a:prstGeom prst="rect">
+            <a:avLst/>
+          </a:prstGeom>
+          <a:noFill/>
+          <a:ln w="12700" cap="flat">
+            <a:noFill/>
+            <a:miter lim="400000"/>
+          </a:ln>
+          <a:effectLst/>
+          <a:extLst>
+            <a:ext uri="{C572A759-6A51-4108-AA02-DFA0A04FC94B}">
+              <ma14:wrappingTextBoxFlag xmlns:ma14="http://schemas.microsoft.com/office/mac/drawingml/2011/main" xmlns="" val="1"/>
+            </a:ext>
+          </a:extLst>
+        </p:spPr>
+        <p:txBody>
+          <a:bodyPr wrap="square" lIns="0" tIns="0" rIns="0" bIns="0" numCol="1" anchor="t">
+            <a:noAutofit/>
+          </a:bodyPr>
+          <a:lstStyle>
+            <a:lvl1pPr algn="l" defTabSz="584200">
+              <a:lnSpc>
+                <a:spcPct val="110000"/>
+              </a:lnSpc>
+              <a:spcBef>
+                <a:spcPts val="3000"/>
+              </a:spcBef>
+              <a:defRPr sz="2000">
+                <a:solidFill>
+                  <a:srgbClr val="4C4C4C"/>
+                </a:solidFill>
+                <a:latin typeface="Helvetica Neue Light"/>
+                <a:ea typeface="Helvetica Neue Light"/>
+                <a:cs typeface="Helvetica Neue Light"/>
+                <a:sym typeface="Helvetica Neue Light"/>
+              </a:defRPr>
+            </a:lvl1pPr>
+          </a:lstStyle>
+          <a:p>
+            <a:pPr lvl="0" algn="ctr">
+              <a:lnSpc>
+                <a:spcPct val="100000"/>
+              </a:lnSpc>
+              <a:defRPr sz="1800">
+                <a:solidFill>
+                  <a:srgbClr val="000000"/>
+                </a:solidFill>
+              </a:defRPr>
+            </a:pPr>
+            <a:r>
+              <a:rPr lang="en-US" sz="4000" b="1" dirty="0">
+                <a:solidFill>
+                  <a:srgbClr val="0170AD"/>
+                </a:solidFill>
+                <a:latin typeface="Lato Light"/>
+                <a:ea typeface="Lato Light"/>
+                <a:cs typeface="Lato Light"/>
+              </a:rPr>
+              <a:t>RNN – Fake Review Generation</a:t>
+            </a:r>
+          </a:p>
+        </p:txBody>
+      </p:sp>
+      <p:sp>
+        <p:nvSpPr>
+          <p:cNvPr id="47" name="Shape 188">
+            <a:extLst>
+              <a:ext uri="{FF2B5EF4-FFF2-40B4-BE49-F238E27FC236}">
+                <a16:creationId xmlns:a16="http://schemas.microsoft.com/office/drawing/2014/main" id="{E9E581CD-DA3C-044C-8747-3E226A2EDC0B}"/>
+              </a:ext>
+            </a:extLst>
+          </p:cNvPr>
+          <p:cNvSpPr/>
+          <p:nvPr/>
+        </p:nvSpPr>
+        <p:spPr>
+          <a:xfrm>
+            <a:off x="919343" y="14468921"/>
+            <a:ext cx="9204371" cy="2916230"/>
+          </a:xfrm>
+          <a:prstGeom prst="rect">
+            <a:avLst/>
+          </a:prstGeom>
+          <a:noFill/>
+          <a:ln w="12700" cap="flat">
+            <a:noFill/>
+            <a:miter lim="400000"/>
+          </a:ln>
+          <a:effectLst/>
+          <a:extLst>
+            <a:ext uri="{C572A759-6A51-4108-AA02-DFA0A04FC94B}">
+              <ma14:wrappingTextBoxFlag xmlns:ma14="http://schemas.microsoft.com/office/mac/drawingml/2011/main" xmlns="" val="1"/>
+            </a:ext>
+          </a:extLst>
+        </p:spPr>
+        <p:txBody>
+          <a:bodyPr wrap="square" lIns="0" tIns="0" rIns="0" bIns="0" numCol="1" anchor="t">
+            <a:noAutofit/>
+          </a:bodyPr>
+          <a:lstStyle>
+            <a:lvl1pPr algn="l" defTabSz="584200">
+              <a:lnSpc>
+                <a:spcPct val="110000"/>
+              </a:lnSpc>
+              <a:spcBef>
+                <a:spcPts val="3000"/>
+              </a:spcBef>
+              <a:defRPr sz="2000">
+                <a:solidFill>
+                  <a:srgbClr val="4C4C4C"/>
+                </a:solidFill>
+                <a:latin typeface="Helvetica Neue Light"/>
+                <a:ea typeface="Helvetica Neue Light"/>
+                <a:cs typeface="Helvetica Neue Light"/>
+                <a:sym typeface="Helvetica Neue Light"/>
+              </a:defRPr>
+            </a:lvl1pPr>
+          </a:lstStyle>
+          <a:p>
+            <a:pPr lvl="0" algn="just">
+              <a:lnSpc>
+                <a:spcPct val="100000"/>
+              </a:lnSpc>
+              <a:spcBef>
+                <a:spcPts val="0"/>
+              </a:spcBef>
+              <a:defRPr sz="1800">
+                <a:solidFill>
+                  <a:srgbClr val="000000"/>
+                </a:solidFill>
+              </a:defRPr>
+            </a:pPr>
+            <a:r>
+              <a:rPr lang="en-US" sz="2400" b="1" u="sng" dirty="0">
+                <a:solidFill>
+                  <a:srgbClr val="0170AD"/>
+                </a:solidFill>
+                <a:latin typeface="Lato Light"/>
+                <a:ea typeface="Lato Light"/>
+                <a:cs typeface="Lato Light"/>
+              </a:rPr>
+              <a:t>Preprocessing:</a:t>
+            </a:r>
+          </a:p>
+          <a:p>
+            <a:pPr marL="342900" lvl="0" indent="-342900" algn="just">
+              <a:lnSpc>
+                <a:spcPct val="100000"/>
+              </a:lnSpc>
+              <a:spcBef>
+                <a:spcPts val="0"/>
+              </a:spcBef>
+              <a:buFont typeface="Arial" panose="020B0604020202020204" pitchFamily="34" charset="0"/>
+              <a:buChar char="•"/>
+              <a:defRPr sz="1800">
+                <a:solidFill>
+                  <a:srgbClr val="000000"/>
+                </a:solidFill>
+              </a:defRPr>
+            </a:pPr>
+            <a:r>
+              <a:rPr lang="en-US" sz="2400" b="1" dirty="0">
+                <a:solidFill>
+                  <a:srgbClr val="0170AD"/>
+                </a:solidFill>
+                <a:latin typeface="Lato Light"/>
+                <a:ea typeface="Lato Light"/>
+                <a:cs typeface="Lato Light"/>
+              </a:rPr>
+              <a:t>We mapped the restaurant and it’s attributes to the induvial image to label them</a:t>
+            </a:r>
+          </a:p>
+          <a:p>
+            <a:pPr marL="342900" lvl="0" indent="-342900" algn="just">
+              <a:lnSpc>
+                <a:spcPct val="100000"/>
+              </a:lnSpc>
+              <a:spcBef>
+                <a:spcPts val="0"/>
+              </a:spcBef>
+              <a:buFont typeface="Arial" panose="020B0604020202020204" pitchFamily="34" charset="0"/>
+              <a:buChar char="•"/>
+              <a:defRPr sz="1800">
+                <a:solidFill>
+                  <a:srgbClr val="000000"/>
+                </a:solidFill>
+              </a:defRPr>
+            </a:pPr>
+            <a:r>
+              <a:rPr lang="en-US" sz="2400" b="1" dirty="0">
+                <a:solidFill>
+                  <a:srgbClr val="0170AD"/>
+                </a:solidFill>
+                <a:latin typeface="Lato Light"/>
+                <a:ea typeface="Lato Light"/>
+                <a:cs typeface="Lato Light"/>
+              </a:rPr>
+              <a:t>We used a subset of 40k test images, </a:t>
+            </a:r>
+            <a:r>
+              <a:rPr lang="en-US" sz="2400" b="1" dirty="0" err="1">
+                <a:solidFill>
+                  <a:srgbClr val="0170AD"/>
+                </a:solidFill>
+                <a:latin typeface="Lato Light"/>
+                <a:ea typeface="Lato Light"/>
+                <a:cs typeface="Lato Light"/>
+              </a:rPr>
+              <a:t>xxk</a:t>
+            </a:r>
+            <a:r>
+              <a:rPr lang="en-US" sz="2400" b="1" dirty="0">
+                <a:solidFill>
+                  <a:srgbClr val="0170AD"/>
+                </a:solidFill>
+                <a:latin typeface="Lato Light"/>
+                <a:ea typeface="Lato Light"/>
+                <a:cs typeface="Lato Light"/>
+              </a:rPr>
+              <a:t> validation images, </a:t>
+            </a:r>
+            <a:r>
+              <a:rPr lang="en-US" sz="2400" b="1" dirty="0" err="1">
+                <a:solidFill>
+                  <a:srgbClr val="0170AD"/>
+                </a:solidFill>
+                <a:latin typeface="Lato Light"/>
+                <a:ea typeface="Lato Light"/>
+                <a:cs typeface="Lato Light"/>
+              </a:rPr>
+              <a:t>xxk</a:t>
+            </a:r>
+            <a:r>
+              <a:rPr lang="en-US" sz="2400" b="1" dirty="0">
+                <a:solidFill>
+                  <a:srgbClr val="0170AD"/>
+                </a:solidFill>
+                <a:latin typeface="Lato Light"/>
+                <a:ea typeface="Lato Light"/>
+                <a:cs typeface="Lato Light"/>
+              </a:rPr>
+              <a:t> test images -&gt; saved in a HDF5 file</a:t>
+            </a:r>
+          </a:p>
+          <a:p>
+            <a:pPr marL="342900" lvl="0" indent="-342900" algn="just">
+              <a:lnSpc>
+                <a:spcPct val="100000"/>
+              </a:lnSpc>
+              <a:spcBef>
+                <a:spcPts val="0"/>
+              </a:spcBef>
+              <a:buFont typeface="Arial" panose="020B0604020202020204" pitchFamily="34" charset="0"/>
+              <a:buChar char="•"/>
+              <a:defRPr sz="1800">
+                <a:solidFill>
+                  <a:srgbClr val="000000"/>
+                </a:solidFill>
+              </a:defRPr>
+            </a:pPr>
+            <a:r>
+              <a:rPr lang="en-US" sz="2400" b="1" dirty="0">
+                <a:solidFill>
+                  <a:srgbClr val="0170AD"/>
+                </a:solidFill>
+                <a:latin typeface="Lato Light"/>
+                <a:ea typeface="Lato Light"/>
+                <a:cs typeface="Lato Light"/>
+              </a:rPr>
+              <a:t>We relied on Image Augmentation (Rotating, Zooming, horizontal flipping) and applied the mean to the data</a:t>
+            </a:r>
+          </a:p>
+          <a:p>
+            <a:pPr marL="342900" lvl="0" indent="-342900" algn="just">
+              <a:lnSpc>
+                <a:spcPct val="100000"/>
+              </a:lnSpc>
+              <a:spcBef>
+                <a:spcPts val="0"/>
+              </a:spcBef>
+              <a:buFont typeface="Arial" panose="020B0604020202020204" pitchFamily="34" charset="0"/>
+              <a:buChar char="•"/>
+              <a:defRPr sz="1800">
+                <a:solidFill>
+                  <a:srgbClr val="000000"/>
+                </a:solidFill>
+              </a:defRPr>
+            </a:pPr>
+            <a:r>
+              <a:rPr lang="en-US" sz="2400" b="1" dirty="0">
+                <a:solidFill>
+                  <a:srgbClr val="0170AD"/>
+                </a:solidFill>
+                <a:latin typeface="Lato Light"/>
+                <a:ea typeface="Lato Light"/>
+                <a:cs typeface="Lato Light"/>
+              </a:rPr>
+              <a:t>We wrote a multi-label generator to use the data in </a:t>
+            </a:r>
+            <a:r>
+              <a:rPr lang="en-US" sz="2400" b="1" dirty="0" err="1">
+                <a:solidFill>
+                  <a:srgbClr val="0170AD"/>
+                </a:solidFill>
+                <a:latin typeface="Lato Light"/>
+                <a:ea typeface="Lato Light"/>
+                <a:cs typeface="Lato Light"/>
+              </a:rPr>
+              <a:t>Keras</a:t>
+            </a:r>
+            <a:endParaRPr lang="en-US" sz="2400" b="1" dirty="0">
+              <a:solidFill>
+                <a:srgbClr val="0170AD"/>
+              </a:solidFill>
+              <a:latin typeface="Lato Light"/>
+              <a:ea typeface="Lato Light"/>
+              <a:cs typeface="Lato Light"/>
+            </a:endParaRPr>
+          </a:p>
+        </p:txBody>
+      </p:sp>
+      <p:sp>
+        <p:nvSpPr>
+          <p:cNvPr id="48" name="Shape 188">
+            <a:extLst>
+              <a:ext uri="{FF2B5EF4-FFF2-40B4-BE49-F238E27FC236}">
+                <a16:creationId xmlns:a16="http://schemas.microsoft.com/office/drawing/2014/main" id="{491EB432-A5E3-F146-A049-69AB4D3465EB}"/>
+              </a:ext>
+            </a:extLst>
+          </p:cNvPr>
+          <p:cNvSpPr/>
+          <p:nvPr/>
+        </p:nvSpPr>
+        <p:spPr>
+          <a:xfrm>
+            <a:off x="11480605" y="14527718"/>
+            <a:ext cx="9204371" cy="2447479"/>
+          </a:xfrm>
+          <a:prstGeom prst="rect">
+            <a:avLst/>
+          </a:prstGeom>
+          <a:noFill/>
+          <a:ln w="12700" cap="flat">
+            <a:noFill/>
+            <a:miter lim="400000"/>
+          </a:ln>
+          <a:effectLst/>
+          <a:extLst>
+            <a:ext uri="{C572A759-6A51-4108-AA02-DFA0A04FC94B}">
+              <ma14:wrappingTextBoxFlag xmlns:ma14="http://schemas.microsoft.com/office/mac/drawingml/2011/main" xmlns="" val="1"/>
+            </a:ext>
+          </a:extLst>
+        </p:spPr>
+        <p:txBody>
+          <a:bodyPr wrap="square" lIns="0" tIns="0" rIns="0" bIns="0" numCol="1" anchor="t">
+            <a:noAutofit/>
+          </a:bodyPr>
+          <a:lstStyle>
+            <a:lvl1pPr algn="l" defTabSz="584200">
+              <a:lnSpc>
+                <a:spcPct val="110000"/>
+              </a:lnSpc>
+              <a:spcBef>
+                <a:spcPts val="3000"/>
+              </a:spcBef>
+              <a:defRPr sz="2000">
+                <a:solidFill>
+                  <a:srgbClr val="4C4C4C"/>
+                </a:solidFill>
+                <a:latin typeface="Helvetica Neue Light"/>
+                <a:ea typeface="Helvetica Neue Light"/>
+                <a:cs typeface="Helvetica Neue Light"/>
+                <a:sym typeface="Helvetica Neue Light"/>
+              </a:defRPr>
+            </a:lvl1pPr>
+          </a:lstStyle>
+          <a:p>
+            <a:pPr lvl="0" algn="just">
+              <a:lnSpc>
+                <a:spcPct val="100000"/>
+              </a:lnSpc>
+              <a:spcBef>
+                <a:spcPts val="0"/>
+              </a:spcBef>
+              <a:defRPr sz="1800">
+                <a:solidFill>
+                  <a:srgbClr val="000000"/>
+                </a:solidFill>
+              </a:defRPr>
+            </a:pPr>
+            <a:r>
+              <a:rPr lang="en-US" sz="2400" b="1" u="sng" dirty="0">
+                <a:solidFill>
+                  <a:srgbClr val="0170AD"/>
+                </a:solidFill>
+                <a:latin typeface="Lato Light"/>
+                <a:ea typeface="Lato Light"/>
+                <a:cs typeface="Lato Light"/>
+              </a:rPr>
+              <a:t>Preprocessing:  </a:t>
+            </a:r>
+          </a:p>
+        </p:txBody>
+      </p:sp>
+      <p:sp>
+        <p:nvSpPr>
+          <p:cNvPr id="49" name="Textfeld 48">
+            <a:extLst>
+              <a:ext uri="{FF2B5EF4-FFF2-40B4-BE49-F238E27FC236}">
+                <a16:creationId xmlns:a16="http://schemas.microsoft.com/office/drawing/2014/main" id="{58C6A501-2123-F046-8D7F-2C8AC239E13C}"/>
+              </a:ext>
+            </a:extLst>
+          </p:cNvPr>
+          <p:cNvSpPr txBox="1"/>
+          <p:nvPr/>
+        </p:nvSpPr>
+        <p:spPr>
+          <a:xfrm>
+            <a:off x="32152844" y="17224361"/>
+            <a:ext cx="8695842" cy="2308324"/>
+          </a:xfrm>
+          <a:prstGeom prst="rect">
+            <a:avLst/>
+          </a:prstGeom>
+          <a:noFill/>
+        </p:spPr>
+        <p:txBody>
+          <a:bodyPr wrap="none" rtlCol="0">
+            <a:spAutoFit/>
+          </a:bodyPr>
+          <a:lstStyle/>
+          <a:p>
+            <a:r>
+              <a:rPr lang="en-US" sz="2400" dirty="0"/>
+              <a:t>Learnings: </a:t>
+            </a:r>
+          </a:p>
+          <a:p>
+            <a:r>
+              <a:rPr lang="en-US" sz="2400" dirty="0"/>
+              <a:t>• Bottlenecks great for speeding things up - however memory issues</a:t>
+            </a:r>
+          </a:p>
+          <a:p>
+            <a:r>
+              <a:rPr lang="en-US" sz="2400" dirty="0"/>
+              <a:t>• VGG16 great for prototyping and it was easier than with the other </a:t>
+            </a:r>
+          </a:p>
+          <a:p>
+            <a:r>
+              <a:rPr lang="en-US" sz="2400" dirty="0"/>
+              <a:t>Architectures to achieve good results</a:t>
+            </a:r>
+          </a:p>
+          <a:p>
+            <a:r>
+              <a:rPr lang="en-US" sz="2400" dirty="0"/>
+              <a:t>• Batch size is important for training speed 16 for inception on a K80</a:t>
+            </a:r>
+          </a:p>
+          <a:p>
+            <a:pPr marL="342900" indent="-342900">
+              <a:buFont typeface="Arial" panose="020B0604020202020204" pitchFamily="34" charset="0"/>
+              <a:buChar char="•"/>
+            </a:pPr>
+            <a:r>
+              <a:rPr lang="en-US" sz="2400" dirty="0"/>
+              <a:t>Possible ideas for improvement </a:t>
+            </a:r>
+            <a:r>
+              <a:rPr lang="en-US" sz="2400" dirty="0" err="1"/>
+              <a:t>Keras</a:t>
+            </a:r>
+            <a:r>
+              <a:rPr lang="en-US" sz="2400" dirty="0"/>
+              <a:t> winner interview</a:t>
+            </a:r>
+          </a:p>
+        </p:txBody>
+      </p:sp>
+      <p:sp>
+        <p:nvSpPr>
+          <p:cNvPr id="50" name="Shape 188">
+            <a:extLst>
+              <a:ext uri="{FF2B5EF4-FFF2-40B4-BE49-F238E27FC236}">
+                <a16:creationId xmlns:a16="http://schemas.microsoft.com/office/drawing/2014/main" id="{BA477D95-0956-BF47-9070-91C2FBC84006}"/>
+              </a:ext>
+            </a:extLst>
+          </p:cNvPr>
+          <p:cNvSpPr/>
+          <p:nvPr/>
+        </p:nvSpPr>
+        <p:spPr>
+          <a:xfrm>
+            <a:off x="919343" y="17803102"/>
+            <a:ext cx="9204371" cy="3353497"/>
+          </a:xfrm>
+          <a:prstGeom prst="rect">
+            <a:avLst/>
+          </a:prstGeom>
+          <a:noFill/>
+          <a:ln w="12700" cap="flat">
+            <a:noFill/>
+            <a:miter lim="400000"/>
+          </a:ln>
+          <a:effectLst/>
+          <a:extLst>
+            <a:ext uri="{C572A759-6A51-4108-AA02-DFA0A04FC94B}">
+              <ma14:wrappingTextBoxFlag xmlns:ma14="http://schemas.microsoft.com/office/mac/drawingml/2011/main" xmlns="" val="1"/>
+            </a:ext>
+          </a:extLst>
+        </p:spPr>
+        <p:txBody>
+          <a:bodyPr wrap="square" lIns="0" tIns="0" rIns="0" bIns="0" numCol="1" anchor="t">
+            <a:noAutofit/>
+          </a:bodyPr>
+          <a:lstStyle>
+            <a:lvl1pPr algn="l" defTabSz="584200">
+              <a:lnSpc>
+                <a:spcPct val="110000"/>
+              </a:lnSpc>
+              <a:spcBef>
+                <a:spcPts val="3000"/>
+              </a:spcBef>
+              <a:defRPr sz="2000">
+                <a:solidFill>
+                  <a:srgbClr val="4C4C4C"/>
+                </a:solidFill>
+                <a:latin typeface="Helvetica Neue Light"/>
+                <a:ea typeface="Helvetica Neue Light"/>
+                <a:cs typeface="Helvetica Neue Light"/>
+                <a:sym typeface="Helvetica Neue Light"/>
+              </a:defRPr>
+            </a:lvl1pPr>
+          </a:lstStyle>
+          <a:p>
+            <a:pPr lvl="0" algn="just">
+              <a:lnSpc>
+                <a:spcPct val="100000"/>
+              </a:lnSpc>
+              <a:spcBef>
+                <a:spcPts val="0"/>
+              </a:spcBef>
+              <a:defRPr sz="1800">
+                <a:solidFill>
+                  <a:srgbClr val="000000"/>
+                </a:solidFill>
+              </a:defRPr>
+            </a:pPr>
+            <a:r>
+              <a:rPr lang="en-US" sz="2400" b="1" u="sng" dirty="0">
+                <a:solidFill>
+                  <a:srgbClr val="0170AD"/>
+                </a:solidFill>
+                <a:latin typeface="Lato Light"/>
+                <a:ea typeface="Lato Light"/>
+                <a:cs typeface="Lato Light"/>
+              </a:rPr>
+              <a:t>Architecture:</a:t>
+            </a:r>
+          </a:p>
+          <a:p>
+            <a:pPr marL="342900" lvl="0" indent="-342900" algn="just">
+              <a:lnSpc>
+                <a:spcPct val="100000"/>
+              </a:lnSpc>
+              <a:spcBef>
+                <a:spcPts val="0"/>
+              </a:spcBef>
+              <a:buFont typeface="Arial" panose="020B0604020202020204" pitchFamily="34" charset="0"/>
+              <a:buChar char="•"/>
+              <a:defRPr sz="1800">
+                <a:solidFill>
+                  <a:srgbClr val="000000"/>
+                </a:solidFill>
+              </a:defRPr>
+            </a:pPr>
+            <a:r>
+              <a:rPr lang="en-US" sz="2400" b="1" dirty="0">
+                <a:solidFill>
+                  <a:srgbClr val="0170AD"/>
+                </a:solidFill>
+                <a:latin typeface="Lato Light"/>
+                <a:ea typeface="Lato Light"/>
+                <a:cs typeface="Lato Light"/>
+              </a:rPr>
+              <a:t>To test our code we used transfer learning on a VGG16 architecture with </a:t>
+            </a:r>
+            <a:r>
+              <a:rPr lang="en-US" sz="2400" b="1" dirty="0" err="1">
+                <a:solidFill>
+                  <a:srgbClr val="0170AD"/>
+                </a:solidFill>
+                <a:latin typeface="Lato Light"/>
+                <a:ea typeface="Lato Light"/>
+                <a:cs typeface="Lato Light"/>
+              </a:rPr>
+              <a:t>pretrained</a:t>
+            </a:r>
+            <a:r>
+              <a:rPr lang="en-US" sz="2400" b="1" dirty="0">
+                <a:solidFill>
+                  <a:srgbClr val="0170AD"/>
+                </a:solidFill>
+                <a:latin typeface="Lato Light"/>
+                <a:ea typeface="Lato Light"/>
+                <a:cs typeface="Lato Light"/>
+              </a:rPr>
+              <a:t> image net weights. </a:t>
+            </a:r>
+          </a:p>
+          <a:p>
+            <a:pPr marL="342900" lvl="0" indent="-342900" algn="just">
+              <a:lnSpc>
+                <a:spcPct val="100000"/>
+              </a:lnSpc>
+              <a:spcBef>
+                <a:spcPts val="0"/>
+              </a:spcBef>
+              <a:buFont typeface="Arial" panose="020B0604020202020204" pitchFamily="34" charset="0"/>
+              <a:buChar char="•"/>
+              <a:defRPr sz="1800">
+                <a:solidFill>
+                  <a:srgbClr val="000000"/>
+                </a:solidFill>
+              </a:defRPr>
+            </a:pPr>
+            <a:r>
+              <a:rPr lang="en-US" sz="2400" b="1" dirty="0">
+                <a:solidFill>
+                  <a:srgbClr val="0170AD"/>
+                </a:solidFill>
+                <a:latin typeface="Lato Light"/>
+                <a:ea typeface="Lato Light"/>
+                <a:cs typeface="Lato Light"/>
+              </a:rPr>
+              <a:t>For the Inception_V3 and the </a:t>
+            </a:r>
+            <a:r>
+              <a:rPr lang="en-US" sz="2400" b="1" dirty="0" err="1">
+                <a:solidFill>
+                  <a:srgbClr val="0170AD"/>
+                </a:solidFill>
+                <a:latin typeface="Lato Light"/>
+                <a:ea typeface="Lato Light"/>
+                <a:cs typeface="Lato Light"/>
+              </a:rPr>
+              <a:t>Xception</a:t>
+            </a:r>
+            <a:r>
+              <a:rPr lang="en-US" sz="2400" b="1" dirty="0">
+                <a:solidFill>
+                  <a:srgbClr val="0170AD"/>
+                </a:solidFill>
+                <a:latin typeface="Lato Light"/>
+                <a:ea typeface="Lato Light"/>
+                <a:cs typeface="Lato Light"/>
+              </a:rPr>
+              <a:t> architecture we also used </a:t>
+            </a:r>
+            <a:r>
+              <a:rPr lang="en-US" sz="2400" b="1" dirty="0" err="1">
+                <a:solidFill>
+                  <a:srgbClr val="0170AD"/>
+                </a:solidFill>
+                <a:latin typeface="Lato Light"/>
+                <a:ea typeface="Lato Light"/>
+                <a:cs typeface="Lato Light"/>
+              </a:rPr>
+              <a:t>pretrained</a:t>
+            </a:r>
+            <a:r>
+              <a:rPr lang="en-US" sz="2400" b="1" dirty="0">
+                <a:solidFill>
+                  <a:srgbClr val="0170AD"/>
+                </a:solidFill>
+                <a:latin typeface="Lato Light"/>
+                <a:ea typeface="Lato Light"/>
+                <a:cs typeface="Lato Light"/>
+              </a:rPr>
+              <a:t> model from </a:t>
+            </a:r>
+            <a:r>
+              <a:rPr lang="en-US" sz="2400" b="1" dirty="0" err="1">
+                <a:solidFill>
+                  <a:srgbClr val="0170AD"/>
+                </a:solidFill>
+                <a:latin typeface="Lato Light"/>
+                <a:ea typeface="Lato Light"/>
+                <a:cs typeface="Lato Light"/>
+              </a:rPr>
+              <a:t>Keras</a:t>
+            </a:r>
+            <a:r>
+              <a:rPr lang="en-US" sz="2400" b="1" dirty="0">
+                <a:solidFill>
+                  <a:srgbClr val="0170AD"/>
+                </a:solidFill>
+                <a:latin typeface="Lato Light"/>
+                <a:ea typeface="Lato Light"/>
+                <a:cs typeface="Lato Light"/>
+              </a:rPr>
+              <a:t> with image net weights</a:t>
+            </a:r>
+          </a:p>
+          <a:p>
+            <a:pPr marL="342900" lvl="0" indent="-342900" algn="just">
+              <a:lnSpc>
+                <a:spcPct val="100000"/>
+              </a:lnSpc>
+              <a:spcBef>
+                <a:spcPts val="0"/>
+              </a:spcBef>
+              <a:buFont typeface="Arial" panose="020B0604020202020204" pitchFamily="34" charset="0"/>
+              <a:buChar char="•"/>
+              <a:defRPr sz="1800">
+                <a:solidFill>
+                  <a:srgbClr val="000000"/>
+                </a:solidFill>
+              </a:defRPr>
+            </a:pPr>
+            <a:r>
+              <a:rPr lang="en-US" sz="2400" b="1" dirty="0">
+                <a:solidFill>
+                  <a:srgbClr val="0170AD"/>
+                </a:solidFill>
+                <a:latin typeface="Lato Light"/>
+                <a:ea typeface="Lato Light"/>
+                <a:cs typeface="Lato Light"/>
+              </a:rPr>
+              <a:t>For all models we replaced the top with a global average pooling layer, followed by a fully connected layer (size of 1024 and a </a:t>
+            </a:r>
+            <a:r>
+              <a:rPr lang="en-US" sz="2400" b="1" dirty="0" err="1">
+                <a:solidFill>
+                  <a:srgbClr val="0170AD"/>
+                </a:solidFill>
+                <a:latin typeface="Lato Light"/>
+                <a:ea typeface="Lato Light"/>
+                <a:cs typeface="Lato Light"/>
+              </a:rPr>
+              <a:t>relu</a:t>
+            </a:r>
+            <a:r>
+              <a:rPr lang="en-US" sz="2400" b="1" dirty="0">
+                <a:solidFill>
+                  <a:srgbClr val="0170AD"/>
+                </a:solidFill>
+                <a:latin typeface="Lato Light"/>
+                <a:ea typeface="Lato Light"/>
+                <a:cs typeface="Lato Light"/>
+              </a:rPr>
+              <a:t> action function) and a prediction layer (size of 9 and a sigmoid activation function for multi-label classification)</a:t>
+            </a:r>
+          </a:p>
+        </p:txBody>
+      </p:sp>
+      <p:sp>
+        <p:nvSpPr>
+          <p:cNvPr id="51" name="Shape 188">
+            <a:extLst>
+              <a:ext uri="{FF2B5EF4-FFF2-40B4-BE49-F238E27FC236}">
+                <a16:creationId xmlns:a16="http://schemas.microsoft.com/office/drawing/2014/main" id="{44E098BF-EAFD-2147-9E33-14CEFA65FC86}"/>
+              </a:ext>
+            </a:extLst>
+          </p:cNvPr>
+          <p:cNvSpPr/>
+          <p:nvPr/>
+        </p:nvSpPr>
+        <p:spPr>
+          <a:xfrm>
+            <a:off x="919342" y="21510288"/>
+            <a:ext cx="9204371" cy="3535699"/>
+          </a:xfrm>
+          <a:prstGeom prst="rect">
+            <a:avLst/>
+          </a:prstGeom>
+          <a:noFill/>
+          <a:ln w="12700" cap="flat">
+            <a:noFill/>
+            <a:miter lim="400000"/>
+          </a:ln>
+          <a:effectLst/>
+          <a:extLst>
+            <a:ext uri="{C572A759-6A51-4108-AA02-DFA0A04FC94B}">
+              <ma14:wrappingTextBoxFlag xmlns:ma14="http://schemas.microsoft.com/office/mac/drawingml/2011/main" xmlns="" val="1"/>
+            </a:ext>
+          </a:extLst>
+        </p:spPr>
+        <p:txBody>
+          <a:bodyPr wrap="square" lIns="0" tIns="0" rIns="0" bIns="0" numCol="1" anchor="t">
+            <a:noAutofit/>
+          </a:bodyPr>
+          <a:lstStyle>
+            <a:lvl1pPr algn="l" defTabSz="584200">
+              <a:lnSpc>
+                <a:spcPct val="110000"/>
+              </a:lnSpc>
+              <a:spcBef>
+                <a:spcPts val="3000"/>
+              </a:spcBef>
+              <a:defRPr sz="2000">
+                <a:solidFill>
+                  <a:srgbClr val="4C4C4C"/>
+                </a:solidFill>
+                <a:latin typeface="Helvetica Neue Light"/>
+                <a:ea typeface="Helvetica Neue Light"/>
+                <a:cs typeface="Helvetica Neue Light"/>
+                <a:sym typeface="Helvetica Neue Light"/>
+              </a:defRPr>
+            </a:lvl1pPr>
+          </a:lstStyle>
+          <a:p>
+            <a:pPr lvl="0" algn="just">
+              <a:lnSpc>
+                <a:spcPct val="100000"/>
+              </a:lnSpc>
+              <a:spcBef>
+                <a:spcPts val="0"/>
+              </a:spcBef>
+              <a:defRPr sz="1800">
+                <a:solidFill>
+                  <a:srgbClr val="000000"/>
+                </a:solidFill>
+              </a:defRPr>
+            </a:pPr>
+            <a:r>
+              <a:rPr lang="en-US" sz="2400" b="1" u="sng" dirty="0">
+                <a:solidFill>
+                  <a:srgbClr val="0170AD"/>
+                </a:solidFill>
+                <a:latin typeface="Lato Light"/>
+                <a:ea typeface="Lato Light"/>
+                <a:cs typeface="Lato Light"/>
+              </a:rPr>
+              <a:t>Training:</a:t>
+            </a:r>
+          </a:p>
+          <a:p>
+            <a:pPr marL="342900" lvl="0" indent="-342900" algn="just">
+              <a:lnSpc>
+                <a:spcPct val="100000"/>
+              </a:lnSpc>
+              <a:spcBef>
+                <a:spcPts val="0"/>
+              </a:spcBef>
+              <a:buFont typeface="Arial" panose="020B0604020202020204" pitchFamily="34" charset="0"/>
+              <a:buChar char="•"/>
+              <a:defRPr sz="1800">
+                <a:solidFill>
+                  <a:srgbClr val="000000"/>
+                </a:solidFill>
+              </a:defRPr>
+            </a:pPr>
+            <a:r>
+              <a:rPr lang="en-US" sz="2400" b="1" dirty="0">
+                <a:solidFill>
+                  <a:srgbClr val="0170AD"/>
+                </a:solidFill>
+                <a:latin typeface="Lato Light"/>
+                <a:ea typeface="Lato Light"/>
+                <a:cs typeface="Lato Light"/>
+              </a:rPr>
+              <a:t>To test our preprocessing we first trained with a very small subset on VGG16 and later with a bigger one until we achieved promising results</a:t>
+            </a:r>
+          </a:p>
+          <a:p>
+            <a:pPr marL="342900" lvl="0" indent="-342900" algn="just">
+              <a:lnSpc>
+                <a:spcPct val="100000"/>
+              </a:lnSpc>
+              <a:spcBef>
+                <a:spcPts val="0"/>
+              </a:spcBef>
+              <a:buFont typeface="Arial" panose="020B0604020202020204" pitchFamily="34" charset="0"/>
+              <a:buChar char="•"/>
+              <a:defRPr sz="1800">
+                <a:solidFill>
+                  <a:srgbClr val="000000"/>
+                </a:solidFill>
+              </a:defRPr>
+            </a:pPr>
+            <a:r>
+              <a:rPr lang="en-US" sz="2400" b="1" dirty="0">
+                <a:solidFill>
+                  <a:srgbClr val="0170AD"/>
+                </a:solidFill>
+                <a:latin typeface="Lato Light"/>
+                <a:ea typeface="Lato Light"/>
+                <a:cs typeface="Lato Light"/>
+              </a:rPr>
+              <a:t>We used Adam as our optimizer</a:t>
+            </a:r>
+          </a:p>
+          <a:p>
+            <a:pPr marL="342900" lvl="0" indent="-342900" algn="just">
+              <a:lnSpc>
+                <a:spcPct val="100000"/>
+              </a:lnSpc>
+              <a:spcBef>
+                <a:spcPts val="0"/>
+              </a:spcBef>
+              <a:buFont typeface="Arial" panose="020B0604020202020204" pitchFamily="34" charset="0"/>
+              <a:buChar char="•"/>
+              <a:defRPr sz="1800">
+                <a:solidFill>
+                  <a:srgbClr val="000000"/>
+                </a:solidFill>
+              </a:defRPr>
+            </a:pPr>
+            <a:r>
+              <a:rPr lang="en-US" sz="2400" b="1" dirty="0">
+                <a:solidFill>
+                  <a:srgbClr val="0170AD"/>
+                </a:solidFill>
+                <a:latin typeface="Lato Light"/>
+                <a:ea typeface="Lato Light"/>
+                <a:cs typeface="Lato Light"/>
+              </a:rPr>
+              <a:t>For multi-label classification we used a binary-</a:t>
+            </a:r>
+            <a:r>
+              <a:rPr lang="en-US" sz="2400" b="1" dirty="0" err="1">
+                <a:solidFill>
+                  <a:srgbClr val="0170AD"/>
+                </a:solidFill>
+                <a:latin typeface="Lato Light"/>
+                <a:ea typeface="Lato Light"/>
+                <a:cs typeface="Lato Light"/>
+              </a:rPr>
+              <a:t>crossentropy</a:t>
+            </a:r>
+            <a:r>
+              <a:rPr lang="en-US" sz="2400" b="1" dirty="0">
+                <a:solidFill>
+                  <a:srgbClr val="0170AD"/>
+                </a:solidFill>
+                <a:latin typeface="Lato Light"/>
+                <a:ea typeface="Lato Light"/>
+                <a:cs typeface="Lato Light"/>
+              </a:rPr>
+              <a:t> loss and an F-score as our metric</a:t>
+            </a:r>
+          </a:p>
+          <a:p>
+            <a:pPr marL="342900" lvl="0" indent="-342900" algn="just">
+              <a:lnSpc>
+                <a:spcPct val="100000"/>
+              </a:lnSpc>
+              <a:spcBef>
+                <a:spcPts val="0"/>
+              </a:spcBef>
+              <a:buFont typeface="Arial" panose="020B0604020202020204" pitchFamily="34" charset="0"/>
+              <a:buChar char="•"/>
+              <a:defRPr sz="1800">
+                <a:solidFill>
+                  <a:srgbClr val="000000"/>
+                </a:solidFill>
+              </a:defRPr>
+            </a:pPr>
+            <a:r>
+              <a:rPr lang="en-US" sz="2400" b="1" dirty="0">
+                <a:solidFill>
+                  <a:srgbClr val="0170AD"/>
+                </a:solidFill>
+                <a:latin typeface="Lato Light"/>
+                <a:ea typeface="Lato Light"/>
+                <a:cs typeface="Lato Light"/>
+              </a:rPr>
+              <a:t>For </a:t>
+            </a:r>
+            <a:r>
+              <a:rPr lang="en-US" sz="2400" b="1" dirty="0" err="1">
+                <a:solidFill>
+                  <a:srgbClr val="0170AD"/>
+                </a:solidFill>
+                <a:latin typeface="Lato Light"/>
+                <a:ea typeface="Lato Light"/>
+                <a:cs typeface="Lato Light"/>
+              </a:rPr>
+              <a:t>hyperparameter</a:t>
+            </a:r>
+            <a:r>
+              <a:rPr lang="en-US" sz="2400" b="1" dirty="0">
+                <a:solidFill>
+                  <a:srgbClr val="0170AD"/>
+                </a:solidFill>
+                <a:latin typeface="Lato Light"/>
+                <a:ea typeface="Lato Light"/>
+                <a:cs typeface="Lato Light"/>
+              </a:rPr>
+              <a:t> search we used a grid search</a:t>
+            </a:r>
+          </a:p>
+          <a:p>
+            <a:pPr marL="342900" lvl="0" indent="-342900" algn="just">
+              <a:lnSpc>
+                <a:spcPct val="100000"/>
+              </a:lnSpc>
+              <a:spcBef>
+                <a:spcPts val="0"/>
+              </a:spcBef>
+              <a:buFont typeface="Arial" panose="020B0604020202020204" pitchFamily="34" charset="0"/>
+              <a:buChar char="•"/>
+              <a:defRPr sz="1800">
+                <a:solidFill>
+                  <a:srgbClr val="000000"/>
+                </a:solidFill>
+              </a:defRPr>
+            </a:pPr>
+            <a:r>
+              <a:rPr lang="en-US" sz="2400" b="1" dirty="0">
+                <a:solidFill>
+                  <a:srgbClr val="0170AD"/>
+                </a:solidFill>
+                <a:latin typeface="Lato Light"/>
+                <a:ea typeface="Lato Light"/>
+                <a:cs typeface="Lato Light"/>
+              </a:rPr>
+              <a:t>We used checkpoints during training</a:t>
             </a:r>
           </a:p>
         </p:txBody>

</xml_diff>

<commit_message>
I started to add our sources to the readme and worked on the methodology of the RNN network
</commit_message>
<xml_diff>
--- a/Poster/Poster_Team_55.pptx
+++ b/Poster/Poster_Team_55.pptx
@@ -269,7 +269,7 @@
           <a:p>
             <a:fld id="{B080005E-6FBA-574A-8FE4-9107E485CAF7}" type="datetimeFigureOut">
               <a:rPr lang="en-US" smtClean="0"/>
-              <a:t>2/3/18</a:t>
+              <a:t>2/4/18</a:t>
             </a:fld>
             <a:endParaRPr lang="en-US"/>
           </a:p>
@@ -439,7 +439,7 @@
           <a:p>
             <a:fld id="{B080005E-6FBA-574A-8FE4-9107E485CAF7}" type="datetimeFigureOut">
               <a:rPr lang="en-US" smtClean="0"/>
-              <a:t>2/3/18</a:t>
+              <a:t>2/4/18</a:t>
             </a:fld>
             <a:endParaRPr lang="en-US"/>
           </a:p>
@@ -619,7 +619,7 @@
           <a:p>
             <a:fld id="{B080005E-6FBA-574A-8FE4-9107E485CAF7}" type="datetimeFigureOut">
               <a:rPr lang="en-US" smtClean="0"/>
-              <a:t>2/3/18</a:t>
+              <a:t>2/4/18</a:t>
             </a:fld>
             <a:endParaRPr lang="en-US"/>
           </a:p>
@@ -1065,7 +1065,7 @@
           <a:p>
             <a:fld id="{B080005E-6FBA-574A-8FE4-9107E485CAF7}" type="datetimeFigureOut">
               <a:rPr lang="en-US" smtClean="0"/>
-              <a:t>2/3/18</a:t>
+              <a:t>2/4/18</a:t>
             </a:fld>
             <a:endParaRPr lang="en-US"/>
           </a:p>
@@ -1309,7 +1309,7 @@
           <a:p>
             <a:fld id="{B080005E-6FBA-574A-8FE4-9107E485CAF7}" type="datetimeFigureOut">
               <a:rPr lang="en-US" smtClean="0"/>
-              <a:t>2/3/18</a:t>
+              <a:t>2/4/18</a:t>
             </a:fld>
             <a:endParaRPr lang="en-US"/>
           </a:p>
@@ -1541,7 +1541,7 @@
           <a:p>
             <a:fld id="{B080005E-6FBA-574A-8FE4-9107E485CAF7}" type="datetimeFigureOut">
               <a:rPr lang="en-US" smtClean="0"/>
-              <a:t>2/3/18</a:t>
+              <a:t>2/4/18</a:t>
             </a:fld>
             <a:endParaRPr lang="en-US"/>
           </a:p>
@@ -1908,7 +1908,7 @@
           <a:p>
             <a:fld id="{B080005E-6FBA-574A-8FE4-9107E485CAF7}" type="datetimeFigureOut">
               <a:rPr lang="en-US" smtClean="0"/>
-              <a:t>2/3/18</a:t>
+              <a:t>2/4/18</a:t>
             </a:fld>
             <a:endParaRPr lang="en-US"/>
           </a:p>
@@ -2026,7 +2026,7 @@
           <a:p>
             <a:fld id="{B080005E-6FBA-574A-8FE4-9107E485CAF7}" type="datetimeFigureOut">
               <a:rPr lang="en-US" smtClean="0"/>
-              <a:t>2/3/18</a:t>
+              <a:t>2/4/18</a:t>
             </a:fld>
             <a:endParaRPr lang="en-US"/>
           </a:p>
@@ -2121,7 +2121,7 @@
           <a:p>
             <a:fld id="{B080005E-6FBA-574A-8FE4-9107E485CAF7}" type="datetimeFigureOut">
               <a:rPr lang="en-US" smtClean="0"/>
-              <a:t>2/3/18</a:t>
+              <a:t>2/4/18</a:t>
             </a:fld>
             <a:endParaRPr lang="en-US"/>
           </a:p>
@@ -2398,7 +2398,7 @@
           <a:p>
             <a:fld id="{B080005E-6FBA-574A-8FE4-9107E485CAF7}" type="datetimeFigureOut">
               <a:rPr lang="en-US" smtClean="0"/>
-              <a:t>2/3/18</a:t>
+              <a:t>2/4/18</a:t>
             </a:fld>
             <a:endParaRPr lang="en-US"/>
           </a:p>
@@ -2655,7 +2655,7 @@
           <a:p>
             <a:fld id="{B080005E-6FBA-574A-8FE4-9107E485CAF7}" type="datetimeFigureOut">
               <a:rPr lang="en-US" smtClean="0"/>
-              <a:t>2/3/18</a:t>
+              <a:t>2/4/18</a:t>
             </a:fld>
             <a:endParaRPr lang="en-US"/>
           </a:p>
@@ -2868,7 +2868,7 @@
           <a:p>
             <a:fld id="{B080005E-6FBA-574A-8FE4-9107E485CAF7}" type="datetimeFigureOut">
               <a:rPr lang="en-US" smtClean="0"/>
-              <a:t>2/3/18</a:t>
+              <a:t>2/4/18</a:t>
             </a:fld>
             <a:endParaRPr lang="en-US"/>
           </a:p>
@@ -3839,7 +3839,7 @@
           <a:effectLst/>
           <a:extLst>
             <a:ext uri="{C572A759-6A51-4108-AA02-DFA0A04FC94B}">
-              <ma14:wrappingTextBoxFlag xmlns:ma14="http://schemas.microsoft.com/office/mac/drawingml/2011/main" xmlns="" val="1"/>
+              <ma14:wrappingTextBoxFlag xmlns="" xmlns:ma14="http://schemas.microsoft.com/office/mac/drawingml/2011/main" val="1"/>
             </a:ext>
           </a:extLst>
         </p:spPr>
@@ -4032,7 +4032,7 @@
           <a:effectLst/>
           <a:extLst>
             <a:ext uri="{C572A759-6A51-4108-AA02-DFA0A04FC94B}">
-              <ma14:wrappingTextBoxFlag xmlns:ma14="http://schemas.microsoft.com/office/mac/drawingml/2011/main" xmlns="" val="1"/>
+              <ma14:wrappingTextBoxFlag xmlns="" xmlns:ma14="http://schemas.microsoft.com/office/mac/drawingml/2011/main" val="1"/>
             </a:ext>
           </a:extLst>
         </p:spPr>
@@ -4226,7 +4226,7 @@
           <a:effectLst/>
           <a:extLst>
             <a:ext uri="{C572A759-6A51-4108-AA02-DFA0A04FC94B}">
-              <ma14:wrappingTextBoxFlag xmlns:ma14="http://schemas.microsoft.com/office/mac/drawingml/2011/main" xmlns="" val="1"/>
+              <ma14:wrappingTextBoxFlag xmlns="" xmlns:ma14="http://schemas.microsoft.com/office/mac/drawingml/2011/main" val="1"/>
             </a:ext>
           </a:extLst>
         </p:spPr>
@@ -4692,7 +4692,7 @@
           <a:effectLst/>
           <a:extLst>
             <a:ext uri="{C572A759-6A51-4108-AA02-DFA0A04FC94B}">
-              <ma14:wrappingTextBoxFlag xmlns:ma14="http://schemas.microsoft.com/office/mac/drawingml/2011/main" xmlns="" val="1"/>
+              <ma14:wrappingTextBoxFlag xmlns="" xmlns:ma14="http://schemas.microsoft.com/office/mac/drawingml/2011/main" val="1"/>
             </a:ext>
           </a:extLst>
         </p:spPr>
@@ -4880,7 +4880,7 @@
           <a:effectLst/>
           <a:extLst>
             <a:ext uri="{C572A759-6A51-4108-AA02-DFA0A04FC94B}">
-              <ma14:wrappingTextBoxFlag xmlns:ma14="http://schemas.microsoft.com/office/mac/drawingml/2011/main" xmlns="" val="1"/>
+              <ma14:wrappingTextBoxFlag xmlns="" xmlns:ma14="http://schemas.microsoft.com/office/mac/drawingml/2011/main" val="1"/>
             </a:ext>
           </a:extLst>
         </p:spPr>
@@ -4960,7 +4960,7 @@
           <a:effectLst/>
           <a:extLst>
             <a:ext uri="{C572A759-6A51-4108-AA02-DFA0A04FC94B}">
-              <ma14:wrappingTextBoxFlag xmlns:ma14="http://schemas.microsoft.com/office/mac/drawingml/2011/main" xmlns="" val="1"/>
+              <ma14:wrappingTextBoxFlag xmlns="" xmlns:ma14="http://schemas.microsoft.com/office/mac/drawingml/2011/main" val="1"/>
             </a:ext>
           </a:extLst>
         </p:spPr>
@@ -5087,7 +5087,7 @@
           <a:effectLst/>
           <a:extLst>
             <a:ext uri="{C572A759-6A51-4108-AA02-DFA0A04FC94B}">
-              <ma14:wrappingTextBoxFlag xmlns:ma14="http://schemas.microsoft.com/office/mac/drawingml/2011/main" xmlns="" val="1"/>
+              <ma14:wrappingTextBoxFlag xmlns="" xmlns:ma14="http://schemas.microsoft.com/office/mac/drawingml/2011/main" val="1"/>
             </a:ext>
           </a:extLst>
         </p:spPr>
@@ -5170,7 +5170,7 @@
           <a:effectLst/>
           <a:extLst>
             <a:ext uri="{C572A759-6A51-4108-AA02-DFA0A04FC94B}">
-              <ma14:wrappingTextBoxFlag xmlns:ma14="http://schemas.microsoft.com/office/mac/drawingml/2011/main" xmlns="" val="1"/>
+              <ma14:wrappingTextBoxFlag xmlns="" xmlns:ma14="http://schemas.microsoft.com/office/mac/drawingml/2011/main" val="1"/>
             </a:ext>
           </a:extLst>
         </p:spPr>
@@ -5288,7 +5288,7 @@
           <a:effectLst/>
           <a:extLst>
             <a:ext uri="{C572A759-6A51-4108-AA02-DFA0A04FC94B}">
-              <ma14:wrappingTextBoxFlag xmlns:ma14="http://schemas.microsoft.com/office/mac/drawingml/2011/main" xmlns="" val="1"/>
+              <ma14:wrappingTextBoxFlag xmlns="" xmlns:ma14="http://schemas.microsoft.com/office/mac/drawingml/2011/main" val="1"/>
             </a:ext>
           </a:extLst>
         </p:spPr>
@@ -5368,7 +5368,7 @@
           <a:effectLst/>
           <a:extLst>
             <a:ext uri="{C572A759-6A51-4108-AA02-DFA0A04FC94B}">
-              <ma14:wrappingTextBoxFlag xmlns:ma14="http://schemas.microsoft.com/office/mac/drawingml/2011/main" xmlns="" val="1"/>
+              <ma14:wrappingTextBoxFlag xmlns="" xmlns:ma14="http://schemas.microsoft.com/office/mac/drawingml/2011/main" val="1"/>
             </a:ext>
           </a:extLst>
         </p:spPr>
@@ -5448,7 +5448,7 @@
           <a:effectLst/>
           <a:extLst>
             <a:ext uri="{C572A759-6A51-4108-AA02-DFA0A04FC94B}">
-              <ma14:wrappingTextBoxFlag xmlns:ma14="http://schemas.microsoft.com/office/mac/drawingml/2011/main" xmlns="" val="1"/>
+              <ma14:wrappingTextBoxFlag xmlns="" xmlns:ma14="http://schemas.microsoft.com/office/mac/drawingml/2011/main" val="1"/>
             </a:ext>
           </a:extLst>
         </p:spPr>
@@ -5526,7 +5526,7 @@
                 <a:ea typeface="Lato Light"/>
                 <a:cs typeface="Lato Light"/>
               </a:rPr>
-              <a:t>We mapped the restaurant and it’s attributes to the induvial image to label them</a:t>
+              <a:t>We mapped the restaurants and their attributes to the induvial image to label them</a:t>
             </a:r>
           </a:p>
           <a:p>
@@ -5554,7 +5554,7 @@
                 <a:ea typeface="Lato Light"/>
                 <a:cs typeface="Lato Light"/>
               </a:rPr>
-              <a:t>We used a subset of 40k test images, </a:t>
+              <a:t>We used a subset of 40k training images, </a:t>
             </a:r>
             <a:r>
               <a:rPr lang="en-US" sz="2400" b="1" dirty="0" err="1">
@@ -5598,7 +5598,7 @@
                 <a:ea typeface="Lato Light"/>
                 <a:cs typeface="Lato Light"/>
               </a:rPr>
-              <a:t> test images -&gt; saved in a HDF5 file</a:t>
+              <a:t> test images -&gt; saved in an HDF5 file</a:t>
             </a:r>
           </a:p>
           <a:p>
@@ -5693,7 +5693,7 @@
         <p:spPr>
           <a:xfrm>
             <a:off x="11480605" y="14527718"/>
-            <a:ext cx="9204371" cy="2447479"/>
+            <a:ext cx="9204371" cy="4083891"/>
           </a:xfrm>
           <a:prstGeom prst="rect">
             <a:avLst/>
@@ -5706,7 +5706,7 @@
           <a:effectLst/>
           <a:extLst>
             <a:ext uri="{C572A759-6A51-4108-AA02-DFA0A04FC94B}">
-              <ma14:wrappingTextBoxFlag xmlns:ma14="http://schemas.microsoft.com/office/mac/drawingml/2011/main" xmlns="" val="1"/>
+              <ma14:wrappingTextBoxFlag xmlns="" xmlns:ma14="http://schemas.microsoft.com/office/mac/drawingml/2011/main" val="1"/>
             </a:ext>
           </a:extLst>
         </p:spPr>
@@ -5756,8 +5756,220 @@
                 <a:ea typeface="Lato Light"/>
                 <a:cs typeface="Lato Light"/>
               </a:rPr>
-              <a:t>Preprocessing:  </a:t>
-            </a:r>
+              <a:t>Preprocessing:</a:t>
+            </a:r>
+          </a:p>
+          <a:p>
+            <a:pPr marL="342900" lvl="0" indent="-342900" algn="just">
+              <a:lnSpc>
+                <a:spcPct val="100000"/>
+              </a:lnSpc>
+              <a:spcBef>
+                <a:spcPts val="0"/>
+              </a:spcBef>
+              <a:buFont typeface="Arial" panose="020B0604020202020204" pitchFamily="34" charset="0"/>
+              <a:buChar char="•"/>
+              <a:defRPr sz="1800">
+                <a:solidFill>
+                  <a:srgbClr val="000000"/>
+                </a:solidFill>
+              </a:defRPr>
+            </a:pPr>
+            <a:r>
+              <a:rPr lang="en-US" sz="2400" b="1" dirty="0">
+                <a:solidFill>
+                  <a:srgbClr val="0170AD"/>
+                </a:solidFill>
+                <a:latin typeface="Lato Light"/>
+                <a:ea typeface="Lato Light"/>
+                <a:cs typeface="Lato Light"/>
+              </a:rPr>
+              <a:t>After importing the dataset, we created a set of all of the distinct characters in the text and then create a map of each character to a unique integer.</a:t>
+            </a:r>
+            <a:r>
+              <a:rPr lang="en-US" sz="2400" dirty="0">
+                <a:solidFill>
+                  <a:srgbClr val="0170AD"/>
+                </a:solidFill>
+                <a:latin typeface="Lato Light"/>
+                <a:ea typeface="Lato Light"/>
+                <a:cs typeface="Lato Light"/>
+              </a:rPr>
+              <a:t> </a:t>
+            </a:r>
+            <a:r>
+              <a:rPr lang="en-US" sz="2400" b="1" dirty="0">
+                <a:solidFill>
+                  <a:srgbClr val="0170AD"/>
+                </a:solidFill>
+                <a:latin typeface="Lato Light"/>
+                <a:ea typeface="Lato Light"/>
+                <a:cs typeface="Lato Light"/>
+              </a:rPr>
+              <a:t>We did this to train the model on integers.</a:t>
+            </a:r>
+          </a:p>
+          <a:p>
+            <a:pPr marL="342900" lvl="0" indent="-342900" algn="just">
+              <a:lnSpc>
+                <a:spcPct val="100000"/>
+              </a:lnSpc>
+              <a:spcBef>
+                <a:spcPts val="0"/>
+              </a:spcBef>
+              <a:buFont typeface="Arial" panose="020B0604020202020204" pitchFamily="34" charset="0"/>
+              <a:buChar char="•"/>
+              <a:defRPr sz="1800">
+                <a:solidFill>
+                  <a:srgbClr val="000000"/>
+                </a:solidFill>
+              </a:defRPr>
+            </a:pPr>
+            <a:r>
+              <a:rPr lang="en-US" sz="2400" b="1" dirty="0">
+                <a:solidFill>
+                  <a:srgbClr val="0170AD"/>
+                </a:solidFill>
+                <a:latin typeface="Lato Light"/>
+                <a:ea typeface="Lato Light"/>
+                <a:cs typeface="Lato Light"/>
+              </a:rPr>
+              <a:t>To define the training data, we split the text into subsequences of 100 characters</a:t>
+            </a:r>
+          </a:p>
+          <a:p>
+            <a:pPr marL="342900" lvl="0" indent="-342900" algn="just">
+              <a:lnSpc>
+                <a:spcPct val="100000"/>
+              </a:lnSpc>
+              <a:spcBef>
+                <a:spcPts val="0"/>
+              </a:spcBef>
+              <a:buFont typeface="Arial" panose="020B0604020202020204" pitchFamily="34" charset="0"/>
+              <a:buChar char="•"/>
+              <a:defRPr sz="1800">
+                <a:solidFill>
+                  <a:srgbClr val="000000"/>
+                </a:solidFill>
+              </a:defRPr>
+            </a:pPr>
+            <a:r>
+              <a:rPr lang="en-US" sz="2400" b="1" dirty="0">
+                <a:solidFill>
+                  <a:srgbClr val="0170AD"/>
+                </a:solidFill>
+                <a:latin typeface="Lato Light"/>
+                <a:ea typeface="Lato Light"/>
+                <a:cs typeface="Lato Light"/>
+              </a:rPr>
+              <a:t>We created these sequences by sliding along the whole book one character at a time, allowing each character a chance to be learned from the 100 characters that preceded it (except the first 100 characters of course). While doing this, we convert the characters to integers using our lookup table we prepared earlier.</a:t>
+            </a:r>
+          </a:p>
+          <a:p>
+            <a:pPr marL="342900" lvl="0" indent="-342900" algn="just">
+              <a:lnSpc>
+                <a:spcPct val="100000"/>
+              </a:lnSpc>
+              <a:spcBef>
+                <a:spcPts val="0"/>
+              </a:spcBef>
+              <a:buFont typeface="Arial" panose="020B0604020202020204" pitchFamily="34" charset="0"/>
+              <a:buChar char="•"/>
+              <a:defRPr sz="1800">
+                <a:solidFill>
+                  <a:srgbClr val="000000"/>
+                </a:solidFill>
+              </a:defRPr>
+            </a:pPr>
+            <a:r>
+              <a:rPr lang="en-US" sz="2400" b="1" dirty="0">
+                <a:solidFill>
+                  <a:srgbClr val="0170AD"/>
+                </a:solidFill>
+                <a:latin typeface="Lato Light"/>
+                <a:ea typeface="Lato Light"/>
+                <a:cs typeface="Lato Light"/>
+              </a:rPr>
+              <a:t>We transformed the input sequences into the form of [samples, time steps, features] so that they can fit into an LSTM.</a:t>
+            </a:r>
+          </a:p>
+          <a:p>
+            <a:pPr marL="342900" lvl="0" indent="-342900" algn="just">
+              <a:lnSpc>
+                <a:spcPct val="100000"/>
+              </a:lnSpc>
+              <a:spcBef>
+                <a:spcPts val="0"/>
+              </a:spcBef>
+              <a:buFont typeface="Arial" panose="020B0604020202020204" pitchFamily="34" charset="0"/>
+              <a:buChar char="•"/>
+              <a:defRPr sz="1800">
+                <a:solidFill>
+                  <a:srgbClr val="000000"/>
+                </a:solidFill>
+              </a:defRPr>
+            </a:pPr>
+            <a:r>
+              <a:rPr lang="en-US" sz="2400" b="1" dirty="0">
+                <a:solidFill>
+                  <a:srgbClr val="0170AD"/>
+                </a:solidFill>
+                <a:latin typeface="Lato Light"/>
+                <a:ea typeface="Lato Light"/>
+                <a:cs typeface="Lato Light"/>
+              </a:rPr>
+              <a:t>We normalized the input</a:t>
+            </a:r>
+          </a:p>
+          <a:p>
+            <a:pPr marL="342900" lvl="0" indent="-342900" algn="just">
+              <a:lnSpc>
+                <a:spcPct val="100000"/>
+              </a:lnSpc>
+              <a:spcBef>
+                <a:spcPts val="0"/>
+              </a:spcBef>
+              <a:buFont typeface="Arial" panose="020B0604020202020204" pitchFamily="34" charset="0"/>
+              <a:buChar char="•"/>
+              <a:defRPr sz="1800">
+                <a:solidFill>
+                  <a:srgbClr val="000000"/>
+                </a:solidFill>
+              </a:defRPr>
+            </a:pPr>
+            <a:endParaRPr lang="en-US" sz="2400" b="1" dirty="0">
+              <a:solidFill>
+                <a:srgbClr val="0170AD"/>
+              </a:solidFill>
+              <a:latin typeface="Lato Light"/>
+              <a:ea typeface="Lato Light"/>
+              <a:cs typeface="Lato Light"/>
+            </a:endParaRPr>
+          </a:p>
+          <a:p>
+            <a:pPr marL="342900" lvl="0" indent="-342900" algn="just">
+              <a:lnSpc>
+                <a:spcPct val="100000"/>
+              </a:lnSpc>
+              <a:spcBef>
+                <a:spcPts val="0"/>
+              </a:spcBef>
+              <a:buFont typeface="Arial" panose="020B0604020202020204" pitchFamily="34" charset="0"/>
+              <a:buChar char="•"/>
+              <a:defRPr sz="1800">
+                <a:solidFill>
+                  <a:srgbClr val="000000"/>
+                </a:solidFill>
+              </a:defRPr>
+            </a:pPr>
+            <a:endParaRPr lang="en-US" sz="2400" b="1" dirty="0">
+              <a:solidFill>
+                <a:srgbClr val="0170AD"/>
+              </a:solidFill>
+              <a:latin typeface="Lato Light"/>
+              <a:ea typeface="Lato Light"/>
+              <a:cs typeface="Lato Light"/>
+            </a:endParaRPr>
           </a:p>
         </p:txBody>
       </p:sp>
@@ -5776,7 +5988,7 @@
         <p:spPr>
           <a:xfrm>
             <a:off x="32152844" y="17224361"/>
-            <a:ext cx="8695842" cy="2308324"/>
+            <a:ext cx="8695842" cy="3046988"/>
           </a:xfrm>
           <a:prstGeom prst="rect">
             <a:avLst/>
@@ -5834,6 +6046,26 @@
             <a:r>
               <a:rPr lang="en-US" sz="2400" dirty="0"/>
               <a:t> winner interview</a:t>
+            </a:r>
+          </a:p>
+          <a:p>
+            <a:pPr marL="342900" indent="-342900">
+              <a:buFont typeface="Arial" panose="020B0604020202020204" pitchFamily="34" charset="0"/>
+              <a:buChar char="•"/>
+            </a:pPr>
+            <a:r>
+              <a:rPr lang="en-US" sz="2400" dirty="0"/>
+              <a:t>Class weights</a:t>
+            </a:r>
+          </a:p>
+          <a:p>
+            <a:pPr marL="342900" indent="-342900">
+              <a:buFont typeface="Arial" panose="020B0604020202020204" pitchFamily="34" charset="0"/>
+              <a:buChar char="•"/>
+            </a:pPr>
+            <a:r>
+              <a:rPr lang="en-US" sz="2400" dirty="0"/>
+              <a:t>Use GANs for text generation to have more semantic control</a:t>
             </a:r>
           </a:p>
         </p:txBody>
@@ -5866,7 +6098,7 @@
           <a:effectLst/>
           <a:extLst>
             <a:ext uri="{C572A759-6A51-4108-AA02-DFA0A04FC94B}">
-              <ma14:wrappingTextBoxFlag xmlns:ma14="http://schemas.microsoft.com/office/mac/drawingml/2011/main" xmlns="" val="1"/>
+              <ma14:wrappingTextBoxFlag xmlns="" xmlns:ma14="http://schemas.microsoft.com/office/mac/drawingml/2011/main" val="1"/>
             </a:ext>
           </a:extLst>
         </p:spPr>
@@ -5994,7 +6226,7 @@
                 <a:ea typeface="Lato Light"/>
                 <a:cs typeface="Lato Light"/>
               </a:rPr>
-              <a:t>For the Inception_V3 and the </a:t>
+              <a:t>For the Inception v3 and the </a:t>
             </a:r>
             <a:r>
               <a:rPr lang="en-US" sz="2400" b="1" dirty="0" err="1">
@@ -6016,7 +6248,7 @@
                 <a:ea typeface="Lato Light"/>
                 <a:cs typeface="Lato Light"/>
               </a:rPr>
-              <a:t> architecture we also used </a:t>
+              <a:t> architecture, we also used </a:t>
             </a:r>
             <a:r>
               <a:rPr lang="en-US" sz="2400" b="1" dirty="0" err="1">
@@ -6088,7 +6320,7 @@
                 <a:ea typeface="Lato Light"/>
                 <a:cs typeface="Lato Light"/>
               </a:rPr>
-              <a:t>For all models we replaced the top with a global average pooling layer, followed by a fully connected layer (size of 1024 and a </a:t>
+              <a:t>For all models, we replaced the top with a global average pooling layer, followed by a fully connected layer (size of 1024 and a </a:t>
             </a:r>
             <a:r>
               <a:rPr lang="en-US" sz="2400" b="1" dirty="0" err="1">
@@ -6143,7 +6375,7 @@
           <a:effectLst/>
           <a:extLst>
             <a:ext uri="{C572A759-6A51-4108-AA02-DFA0A04FC94B}">
-              <ma14:wrappingTextBoxFlag xmlns:ma14="http://schemas.microsoft.com/office/mac/drawingml/2011/main" xmlns="" val="1"/>
+              <ma14:wrappingTextBoxFlag xmlns="" xmlns:ma14="http://schemas.microsoft.com/office/mac/drawingml/2011/main" val="1"/>
             </a:ext>
           </a:extLst>
         </p:spPr>
@@ -6277,29 +6509,7 @@
                 <a:ea typeface="Lato Light"/>
                 <a:cs typeface="Lato Light"/>
               </a:rPr>
-              <a:t>For multi-label classification we used a binary-</a:t>
-            </a:r>
-            <a:r>
-              <a:rPr lang="en-US" sz="2400" b="1" dirty="0" err="1">
-                <a:solidFill>
-                  <a:srgbClr val="0170AD"/>
-                </a:solidFill>
-                <a:latin typeface="Lato Light"/>
-                <a:ea typeface="Lato Light"/>
-                <a:cs typeface="Lato Light"/>
-              </a:rPr>
-              <a:t>crossentropy</a:t>
-            </a:r>
-            <a:r>
-              <a:rPr lang="en-US" sz="2400" b="1" dirty="0">
-                <a:solidFill>
-                  <a:srgbClr val="0170AD"/>
-                </a:solidFill>
-                <a:latin typeface="Lato Light"/>
-                <a:ea typeface="Lato Light"/>
-                <a:cs typeface="Lato Light"/>
-              </a:rPr>
-              <a:t> loss and an F-score as our metric</a:t>
+              <a:t>For multi-label classification, we used a binary-cross entropy loss and an F-score as our metric</a:t>
             </a:r>
           </a:p>
           <a:p>
@@ -6349,7 +6559,252 @@
                 <a:ea typeface="Lato Light"/>
                 <a:cs typeface="Lato Light"/>
               </a:rPr>
-              <a:t> search we used a grid search</a:t>
+              <a:t> search, we used a grid search</a:t>
+            </a:r>
+          </a:p>
+          <a:p>
+            <a:pPr marL="342900" lvl="0" indent="-342900" algn="just">
+              <a:lnSpc>
+                <a:spcPct val="100000"/>
+              </a:lnSpc>
+              <a:spcBef>
+                <a:spcPts val="0"/>
+              </a:spcBef>
+              <a:buFont typeface="Arial" panose="020B0604020202020204" pitchFamily="34" charset="0"/>
+              <a:buChar char="•"/>
+              <a:defRPr sz="1800">
+                <a:solidFill>
+                  <a:srgbClr val="000000"/>
+                </a:solidFill>
+              </a:defRPr>
+            </a:pPr>
+            <a:r>
+              <a:rPr lang="en-US" sz="2400" b="1" dirty="0">
+                <a:solidFill>
+                  <a:srgbClr val="0170AD"/>
+                </a:solidFill>
+                <a:latin typeface="Lato Light"/>
+                <a:ea typeface="Lato Light"/>
+                <a:cs typeface="Lato Light"/>
+              </a:rPr>
+              <a:t>We used checkpoints during training</a:t>
+            </a:r>
+          </a:p>
+        </p:txBody>
+      </p:sp>
+      <p:sp>
+        <p:nvSpPr>
+          <p:cNvPr id="34" name="Shape 188">
+            <a:extLst>
+              <a:ext uri="{FF2B5EF4-FFF2-40B4-BE49-F238E27FC236}">
+                <a16:creationId xmlns:a16="http://schemas.microsoft.com/office/drawing/2014/main" id="{53005AED-E506-4C46-8ECE-031E75F77FB1}"/>
+              </a:ext>
+            </a:extLst>
+          </p:cNvPr>
+          <p:cNvSpPr/>
+          <p:nvPr/>
+        </p:nvSpPr>
+        <p:spPr>
+          <a:xfrm>
+            <a:off x="11480604" y="22492028"/>
+            <a:ext cx="9204371" cy="3535699"/>
+          </a:xfrm>
+          <a:prstGeom prst="rect">
+            <a:avLst/>
+          </a:prstGeom>
+          <a:noFill/>
+          <a:ln w="12700" cap="flat">
+            <a:noFill/>
+            <a:miter lim="400000"/>
+          </a:ln>
+          <a:effectLst/>
+          <a:extLst>
+            <a:ext uri="{C572A759-6A51-4108-AA02-DFA0A04FC94B}">
+              <ma14:wrappingTextBoxFlag xmlns="" xmlns:ma14="http://schemas.microsoft.com/office/mac/drawingml/2011/main" val="1"/>
+            </a:ext>
+          </a:extLst>
+        </p:spPr>
+        <p:txBody>
+          <a:bodyPr wrap="square" lIns="0" tIns="0" rIns="0" bIns="0" numCol="1" anchor="t">
+            <a:noAutofit/>
+          </a:bodyPr>
+          <a:lstStyle>
+            <a:lvl1pPr algn="l" defTabSz="584200">
+              <a:lnSpc>
+                <a:spcPct val="110000"/>
+              </a:lnSpc>
+              <a:spcBef>
+                <a:spcPts val="3000"/>
+              </a:spcBef>
+              <a:defRPr sz="2000">
+                <a:solidFill>
+                  <a:srgbClr val="4C4C4C"/>
+                </a:solidFill>
+                <a:latin typeface="Helvetica Neue Light"/>
+                <a:ea typeface="Helvetica Neue Light"/>
+                <a:cs typeface="Helvetica Neue Light"/>
+                <a:sym typeface="Helvetica Neue Light"/>
+              </a:defRPr>
+            </a:lvl1pPr>
+          </a:lstStyle>
+          <a:p>
+            <a:pPr lvl="0" algn="just">
+              <a:lnSpc>
+                <a:spcPct val="100000"/>
+              </a:lnSpc>
+              <a:spcBef>
+                <a:spcPts val="0"/>
+              </a:spcBef>
+              <a:defRPr sz="1800">
+                <a:solidFill>
+                  <a:srgbClr val="000000"/>
+                </a:solidFill>
+              </a:defRPr>
+            </a:pPr>
+            <a:r>
+              <a:rPr lang="en-US" sz="2400" b="1" u="sng" dirty="0">
+                <a:solidFill>
+                  <a:srgbClr val="0170AD"/>
+                </a:solidFill>
+                <a:latin typeface="Lato Light"/>
+                <a:ea typeface="Lato Light"/>
+                <a:cs typeface="Lato Light"/>
+              </a:rPr>
+              <a:t>Text generation:</a:t>
+            </a:r>
+          </a:p>
+          <a:p>
+            <a:pPr marL="342900" lvl="0" indent="-342900" algn="just">
+              <a:lnSpc>
+                <a:spcPct val="100000"/>
+              </a:lnSpc>
+              <a:spcBef>
+                <a:spcPts val="0"/>
+              </a:spcBef>
+              <a:buFont typeface="Arial" panose="020B0604020202020204" pitchFamily="34" charset="0"/>
+              <a:buChar char="•"/>
+              <a:defRPr sz="1800">
+                <a:solidFill>
+                  <a:srgbClr val="000000"/>
+                </a:solidFill>
+              </a:defRPr>
+            </a:pPr>
+            <a:r>
+              <a:rPr lang="en-US" sz="2400" b="1" dirty="0">
+                <a:solidFill>
+                  <a:srgbClr val="0170AD"/>
+                </a:solidFill>
+                <a:latin typeface="Lato Light"/>
+                <a:ea typeface="Lato Light"/>
+                <a:cs typeface="Lato Light"/>
+              </a:rPr>
+              <a:t>To test our preprocessing we first trained with a very small subset on VGG16 and later with a bigger one until we achieved promising results</a:t>
+            </a:r>
+          </a:p>
+          <a:p>
+            <a:pPr marL="342900" lvl="0" indent="-342900" algn="just">
+              <a:lnSpc>
+                <a:spcPct val="100000"/>
+              </a:lnSpc>
+              <a:spcBef>
+                <a:spcPts val="0"/>
+              </a:spcBef>
+              <a:buFont typeface="Arial" panose="020B0604020202020204" pitchFamily="34" charset="0"/>
+              <a:buChar char="•"/>
+              <a:defRPr sz="1800">
+                <a:solidFill>
+                  <a:srgbClr val="000000"/>
+                </a:solidFill>
+              </a:defRPr>
+            </a:pPr>
+            <a:r>
+              <a:rPr lang="en-US" sz="2400" b="1" dirty="0">
+                <a:solidFill>
+                  <a:srgbClr val="0170AD"/>
+                </a:solidFill>
+                <a:latin typeface="Lato Light"/>
+                <a:ea typeface="Lato Light"/>
+                <a:cs typeface="Lato Light"/>
+              </a:rPr>
+              <a:t>We used Adam as our optimizer</a:t>
+            </a:r>
+          </a:p>
+          <a:p>
+            <a:pPr marL="342900" lvl="0" indent="-342900" algn="just">
+              <a:lnSpc>
+                <a:spcPct val="100000"/>
+              </a:lnSpc>
+              <a:spcBef>
+                <a:spcPts val="0"/>
+              </a:spcBef>
+              <a:buFont typeface="Arial" panose="020B0604020202020204" pitchFamily="34" charset="0"/>
+              <a:buChar char="•"/>
+              <a:defRPr sz="1800">
+                <a:solidFill>
+                  <a:srgbClr val="000000"/>
+                </a:solidFill>
+              </a:defRPr>
+            </a:pPr>
+            <a:r>
+              <a:rPr lang="en-US" sz="2400" b="1" dirty="0">
+                <a:solidFill>
+                  <a:srgbClr val="0170AD"/>
+                </a:solidFill>
+                <a:latin typeface="Lato Light"/>
+                <a:ea typeface="Lato Light"/>
+                <a:cs typeface="Lato Light"/>
+              </a:rPr>
+              <a:t>For multi-label classification, we used a binary-cross entropy loss and an F-score as our metric</a:t>
+            </a:r>
+          </a:p>
+          <a:p>
+            <a:pPr marL="342900" lvl="0" indent="-342900" algn="just">
+              <a:lnSpc>
+                <a:spcPct val="100000"/>
+              </a:lnSpc>
+              <a:spcBef>
+                <a:spcPts val="0"/>
+              </a:spcBef>
+              <a:buFont typeface="Arial" panose="020B0604020202020204" pitchFamily="34" charset="0"/>
+              <a:buChar char="•"/>
+              <a:defRPr sz="1800">
+                <a:solidFill>
+                  <a:srgbClr val="000000"/>
+                </a:solidFill>
+              </a:defRPr>
+            </a:pPr>
+            <a:r>
+              <a:rPr lang="en-US" sz="2400" b="1" dirty="0">
+                <a:solidFill>
+                  <a:srgbClr val="0170AD"/>
+                </a:solidFill>
+                <a:latin typeface="Lato Light"/>
+                <a:ea typeface="Lato Light"/>
+                <a:cs typeface="Lato Light"/>
+              </a:rPr>
+              <a:t>For </a:t>
+            </a:r>
+            <a:r>
+              <a:rPr lang="en-US" sz="2400" b="1" dirty="0" err="1">
+                <a:solidFill>
+                  <a:srgbClr val="0170AD"/>
+                </a:solidFill>
+                <a:latin typeface="Lato Light"/>
+                <a:ea typeface="Lato Light"/>
+                <a:cs typeface="Lato Light"/>
+              </a:rPr>
+              <a:t>hyperparameter</a:t>
+            </a:r>
+            <a:r>
+              <a:rPr lang="en-US" sz="2400" b="1" dirty="0">
+                <a:solidFill>
+                  <a:srgbClr val="0170AD"/>
+                </a:solidFill>
+                <a:latin typeface="Lato Light"/>
+                <a:ea typeface="Lato Light"/>
+                <a:cs typeface="Lato Light"/>
+              </a:rPr>
+              <a:t> search, we used a grid search</a:t>
             </a:r>
           </a:p>
           <a:p>

</xml_diff>

<commit_message>
Training and architecture part for the RNN
</commit_message>
<xml_diff>
--- a/Poster/Poster_Team_55.pptx
+++ b/Poster/Poster_Team_55.pptx
@@ -5526,7 +5526,7 @@
                 <a:ea typeface="Lato Light"/>
                 <a:cs typeface="Lato Light"/>
               </a:rPr>
-              <a:t>We mapped the restaurants and their attributes to the induvial image to label them</a:t>
+              <a:t>We mapped the restaurants and their attributes to the induvial image to label them.</a:t>
             </a:r>
           </a:p>
           <a:p>
@@ -5626,7 +5626,7 @@
                 <a:ea typeface="Lato Light"/>
                 <a:cs typeface="Lato Light"/>
               </a:rPr>
-              <a:t>We relied on Image Augmentation (Rotating, Zooming, horizontal flipping) and applied the mean to the data</a:t>
+              <a:t>We relied on Image Augmentation (Rotating, Zooming, horizontal flipping) and applied the mean to the data.</a:t>
             </a:r>
           </a:p>
           <a:p>
@@ -5667,14 +5667,17 @@
               </a:rPr>
               <a:t>Keras</a:t>
             </a:r>
-            <a:endParaRPr lang="en-US" sz="2400" b="1" dirty="0">
-              <a:solidFill>
-                <a:srgbClr val="0170AD"/>
-              </a:solidFill>
-              <a:latin typeface="Lato Light"/>
-              <a:ea typeface="Lato Light"/>
-              <a:cs typeface="Lato Light"/>
-            </a:endParaRPr>
+            <a:r>
+              <a:rPr lang="en-US" sz="2400" b="1" dirty="0">
+                <a:solidFill>
+                  <a:srgbClr val="0170AD"/>
+                </a:solidFill>
+                <a:latin typeface="Lato Light"/>
+                <a:ea typeface="Lato Light"/>
+                <a:cs typeface="Lato Light"/>
+              </a:rPr>
+              <a:t>.</a:t>
+            </a:r>
           </a:p>
         </p:txBody>
       </p:sp>
@@ -5693,7 +5696,7 @@
         <p:spPr>
           <a:xfrm>
             <a:off x="11480605" y="14527718"/>
-            <a:ext cx="9204371" cy="4083891"/>
+            <a:ext cx="9204371" cy="6357178"/>
           </a:xfrm>
           <a:prstGeom prst="rect">
             <a:avLst/>
@@ -5834,7 +5837,7 @@
                 <a:ea typeface="Lato Light"/>
                 <a:cs typeface="Lato Light"/>
               </a:rPr>
-              <a:t>To define the training data, we split the text into subsequences of 100 characters</a:t>
+              <a:t>To define the training data, we split the text into subsequences of 100 characters.</a:t>
             </a:r>
           </a:p>
           <a:p>
@@ -5918,7 +5921,7 @@
                 <a:ea typeface="Lato Light"/>
                 <a:cs typeface="Lato Light"/>
               </a:rPr>
-              <a:t>We normalized the input</a:t>
+              <a:t>We normalized the input.</a:t>
             </a:r>
           </a:p>
           <a:p>
@@ -5937,39 +5940,17 @@
                 </a:solidFill>
               </a:defRPr>
             </a:pPr>
-            <a:endParaRPr lang="en-US" sz="2400" b="1" dirty="0">
-              <a:solidFill>
-                <a:srgbClr val="0170AD"/>
-              </a:solidFill>
-              <a:latin typeface="Lato Light"/>
-              <a:ea typeface="Lato Light"/>
-              <a:cs typeface="Lato Light"/>
-            </a:endParaRPr>
-          </a:p>
-          <a:p>
-            <a:pPr marL="342900" lvl="0" indent="-342900" algn="just">
-              <a:lnSpc>
-                <a:spcPct val="100000"/>
-              </a:lnSpc>
-              <a:spcBef>
-                <a:spcPts val="0"/>
-              </a:spcBef>
-              <a:buFont typeface="Arial" panose="020B0604020202020204" pitchFamily="34" charset="0"/>
-              <a:buChar char="•"/>
-              <a:defRPr sz="1800">
-                <a:solidFill>
-                  <a:srgbClr val="000000"/>
-                </a:solidFill>
-              </a:defRPr>
-            </a:pPr>
-            <a:endParaRPr lang="en-US" sz="2400" b="1" dirty="0">
-              <a:solidFill>
-                <a:srgbClr val="0170AD"/>
-              </a:solidFill>
-              <a:latin typeface="Lato Light"/>
-              <a:ea typeface="Lato Light"/>
-              <a:cs typeface="Lato Light"/>
-            </a:endParaRPr>
+            <a:r>
+              <a:rPr lang="en-US" sz="2400" b="1" dirty="0">
+                <a:solidFill>
+                  <a:srgbClr val="0170AD"/>
+                </a:solidFill>
+                <a:latin typeface="Lato Light"/>
+                <a:ea typeface="Lato Light"/>
+                <a:cs typeface="Lato Light"/>
+              </a:rPr>
+              <a:t>We converted the output patterns into a one hot encoded vector. That is, that the network can predict the probability of the different character in our lookup table</a:t>
+            </a:r>
           </a:p>
         </p:txBody>
       </p:sp>
@@ -6292,7 +6273,7 @@
                 <a:ea typeface="Lato Light"/>
                 <a:cs typeface="Lato Light"/>
               </a:rPr>
-              <a:t> with image net weights</a:t>
+              <a:t> with image net weights.</a:t>
             </a:r>
           </a:p>
           <a:p>
@@ -6342,7 +6323,7 @@
                 <a:ea typeface="Lato Light"/>
                 <a:cs typeface="Lato Light"/>
               </a:rPr>
-              <a:t> action function) and a prediction layer (size of 9 and a sigmoid activation function for multi-label classification)</a:t>
+              <a:t> action function) and a prediction layer (size of 9 and a sigmoid activation function for multi-label classification).</a:t>
             </a:r>
           </a:p>
         </p:txBody>
@@ -6453,7 +6434,7 @@
                 <a:ea typeface="Lato Light"/>
                 <a:cs typeface="Lato Light"/>
               </a:rPr>
-              <a:t>To test our preprocessing we first trained with a very small subset on VGG16 and later with a bigger one until we achieved promising results</a:t>
+              <a:t>To test our preprocessing we first trained with a very small subset on VGG16 and later with a bigger one until we achieved promising results.</a:t>
             </a:r>
           </a:p>
           <a:p>
@@ -6481,7 +6462,7 @@
                 <a:ea typeface="Lato Light"/>
                 <a:cs typeface="Lato Light"/>
               </a:rPr>
-              <a:t>We used Adam as our optimizer</a:t>
+              <a:t>We used Adam as our optimizer.</a:t>
             </a:r>
           </a:p>
           <a:p>
@@ -6509,7 +6490,7 @@
                 <a:ea typeface="Lato Light"/>
                 <a:cs typeface="Lato Light"/>
               </a:rPr>
-              <a:t>For multi-label classification, we used a binary-cross entropy loss and an F-score as our metric</a:t>
+              <a:t>For multi-label classification, we used a binary-cross entropy loss and an F-score as our metric.</a:t>
             </a:r>
           </a:p>
           <a:p>
@@ -6559,7 +6540,7 @@
                 <a:ea typeface="Lato Light"/>
                 <a:cs typeface="Lato Light"/>
               </a:rPr>
-              <a:t> search, we used a grid search</a:t>
+              <a:t> search, we used a grid search.</a:t>
             </a:r>
           </a:p>
           <a:p>
@@ -6587,7 +6568,7 @@
                 <a:ea typeface="Lato Light"/>
                 <a:cs typeface="Lato Light"/>
               </a:rPr>
-              <a:t>We used checkpoints during training</a:t>
+              <a:t>We used checkpoints during training.</a:t>
             </a:r>
           </a:p>
         </p:txBody>
@@ -6606,7 +6587,7 @@
         </p:nvSpPr>
         <p:spPr>
           <a:xfrm>
-            <a:off x="11480604" y="22492028"/>
+            <a:off x="11480605" y="26260000"/>
             <a:ext cx="9204371" cy="3535699"/>
           </a:xfrm>
           <a:prstGeom prst="rect">
@@ -6805,6 +6786,412 @@
                 <a:cs typeface="Lato Light"/>
               </a:rPr>
               <a:t> search, we used a grid search</a:t>
+            </a:r>
+          </a:p>
+          <a:p>
+            <a:pPr marL="342900" lvl="0" indent="-342900" algn="just">
+              <a:lnSpc>
+                <a:spcPct val="100000"/>
+              </a:lnSpc>
+              <a:spcBef>
+                <a:spcPts val="0"/>
+              </a:spcBef>
+              <a:buFont typeface="Arial" panose="020B0604020202020204" pitchFamily="34" charset="0"/>
+              <a:buChar char="•"/>
+              <a:defRPr sz="1800">
+                <a:solidFill>
+                  <a:srgbClr val="000000"/>
+                </a:solidFill>
+              </a:defRPr>
+            </a:pPr>
+            <a:r>
+              <a:rPr lang="en-US" sz="2400" b="1" dirty="0">
+                <a:solidFill>
+                  <a:srgbClr val="0170AD"/>
+                </a:solidFill>
+                <a:latin typeface="Lato Light"/>
+                <a:ea typeface="Lato Light"/>
+                <a:cs typeface="Lato Light"/>
+              </a:rPr>
+              <a:t>We used checkpoints during training</a:t>
+            </a:r>
+          </a:p>
+        </p:txBody>
+      </p:sp>
+      <p:sp>
+        <p:nvSpPr>
+          <p:cNvPr id="39" name="Shape 188">
+            <a:extLst>
+              <a:ext uri="{FF2B5EF4-FFF2-40B4-BE49-F238E27FC236}">
+                <a16:creationId xmlns:a16="http://schemas.microsoft.com/office/drawing/2014/main" id="{7D94EF4D-1967-F64C-ADA0-BB2C71B5E243}"/>
+              </a:ext>
+            </a:extLst>
+          </p:cNvPr>
+          <p:cNvSpPr/>
+          <p:nvPr/>
+        </p:nvSpPr>
+        <p:spPr>
+          <a:xfrm>
+            <a:off x="11480604" y="21156599"/>
+            <a:ext cx="9204371" cy="1551001"/>
+          </a:xfrm>
+          <a:prstGeom prst="rect">
+            <a:avLst/>
+          </a:prstGeom>
+          <a:noFill/>
+          <a:ln w="12700" cap="flat">
+            <a:noFill/>
+            <a:miter lim="400000"/>
+          </a:ln>
+          <a:effectLst/>
+          <a:extLst>
+            <a:ext uri="{C572A759-6A51-4108-AA02-DFA0A04FC94B}">
+              <ma14:wrappingTextBoxFlag xmlns="" xmlns:ma14="http://schemas.microsoft.com/office/mac/drawingml/2011/main" val="1"/>
+            </a:ext>
+          </a:extLst>
+        </p:spPr>
+        <p:txBody>
+          <a:bodyPr wrap="square" lIns="0" tIns="0" rIns="0" bIns="0" numCol="1" anchor="t">
+            <a:noAutofit/>
+          </a:bodyPr>
+          <a:lstStyle>
+            <a:lvl1pPr algn="l" defTabSz="584200">
+              <a:lnSpc>
+                <a:spcPct val="110000"/>
+              </a:lnSpc>
+              <a:spcBef>
+                <a:spcPts val="3000"/>
+              </a:spcBef>
+              <a:defRPr sz="2000">
+                <a:solidFill>
+                  <a:srgbClr val="4C4C4C"/>
+                </a:solidFill>
+                <a:latin typeface="Helvetica Neue Light"/>
+                <a:ea typeface="Helvetica Neue Light"/>
+                <a:cs typeface="Helvetica Neue Light"/>
+                <a:sym typeface="Helvetica Neue Light"/>
+              </a:defRPr>
+            </a:lvl1pPr>
+          </a:lstStyle>
+          <a:p>
+            <a:pPr lvl="0" algn="just">
+              <a:lnSpc>
+                <a:spcPct val="100000"/>
+              </a:lnSpc>
+              <a:spcBef>
+                <a:spcPts val="0"/>
+              </a:spcBef>
+              <a:defRPr sz="1800">
+                <a:solidFill>
+                  <a:srgbClr val="000000"/>
+                </a:solidFill>
+              </a:defRPr>
+            </a:pPr>
+            <a:r>
+              <a:rPr lang="en-US" sz="2400" b="1" u="sng" dirty="0">
+                <a:solidFill>
+                  <a:srgbClr val="0170AD"/>
+                </a:solidFill>
+                <a:latin typeface="Lato Light"/>
+                <a:ea typeface="Lato Light"/>
+                <a:cs typeface="Lato Light"/>
+              </a:rPr>
+              <a:t>Architecture:</a:t>
+            </a:r>
+          </a:p>
+          <a:p>
+            <a:pPr marL="342900" lvl="0" indent="-342900" algn="just">
+              <a:lnSpc>
+                <a:spcPct val="100000"/>
+              </a:lnSpc>
+              <a:spcBef>
+                <a:spcPts val="0"/>
+              </a:spcBef>
+              <a:buFont typeface="Arial" panose="020B0604020202020204" pitchFamily="34" charset="0"/>
+              <a:buChar char="•"/>
+              <a:defRPr sz="1800">
+                <a:solidFill>
+                  <a:srgbClr val="000000"/>
+                </a:solidFill>
+              </a:defRPr>
+            </a:pPr>
+            <a:r>
+              <a:rPr lang="en-US" sz="2400" b="1" dirty="0">
+                <a:solidFill>
+                  <a:srgbClr val="0170AD"/>
+                </a:solidFill>
+                <a:latin typeface="Lato Light"/>
+                <a:ea typeface="Lato Light"/>
+                <a:cs typeface="Lato Light"/>
+              </a:rPr>
+              <a:t>For our RNN we used LSTMs with 256 memory units.</a:t>
+            </a:r>
+          </a:p>
+          <a:p>
+            <a:pPr marL="342900" lvl="0" indent="-342900" algn="just">
+              <a:lnSpc>
+                <a:spcPct val="100000"/>
+              </a:lnSpc>
+              <a:spcBef>
+                <a:spcPts val="0"/>
+              </a:spcBef>
+              <a:buFont typeface="Arial" panose="020B0604020202020204" pitchFamily="34" charset="0"/>
+              <a:buChar char="•"/>
+              <a:defRPr sz="1800">
+                <a:solidFill>
+                  <a:srgbClr val="000000"/>
+                </a:solidFill>
+              </a:defRPr>
+            </a:pPr>
+            <a:r>
+              <a:rPr lang="en-US" sz="2400" b="1" dirty="0">
+                <a:solidFill>
+                  <a:srgbClr val="0170AD"/>
+                </a:solidFill>
+                <a:latin typeface="Lato Light"/>
+                <a:ea typeface="Lato Light"/>
+                <a:cs typeface="Lato Light"/>
+              </a:rPr>
+              <a:t>Every LSTM layer is followed by a dropout layer. </a:t>
+            </a:r>
+          </a:p>
+          <a:p>
+            <a:pPr marL="342900" lvl="0" indent="-342900" algn="just">
+              <a:lnSpc>
+                <a:spcPct val="100000"/>
+              </a:lnSpc>
+              <a:spcBef>
+                <a:spcPts val="0"/>
+              </a:spcBef>
+              <a:buFont typeface="Arial" panose="020B0604020202020204" pitchFamily="34" charset="0"/>
+              <a:buChar char="•"/>
+              <a:defRPr sz="1800">
+                <a:solidFill>
+                  <a:srgbClr val="000000"/>
+                </a:solidFill>
+              </a:defRPr>
+            </a:pPr>
+            <a:r>
+              <a:rPr lang="en-US" sz="2400" b="1" dirty="0">
+                <a:solidFill>
+                  <a:srgbClr val="0170AD"/>
+                </a:solidFill>
+                <a:latin typeface="Lato Light"/>
+                <a:ea typeface="Lato Light"/>
+                <a:cs typeface="Lato Light"/>
+              </a:rPr>
+              <a:t>The prediction layer uses </a:t>
+            </a:r>
+            <a:r>
+              <a:rPr lang="en-US" sz="2400" b="1" dirty="0" err="1">
+                <a:solidFill>
+                  <a:srgbClr val="0170AD"/>
+                </a:solidFill>
+                <a:latin typeface="Lato Light"/>
+                <a:ea typeface="Lato Light"/>
+                <a:cs typeface="Lato Light"/>
+              </a:rPr>
+              <a:t>softmax</a:t>
+            </a:r>
+            <a:r>
+              <a:rPr lang="en-US" sz="2400" b="1" dirty="0">
+                <a:solidFill>
+                  <a:srgbClr val="0170AD"/>
+                </a:solidFill>
+                <a:latin typeface="Lato Light"/>
+                <a:ea typeface="Lato Light"/>
+                <a:cs typeface="Lato Light"/>
+              </a:rPr>
+              <a:t> function</a:t>
+            </a:r>
+          </a:p>
+        </p:txBody>
+      </p:sp>
+      <p:sp>
+        <p:nvSpPr>
+          <p:cNvPr id="40" name="Shape 188">
+            <a:extLst>
+              <a:ext uri="{FF2B5EF4-FFF2-40B4-BE49-F238E27FC236}">
+                <a16:creationId xmlns:a16="http://schemas.microsoft.com/office/drawing/2014/main" id="{60B2218C-2F1F-E540-8C8F-A0713AF24158}"/>
+              </a:ext>
+            </a:extLst>
+          </p:cNvPr>
+          <p:cNvSpPr/>
+          <p:nvPr/>
+        </p:nvSpPr>
+        <p:spPr>
+          <a:xfrm>
+            <a:off x="11480603" y="22955873"/>
+            <a:ext cx="9204371" cy="2769248"/>
+          </a:xfrm>
+          <a:prstGeom prst="rect">
+            <a:avLst/>
+          </a:prstGeom>
+          <a:noFill/>
+          <a:ln w="12700" cap="flat">
+            <a:noFill/>
+            <a:miter lim="400000"/>
+          </a:ln>
+          <a:effectLst/>
+          <a:extLst>
+            <a:ext uri="{C572A759-6A51-4108-AA02-DFA0A04FC94B}">
+              <ma14:wrappingTextBoxFlag xmlns="" xmlns:ma14="http://schemas.microsoft.com/office/mac/drawingml/2011/main" val="1"/>
+            </a:ext>
+          </a:extLst>
+        </p:spPr>
+        <p:txBody>
+          <a:bodyPr wrap="square" lIns="0" tIns="0" rIns="0" bIns="0" numCol="1" anchor="t">
+            <a:noAutofit/>
+          </a:bodyPr>
+          <a:lstStyle>
+            <a:lvl1pPr algn="l" defTabSz="584200">
+              <a:lnSpc>
+                <a:spcPct val="110000"/>
+              </a:lnSpc>
+              <a:spcBef>
+                <a:spcPts val="3000"/>
+              </a:spcBef>
+              <a:defRPr sz="2000">
+                <a:solidFill>
+                  <a:srgbClr val="4C4C4C"/>
+                </a:solidFill>
+                <a:latin typeface="Helvetica Neue Light"/>
+                <a:ea typeface="Helvetica Neue Light"/>
+                <a:cs typeface="Helvetica Neue Light"/>
+                <a:sym typeface="Helvetica Neue Light"/>
+              </a:defRPr>
+            </a:lvl1pPr>
+          </a:lstStyle>
+          <a:p>
+            <a:pPr lvl="0" algn="just">
+              <a:lnSpc>
+                <a:spcPct val="100000"/>
+              </a:lnSpc>
+              <a:spcBef>
+                <a:spcPts val="0"/>
+              </a:spcBef>
+              <a:defRPr sz="1800">
+                <a:solidFill>
+                  <a:srgbClr val="000000"/>
+                </a:solidFill>
+              </a:defRPr>
+            </a:pPr>
+            <a:r>
+              <a:rPr lang="en-US" sz="2400" b="1" u="sng" dirty="0">
+                <a:solidFill>
+                  <a:srgbClr val="0170AD"/>
+                </a:solidFill>
+                <a:latin typeface="Lato Light"/>
+                <a:ea typeface="Lato Light"/>
+                <a:cs typeface="Lato Light"/>
+              </a:rPr>
+              <a:t>Training:</a:t>
+            </a:r>
+          </a:p>
+          <a:p>
+            <a:pPr marL="342900" lvl="0" indent="-342900" algn="just">
+              <a:lnSpc>
+                <a:spcPct val="100000"/>
+              </a:lnSpc>
+              <a:spcBef>
+                <a:spcPts val="0"/>
+              </a:spcBef>
+              <a:buFont typeface="Arial" panose="020B0604020202020204" pitchFamily="34" charset="0"/>
+              <a:buChar char="•"/>
+              <a:defRPr sz="1800">
+                <a:solidFill>
+                  <a:srgbClr val="000000"/>
+                </a:solidFill>
+              </a:defRPr>
+            </a:pPr>
+            <a:r>
+              <a:rPr lang="en-US" sz="2400" b="1" dirty="0">
+                <a:solidFill>
+                  <a:srgbClr val="0170AD"/>
+                </a:solidFill>
+                <a:latin typeface="Lato Light"/>
+                <a:ea typeface="Lato Light"/>
+                <a:cs typeface="Lato Light"/>
+              </a:rPr>
+              <a:t>For </a:t>
+            </a:r>
+            <a:r>
+              <a:rPr lang="en-US" sz="2400" b="1" dirty="0" err="1">
+                <a:solidFill>
+                  <a:srgbClr val="0170AD"/>
+                </a:solidFill>
+                <a:latin typeface="Lato Light"/>
+                <a:ea typeface="Lato Light"/>
+                <a:cs typeface="Lato Light"/>
+              </a:rPr>
+              <a:t>hyperparameter</a:t>
+            </a:r>
+            <a:r>
+              <a:rPr lang="en-US" sz="2400" b="1" dirty="0">
+                <a:solidFill>
+                  <a:srgbClr val="0170AD"/>
+                </a:solidFill>
+                <a:latin typeface="Lato Light"/>
+                <a:ea typeface="Lato Light"/>
+                <a:cs typeface="Lato Light"/>
+              </a:rPr>
+              <a:t> search we used a grid search. We tried various numbers of LSTM and dropout layer pairs from 2 - 6, different dropout rates and learning rates</a:t>
+            </a:r>
+          </a:p>
+          <a:p>
+            <a:pPr marL="342900" lvl="0" indent="-342900" algn="just">
+              <a:lnSpc>
+                <a:spcPct val="100000"/>
+              </a:lnSpc>
+              <a:spcBef>
+                <a:spcPts val="0"/>
+              </a:spcBef>
+              <a:buFont typeface="Arial" panose="020B0604020202020204" pitchFamily="34" charset="0"/>
+              <a:buChar char="•"/>
+              <a:defRPr sz="1800">
+                <a:solidFill>
+                  <a:srgbClr val="000000"/>
+                </a:solidFill>
+              </a:defRPr>
+            </a:pPr>
+            <a:r>
+              <a:rPr lang="en-US" sz="2400" b="1" dirty="0">
+                <a:solidFill>
+                  <a:srgbClr val="0170AD"/>
+                </a:solidFill>
+                <a:latin typeface="Lato Light"/>
+                <a:ea typeface="Lato Light"/>
+                <a:cs typeface="Lato Light"/>
+              </a:rPr>
+              <a:t>We used Adam as our optimizer</a:t>
+            </a:r>
+          </a:p>
+          <a:p>
+            <a:pPr marL="342900" lvl="0" indent="-342900" algn="just">
+              <a:lnSpc>
+                <a:spcPct val="100000"/>
+              </a:lnSpc>
+              <a:spcBef>
+                <a:spcPts val="0"/>
+              </a:spcBef>
+              <a:buFont typeface="Arial" panose="020B0604020202020204" pitchFamily="34" charset="0"/>
+              <a:buChar char="•"/>
+              <a:defRPr sz="1800">
+                <a:solidFill>
+                  <a:srgbClr val="000000"/>
+                </a:solidFill>
+              </a:defRPr>
+            </a:pPr>
+            <a:r>
+              <a:rPr lang="en-US" sz="2400" b="1" dirty="0">
+                <a:solidFill>
+                  <a:srgbClr val="0170AD"/>
+                </a:solidFill>
+                <a:latin typeface="Lato Light"/>
+                <a:ea typeface="Lato Light"/>
+                <a:cs typeface="Lato Light"/>
+              </a:rPr>
+              <a:t>We used a categorical cross entropy loss</a:t>
             </a:r>
           </a:p>
           <a:p>

</xml_diff>

<commit_message>
Finished the RNN Methodology
</commit_message>
<xml_diff>
--- a/Poster/Poster_Team_55.pptx
+++ b/Poster/Poster_Team_55.pptx
@@ -5865,7 +5865,29 @@
                 <a:ea typeface="Lato Light"/>
                 <a:cs typeface="Lato Light"/>
               </a:rPr>
-              <a:t>We created these sequences by sliding along the whole book one character at a time, allowing each character a chance to be learned from the 100 characters that preceded it (except the first 100 characters of course). While doing this, we convert the characters to integers using our lookup table we prepared earlier.</a:t>
+              <a:t>We created these sequences by sliding along the whole text one character at a time, allowing each character a chance to be learned from the 100 characters that preceded it (except the first </a:t>
+            </a:r>
+            <a:r>
+              <a:rPr lang="en-US" sz="2400" b="1">
+                <a:solidFill>
+                  <a:srgbClr val="0170AD"/>
+                </a:solidFill>
+                <a:latin typeface="Lato Light"/>
+                <a:ea typeface="Lato Light"/>
+                <a:cs typeface="Lato Light"/>
+              </a:rPr>
+              <a:t>100 characters). </a:t>
+            </a:r>
+            <a:r>
+              <a:rPr lang="en-US" sz="2400" b="1" dirty="0">
+                <a:solidFill>
+                  <a:srgbClr val="0170AD"/>
+                </a:solidFill>
+                <a:latin typeface="Lato Light"/>
+                <a:ea typeface="Lato Light"/>
+                <a:cs typeface="Lato Light"/>
+              </a:rPr>
+              <a:t>While doing this, we convert the characters to integers using our lookup table we prepared earlier.</a:t>
             </a:r>
           </a:p>
           <a:p>
@@ -5949,7 +5971,7 @@
                 <a:ea typeface="Lato Light"/>
                 <a:cs typeface="Lato Light"/>
               </a:rPr>
-              <a:t>We converted the output patterns into a one hot encoded vector. That is, that the network can predict the probability of the different character in our lookup table</a:t>
+              <a:t>We converted the output patterns into a one hot encoded vector. That is, that the network can predict the probability of the different character in our lookup table.</a:t>
             </a:r>
           </a:p>
         </p:txBody>
@@ -5969,7 +5991,7 @@
         <p:spPr>
           <a:xfrm>
             <a:off x="32152844" y="17224361"/>
-            <a:ext cx="8695842" cy="3046988"/>
+            <a:ext cx="11013913" cy="3416320"/>
           </a:xfrm>
           <a:prstGeom prst="rect">
             <a:avLst/>
@@ -6046,7 +6068,17 @@
             </a:pPr>
             <a:r>
               <a:rPr lang="en-US" sz="2400" dirty="0"/>
-              <a:t>Use GANs for text generation to have more semantic control</a:t>
+              <a:t>Filter by language</a:t>
+            </a:r>
+          </a:p>
+          <a:p>
+            <a:pPr marL="342900" indent="-342900">
+              <a:buFont typeface="Arial" panose="020B0604020202020204" pitchFamily="34" charset="0"/>
+              <a:buChar char="•"/>
+            </a:pPr>
+            <a:r>
+              <a:rPr lang="en-US" sz="2400" dirty="0"/>
+              <a:t>Better seed sequences. Use GANs for text generation to have more semantic control</a:t>
             </a:r>
           </a:p>
         </p:txBody>
@@ -6587,8 +6619,8 @@
         </p:nvSpPr>
         <p:spPr>
           <a:xfrm>
-            <a:off x="11480605" y="26260000"/>
-            <a:ext cx="9204371" cy="3535699"/>
+            <a:off x="11480603" y="25973394"/>
+            <a:ext cx="9204371" cy="4015213"/>
           </a:xfrm>
           <a:prstGeom prst="rect">
             <a:avLst/>
@@ -6679,7 +6711,7 @@
                 <a:ea typeface="Lato Light"/>
                 <a:cs typeface="Lato Light"/>
               </a:rPr>
-              <a:t>To test our preprocessing we first trained with a very small subset on VGG16 and later with a bigger one until we achieved promising results</a:t>
+              <a:t>To generate a fake review we first check which predicted labels from the CNN are above a certain threshold. </a:t>
             </a:r>
           </a:p>
           <a:p>
@@ -6707,7 +6739,7 @@
                 <a:ea typeface="Lato Light"/>
                 <a:cs typeface="Lato Light"/>
               </a:rPr>
-              <a:t>We used Adam as our optimizer</a:t>
+              <a:t>For every label above it, we feed a prepared seed sequence into the model as an input.</a:t>
             </a:r>
           </a:p>
           <a:p>
@@ -6735,7 +6767,7 @@
                 <a:ea typeface="Lato Light"/>
                 <a:cs typeface="Lato Light"/>
               </a:rPr>
-              <a:t>For multi-label classification, we used a binary-cross entropy loss and an F-score as our metric</a:t>
+              <a:t>The model then updates the seed sequence to add the generated character on the end and trim off the first character.</a:t>
             </a:r>
           </a:p>
           <a:p>
@@ -6763,29 +6795,7 @@
                 <a:ea typeface="Lato Light"/>
                 <a:cs typeface="Lato Light"/>
               </a:rPr>
-              <a:t>For </a:t>
-            </a:r>
-            <a:r>
-              <a:rPr lang="en-US" sz="2400" b="1" dirty="0" err="1">
-                <a:solidFill>
-                  <a:srgbClr val="0170AD"/>
-                </a:solidFill>
-                <a:latin typeface="Lato Light"/>
-                <a:ea typeface="Lato Light"/>
-                <a:cs typeface="Lato Light"/>
-              </a:rPr>
-              <a:t>hyperparameter</a:t>
-            </a:r>
-            <a:r>
-              <a:rPr lang="en-US" sz="2400" b="1" dirty="0">
-                <a:solidFill>
-                  <a:srgbClr val="0170AD"/>
-                </a:solidFill>
-                <a:latin typeface="Lato Light"/>
-                <a:ea typeface="Lato Light"/>
-                <a:cs typeface="Lato Light"/>
-              </a:rPr>
-              <a:t> search, we used a grid search</a:t>
+              <a:t>In the end, we concatenate the different generated sequences to one restaurant review.</a:t>
             </a:r>
           </a:p>
           <a:p>
@@ -6813,8 +6823,33 @@
                 <a:ea typeface="Lato Light"/>
                 <a:cs typeface="Lato Light"/>
               </a:rPr>
-              <a:t>We used checkpoints during training</a:t>
-            </a:r>
+              <a:t>Notice that you have to convert the seed sequence into integers and the output into character</a:t>
+            </a:r>
+          </a:p>
+          <a:p>
+            <a:pPr marL="342900" lvl="0" indent="-342900" algn="just">
+              <a:lnSpc>
+                <a:spcPct val="100000"/>
+              </a:lnSpc>
+              <a:spcBef>
+                <a:spcPts val="0"/>
+              </a:spcBef>
+              <a:buFont typeface="Arial" panose="020B0604020202020204" pitchFamily="34" charset="0"/>
+              <a:buChar char="•"/>
+              <a:defRPr sz="1800">
+                <a:solidFill>
+                  <a:srgbClr val="000000"/>
+                </a:solidFill>
+              </a:defRPr>
+            </a:pPr>
+            <a:endParaRPr lang="en-US" sz="2400" b="1" dirty="0">
+              <a:solidFill>
+                <a:srgbClr val="0170AD"/>
+              </a:solidFill>
+              <a:latin typeface="Lato Light"/>
+              <a:ea typeface="Lato Light"/>
+              <a:cs typeface="Lato Light"/>
+            </a:endParaRPr>
           </a:p>
         </p:txBody>
       </p:sp>
@@ -7002,7 +7037,7 @@
                 <a:ea typeface="Lato Light"/>
                 <a:cs typeface="Lato Light"/>
               </a:rPr>
-              <a:t> function</a:t>
+              <a:t> function.</a:t>
             </a:r>
           </a:p>
         </p:txBody>
@@ -7135,7 +7170,7 @@
                 <a:ea typeface="Lato Light"/>
                 <a:cs typeface="Lato Light"/>
               </a:rPr>
-              <a:t> search we used a grid search. We tried various numbers of LSTM and dropout layer pairs from 2 - 6, different dropout rates and learning rates</a:t>
+              <a:t> search, we used a grid search. We tried various numbers of LSTM and dropout layer pairs from 2 - 6, different dropout rates and learning rates.</a:t>
             </a:r>
           </a:p>
           <a:p>
@@ -7163,7 +7198,7 @@
                 <a:ea typeface="Lato Light"/>
                 <a:cs typeface="Lato Light"/>
               </a:rPr>
-              <a:t>We used Adam as our optimizer</a:t>
+              <a:t>We used Adam as our optimizer.</a:t>
             </a:r>
           </a:p>
           <a:p>
@@ -7191,7 +7226,7 @@
                 <a:ea typeface="Lato Light"/>
                 <a:cs typeface="Lato Light"/>
               </a:rPr>
-              <a:t>We used a categorical cross entropy loss</a:t>
+              <a:t>We used a categorical cross entropy loss.</a:t>
             </a:r>
           </a:p>
           <a:p>
@@ -7219,7 +7254,7 @@
                 <a:ea typeface="Lato Light"/>
                 <a:cs typeface="Lato Light"/>
               </a:rPr>
-              <a:t>We used checkpoints during training</a:t>
+              <a:t>We used checkpoints during training.</a:t>
             </a:r>
           </a:p>
         </p:txBody>

</xml_diff>

<commit_message>
Stuff added to the learning section
</commit_message>
<xml_diff>
--- a/Poster/Poster_Team_55.pptx
+++ b/Poster/Poster_Team_55.pptx
@@ -4273,7 +4273,7 @@
                 <a:ea typeface="Lato Light"/>
                 <a:cs typeface="Lato Light"/>
               </a:rPr>
-              <a:t>Yelp Restaurant Photos</a:t>
+              <a:t>Yelp Restaurant Photos:</a:t>
             </a:r>
           </a:p>
           <a:p>
@@ -4436,7 +4436,7 @@
                 <a:ea typeface="Lato Light"/>
                 <a:cs typeface="Lato Light"/>
               </a:rPr>
-              <a:t>Yelp Reviews</a:t>
+              <a:t>Yelp Reviews:</a:t>
             </a:r>
           </a:p>
           <a:p>
@@ -5227,41 +5227,6 @@
       </p:sp>
       <p:sp>
         <p:nvSpPr>
-          <p:cNvPr id="38" name="Textfeld 37">
-            <a:extLst>
-              <a:ext uri="{FF2B5EF4-FFF2-40B4-BE49-F238E27FC236}">
-                <a16:creationId xmlns:a16="http://schemas.microsoft.com/office/drawing/2014/main" id="{AE64ACE4-B692-A544-BA8A-C5E0E90AF04A}"/>
-              </a:ext>
-            </a:extLst>
-          </p:cNvPr>
-          <p:cNvSpPr txBox="1"/>
-          <p:nvPr/>
-        </p:nvSpPr>
-        <p:spPr>
-          <a:xfrm>
-            <a:off x="31333440" y="25725120"/>
-            <a:ext cx="4366901" cy="1154932"/>
-          </a:xfrm>
-          <a:prstGeom prst="rect">
-            <a:avLst/>
-          </a:prstGeom>
-          <a:noFill/>
-        </p:spPr>
-        <p:txBody>
-          <a:bodyPr wrap="none" rtlCol="0">
-            <a:spAutoFit/>
-          </a:bodyPr>
-          <a:lstStyle/>
-          <a:p>
-            <a:r>
-              <a:rPr lang="en-US" dirty="0"/>
-              <a:t>GitHub Link</a:t>
-            </a:r>
-          </a:p>
-        </p:txBody>
-      </p:sp>
-      <p:sp>
-        <p:nvSpPr>
           <p:cNvPr id="45" name="Shape 188">
             <a:extLst>
               <a:ext uri="{FF2B5EF4-FFF2-40B4-BE49-F238E27FC236}">
@@ -5865,29 +5830,7 @@
                 <a:ea typeface="Lato Light"/>
                 <a:cs typeface="Lato Light"/>
               </a:rPr>
-              <a:t>We created these sequences by sliding along the whole text one character at a time, allowing each character a chance to be learned from the 100 characters that preceded it (except the first </a:t>
-            </a:r>
-            <a:r>
-              <a:rPr lang="en-US" sz="2400" b="1">
-                <a:solidFill>
-                  <a:srgbClr val="0170AD"/>
-                </a:solidFill>
-                <a:latin typeface="Lato Light"/>
-                <a:ea typeface="Lato Light"/>
-                <a:cs typeface="Lato Light"/>
-              </a:rPr>
-              <a:t>100 characters). </a:t>
-            </a:r>
-            <a:r>
-              <a:rPr lang="en-US" sz="2400" b="1" dirty="0">
-                <a:solidFill>
-                  <a:srgbClr val="0170AD"/>
-                </a:solidFill>
-                <a:latin typeface="Lato Light"/>
-                <a:ea typeface="Lato Light"/>
-                <a:cs typeface="Lato Light"/>
-              </a:rPr>
-              <a:t>While doing this, we convert the characters to integers using our lookup table we prepared earlier.</a:t>
+              <a:t>We created these sequences by sliding along the whole text one character at a time, allowing each character a chance to be learned from the 100 characters that preceded it (except the first 100 characters). While doing this, we convert the characters to integers using our lookup table we prepared earlier.</a:t>
             </a:r>
           </a:p>
           <a:p>
@@ -5972,113 +5915,6 @@
                 <a:cs typeface="Lato Light"/>
               </a:rPr>
               <a:t>We converted the output patterns into a one hot encoded vector. That is, that the network can predict the probability of the different character in our lookup table.</a:t>
-            </a:r>
-          </a:p>
-        </p:txBody>
-      </p:sp>
-      <p:sp>
-        <p:nvSpPr>
-          <p:cNvPr id="49" name="Textfeld 48">
-            <a:extLst>
-              <a:ext uri="{FF2B5EF4-FFF2-40B4-BE49-F238E27FC236}">
-                <a16:creationId xmlns:a16="http://schemas.microsoft.com/office/drawing/2014/main" id="{58C6A501-2123-F046-8D7F-2C8AC239E13C}"/>
-              </a:ext>
-            </a:extLst>
-          </p:cNvPr>
-          <p:cNvSpPr txBox="1"/>
-          <p:nvPr/>
-        </p:nvSpPr>
-        <p:spPr>
-          <a:xfrm>
-            <a:off x="32152844" y="17224361"/>
-            <a:ext cx="11013913" cy="3416320"/>
-          </a:xfrm>
-          <a:prstGeom prst="rect">
-            <a:avLst/>
-          </a:prstGeom>
-          <a:noFill/>
-        </p:spPr>
-        <p:txBody>
-          <a:bodyPr wrap="none" rtlCol="0">
-            <a:spAutoFit/>
-          </a:bodyPr>
-          <a:lstStyle/>
-          <a:p>
-            <a:r>
-              <a:rPr lang="en-US" sz="2400" dirty="0"/>
-              <a:t>Learnings: </a:t>
-            </a:r>
-          </a:p>
-          <a:p>
-            <a:r>
-              <a:rPr lang="en-US" sz="2400" dirty="0"/>
-              <a:t>• Bottlenecks great for speeding things up - however memory issues</a:t>
-            </a:r>
-          </a:p>
-          <a:p>
-            <a:r>
-              <a:rPr lang="en-US" sz="2400" dirty="0"/>
-              <a:t>• VGG16 great for prototyping and it was easier than with the other </a:t>
-            </a:r>
-          </a:p>
-          <a:p>
-            <a:r>
-              <a:rPr lang="en-US" sz="2400" dirty="0"/>
-              <a:t>Architectures to achieve good results</a:t>
-            </a:r>
-          </a:p>
-          <a:p>
-            <a:r>
-              <a:rPr lang="en-US" sz="2400" dirty="0"/>
-              <a:t>• Batch size is important for training speed 16 for inception on a K80</a:t>
-            </a:r>
-          </a:p>
-          <a:p>
-            <a:pPr marL="342900" indent="-342900">
-              <a:buFont typeface="Arial" panose="020B0604020202020204" pitchFamily="34" charset="0"/>
-              <a:buChar char="•"/>
-            </a:pPr>
-            <a:r>
-              <a:rPr lang="en-US" sz="2400" dirty="0"/>
-              <a:t>Possible ideas for improvement </a:t>
-            </a:r>
-            <a:r>
-              <a:rPr lang="en-US" sz="2400" dirty="0" err="1"/>
-              <a:t>Keras</a:t>
-            </a:r>
-            <a:r>
-              <a:rPr lang="en-US" sz="2400" dirty="0"/>
-              <a:t> winner interview</a:t>
-            </a:r>
-          </a:p>
-          <a:p>
-            <a:pPr marL="342900" indent="-342900">
-              <a:buFont typeface="Arial" panose="020B0604020202020204" pitchFamily="34" charset="0"/>
-              <a:buChar char="•"/>
-            </a:pPr>
-            <a:r>
-              <a:rPr lang="en-US" sz="2400" dirty="0"/>
-              <a:t>Class weights</a:t>
-            </a:r>
-          </a:p>
-          <a:p>
-            <a:pPr marL="342900" indent="-342900">
-              <a:buFont typeface="Arial" panose="020B0604020202020204" pitchFamily="34" charset="0"/>
-              <a:buChar char="•"/>
-            </a:pPr>
-            <a:r>
-              <a:rPr lang="en-US" sz="2400" dirty="0"/>
-              <a:t>Filter by language</a:t>
-            </a:r>
-          </a:p>
-          <a:p>
-            <a:pPr marL="342900" indent="-342900">
-              <a:buFont typeface="Arial" panose="020B0604020202020204" pitchFamily="34" charset="0"/>
-              <a:buChar char="•"/>
-            </a:pPr>
-            <a:r>
-              <a:rPr lang="en-US" sz="2400" dirty="0"/>
-              <a:t>Better seed sequences. Use GANs for text generation to have more semantic control</a:t>
             </a:r>
           </a:p>
         </p:txBody>
@@ -6375,7 +6211,7 @@
         <p:spPr>
           <a:xfrm>
             <a:off x="919342" y="21510288"/>
-            <a:ext cx="9204371" cy="3535699"/>
+            <a:ext cx="9204371" cy="3804154"/>
           </a:xfrm>
           <a:prstGeom prst="rect">
             <a:avLst/>
@@ -6572,7 +6408,7 @@
                 <a:ea typeface="Lato Light"/>
                 <a:cs typeface="Lato Light"/>
               </a:rPr>
-              <a:t> search, we used a grid search.</a:t>
+              <a:t> search, we used a grid search and tried different learning rates and number of freezed layers.</a:t>
             </a:r>
           </a:p>
           <a:p>
@@ -6619,7 +6455,7 @@
         </p:nvSpPr>
         <p:spPr>
           <a:xfrm>
-            <a:off x="11480603" y="25973394"/>
+            <a:off x="11480601" y="25933168"/>
             <a:ext cx="9204371" cy="4015213"/>
           </a:xfrm>
           <a:prstGeom prst="rect">
@@ -6867,7 +6703,7 @@
         </p:nvSpPr>
         <p:spPr>
           <a:xfrm>
-            <a:off x="11480604" y="21156599"/>
+            <a:off x="11480602" y="20921805"/>
             <a:ext cx="9204371" cy="1551001"/>
           </a:xfrm>
           <a:prstGeom prst="rect">
@@ -7056,8 +6892,8 @@
         </p:nvSpPr>
         <p:spPr>
           <a:xfrm>
-            <a:off x="11480603" y="22955873"/>
-            <a:ext cx="9204371" cy="2769248"/>
+            <a:off x="11480602" y="22707599"/>
+            <a:ext cx="9204371" cy="3017521"/>
           </a:xfrm>
           <a:prstGeom prst="rect">
             <a:avLst/>
@@ -7255,6 +7091,523 @@
                 <a:cs typeface="Lato Light"/>
               </a:rPr>
               <a:t>We used checkpoints during training.</a:t>
+            </a:r>
+          </a:p>
+          <a:p>
+            <a:pPr marL="342900" lvl="0" indent="-342900" algn="just">
+              <a:lnSpc>
+                <a:spcPct val="100000"/>
+              </a:lnSpc>
+              <a:spcBef>
+                <a:spcPts val="0"/>
+              </a:spcBef>
+              <a:buFont typeface="Arial" panose="020B0604020202020204" pitchFamily="34" charset="0"/>
+              <a:buChar char="•"/>
+              <a:defRPr sz="1800">
+                <a:solidFill>
+                  <a:srgbClr val="000000"/>
+                </a:solidFill>
+              </a:defRPr>
+            </a:pPr>
+            <a:r>
+              <a:rPr lang="en-US" sz="2400" b="1" dirty="0">
+                <a:solidFill>
+                  <a:srgbClr val="0170AD"/>
+                </a:solidFill>
+                <a:latin typeface="Lato Light"/>
+                <a:ea typeface="Lato Light"/>
+                <a:cs typeface="Lato Light"/>
+              </a:rPr>
+              <a:t>We used only xx% of the training set</a:t>
+            </a:r>
+          </a:p>
+        </p:txBody>
+      </p:sp>
+      <p:pic>
+        <p:nvPicPr>
+          <p:cNvPr id="6" name="Grafik 5">
+            <a:extLst>
+              <a:ext uri="{FF2B5EF4-FFF2-40B4-BE49-F238E27FC236}">
+                <a16:creationId xmlns:a16="http://schemas.microsoft.com/office/drawing/2014/main" id="{809724DC-F5BF-BE4B-9B5D-4CF1E601A8E4}"/>
+              </a:ext>
+            </a:extLst>
+          </p:cNvPr>
+          <p:cNvPicPr>
+            <a:picLocks noChangeAspect="1"/>
+          </p:cNvPicPr>
+          <p:nvPr/>
+        </p:nvPicPr>
+        <p:blipFill>
+          <a:blip r:embed="rId10">
+            <a:extLst>
+              <a:ext uri="{28A0092B-C50C-407E-A947-70E740481C1C}">
+                <a14:useLocalDpi xmlns:a14="http://schemas.microsoft.com/office/drawing/2010/main" val="0"/>
+              </a:ext>
+            </a:extLst>
+          </a:blip>
+          <a:stretch>
+            <a:fillRect/>
+          </a:stretch>
+        </p:blipFill>
+        <p:spPr>
+          <a:xfrm>
+            <a:off x="38912753" y="26711000"/>
+            <a:ext cx="2540000" cy="2540000"/>
+          </a:xfrm>
+          <a:prstGeom prst="rect">
+            <a:avLst/>
+          </a:prstGeom>
+        </p:spPr>
+      </p:pic>
+      <p:sp>
+        <p:nvSpPr>
+          <p:cNvPr id="41" name="Shape 188">
+            <a:extLst>
+              <a:ext uri="{FF2B5EF4-FFF2-40B4-BE49-F238E27FC236}">
+                <a16:creationId xmlns:a16="http://schemas.microsoft.com/office/drawing/2014/main" id="{0AC7E769-5067-514F-9DDE-5769FC222785}"/>
+              </a:ext>
+            </a:extLst>
+          </p:cNvPr>
+          <p:cNvSpPr/>
+          <p:nvPr/>
+        </p:nvSpPr>
+        <p:spPr>
+          <a:xfrm>
+            <a:off x="38304864" y="29404031"/>
+            <a:ext cx="3755777" cy="584576"/>
+          </a:xfrm>
+          <a:prstGeom prst="rect">
+            <a:avLst/>
+          </a:prstGeom>
+          <a:noFill/>
+          <a:ln w="12700" cap="flat">
+            <a:noFill/>
+            <a:miter lim="400000"/>
+          </a:ln>
+          <a:effectLst/>
+          <a:extLst>
+            <a:ext uri="{C572A759-6A51-4108-AA02-DFA0A04FC94B}">
+              <ma14:wrappingTextBoxFlag xmlns="" xmlns:ma14="http://schemas.microsoft.com/office/mac/drawingml/2011/main" val="1"/>
+            </a:ext>
+          </a:extLst>
+        </p:spPr>
+        <p:txBody>
+          <a:bodyPr wrap="square" lIns="0" tIns="0" rIns="0" bIns="0" numCol="1" anchor="t">
+            <a:noAutofit/>
+          </a:bodyPr>
+          <a:lstStyle>
+            <a:lvl1pPr algn="l" defTabSz="584200">
+              <a:lnSpc>
+                <a:spcPct val="110000"/>
+              </a:lnSpc>
+              <a:spcBef>
+                <a:spcPts val="3000"/>
+              </a:spcBef>
+              <a:defRPr sz="2000">
+                <a:solidFill>
+                  <a:srgbClr val="4C4C4C"/>
+                </a:solidFill>
+                <a:latin typeface="Helvetica Neue Light"/>
+                <a:ea typeface="Helvetica Neue Light"/>
+                <a:cs typeface="Helvetica Neue Light"/>
+                <a:sym typeface="Helvetica Neue Light"/>
+              </a:defRPr>
+            </a:lvl1pPr>
+          </a:lstStyle>
+          <a:p>
+            <a:pPr lvl="0" algn="ctr">
+              <a:lnSpc>
+                <a:spcPct val="100000"/>
+              </a:lnSpc>
+              <a:defRPr sz="1800">
+                <a:solidFill>
+                  <a:srgbClr val="000000"/>
+                </a:solidFill>
+              </a:defRPr>
+            </a:pPr>
+            <a:r>
+              <a:rPr lang="en-US" sz="2400" b="1" dirty="0">
+                <a:solidFill>
+                  <a:srgbClr val="0170AD"/>
+                </a:solidFill>
+                <a:latin typeface="Lato Light"/>
+                <a:ea typeface="Lato Light"/>
+                <a:cs typeface="Lato Light"/>
+              </a:rPr>
+              <a:t>Our GitHub Repository</a:t>
+            </a:r>
+          </a:p>
+        </p:txBody>
+      </p:sp>
+      <p:sp>
+        <p:nvSpPr>
+          <p:cNvPr id="42" name="Shape 188">
+            <a:extLst>
+              <a:ext uri="{FF2B5EF4-FFF2-40B4-BE49-F238E27FC236}">
+                <a16:creationId xmlns:a16="http://schemas.microsoft.com/office/drawing/2014/main" id="{29A27DEB-B8E9-744B-A1EA-7458FB93FC93}"/>
+              </a:ext>
+            </a:extLst>
+          </p:cNvPr>
+          <p:cNvSpPr/>
+          <p:nvPr/>
+        </p:nvSpPr>
+        <p:spPr>
+          <a:xfrm>
+            <a:off x="32260415" y="15562685"/>
+            <a:ext cx="9901058" cy="7349416"/>
+          </a:xfrm>
+          <a:prstGeom prst="rect">
+            <a:avLst/>
+          </a:prstGeom>
+          <a:noFill/>
+          <a:ln w="12700" cap="flat">
+            <a:noFill/>
+            <a:miter lim="400000"/>
+          </a:ln>
+          <a:effectLst/>
+          <a:extLst>
+            <a:ext uri="{C572A759-6A51-4108-AA02-DFA0A04FC94B}">
+              <ma14:wrappingTextBoxFlag xmlns="" xmlns:ma14="http://schemas.microsoft.com/office/mac/drawingml/2011/main" val="1"/>
+            </a:ext>
+          </a:extLst>
+        </p:spPr>
+        <p:txBody>
+          <a:bodyPr wrap="square" lIns="0" tIns="0" rIns="0" bIns="0" numCol="1" anchor="t">
+            <a:noAutofit/>
+          </a:bodyPr>
+          <a:lstStyle>
+            <a:lvl1pPr algn="l" defTabSz="584200">
+              <a:lnSpc>
+                <a:spcPct val="110000"/>
+              </a:lnSpc>
+              <a:spcBef>
+                <a:spcPts val="3000"/>
+              </a:spcBef>
+              <a:defRPr sz="2000">
+                <a:solidFill>
+                  <a:srgbClr val="4C4C4C"/>
+                </a:solidFill>
+                <a:latin typeface="Helvetica Neue Light"/>
+                <a:ea typeface="Helvetica Neue Light"/>
+                <a:cs typeface="Helvetica Neue Light"/>
+                <a:sym typeface="Helvetica Neue Light"/>
+              </a:defRPr>
+            </a:lvl1pPr>
+          </a:lstStyle>
+          <a:p>
+            <a:pPr marL="342900" lvl="0" indent="-342900" algn="just">
+              <a:lnSpc>
+                <a:spcPct val="100000"/>
+              </a:lnSpc>
+              <a:spcBef>
+                <a:spcPts val="0"/>
+              </a:spcBef>
+              <a:buFont typeface="Arial" panose="020B0604020202020204" pitchFamily="34" charset="0"/>
+              <a:buChar char="•"/>
+              <a:defRPr sz="1800">
+                <a:solidFill>
+                  <a:srgbClr val="000000"/>
+                </a:solidFill>
+              </a:defRPr>
+            </a:pPr>
+            <a:r>
+              <a:rPr lang="en-US" sz="2400" b="1" dirty="0">
+                <a:solidFill>
+                  <a:srgbClr val="0170AD"/>
+                </a:solidFill>
+                <a:latin typeface="Lato Light"/>
+                <a:ea typeface="Lato Light"/>
+                <a:cs typeface="Lato Light"/>
+              </a:rPr>
+              <a:t>VGG16 is indeed great for prototyping and it was easier to achieve good results with it than with the Inception v3 architecture or the </a:t>
+            </a:r>
+            <a:r>
+              <a:rPr lang="en-US" sz="2400" b="1" dirty="0" err="1">
+                <a:solidFill>
+                  <a:srgbClr val="0170AD"/>
+                </a:solidFill>
+                <a:latin typeface="Lato Light"/>
+                <a:ea typeface="Lato Light"/>
+                <a:cs typeface="Lato Light"/>
+              </a:rPr>
+              <a:t>Xception</a:t>
+            </a:r>
+            <a:r>
+              <a:rPr lang="en-US" sz="2400" b="1" dirty="0">
+                <a:solidFill>
+                  <a:srgbClr val="0170AD"/>
+                </a:solidFill>
+                <a:latin typeface="Lato Light"/>
+                <a:ea typeface="Lato Light"/>
+                <a:cs typeface="Lato Light"/>
+              </a:rPr>
+              <a:t> architecture.</a:t>
+            </a:r>
+          </a:p>
+          <a:p>
+            <a:pPr marL="342900" lvl="0" indent="-342900" algn="just">
+              <a:lnSpc>
+                <a:spcPct val="100000"/>
+              </a:lnSpc>
+              <a:spcBef>
+                <a:spcPts val="0"/>
+              </a:spcBef>
+              <a:buFont typeface="Arial" panose="020B0604020202020204" pitchFamily="34" charset="0"/>
+              <a:buChar char="•"/>
+              <a:defRPr sz="1800">
+                <a:solidFill>
+                  <a:srgbClr val="000000"/>
+                </a:solidFill>
+              </a:defRPr>
+            </a:pPr>
+            <a:r>
+              <a:rPr lang="en-US" sz="2400" b="1" dirty="0">
+                <a:solidFill>
+                  <a:srgbClr val="0170AD"/>
+                </a:solidFill>
+                <a:latin typeface="Lato Light"/>
+                <a:ea typeface="Lato Light"/>
+                <a:cs typeface="Lato Light"/>
+              </a:rPr>
+              <a:t>Using bottlenecks can really speed up training. However, memory issues can occur and you have to fix them.</a:t>
+            </a:r>
+          </a:p>
+          <a:p>
+            <a:pPr marL="342900" lvl="0" indent="-342900" algn="just">
+              <a:lnSpc>
+                <a:spcPct val="100000"/>
+              </a:lnSpc>
+              <a:spcBef>
+                <a:spcPts val="0"/>
+              </a:spcBef>
+              <a:buFont typeface="Arial" panose="020B0604020202020204" pitchFamily="34" charset="0"/>
+              <a:buChar char="•"/>
+              <a:defRPr sz="1800">
+                <a:solidFill>
+                  <a:srgbClr val="000000"/>
+                </a:solidFill>
+              </a:defRPr>
+            </a:pPr>
+            <a:r>
+              <a:rPr lang="en-US" sz="2400" b="1" dirty="0">
+                <a:solidFill>
+                  <a:srgbClr val="0170AD"/>
+                </a:solidFill>
+                <a:latin typeface="Lato Light"/>
+                <a:ea typeface="Lato Light"/>
+                <a:cs typeface="Lato Light"/>
+              </a:rPr>
+              <a:t>Batch size is important for training speed. We found out that a batch size of 16 works best for us when training an Inception v3 model on K80.</a:t>
+            </a:r>
+          </a:p>
+          <a:p>
+            <a:pPr marL="342900" lvl="0" indent="-342900" algn="just">
+              <a:lnSpc>
+                <a:spcPct val="100000"/>
+              </a:lnSpc>
+              <a:spcBef>
+                <a:spcPts val="0"/>
+              </a:spcBef>
+              <a:buFont typeface="Arial" panose="020B0604020202020204" pitchFamily="34" charset="0"/>
+              <a:buChar char="•"/>
+              <a:defRPr sz="1800">
+                <a:solidFill>
+                  <a:srgbClr val="000000"/>
+                </a:solidFill>
+              </a:defRPr>
+            </a:pPr>
+            <a:endParaRPr lang="en-US" sz="2400" b="1" dirty="0">
+              <a:solidFill>
+                <a:srgbClr val="0170AD"/>
+              </a:solidFill>
+              <a:latin typeface="Lato Light"/>
+              <a:ea typeface="Lato Light"/>
+              <a:cs typeface="Lato Light"/>
+            </a:endParaRPr>
+          </a:p>
+          <a:p>
+            <a:pPr lvl="0" algn="just">
+              <a:lnSpc>
+                <a:spcPct val="100000"/>
+              </a:lnSpc>
+              <a:spcBef>
+                <a:spcPts val="0"/>
+              </a:spcBef>
+              <a:defRPr sz="1800">
+                <a:solidFill>
+                  <a:srgbClr val="000000"/>
+                </a:solidFill>
+              </a:defRPr>
+            </a:pPr>
+            <a:r>
+              <a:rPr lang="en-US" sz="2400" b="1" dirty="0">
+                <a:solidFill>
+                  <a:srgbClr val="0170AD"/>
+                </a:solidFill>
+                <a:latin typeface="Lato Light"/>
+                <a:ea typeface="Lato Light"/>
+                <a:cs typeface="Lato Light"/>
+              </a:rPr>
+              <a:t>Ideas for improvement:</a:t>
+            </a:r>
+          </a:p>
+          <a:p>
+            <a:pPr marL="342900" lvl="0" indent="-342900" algn="just">
+              <a:lnSpc>
+                <a:spcPct val="100000"/>
+              </a:lnSpc>
+              <a:spcBef>
+                <a:spcPts val="0"/>
+              </a:spcBef>
+              <a:buFont typeface="Arial" panose="020B0604020202020204" pitchFamily="34" charset="0"/>
+              <a:buChar char="•"/>
+              <a:defRPr sz="1800">
+                <a:solidFill>
+                  <a:srgbClr val="000000"/>
+                </a:solidFill>
+              </a:defRPr>
+            </a:pPr>
+            <a:r>
+              <a:rPr lang="en-US" sz="2400" b="1" dirty="0">
+                <a:solidFill>
+                  <a:srgbClr val="0170AD"/>
+                </a:solidFill>
+                <a:latin typeface="Lato Light"/>
+                <a:ea typeface="Lato Light"/>
+                <a:cs typeface="Lato Light"/>
+              </a:rPr>
+              <a:t>Using class weights to improve the balance of the photo dataset</a:t>
+            </a:r>
+          </a:p>
+          <a:p>
+            <a:pPr marL="342900" lvl="0" indent="-342900" algn="just">
+              <a:lnSpc>
+                <a:spcPct val="100000"/>
+              </a:lnSpc>
+              <a:spcBef>
+                <a:spcPts val="0"/>
+              </a:spcBef>
+              <a:buFont typeface="Arial" panose="020B0604020202020204" pitchFamily="34" charset="0"/>
+              <a:buChar char="•"/>
+              <a:defRPr sz="1800">
+                <a:solidFill>
+                  <a:srgbClr val="000000"/>
+                </a:solidFill>
+              </a:defRPr>
+            </a:pPr>
+            <a:r>
+              <a:rPr lang="en-US" sz="2400" b="1" dirty="0">
+                <a:solidFill>
+                  <a:srgbClr val="0170AD"/>
+                </a:solidFill>
+                <a:latin typeface="Lato Light"/>
+                <a:ea typeface="Lato Light"/>
+                <a:cs typeface="Lato Light"/>
+              </a:rPr>
+              <a:t>Filter out the few reviews which were written in other languages to further improve the RNN results.</a:t>
+            </a:r>
+          </a:p>
+          <a:p>
+            <a:pPr marL="342900" lvl="0" indent="-342900" algn="just">
+              <a:lnSpc>
+                <a:spcPct val="100000"/>
+              </a:lnSpc>
+              <a:spcBef>
+                <a:spcPts val="0"/>
+              </a:spcBef>
+              <a:buFont typeface="Arial" panose="020B0604020202020204" pitchFamily="34" charset="0"/>
+              <a:buChar char="•"/>
+              <a:defRPr sz="1800">
+                <a:solidFill>
+                  <a:srgbClr val="000000"/>
+                </a:solidFill>
+              </a:defRPr>
+            </a:pPr>
+            <a:r>
+              <a:rPr lang="en-US" sz="2400" b="1" dirty="0">
+                <a:solidFill>
+                  <a:srgbClr val="0170AD"/>
+                </a:solidFill>
+                <a:latin typeface="Lato Light"/>
+                <a:ea typeface="Lato Light"/>
+                <a:cs typeface="Lato Light"/>
+              </a:rPr>
+              <a:t>Use better seed sequences for the RNN to write more convincing fake reviews. One idea would be to have not one but a few different seed sequences for every predicted label and then randomly choose one. Also, you could shuffle the order of the predictions for the labels, so that label one isn’t always at first.</a:t>
+            </a:r>
+          </a:p>
+          <a:p>
+            <a:pPr marL="342900" lvl="0" indent="-342900" algn="just">
+              <a:lnSpc>
+                <a:spcPct val="100000"/>
+              </a:lnSpc>
+              <a:spcBef>
+                <a:spcPts val="0"/>
+              </a:spcBef>
+              <a:buFont typeface="Arial" panose="020B0604020202020204" pitchFamily="34" charset="0"/>
+              <a:buChar char="•"/>
+              <a:defRPr sz="1800">
+                <a:solidFill>
+                  <a:srgbClr val="000000"/>
+                </a:solidFill>
+              </a:defRPr>
+            </a:pPr>
+            <a:r>
+              <a:rPr lang="en-US" sz="2400" b="1" dirty="0">
+                <a:solidFill>
+                  <a:srgbClr val="0170AD"/>
+                </a:solidFill>
+                <a:latin typeface="Lato Light"/>
+                <a:ea typeface="Lato Light"/>
+                <a:cs typeface="Lato Light"/>
+              </a:rPr>
+              <a:t>Use a </a:t>
+            </a:r>
+            <a:r>
+              <a:rPr lang="en-US" sz="2400" b="1" dirty="0" err="1">
+                <a:solidFill>
+                  <a:srgbClr val="0170AD"/>
+                </a:solidFill>
+                <a:latin typeface="Lato Light"/>
+                <a:ea typeface="Lato Light"/>
+                <a:cs typeface="Lato Light"/>
+              </a:rPr>
+              <a:t>Gan</a:t>
+            </a:r>
+            <a:endParaRPr lang="en-US" sz="2400" b="1" dirty="0">
+              <a:solidFill>
+                <a:srgbClr val="0170AD"/>
+              </a:solidFill>
+              <a:latin typeface="Lato Light"/>
+              <a:ea typeface="Lato Light"/>
+              <a:cs typeface="Lato Light"/>
+            </a:endParaRPr>
+          </a:p>
+          <a:p>
+            <a:pPr marL="342900" lvl="0" indent="-342900" algn="just">
+              <a:lnSpc>
+                <a:spcPct val="100000"/>
+              </a:lnSpc>
+              <a:spcBef>
+                <a:spcPts val="0"/>
+              </a:spcBef>
+              <a:buFont typeface="Arial" panose="020B0604020202020204" pitchFamily="34" charset="0"/>
+              <a:buChar char="•"/>
+              <a:defRPr sz="1800">
+                <a:solidFill>
+                  <a:srgbClr val="000000"/>
+                </a:solidFill>
+              </a:defRPr>
+            </a:pPr>
+            <a:r>
+              <a:rPr lang="en-US" sz="2400" b="1" dirty="0">
+                <a:solidFill>
+                  <a:srgbClr val="0170AD"/>
+                </a:solidFill>
+                <a:latin typeface="Lato Light"/>
+                <a:ea typeface="Lato Light"/>
+                <a:cs typeface="Lato Light"/>
+              </a:rPr>
+              <a:t>Ideas from the interview</a:t>
             </a:r>
           </a:p>
         </p:txBody>

</xml_diff>

<commit_message>
Everything except the final results is close to finsh now
</commit_message>
<xml_diff>
--- a/Poster/Poster_Team_55.pptx
+++ b/Poster/Poster_Team_55.pptx
@@ -6358,7 +6358,7 @@
                 <a:ea typeface="Lato Light"/>
                 <a:cs typeface="Lato Light"/>
               </a:rPr>
-              <a:t>For multi-label classification, we used a binary-cross entropy loss and an F-score as our metric.</a:t>
+              <a:t>For multi-label classification, we used a binary-cross entropy loss and an F1-score as our metric.</a:t>
             </a:r>
           </a:p>
           <a:p>
@@ -7254,7 +7254,7 @@
         <p:spPr>
           <a:xfrm>
             <a:off x="32260415" y="15562685"/>
-            <a:ext cx="9901058" cy="7349416"/>
+            <a:ext cx="9901058" cy="8512330"/>
           </a:xfrm>
           <a:prstGeom prst="rect">
             <a:avLst/>
@@ -7397,7 +7397,7 @@
                 <a:ea typeface="Lato Light"/>
                 <a:cs typeface="Lato Light"/>
               </a:rPr>
-              <a:t>Batch size is important for training speed. We found out that a batch size of 16 works best for us when training an Inception v3 model on K80.</a:t>
+              <a:t>Batch size is important for training speed. We found out that a batch size of 16 works best for us when training an Inception v3 model on a K80.</a:t>
             </a:r>
           </a:p>
           <a:p>
@@ -7532,7 +7532,7 @@
                 <a:ea typeface="Lato Light"/>
                 <a:cs typeface="Lato Light"/>
               </a:rPr>
-              <a:t>Use better seed sequences for the RNN to write more convincing fake reviews. One idea would be to have not one but a few different seed sequences for every predicted label and then randomly choose one. Also, you could shuffle the order of the predictions for the labels, so that label one isn’t always at first.</a:t>
+              <a:t>Use better seed sequences for the RNN to write more convincing fake reviews. One idea would be to have not one but a few different seed sequences for every predicted label and then randomly choose one. Also, you could shuffle the order of the predictions for the labels, so that label 0 isn’t always the first sequence in a review.</a:t>
             </a:r>
           </a:p>
           <a:p>
@@ -7560,18 +7560,129 @@
                 <a:ea typeface="Lato Light"/>
                 <a:cs typeface="Lato Light"/>
               </a:rPr>
-              <a:t>Use a </a:t>
-            </a:r>
-            <a:r>
-              <a:rPr lang="en-US" sz="2400" b="1" dirty="0" err="1">
-                <a:solidFill>
-                  <a:srgbClr val="0170AD"/>
-                </a:solidFill>
-                <a:latin typeface="Lato Light"/>
-                <a:ea typeface="Lato Light"/>
-                <a:cs typeface="Lato Light"/>
-              </a:rPr>
-              <a:t>Gan</a:t>
+              <a:t>Use a GAN to conditional generate text based on the predicated labels to write more natural sounding fake reviews.</a:t>
+            </a:r>
+          </a:p>
+          <a:p>
+            <a:pPr marL="342900" lvl="0" indent="-342900" algn="just">
+              <a:lnSpc>
+                <a:spcPct val="100000"/>
+              </a:lnSpc>
+              <a:spcBef>
+                <a:spcPts val="0"/>
+              </a:spcBef>
+              <a:buFont typeface="Arial" panose="020B0604020202020204" pitchFamily="34" charset="0"/>
+              <a:buChar char="•"/>
+              <a:defRPr sz="1800">
+                <a:solidFill>
+                  <a:srgbClr val="000000"/>
+                </a:solidFill>
+              </a:defRPr>
+            </a:pPr>
+            <a:r>
+              <a:rPr lang="en-US" sz="2400" b="1" dirty="0">
+                <a:solidFill>
+                  <a:srgbClr val="0170AD"/>
+                </a:solidFill>
+                <a:latin typeface="Lato Light"/>
+                <a:ea typeface="Lato Light"/>
+                <a:cs typeface="Lato Light"/>
+              </a:rPr>
+              <a:t>(Use a more advanced approach for the multi-instance approach of this problem)</a:t>
+            </a:r>
+          </a:p>
+        </p:txBody>
+      </p:sp>
+      <p:sp>
+        <p:nvSpPr>
+          <p:cNvPr id="43" name="Shape 188">
+            <a:extLst>
+              <a:ext uri="{FF2B5EF4-FFF2-40B4-BE49-F238E27FC236}">
+                <a16:creationId xmlns:a16="http://schemas.microsoft.com/office/drawing/2014/main" id="{E78896CC-B658-A14F-808C-9425E898FCBA}"/>
+              </a:ext>
+            </a:extLst>
+          </p:cNvPr>
+          <p:cNvSpPr/>
+          <p:nvPr/>
+        </p:nvSpPr>
+        <p:spPr>
+          <a:xfrm>
+            <a:off x="919341" y="27823326"/>
+            <a:ext cx="9204371" cy="1551001"/>
+          </a:xfrm>
+          <a:prstGeom prst="rect">
+            <a:avLst/>
+          </a:prstGeom>
+          <a:noFill/>
+          <a:ln w="12700" cap="flat">
+            <a:noFill/>
+            <a:miter lim="400000"/>
+          </a:ln>
+          <a:effectLst/>
+          <a:extLst>
+            <a:ext uri="{C572A759-6A51-4108-AA02-DFA0A04FC94B}">
+              <ma14:wrappingTextBoxFlag xmlns="" xmlns:ma14="http://schemas.microsoft.com/office/mac/drawingml/2011/main" val="1"/>
+            </a:ext>
+          </a:extLst>
+        </p:spPr>
+        <p:txBody>
+          <a:bodyPr wrap="square" lIns="0" tIns="0" rIns="0" bIns="0" numCol="1" anchor="t">
+            <a:noAutofit/>
+          </a:bodyPr>
+          <a:lstStyle>
+            <a:lvl1pPr algn="l" defTabSz="584200">
+              <a:lnSpc>
+                <a:spcPct val="110000"/>
+              </a:lnSpc>
+              <a:spcBef>
+                <a:spcPts val="3000"/>
+              </a:spcBef>
+              <a:defRPr sz="2000">
+                <a:solidFill>
+                  <a:srgbClr val="4C4C4C"/>
+                </a:solidFill>
+                <a:latin typeface="Helvetica Neue Light"/>
+                <a:ea typeface="Helvetica Neue Light"/>
+                <a:cs typeface="Helvetica Neue Light"/>
+                <a:sym typeface="Helvetica Neue Light"/>
+              </a:defRPr>
+            </a:lvl1pPr>
+          </a:lstStyle>
+          <a:p>
+            <a:pPr lvl="0" algn="just">
+              <a:lnSpc>
+                <a:spcPct val="100000"/>
+              </a:lnSpc>
+              <a:spcBef>
+                <a:spcPts val="0"/>
+              </a:spcBef>
+              <a:defRPr sz="1800">
+                <a:solidFill>
+                  <a:srgbClr val="000000"/>
+                </a:solidFill>
+              </a:defRPr>
+            </a:pPr>
+            <a:r>
+              <a:rPr lang="en-US" sz="2400" b="1" u="sng" dirty="0" err="1">
+                <a:solidFill>
+                  <a:srgbClr val="0170AD"/>
+                </a:solidFill>
+                <a:latin typeface="Lato Light"/>
+                <a:ea typeface="Lato Light"/>
+                <a:cs typeface="Lato Light"/>
+              </a:rPr>
+              <a:t>Haydar</a:t>
+            </a:r>
+            <a:r>
+              <a:rPr lang="en-US" sz="2400" b="1" u="sng" dirty="0">
+                <a:solidFill>
+                  <a:srgbClr val="0170AD"/>
+                </a:solidFill>
+                <a:latin typeface="Lato Light"/>
+                <a:ea typeface="Lato Light"/>
+                <a:cs typeface="Lato Light"/>
+              </a:rPr>
+              <a:t> can you please add under architecture how you have done the classification on the business level??</a:t>
             </a:r>
             <a:endParaRPr lang="en-US" sz="2400" b="1" dirty="0">
               <a:solidFill>
@@ -7582,6 +7693,63 @@
               <a:cs typeface="Lato Light"/>
             </a:endParaRPr>
           </a:p>
+        </p:txBody>
+      </p:sp>
+      <p:sp>
+        <p:nvSpPr>
+          <p:cNvPr id="53" name="Shape 188">
+            <a:extLst>
+              <a:ext uri="{FF2B5EF4-FFF2-40B4-BE49-F238E27FC236}">
+                <a16:creationId xmlns:a16="http://schemas.microsoft.com/office/drawing/2014/main" id="{D9008FA4-6C55-4349-B8EB-CAF713A75C51}"/>
+              </a:ext>
+            </a:extLst>
+          </p:cNvPr>
+          <p:cNvSpPr/>
+          <p:nvPr/>
+        </p:nvSpPr>
+        <p:spPr>
+          <a:xfrm>
+            <a:off x="21705078" y="15562685"/>
+            <a:ext cx="9901058" cy="8512330"/>
+          </a:xfrm>
+          <a:prstGeom prst="rect">
+            <a:avLst/>
+          </a:prstGeom>
+          <a:noFill/>
+          <a:ln w="12700" cap="flat">
+            <a:noFill/>
+            <a:miter lim="400000"/>
+          </a:ln>
+          <a:effectLst/>
+          <a:extLst>
+            <a:ext uri="{C572A759-6A51-4108-AA02-DFA0A04FC94B}">
+              <ma14:wrappingTextBoxFlag xmlns="" xmlns:ma14="http://schemas.microsoft.com/office/mac/drawingml/2011/main" val="1"/>
+            </a:ext>
+          </a:extLst>
+        </p:spPr>
+        <p:txBody>
+          <a:bodyPr wrap="square" lIns="0" tIns="0" rIns="0" bIns="0" numCol="1" anchor="t">
+            <a:noAutofit/>
+          </a:bodyPr>
+          <a:lstStyle>
+            <a:lvl1pPr algn="l" defTabSz="584200">
+              <a:lnSpc>
+                <a:spcPct val="110000"/>
+              </a:lnSpc>
+              <a:spcBef>
+                <a:spcPts val="3000"/>
+              </a:spcBef>
+              <a:defRPr sz="2000">
+                <a:solidFill>
+                  <a:srgbClr val="4C4C4C"/>
+                </a:solidFill>
+                <a:latin typeface="Helvetica Neue Light"/>
+                <a:ea typeface="Helvetica Neue Light"/>
+                <a:cs typeface="Helvetica Neue Light"/>
+                <a:sym typeface="Helvetica Neue Light"/>
+              </a:defRPr>
+            </a:lvl1pPr>
+          </a:lstStyle>
           <a:p>
             <a:pPr marL="342900" lvl="0" indent="-342900" algn="just">
               <a:lnSpc>
@@ -7598,6 +7766,570 @@
                 </a:solidFill>
               </a:defRPr>
             </a:pPr>
+            <a:endParaRPr lang="en-US" sz="2400" b="1" dirty="0">
+              <a:solidFill>
+                <a:srgbClr val="0170AD"/>
+              </a:solidFill>
+              <a:latin typeface="Lato Light"/>
+              <a:ea typeface="Lato Light"/>
+              <a:cs typeface="Lato Light"/>
+            </a:endParaRPr>
+          </a:p>
+        </p:txBody>
+      </p:sp>
+      <mc:AlternateContent xmlns:mc="http://schemas.openxmlformats.org/markup-compatibility/2006">
+        <mc:Choice xmlns:a14="http://schemas.microsoft.com/office/drawing/2010/main" Requires="a14">
+          <p:sp>
+            <p:nvSpPr>
+              <p:cNvPr id="54" name="Shape 188">
+                <a:extLst>
+                  <a:ext uri="{FF2B5EF4-FFF2-40B4-BE49-F238E27FC236}">
+                    <a16:creationId xmlns:a16="http://schemas.microsoft.com/office/drawing/2014/main" id="{600886FA-A6C3-EA4B-A501-9D8287AD722B}"/>
+                  </a:ext>
+                </a:extLst>
+              </p:cNvPr>
+              <p:cNvSpPr/>
+              <p:nvPr/>
+            </p:nvSpPr>
+            <p:spPr>
+              <a:xfrm>
+                <a:off x="919341" y="25725120"/>
+                <a:ext cx="9204371" cy="1551001"/>
+              </a:xfrm>
+              <a:prstGeom prst="rect">
+                <a:avLst/>
+              </a:prstGeom>
+              <a:noFill/>
+              <a:ln w="12700" cap="flat">
+                <a:noFill/>
+                <a:miter lim="400000"/>
+              </a:ln>
+              <a:effectLst/>
+              <a:extLst>
+                <a:ext uri="{C572A759-6A51-4108-AA02-DFA0A04FC94B}">
+                  <ma14:wrappingTextBoxFlag xmlns="" xmlns:ma14="http://schemas.microsoft.com/office/mac/drawingml/2011/main" val="1"/>
+                </a:ext>
+              </a:extLst>
+            </p:spPr>
+            <p:txBody>
+              <a:bodyPr wrap="square" lIns="0" tIns="0" rIns="0" bIns="0" numCol="1" anchor="t">
+                <a:noAutofit/>
+              </a:bodyPr>
+              <a:lstStyle>
+                <a:lvl1pPr algn="l" defTabSz="584200">
+                  <a:lnSpc>
+                    <a:spcPct val="110000"/>
+                  </a:lnSpc>
+                  <a:spcBef>
+                    <a:spcPts val="3000"/>
+                  </a:spcBef>
+                  <a:defRPr sz="2000">
+                    <a:solidFill>
+                      <a:srgbClr val="4C4C4C"/>
+                    </a:solidFill>
+                    <a:latin typeface="Helvetica Neue Light"/>
+                    <a:ea typeface="Helvetica Neue Light"/>
+                    <a:cs typeface="Helvetica Neue Light"/>
+                    <a:sym typeface="Helvetica Neue Light"/>
+                  </a:defRPr>
+                </a:lvl1pPr>
+              </a:lstStyle>
+              <a:p>
+                <a:pPr lvl="0" algn="just">
+                  <a:lnSpc>
+                    <a:spcPct val="100000"/>
+                  </a:lnSpc>
+                  <a:spcBef>
+                    <a:spcPts val="0"/>
+                  </a:spcBef>
+                  <a:defRPr sz="1800">
+                    <a:solidFill>
+                      <a:srgbClr val="000000"/>
+                    </a:solidFill>
+                  </a:defRPr>
+                </a:pPr>
+                <a14:m>
+                  <m:oMathPara xmlns:m="http://schemas.openxmlformats.org/officeDocument/2006/math">
+                    <m:oMathParaPr>
+                      <m:jc m:val="centerGroup"/>
+                    </m:oMathParaPr>
+                    <m:oMath xmlns:m="http://schemas.openxmlformats.org/officeDocument/2006/math">
+                      <m:r>
+                        <a:rPr lang="de-DE" sz="2400" b="1" i="1" smtClean="0">
+                          <a:solidFill>
+                            <a:srgbClr val="0170AD"/>
+                          </a:solidFill>
+                          <a:latin typeface="Cambria Math" panose="02040503050406030204" pitchFamily="18" charset="0"/>
+                          <a:ea typeface="Lato Light"/>
+                          <a:cs typeface="Lato Light"/>
+                        </a:rPr>
+                        <m:t>𝑭</m:t>
+                      </m:r>
+                      <m:r>
+                        <a:rPr lang="de-DE" sz="2400" b="1" i="1" smtClean="0">
+                          <a:solidFill>
+                            <a:srgbClr val="0170AD"/>
+                          </a:solidFill>
+                          <a:latin typeface="Cambria Math" panose="02040503050406030204" pitchFamily="18" charset="0"/>
+                          <a:ea typeface="Lato Light"/>
+                          <a:cs typeface="Lato Light"/>
+                        </a:rPr>
+                        <m:t>𝟏</m:t>
+                      </m:r>
+                      <m:r>
+                        <a:rPr lang="de-DE" sz="2400" b="1" i="1" smtClean="0">
+                          <a:solidFill>
+                            <a:srgbClr val="0170AD"/>
+                          </a:solidFill>
+                          <a:latin typeface="Cambria Math" panose="02040503050406030204" pitchFamily="18" charset="0"/>
+                          <a:ea typeface="Lato Light"/>
+                          <a:cs typeface="Lato Light"/>
+                        </a:rPr>
+                        <m:t>=</m:t>
+                      </m:r>
+                      <m:r>
+                        <a:rPr lang="de-DE" sz="2400" b="1" i="1" smtClean="0">
+                          <a:solidFill>
+                            <a:srgbClr val="0170AD"/>
+                          </a:solidFill>
+                          <a:latin typeface="Cambria Math" panose="02040503050406030204" pitchFamily="18" charset="0"/>
+                          <a:ea typeface="Lato Light"/>
+                          <a:cs typeface="Lato Light"/>
+                        </a:rPr>
+                        <m:t>𝟐</m:t>
+                      </m:r>
+                      <m:f>
+                        <m:fPr>
+                          <m:ctrlPr>
+                            <a:rPr lang="de-DE" sz="2400" b="1" i="1" smtClean="0">
+                              <a:solidFill>
+                                <a:srgbClr val="0170AD"/>
+                              </a:solidFill>
+                              <a:latin typeface="Cambria Math" panose="02040503050406030204" pitchFamily="18" charset="0"/>
+                              <a:ea typeface="Lato Light"/>
+                              <a:cs typeface="Lato Light"/>
+                            </a:rPr>
+                          </m:ctrlPr>
+                        </m:fPr>
+                        <m:num>
+                          <m:r>
+                            <a:rPr lang="de-DE" sz="2400" b="1" i="1" smtClean="0">
+                              <a:solidFill>
+                                <a:srgbClr val="0170AD"/>
+                              </a:solidFill>
+                              <a:latin typeface="Cambria Math" panose="02040503050406030204" pitchFamily="18" charset="0"/>
+                              <a:ea typeface="Lato Light"/>
+                              <a:cs typeface="Lato Light"/>
+                            </a:rPr>
+                            <m:t>𝒑</m:t>
+                          </m:r>
+                          <m:r>
+                            <a:rPr lang="de-DE" sz="2400" b="1" i="1" smtClean="0">
+                              <a:solidFill>
+                                <a:srgbClr val="0170AD"/>
+                              </a:solidFill>
+                              <a:latin typeface="Cambria Math" panose="02040503050406030204" pitchFamily="18" charset="0"/>
+                              <a:ea typeface="Cambria Math" panose="02040503050406030204" pitchFamily="18" charset="0"/>
+                              <a:cs typeface="Lato Light"/>
+                            </a:rPr>
+                            <m:t>×</m:t>
+                          </m:r>
+                          <m:r>
+                            <a:rPr lang="de-DE" sz="2400" b="1" i="1" smtClean="0">
+                              <a:solidFill>
+                                <a:srgbClr val="0170AD"/>
+                              </a:solidFill>
+                              <a:latin typeface="Cambria Math" panose="02040503050406030204" pitchFamily="18" charset="0"/>
+                              <a:ea typeface="Cambria Math" panose="02040503050406030204" pitchFamily="18" charset="0"/>
+                              <a:cs typeface="Lato Light"/>
+                            </a:rPr>
+                            <m:t>𝒓</m:t>
+                          </m:r>
+                        </m:num>
+                        <m:den>
+                          <m:r>
+                            <a:rPr lang="de-DE" sz="2400" b="1" i="1" smtClean="0">
+                              <a:solidFill>
+                                <a:srgbClr val="0170AD"/>
+                              </a:solidFill>
+                              <a:latin typeface="Cambria Math" panose="02040503050406030204" pitchFamily="18" charset="0"/>
+                              <a:ea typeface="Lato Light"/>
+                              <a:cs typeface="Lato Light"/>
+                            </a:rPr>
+                            <m:t>𝒑</m:t>
+                          </m:r>
+                          <m:r>
+                            <a:rPr lang="de-DE" sz="2400" b="1" i="1" smtClean="0">
+                              <a:solidFill>
+                                <a:srgbClr val="0170AD"/>
+                              </a:solidFill>
+                              <a:latin typeface="Cambria Math" panose="02040503050406030204" pitchFamily="18" charset="0"/>
+                              <a:ea typeface="Lato Light"/>
+                              <a:cs typeface="Lato Light"/>
+                            </a:rPr>
+                            <m:t>+</m:t>
+                          </m:r>
+                          <m:r>
+                            <a:rPr lang="de-DE" sz="2400" b="1" i="1" smtClean="0">
+                              <a:solidFill>
+                                <a:srgbClr val="0170AD"/>
+                              </a:solidFill>
+                              <a:latin typeface="Cambria Math" panose="02040503050406030204" pitchFamily="18" charset="0"/>
+                              <a:ea typeface="Lato Light"/>
+                              <a:cs typeface="Lato Light"/>
+                            </a:rPr>
+                            <m:t>𝒓</m:t>
+                          </m:r>
+                        </m:den>
+                      </m:f>
+                      <m:r>
+                        <a:rPr lang="de-DE" sz="2400" b="1" i="1" smtClean="0">
+                          <a:solidFill>
+                            <a:srgbClr val="0170AD"/>
+                          </a:solidFill>
+                          <a:latin typeface="Cambria Math" panose="02040503050406030204" pitchFamily="18" charset="0"/>
+                          <a:ea typeface="Lato Light"/>
+                          <a:cs typeface="Lato Light"/>
+                        </a:rPr>
+                        <m:t> </m:t>
+                      </m:r>
+                      <m:r>
+                        <a:rPr lang="de-DE" sz="2400" b="1" i="0" smtClean="0">
+                          <a:solidFill>
+                            <a:srgbClr val="0170AD"/>
+                          </a:solidFill>
+                          <a:latin typeface="Cambria Math" panose="02040503050406030204" pitchFamily="18" charset="0"/>
+                          <a:ea typeface="Lato Light"/>
+                          <a:cs typeface="Lato Light"/>
+                        </a:rPr>
+                        <m:t>𝐰𝐡𝐞𝐫𝐞</m:t>
+                      </m:r>
+                      <m:r>
+                        <a:rPr lang="de-DE" sz="2400" b="1" i="0" smtClean="0">
+                          <a:solidFill>
+                            <a:srgbClr val="0170AD"/>
+                          </a:solidFill>
+                          <a:latin typeface="Cambria Math" panose="02040503050406030204" pitchFamily="18" charset="0"/>
+                          <a:ea typeface="Lato Light"/>
+                          <a:cs typeface="Lato Light"/>
+                        </a:rPr>
+                        <m:t> </m:t>
+                      </m:r>
+                      <m:r>
+                        <a:rPr lang="de-DE" sz="2400" b="1" i="0" smtClean="0">
+                          <a:solidFill>
+                            <a:srgbClr val="0170AD"/>
+                          </a:solidFill>
+                          <a:latin typeface="Cambria Math" panose="02040503050406030204" pitchFamily="18" charset="0"/>
+                          <a:ea typeface="Lato Light"/>
+                          <a:cs typeface="Lato Light"/>
+                        </a:rPr>
+                        <m:t>𝐩</m:t>
+                      </m:r>
+                      <m:r>
+                        <a:rPr lang="de-DE" sz="2400" b="1" i="0" smtClean="0">
+                          <a:solidFill>
+                            <a:srgbClr val="0170AD"/>
+                          </a:solidFill>
+                          <a:latin typeface="Cambria Math" panose="02040503050406030204" pitchFamily="18" charset="0"/>
+                          <a:ea typeface="Lato Light"/>
+                          <a:cs typeface="Lato Light"/>
+                        </a:rPr>
+                        <m:t>= </m:t>
+                      </m:r>
+                      <m:f>
+                        <m:fPr>
+                          <m:ctrlPr>
+                            <a:rPr lang="de-DE" sz="2400" b="1" i="1" smtClean="0">
+                              <a:solidFill>
+                                <a:srgbClr val="0170AD"/>
+                              </a:solidFill>
+                              <a:latin typeface="Cambria Math" panose="02040503050406030204" pitchFamily="18" charset="0"/>
+                              <a:ea typeface="Lato Light"/>
+                              <a:cs typeface="Lato Light"/>
+                            </a:rPr>
+                          </m:ctrlPr>
+                        </m:fPr>
+                        <m:num>
+                          <m:r>
+                            <a:rPr lang="de-DE" sz="2400" b="1" i="1" smtClean="0">
+                              <a:solidFill>
+                                <a:srgbClr val="0170AD"/>
+                              </a:solidFill>
+                              <a:latin typeface="Cambria Math" panose="02040503050406030204" pitchFamily="18" charset="0"/>
+                              <a:ea typeface="Lato Light"/>
+                              <a:cs typeface="Lato Light"/>
+                            </a:rPr>
+                            <m:t>𝒕𝒑</m:t>
+                          </m:r>
+                        </m:num>
+                        <m:den>
+                          <m:r>
+                            <a:rPr lang="de-DE" sz="2400" b="1" i="1" smtClean="0">
+                              <a:solidFill>
+                                <a:srgbClr val="0170AD"/>
+                              </a:solidFill>
+                              <a:latin typeface="Cambria Math" panose="02040503050406030204" pitchFamily="18" charset="0"/>
+                              <a:ea typeface="Lato Light"/>
+                              <a:cs typeface="Lato Light"/>
+                            </a:rPr>
+                            <m:t>𝒕𝒑</m:t>
+                          </m:r>
+                          <m:r>
+                            <a:rPr lang="de-DE" sz="2400" b="1" i="1" smtClean="0">
+                              <a:solidFill>
+                                <a:srgbClr val="0170AD"/>
+                              </a:solidFill>
+                              <a:latin typeface="Cambria Math" panose="02040503050406030204" pitchFamily="18" charset="0"/>
+                              <a:ea typeface="Lato Light"/>
+                              <a:cs typeface="Lato Light"/>
+                            </a:rPr>
+                            <m:t>+</m:t>
+                          </m:r>
+                          <m:r>
+                            <a:rPr lang="de-DE" sz="2400" b="1" i="1" smtClean="0">
+                              <a:solidFill>
+                                <a:srgbClr val="0170AD"/>
+                              </a:solidFill>
+                              <a:latin typeface="Cambria Math" panose="02040503050406030204" pitchFamily="18" charset="0"/>
+                              <a:ea typeface="Lato Light"/>
+                              <a:cs typeface="Lato Light"/>
+                            </a:rPr>
+                            <m:t>𝒇𝒑</m:t>
+                          </m:r>
+                        </m:den>
+                      </m:f>
+                      <m:r>
+                        <a:rPr lang="de-DE" sz="2400" b="1" i="1" smtClean="0">
+                          <a:solidFill>
+                            <a:srgbClr val="0170AD"/>
+                          </a:solidFill>
+                          <a:latin typeface="Cambria Math" panose="02040503050406030204" pitchFamily="18" charset="0"/>
+                          <a:ea typeface="Lato Light"/>
+                          <a:cs typeface="Lato Light"/>
+                        </a:rPr>
+                        <m:t>, </m:t>
+                      </m:r>
+                      <m:r>
+                        <a:rPr lang="de-DE" sz="2400" b="1" i="1" smtClean="0">
+                          <a:solidFill>
+                            <a:srgbClr val="0170AD"/>
+                          </a:solidFill>
+                          <a:latin typeface="Cambria Math" panose="02040503050406030204" pitchFamily="18" charset="0"/>
+                          <a:ea typeface="Lato Light"/>
+                          <a:cs typeface="Lato Light"/>
+                        </a:rPr>
+                        <m:t>𝒓</m:t>
+                      </m:r>
+                      <m:r>
+                        <a:rPr lang="de-DE" sz="2400" b="1" i="1" smtClean="0">
+                          <a:solidFill>
+                            <a:srgbClr val="0170AD"/>
+                          </a:solidFill>
+                          <a:latin typeface="Cambria Math" panose="02040503050406030204" pitchFamily="18" charset="0"/>
+                          <a:ea typeface="Lato Light"/>
+                          <a:cs typeface="Lato Light"/>
+                        </a:rPr>
+                        <m:t>=</m:t>
+                      </m:r>
+                      <m:f>
+                        <m:fPr>
+                          <m:ctrlPr>
+                            <a:rPr lang="de-DE" sz="2400" b="1" i="1" smtClean="0">
+                              <a:solidFill>
+                                <a:srgbClr val="0170AD"/>
+                              </a:solidFill>
+                              <a:latin typeface="Cambria Math" panose="02040503050406030204" pitchFamily="18" charset="0"/>
+                              <a:ea typeface="Lato Light"/>
+                              <a:cs typeface="Lato Light"/>
+                            </a:rPr>
+                          </m:ctrlPr>
+                        </m:fPr>
+                        <m:num>
+                          <m:r>
+                            <a:rPr lang="de-DE" sz="2400" b="1" i="1" smtClean="0">
+                              <a:solidFill>
+                                <a:srgbClr val="0170AD"/>
+                              </a:solidFill>
+                              <a:latin typeface="Cambria Math" panose="02040503050406030204" pitchFamily="18" charset="0"/>
+                              <a:ea typeface="Lato Light"/>
+                              <a:cs typeface="Lato Light"/>
+                            </a:rPr>
+                            <m:t>𝒕𝒑</m:t>
+                          </m:r>
+                        </m:num>
+                        <m:den>
+                          <m:r>
+                            <a:rPr lang="de-DE" sz="2400" b="1" i="1" smtClean="0">
+                              <a:solidFill>
+                                <a:srgbClr val="0170AD"/>
+                              </a:solidFill>
+                              <a:latin typeface="Cambria Math" panose="02040503050406030204" pitchFamily="18" charset="0"/>
+                              <a:ea typeface="Lato Light"/>
+                              <a:cs typeface="Lato Light"/>
+                            </a:rPr>
+                            <m:t>𝒕𝒑</m:t>
+                          </m:r>
+                          <m:r>
+                            <a:rPr lang="de-DE" sz="2400" b="1" i="1" smtClean="0">
+                              <a:solidFill>
+                                <a:srgbClr val="0170AD"/>
+                              </a:solidFill>
+                              <a:latin typeface="Cambria Math" panose="02040503050406030204" pitchFamily="18" charset="0"/>
+                              <a:ea typeface="Lato Light"/>
+                              <a:cs typeface="Lato Light"/>
+                            </a:rPr>
+                            <m:t>+</m:t>
+                          </m:r>
+                          <m:r>
+                            <a:rPr lang="de-DE" sz="2400" b="1" i="1" smtClean="0">
+                              <a:solidFill>
+                                <a:srgbClr val="0170AD"/>
+                              </a:solidFill>
+                              <a:latin typeface="Cambria Math" panose="02040503050406030204" pitchFamily="18" charset="0"/>
+                              <a:ea typeface="Lato Light"/>
+                              <a:cs typeface="Lato Light"/>
+                            </a:rPr>
+                            <m:t>𝒇𝒏</m:t>
+                          </m:r>
+                        </m:den>
+                      </m:f>
+                    </m:oMath>
+                  </m:oMathPara>
+                </a14:m>
+                <a:endParaRPr lang="en-US" sz="2400" b="1" dirty="0">
+                  <a:solidFill>
+                    <a:srgbClr val="0170AD"/>
+                  </a:solidFill>
+                  <a:latin typeface="Lato Light"/>
+                  <a:ea typeface="Lato Light"/>
+                  <a:cs typeface="Lato Light"/>
+                </a:endParaRPr>
+              </a:p>
+            </p:txBody>
+          </p:sp>
+        </mc:Choice>
+        <mc:Fallback>
+          <p:sp>
+            <p:nvSpPr>
+              <p:cNvPr id="54" name="Shape 188">
+                <a:extLst>
+                  <a:ext uri="{FF2B5EF4-FFF2-40B4-BE49-F238E27FC236}">
+                    <a16:creationId xmlns:a16="http://schemas.microsoft.com/office/drawing/2014/main" id="{600886FA-A6C3-EA4B-A501-9D8287AD722B}"/>
+                  </a:ext>
+                </a:extLst>
+              </p:cNvPr>
+              <p:cNvSpPr>
+                <a:spLocks noRot="1" noChangeAspect="1" noMove="1" noResize="1" noEditPoints="1" noAdjustHandles="1" noChangeArrowheads="1" noChangeShapeType="1" noTextEdit="1"/>
+              </p:cNvSpPr>
+              <p:nvPr/>
+            </p:nvSpPr>
+            <p:spPr>
+              <a:xfrm>
+                <a:off x="919341" y="25725120"/>
+                <a:ext cx="9204371" cy="1551001"/>
+              </a:xfrm>
+              <a:prstGeom prst="rect">
+                <a:avLst/>
+              </a:prstGeom>
+              <a:blipFill>
+                <a:blip r:embed="rId11"/>
+                <a:stretch>
+                  <a:fillRect t="-813"/>
+                </a:stretch>
+              </a:blipFill>
+              <a:ln w="12700" cap="flat">
+                <a:noFill/>
+                <a:miter lim="400000"/>
+              </a:ln>
+              <a:effectLst/>
+              <a:extLst>
+                <a:ext uri="{C572A759-6A51-4108-AA02-DFA0A04FC94B}">
+                  <ma14:wrappingTextBoxFlag xmlns="" xmlns:ma14="http://schemas.microsoft.com/office/mac/drawingml/2011/main" val="1"/>
+                </a:ext>
+              </a:extLst>
+            </p:spPr>
+            <p:txBody>
+              <a:bodyPr/>
+              <a:lstStyle/>
+              <a:p>
+                <a:r>
+                  <a:rPr lang="en-US">
+                    <a:noFill/>
+                  </a:rPr>
+                  <a:t> </a:t>
+                </a:r>
+              </a:p>
+            </p:txBody>
+          </p:sp>
+        </mc:Fallback>
+      </mc:AlternateContent>
+      <p:sp>
+        <p:nvSpPr>
+          <p:cNvPr id="55" name="Shape 188">
+            <a:extLst>
+              <a:ext uri="{FF2B5EF4-FFF2-40B4-BE49-F238E27FC236}">
+                <a16:creationId xmlns:a16="http://schemas.microsoft.com/office/drawing/2014/main" id="{4BE11666-7530-094D-97F6-37BEECE48F36}"/>
+              </a:ext>
+            </a:extLst>
+          </p:cNvPr>
+          <p:cNvSpPr/>
+          <p:nvPr/>
+        </p:nvSpPr>
+        <p:spPr>
+          <a:xfrm>
+            <a:off x="3643637" y="26711000"/>
+            <a:ext cx="3755777" cy="584576"/>
+          </a:xfrm>
+          <a:prstGeom prst="rect">
+            <a:avLst/>
+          </a:prstGeom>
+          <a:noFill/>
+          <a:ln w="12700" cap="flat">
+            <a:noFill/>
+            <a:miter lim="400000"/>
+          </a:ln>
+          <a:effectLst/>
+          <a:extLst>
+            <a:ext uri="{C572A759-6A51-4108-AA02-DFA0A04FC94B}">
+              <ma14:wrappingTextBoxFlag xmlns="" xmlns:ma14="http://schemas.microsoft.com/office/mac/drawingml/2011/main" val="1"/>
+            </a:ext>
+          </a:extLst>
+        </p:spPr>
+        <p:txBody>
+          <a:bodyPr wrap="square" lIns="0" tIns="0" rIns="0" bIns="0" numCol="1" anchor="t">
+            <a:noAutofit/>
+          </a:bodyPr>
+          <a:lstStyle>
+            <a:lvl1pPr algn="l" defTabSz="584200">
+              <a:lnSpc>
+                <a:spcPct val="110000"/>
+              </a:lnSpc>
+              <a:spcBef>
+                <a:spcPts val="3000"/>
+              </a:spcBef>
+              <a:defRPr sz="2000">
+                <a:solidFill>
+                  <a:srgbClr val="4C4C4C"/>
+                </a:solidFill>
+                <a:latin typeface="Helvetica Neue Light"/>
+                <a:ea typeface="Helvetica Neue Light"/>
+                <a:cs typeface="Helvetica Neue Light"/>
+                <a:sym typeface="Helvetica Neue Light"/>
+              </a:defRPr>
+            </a:lvl1pPr>
+          </a:lstStyle>
+          <a:p>
+            <a:pPr lvl="0" algn="ctr">
+              <a:lnSpc>
+                <a:spcPct val="100000"/>
+              </a:lnSpc>
+              <a:defRPr sz="1800">
+                <a:solidFill>
+                  <a:srgbClr val="000000"/>
+                </a:solidFill>
+              </a:defRPr>
+            </a:pPr>
             <a:r>
               <a:rPr lang="en-US" sz="2400" b="1" dirty="0">
                 <a:solidFill>
@@ -7607,7 +8339,303 @@
                 <a:ea typeface="Lato Light"/>
                 <a:cs typeface="Lato Light"/>
               </a:rPr>
-              <a:t>Ideas from the interview</a:t>
+              <a:t>F1-score</a:t>
+            </a:r>
+          </a:p>
+        </p:txBody>
+      </p:sp>
+      <p:sp>
+        <p:nvSpPr>
+          <p:cNvPr id="56" name="Shape 188">
+            <a:extLst>
+              <a:ext uri="{FF2B5EF4-FFF2-40B4-BE49-F238E27FC236}">
+                <a16:creationId xmlns:a16="http://schemas.microsoft.com/office/drawing/2014/main" id="{178C1D35-91F6-7947-878F-82208958A5A3}"/>
+              </a:ext>
+            </a:extLst>
+          </p:cNvPr>
+          <p:cNvSpPr/>
+          <p:nvPr/>
+        </p:nvSpPr>
+        <p:spPr>
+          <a:xfrm>
+            <a:off x="21705078" y="15562685"/>
+            <a:ext cx="9901058" cy="8512330"/>
+          </a:xfrm>
+          <a:prstGeom prst="rect">
+            <a:avLst/>
+          </a:prstGeom>
+          <a:noFill/>
+          <a:ln w="12700" cap="flat">
+            <a:noFill/>
+            <a:miter lim="400000"/>
+          </a:ln>
+          <a:effectLst/>
+          <a:extLst>
+            <a:ext uri="{C572A759-6A51-4108-AA02-DFA0A04FC94B}">
+              <ma14:wrappingTextBoxFlag xmlns="" xmlns:ma14="http://schemas.microsoft.com/office/mac/drawingml/2011/main" val="1"/>
+            </a:ext>
+          </a:extLst>
+        </p:spPr>
+        <p:txBody>
+          <a:bodyPr wrap="square" lIns="0" tIns="0" rIns="0" bIns="0" numCol="1" anchor="t">
+            <a:noAutofit/>
+          </a:bodyPr>
+          <a:lstStyle>
+            <a:lvl1pPr algn="l" defTabSz="584200">
+              <a:lnSpc>
+                <a:spcPct val="110000"/>
+              </a:lnSpc>
+              <a:spcBef>
+                <a:spcPts val="3000"/>
+              </a:spcBef>
+              <a:defRPr sz="2000">
+                <a:solidFill>
+                  <a:srgbClr val="4C4C4C"/>
+                </a:solidFill>
+                <a:latin typeface="Helvetica Neue Light"/>
+                <a:ea typeface="Helvetica Neue Light"/>
+                <a:cs typeface="Helvetica Neue Light"/>
+                <a:sym typeface="Helvetica Neue Light"/>
+              </a:defRPr>
+            </a:lvl1pPr>
+          </a:lstStyle>
+          <a:p>
+            <a:pPr lvl="0" algn="just">
+              <a:lnSpc>
+                <a:spcPct val="100000"/>
+              </a:lnSpc>
+              <a:spcBef>
+                <a:spcPts val="0"/>
+              </a:spcBef>
+              <a:defRPr sz="1800">
+                <a:solidFill>
+                  <a:srgbClr val="000000"/>
+                </a:solidFill>
+              </a:defRPr>
+            </a:pPr>
+            <a:r>
+              <a:rPr lang="en-US" sz="2400" b="1" u="sng" dirty="0">
+                <a:solidFill>
+                  <a:srgbClr val="0170AD"/>
+                </a:solidFill>
+                <a:latin typeface="Lato Light"/>
+                <a:ea typeface="Lato Light"/>
+                <a:cs typeface="Lato Light"/>
+              </a:rPr>
+              <a:t>CNN - Photo Classification:</a:t>
+            </a:r>
+          </a:p>
+          <a:p>
+            <a:pPr marL="342900" lvl="0" indent="-342900" algn="just">
+              <a:lnSpc>
+                <a:spcPct val="100000"/>
+              </a:lnSpc>
+              <a:spcBef>
+                <a:spcPts val="0"/>
+              </a:spcBef>
+              <a:buFont typeface="Arial" panose="020B0604020202020204" pitchFamily="34" charset="0"/>
+              <a:buChar char="•"/>
+              <a:defRPr sz="1800">
+                <a:solidFill>
+                  <a:srgbClr val="000000"/>
+                </a:solidFill>
+              </a:defRPr>
+            </a:pPr>
+            <a:r>
+              <a:rPr lang="en-US" sz="2400" b="1" dirty="0">
+                <a:solidFill>
+                  <a:srgbClr val="0170AD"/>
+                </a:solidFill>
+                <a:latin typeface="Lato Light"/>
+                <a:ea typeface="Lato Light"/>
+                <a:cs typeface="Lato Light"/>
+              </a:rPr>
+              <a:t>Our best F1-score: 0.xx</a:t>
+            </a:r>
+          </a:p>
+          <a:p>
+            <a:pPr marL="342900" lvl="0" indent="-342900" algn="just">
+              <a:lnSpc>
+                <a:spcPct val="100000"/>
+              </a:lnSpc>
+              <a:spcBef>
+                <a:spcPts val="0"/>
+              </a:spcBef>
+              <a:buFont typeface="Arial" panose="020B0604020202020204" pitchFamily="34" charset="0"/>
+              <a:buChar char="•"/>
+              <a:defRPr sz="1800">
+                <a:solidFill>
+                  <a:srgbClr val="000000"/>
+                </a:solidFill>
+              </a:defRPr>
+            </a:pPr>
+            <a:r>
+              <a:rPr lang="en-US" sz="2400" b="1" dirty="0">
+                <a:solidFill>
+                  <a:srgbClr val="0170AD"/>
+                </a:solidFill>
+                <a:latin typeface="Lato Light"/>
+                <a:ea typeface="Lato Light"/>
+                <a:cs typeface="Lato Light"/>
+              </a:rPr>
+              <a:t>Winner F1-score: 0.83 , we are place xxx of xxx</a:t>
+            </a:r>
+          </a:p>
+          <a:p>
+            <a:pPr marL="342900" lvl="0" indent="-342900" algn="just">
+              <a:lnSpc>
+                <a:spcPct val="100000"/>
+              </a:lnSpc>
+              <a:spcBef>
+                <a:spcPts val="0"/>
+              </a:spcBef>
+              <a:buFont typeface="Arial" panose="020B0604020202020204" pitchFamily="34" charset="0"/>
+              <a:buChar char="•"/>
+              <a:defRPr sz="1800">
+                <a:solidFill>
+                  <a:srgbClr val="000000"/>
+                </a:solidFill>
+              </a:defRPr>
+            </a:pPr>
+            <a:r>
+              <a:rPr lang="en-US" sz="2400" b="1" dirty="0">
+                <a:solidFill>
+                  <a:srgbClr val="0170AD"/>
+                </a:solidFill>
+                <a:latin typeface="Lato Light"/>
+                <a:ea typeface="Lato Light"/>
+                <a:cs typeface="Lato Light"/>
+              </a:rPr>
+              <a:t>Inception v3 vs </a:t>
+            </a:r>
+            <a:r>
+              <a:rPr lang="en-US" sz="2400" b="1" dirty="0" err="1">
+                <a:solidFill>
+                  <a:srgbClr val="0170AD"/>
+                </a:solidFill>
+                <a:latin typeface="Lato Light"/>
+                <a:ea typeface="Lato Light"/>
+                <a:cs typeface="Lato Light"/>
+              </a:rPr>
+              <a:t>Xception</a:t>
+            </a:r>
+            <a:r>
+              <a:rPr lang="en-US" sz="2400" b="1" dirty="0">
+                <a:solidFill>
+                  <a:srgbClr val="0170AD"/>
+                </a:solidFill>
+                <a:latin typeface="Lato Light"/>
+                <a:ea typeface="Lato Light"/>
+                <a:cs typeface="Lato Light"/>
+              </a:rPr>
+              <a:t>: In our case, both performed quite similar. Further research is necessary to find out if one of the architectures platoons as we are getting closer to a 0.83 score</a:t>
+            </a:r>
+          </a:p>
+          <a:p>
+            <a:pPr marL="342900" lvl="0" indent="-342900" algn="just">
+              <a:lnSpc>
+                <a:spcPct val="100000"/>
+              </a:lnSpc>
+              <a:spcBef>
+                <a:spcPts val="0"/>
+              </a:spcBef>
+              <a:buFont typeface="Arial" panose="020B0604020202020204" pitchFamily="34" charset="0"/>
+              <a:buChar char="•"/>
+              <a:defRPr sz="1800">
+                <a:solidFill>
+                  <a:srgbClr val="000000"/>
+                </a:solidFill>
+              </a:defRPr>
+            </a:pPr>
+            <a:endParaRPr lang="en-US" sz="2400" b="1" dirty="0">
+              <a:solidFill>
+                <a:srgbClr val="0170AD"/>
+              </a:solidFill>
+              <a:latin typeface="Lato Light"/>
+              <a:ea typeface="Lato Light"/>
+              <a:cs typeface="Lato Light"/>
+            </a:endParaRPr>
+          </a:p>
+          <a:p>
+            <a:pPr lvl="0" algn="just">
+              <a:lnSpc>
+                <a:spcPct val="100000"/>
+              </a:lnSpc>
+              <a:spcBef>
+                <a:spcPts val="0"/>
+              </a:spcBef>
+              <a:defRPr sz="1800">
+                <a:solidFill>
+                  <a:srgbClr val="000000"/>
+                </a:solidFill>
+              </a:defRPr>
+            </a:pPr>
+            <a:r>
+              <a:rPr lang="en-US" sz="2400" b="1" u="sng" dirty="0">
+                <a:solidFill>
+                  <a:srgbClr val="0170AD"/>
+                </a:solidFill>
+                <a:latin typeface="Lato Light"/>
+                <a:ea typeface="Lato Light"/>
+                <a:cs typeface="Lato Light"/>
+              </a:rPr>
+              <a:t>RNN – Fake Review Generation:</a:t>
+            </a:r>
+          </a:p>
+          <a:p>
+            <a:pPr marL="342900" lvl="0" indent="-342900" algn="just">
+              <a:lnSpc>
+                <a:spcPct val="100000"/>
+              </a:lnSpc>
+              <a:spcBef>
+                <a:spcPts val="0"/>
+              </a:spcBef>
+              <a:buFont typeface="Arial" panose="020B0604020202020204" pitchFamily="34" charset="0"/>
+              <a:buChar char="•"/>
+              <a:defRPr sz="1800">
+                <a:solidFill>
+                  <a:srgbClr val="000000"/>
+                </a:solidFill>
+              </a:defRPr>
+            </a:pPr>
+            <a:r>
+              <a:rPr lang="en-US" sz="2400" b="1" dirty="0">
+                <a:solidFill>
+                  <a:srgbClr val="0170AD"/>
+                </a:solidFill>
+                <a:latin typeface="Lato Light"/>
+                <a:ea typeface="Lato Light"/>
+                <a:cs typeface="Lato Light"/>
+              </a:rPr>
+              <a:t>As a metric, some of our friends classified 20 reviews. 10 were real 10 were fake. </a:t>
+            </a:r>
+          </a:p>
+          <a:p>
+            <a:pPr marL="342900" lvl="0" indent="-342900" algn="just">
+              <a:lnSpc>
+                <a:spcPct val="100000"/>
+              </a:lnSpc>
+              <a:spcBef>
+                <a:spcPts val="0"/>
+              </a:spcBef>
+              <a:buFont typeface="Arial" panose="020B0604020202020204" pitchFamily="34" charset="0"/>
+              <a:buChar char="•"/>
+              <a:defRPr sz="1800">
+                <a:solidFill>
+                  <a:srgbClr val="000000"/>
+                </a:solidFill>
+              </a:defRPr>
+            </a:pPr>
+            <a:r>
+              <a:rPr lang="en-US" sz="2400" b="1" dirty="0">
+                <a:solidFill>
+                  <a:srgbClr val="0170AD"/>
+                </a:solidFill>
+                <a:latin typeface="Lato Light"/>
+                <a:ea typeface="Lato Light"/>
+                <a:cs typeface="Lato Light"/>
+              </a:rPr>
+              <a:t>Xx of our fake reviews were considered to be real and xx of the real reviews were considered to be real.</a:t>
             </a:r>
           </a:p>
         </p:txBody>

</xml_diff>

<commit_message>
Everything checked. Now I do the highlighting and comments for the final stuff
</commit_message>
<xml_diff>
--- a/Poster/Poster_Team_55.pptx
+++ b/Poster/Poster_Team_55.pptx
@@ -4193,7 +4193,7 @@
                 <a:ea typeface="Lato Light"/>
                 <a:cs typeface="Lato Light"/>
               </a:rPr>
-              <a:t>Researchers from the University of Chicago have already written a paper on how to write very convincing fake reviews for restaurants using RNNs. In their method, they used specific metadata about the restaurant like the name of their dishes to produce the fake review. With our approach, we want to use the generated multiple labels from our CNN to write these reviews. In this way, we hope we can use image data about the restaurant to make the fake reviews even more convincing.</a:t>
+              <a:t>Researchers from the University of Chicago have already written a paper on how to write very convincing fake reviews for restaurants using RNNs. In their method, they used specific metadata about the restaurant like the name of their dishes to produce the fake reviews. With our approach, we want to use the generated multiple labels from our CNN to write these reviews. In this way, we hope we can use image data about the restaurant to make the fake reviews even more convincing.</a:t>
             </a:r>
           </a:p>
         </p:txBody>
@@ -4265,7 +4265,7 @@
               </a:defRPr>
             </a:pPr>
             <a:r>
-              <a:rPr lang="en-US" sz="2400" b="1" dirty="0">
+              <a:rPr lang="en-US" sz="2400" b="1" u="sng" dirty="0">
                 <a:solidFill>
                   <a:srgbClr val="0170AD"/>
                 </a:solidFill>
@@ -4329,7 +4329,7 @@
                 <a:ea typeface="Lato Light"/>
                 <a:cs typeface="Lato Light"/>
               </a:rPr>
-              <a:t>Average pics per restaurant  ~ 117,5; Range from 1 to 3000</a:t>
+              <a:t>Average pics per restaurant  ~ 117,5; Range from 1 to 300</a:t>
             </a:r>
           </a:p>
           <a:p>
@@ -4428,7 +4428,7 @@
               </a:defRPr>
             </a:pPr>
             <a:r>
-              <a:rPr lang="en-US" sz="2400" b="1" dirty="0">
+              <a:rPr lang="en-US" sz="2400" b="1" u="sng" dirty="0">
                 <a:solidFill>
                   <a:srgbClr val="0170AD"/>
                 </a:solidFill>

</xml_diff>

<commit_message>
Poster finish for control and adding last details
</commit_message>
<xml_diff>
--- a/Poster/Poster_Team_55.pptx
+++ b/Poster/Poster_Team_55.pptx
@@ -114,7 +114,7 @@
 
 <file path=ppt/commentAuthors.xml><?xml version="1.0" encoding="utf-8"?>
 <p:cmAuthorLst xmlns:a="http://schemas.openxmlformats.org/drawingml/2006/main" xmlns:r="http://schemas.openxmlformats.org/officeDocument/2006/relationships" xmlns:p="http://schemas.openxmlformats.org/presentationml/2006/main">
-  <p:cmAuthor id="1" name="Sebastian Muhle" initials="SM" lastIdx="1" clrIdx="0">
+  <p:cmAuthor id="1" name="Sebastian Muhle" initials="SM" lastIdx="7" clrIdx="0">
     <p:extLst>
       <p:ext uri="{19B8F6BF-5375-455C-9EA6-DF929625EA0E}">
         <p15:presenceInfo xmlns:p15="http://schemas.microsoft.com/office/powerpoint/2012/main" userId="a5c9cdf4c06dbaa6" providerId="Windows Live"/>
@@ -129,6 +129,61 @@
   <p:cm authorId="1" dt="2018-02-03T22:56:44.549" idx="1">
     <p:pos x="6372" y="12825"/>
     <p:text>sounds like a question they might ask</p:text>
+    <p:extLst>
+      <p:ext uri="{C676402C-5697-4E1C-873F-D02D1690AC5C}">
+        <p15:threadingInfo xmlns:p15="http://schemas.microsoft.com/office/powerpoint/2012/main" timeZoneBias="-60"/>
+      </p:ext>
+    </p:extLst>
+  </p:cm>
+  <p:cm authorId="1" dt="2018-02-04T15:18:38.246" idx="2">
+    <p:pos x="4933" y="13041"/>
+    <p:text>Haydar can you please add under architecture how you have done the classification on the business level??
+</p:text>
+    <p:extLst>
+      <p:ext uri="{C676402C-5697-4E1C-873F-D02D1690AC5C}">
+        <p15:threadingInfo xmlns:p15="http://schemas.microsoft.com/office/powerpoint/2012/main" timeZoneBias="-60"/>
+      </p:ext>
+    </p:extLst>
+  </p:cm>
+  <p:cm authorId="1" dt="2018-02-04T15:19:03.693" idx="3">
+    <p:pos x="25935" y="12111"/>
+    <p:text>Futher ideas to improve the RNN?</p:text>
+    <p:extLst>
+      <p:ext uri="{C676402C-5697-4E1C-873F-D02D1690AC5C}">
+        <p15:threadingInfo xmlns:p15="http://schemas.microsoft.com/office/powerpoint/2012/main" timeZoneBias="-60"/>
+      </p:ext>
+    </p:extLst>
+  </p:cm>
+  <p:cm authorId="1" dt="2018-02-04T15:19:27.907" idx="4">
+    <p:pos x="26599" y="9807"/>
+    <p:text>Other learnings?</p:text>
+    <p:extLst>
+      <p:ext uri="{C676402C-5697-4E1C-873F-D02D1690AC5C}">
+        <p15:threadingInfo xmlns:p15="http://schemas.microsoft.com/office/powerpoint/2012/main" timeZoneBias="-60"/>
+      </p:ext>
+    </p:extLst>
+  </p:cm>
+  <p:cm authorId="1" dt="2018-02-04T15:22:10.211" idx="5">
+    <p:pos x="15463" y="14430"/>
+    <p:text>Haydar could you please add here two example predictions for pictures from the training set?</p:text>
+    <p:extLst>
+      <p:ext uri="{C676402C-5697-4E1C-873F-D02D1690AC5C}">
+        <p15:threadingInfo xmlns:p15="http://schemas.microsoft.com/office/powerpoint/2012/main" timeZoneBias="-60"/>
+      </p:ext>
+    </p:extLst>
+  </p:cm>
+  <p:cm authorId="1" dt="2018-02-04T15:23:05.751" idx="6">
+    <p:pos x="19953" y="12111"/>
+    <p:text>To be changed depending on the results</p:text>
+    <p:extLst>
+      <p:ext uri="{C676402C-5697-4E1C-873F-D02D1690AC5C}">
+        <p15:threadingInfo xmlns:p15="http://schemas.microsoft.com/office/powerpoint/2012/main" timeZoneBias="-60"/>
+      </p:ext>
+    </p:extLst>
+  </p:cm>
+  <p:cm authorId="1" dt="2018-02-04T15:29:45.021" idx="7">
+    <p:pos x="26599" y="14636"/>
+    <p:text>Haydar should we leave this sentence in the poster?</p:text>
     <p:extLst>
       <p:ext uri="{C676402C-5697-4E1C-873F-D02D1690AC5C}">
         <p15:threadingInfo xmlns:p15="http://schemas.microsoft.com/office/powerpoint/2012/main" timeZoneBias="-60"/>
@@ -4269,9 +4324,9 @@
                 <a:solidFill>
                   <a:srgbClr val="0170AD"/>
                 </a:solidFill>
-                <a:latin typeface="Lato Light"/>
-                <a:ea typeface="Lato Light"/>
-                <a:cs typeface="Lato Light"/>
+                <a:latin typeface="Lato Heavy" panose="020F0502020204030203" pitchFamily="34" charset="0"/>
+                <a:ea typeface="Lato Heavy" panose="020F0502020204030203" pitchFamily="34" charset="0"/>
+                <a:cs typeface="Lato Heavy" panose="020F0502020204030203" pitchFamily="34" charset="0"/>
               </a:rPr>
               <a:t>Yelp Restaurant Photos:</a:t>
             </a:r>
@@ -4297,11 +4352,22 @@
                 <a:solidFill>
                   <a:srgbClr val="0170AD"/>
                 </a:solidFill>
-                <a:latin typeface="Lato Light"/>
-                <a:ea typeface="Lato Light"/>
-                <a:cs typeface="Lato Light"/>
-              </a:rPr>
-              <a:t>~235k images of 2000 different restaurants</a:t>
+                <a:latin typeface="Lato Heavy" panose="020F0502020204030203" pitchFamily="34" charset="0"/>
+                <a:ea typeface="Lato Heavy" panose="020F0502020204030203" pitchFamily="34" charset="0"/>
+                <a:cs typeface="Lato Heavy" panose="020F0502020204030203" pitchFamily="34" charset="0"/>
+              </a:rPr>
+              <a:t>~235k images </a:t>
+            </a:r>
+            <a:r>
+              <a:rPr lang="en-US" sz="2400" b="1" dirty="0">
+                <a:solidFill>
+                  <a:srgbClr val="0170AD"/>
+                </a:solidFill>
+                <a:latin typeface="Lato Light"/>
+                <a:ea typeface="Lato Light"/>
+                <a:cs typeface="Lato Light"/>
+              </a:rPr>
+              <a:t>of 2000 different restaurants</a:t>
             </a:r>
           </a:p>
           <a:p>
@@ -4353,11 +4419,33 @@
                 <a:solidFill>
                   <a:srgbClr val="0170AD"/>
                 </a:solidFill>
-                <a:latin typeface="Lato Light"/>
-                <a:ea typeface="Lato Light"/>
-                <a:cs typeface="Lato Light"/>
-              </a:rPr>
-              <a:t>Multi-label classification problem with 9 different labels</a:t>
+                <a:latin typeface="Lato Heavy" panose="020F0502020204030203" pitchFamily="34" charset="0"/>
+                <a:ea typeface="Lato Heavy" panose="020F0502020204030203" pitchFamily="34" charset="0"/>
+                <a:cs typeface="Lato Heavy" panose="020F0502020204030203" pitchFamily="34" charset="0"/>
+              </a:rPr>
+              <a:t>Multi-label classification </a:t>
+            </a:r>
+            <a:r>
+              <a:rPr lang="en-US" sz="2400" b="1" dirty="0">
+                <a:solidFill>
+                  <a:srgbClr val="0170AD"/>
+                </a:solidFill>
+                <a:latin typeface="Lato Light"/>
+                <a:ea typeface="Lato Light"/>
+                <a:cs typeface="Lato Light"/>
+              </a:rPr>
+              <a:t>problem with </a:t>
+            </a:r>
+            <a:r>
+              <a:rPr lang="en-US" sz="2400" b="1" dirty="0">
+                <a:solidFill>
+                  <a:srgbClr val="0170AD"/>
+                </a:solidFill>
+                <a:latin typeface="Lato Heavy" panose="020F0502020204030203" pitchFamily="34" charset="0"/>
+                <a:ea typeface="Lato Heavy" panose="020F0502020204030203" pitchFamily="34" charset="0"/>
+                <a:cs typeface="Lato Heavy" panose="020F0502020204030203" pitchFamily="34" charset="0"/>
+              </a:rPr>
+              <a:t>9 different labels</a:t>
             </a:r>
           </a:p>
           <a:p>
@@ -4432,9 +4520,9 @@
                 <a:solidFill>
                   <a:srgbClr val="0170AD"/>
                 </a:solidFill>
-                <a:latin typeface="Lato Light"/>
-                <a:ea typeface="Lato Light"/>
-                <a:cs typeface="Lato Light"/>
+                <a:latin typeface="Lato Heavy" panose="020F0502020204030203" pitchFamily="34" charset="0"/>
+                <a:ea typeface="Lato Heavy" panose="020F0502020204030203" pitchFamily="34" charset="0"/>
+                <a:cs typeface="Lato Heavy" panose="020F0502020204030203" pitchFamily="34" charset="0"/>
               </a:rPr>
               <a:t>Yelp Reviews:</a:t>
             </a:r>
@@ -4460,11 +4548,22 @@
                 <a:solidFill>
                   <a:srgbClr val="0170AD"/>
                 </a:solidFill>
-                <a:latin typeface="Lato Light"/>
-                <a:ea typeface="Lato Light"/>
-                <a:cs typeface="Lato Light"/>
-              </a:rPr>
-              <a:t>2.225k reviews for 77.5k businesses written by 500k different users</a:t>
+                <a:latin typeface="Lato Heavy" panose="020F0502020204030203" pitchFamily="34" charset="0"/>
+                <a:ea typeface="Lato Heavy" panose="020F0502020204030203" pitchFamily="34" charset="0"/>
+                <a:cs typeface="Lato Heavy" panose="020F0502020204030203" pitchFamily="34" charset="0"/>
+              </a:rPr>
+              <a:t>2.225k reviews </a:t>
+            </a:r>
+            <a:r>
+              <a:rPr lang="en-US" sz="2400" b="1" dirty="0">
+                <a:solidFill>
+                  <a:srgbClr val="0170AD"/>
+                </a:solidFill>
+                <a:latin typeface="Lato Light"/>
+                <a:ea typeface="Lato Light"/>
+                <a:cs typeface="Lato Light"/>
+              </a:rPr>
+              <a:t>for 77.5k businesses written by 500k different users</a:t>
             </a:r>
           </a:p>
           <a:p>
@@ -5459,9 +5558,9 @@
                 <a:solidFill>
                   <a:srgbClr val="0170AD"/>
                 </a:solidFill>
-                <a:latin typeface="Lato Light"/>
-                <a:ea typeface="Lato Light"/>
-                <a:cs typeface="Lato Light"/>
+                <a:latin typeface="Lato Heavy" panose="020F0502020204030203" pitchFamily="34" charset="0"/>
+                <a:ea typeface="Lato Heavy" panose="020F0502020204030203" pitchFamily="34" charset="0"/>
+                <a:cs typeface="Lato Heavy" panose="020F0502020204030203" pitchFamily="34" charset="0"/>
               </a:rPr>
               <a:t>Preprocessing:</a:t>
             </a:r>
@@ -5519,16 +5618,49 @@
                 <a:ea typeface="Lato Light"/>
                 <a:cs typeface="Lato Light"/>
               </a:rPr>
-              <a:t>We used a subset of 40k training images, </a:t>
+              <a:t>We used a </a:t>
+            </a:r>
+            <a:r>
+              <a:rPr lang="en-US" sz="2400" b="1" dirty="0">
+                <a:solidFill>
+                  <a:srgbClr val="0170AD"/>
+                </a:solidFill>
+                <a:latin typeface="Lato Heavy" panose="020F0502020204030203" pitchFamily="34" charset="0"/>
+                <a:ea typeface="Lato Heavy" panose="020F0502020204030203" pitchFamily="34" charset="0"/>
+                <a:cs typeface="Lato Heavy" panose="020F0502020204030203" pitchFamily="34" charset="0"/>
+              </a:rPr>
+              <a:t>subset</a:t>
+            </a:r>
+            <a:r>
+              <a:rPr lang="en-US" sz="2400" b="1" dirty="0">
+                <a:solidFill>
+                  <a:srgbClr val="0170AD"/>
+                </a:solidFill>
+                <a:latin typeface="Lato Light"/>
+                <a:ea typeface="Lato Light"/>
+                <a:cs typeface="Lato Light"/>
+              </a:rPr>
+              <a:t> of </a:t>
+            </a:r>
+            <a:r>
+              <a:rPr lang="en-US" sz="2400" b="1" dirty="0">
+                <a:solidFill>
+                  <a:srgbClr val="0170AD"/>
+                </a:solidFill>
+                <a:latin typeface="Lato Heavy" panose="020F0502020204030203" pitchFamily="34" charset="0"/>
+                <a:ea typeface="Lato Heavy" panose="020F0502020204030203" pitchFamily="34" charset="0"/>
+                <a:cs typeface="Lato Heavy" panose="020F0502020204030203" pitchFamily="34" charset="0"/>
+              </a:rPr>
+              <a:t>40k training images, </a:t>
             </a:r>
             <a:r>
               <a:rPr lang="en-US" sz="2400" b="1" dirty="0" err="1">
                 <a:solidFill>
                   <a:srgbClr val="0170AD"/>
                 </a:solidFill>
-                <a:latin typeface="Lato Light"/>
-                <a:ea typeface="Lato Light"/>
-                <a:cs typeface="Lato Light"/>
+                <a:latin typeface="Lato Heavy" panose="020F0502020204030203" pitchFamily="34" charset="0"/>
+                <a:ea typeface="Lato Heavy" panose="020F0502020204030203" pitchFamily="34" charset="0"/>
+                <a:cs typeface="Lato Heavy" panose="020F0502020204030203" pitchFamily="34" charset="0"/>
               </a:rPr>
               <a:t>xxk</a:t>
             </a:r>
@@ -5537,9 +5669,9 @@
                 <a:solidFill>
                   <a:srgbClr val="0170AD"/>
                 </a:solidFill>
-                <a:latin typeface="Lato Light"/>
-                <a:ea typeface="Lato Light"/>
-                <a:cs typeface="Lato Light"/>
+                <a:latin typeface="Lato Heavy" panose="020F0502020204030203" pitchFamily="34" charset="0"/>
+                <a:ea typeface="Lato Heavy" panose="020F0502020204030203" pitchFamily="34" charset="0"/>
+                <a:cs typeface="Lato Heavy" panose="020F0502020204030203" pitchFamily="34" charset="0"/>
               </a:rPr>
               <a:t> validation images, </a:t>
             </a:r>
@@ -5548,9 +5680,9 @@
                 <a:solidFill>
                   <a:srgbClr val="0170AD"/>
                 </a:solidFill>
-                <a:latin typeface="Lato Light"/>
-                <a:ea typeface="Lato Light"/>
-                <a:cs typeface="Lato Light"/>
+                <a:latin typeface="Lato Heavy" panose="020F0502020204030203" pitchFamily="34" charset="0"/>
+                <a:ea typeface="Lato Heavy" panose="020F0502020204030203" pitchFamily="34" charset="0"/>
+                <a:cs typeface="Lato Heavy" panose="020F0502020204030203" pitchFamily="34" charset="0"/>
               </a:rPr>
               <a:t>xxk</a:t>
             </a:r>
@@ -5559,11 +5691,22 @@
                 <a:solidFill>
                   <a:srgbClr val="0170AD"/>
                 </a:solidFill>
-                <a:latin typeface="Lato Light"/>
-                <a:ea typeface="Lato Light"/>
-                <a:cs typeface="Lato Light"/>
-              </a:rPr>
-              <a:t> test images -&gt; saved in an HDF5 file</a:t>
+                <a:latin typeface="Lato Heavy" panose="020F0502020204030203" pitchFamily="34" charset="0"/>
+                <a:ea typeface="Lato Heavy" panose="020F0502020204030203" pitchFamily="34" charset="0"/>
+                <a:cs typeface="Lato Heavy" panose="020F0502020204030203" pitchFamily="34" charset="0"/>
+              </a:rPr>
+              <a:t> test images </a:t>
+            </a:r>
+            <a:r>
+              <a:rPr lang="en-US" sz="2400" b="1" dirty="0">
+                <a:solidFill>
+                  <a:srgbClr val="0170AD"/>
+                </a:solidFill>
+                <a:latin typeface="Lato Light"/>
+                <a:ea typeface="Lato Light"/>
+                <a:cs typeface="Lato Light"/>
+              </a:rPr>
+              <a:t>-&gt; saved in an HDF5 file</a:t>
             </a:r>
           </a:p>
           <a:p>
@@ -5591,7 +5734,51 @@
                 <a:ea typeface="Lato Light"/>
                 <a:cs typeface="Lato Light"/>
               </a:rPr>
-              <a:t>We relied on Image Augmentation (Rotating, Zooming, horizontal flipping) and applied the mean to the data.</a:t>
+              <a:t>We relied on </a:t>
+            </a:r>
+            <a:r>
+              <a:rPr lang="en-US" sz="2400" b="1" dirty="0">
+                <a:solidFill>
+                  <a:srgbClr val="0170AD"/>
+                </a:solidFill>
+                <a:latin typeface="Lato Heavy" panose="020F0502020204030203" pitchFamily="34" charset="0"/>
+                <a:ea typeface="Lato Heavy" panose="020F0502020204030203" pitchFamily="34" charset="0"/>
+                <a:cs typeface="Lato Heavy" panose="020F0502020204030203" pitchFamily="34" charset="0"/>
+              </a:rPr>
+              <a:t>Image Augmentation </a:t>
+            </a:r>
+            <a:r>
+              <a:rPr lang="en-US" sz="2400" b="1" dirty="0">
+                <a:solidFill>
+                  <a:srgbClr val="0170AD"/>
+                </a:solidFill>
+                <a:latin typeface="Lato Light"/>
+                <a:ea typeface="Lato Light"/>
+                <a:cs typeface="Lato Light"/>
+              </a:rPr>
+              <a:t>(rotating, zooming, horizontal flipping) and </a:t>
+            </a:r>
+            <a:r>
+              <a:rPr lang="en-US" sz="2400" b="1" dirty="0">
+                <a:solidFill>
+                  <a:srgbClr val="0170AD"/>
+                </a:solidFill>
+                <a:latin typeface="Lato Heavy" panose="020F0502020204030203" pitchFamily="34" charset="0"/>
+                <a:ea typeface="Lato Heavy" panose="020F0502020204030203" pitchFamily="34" charset="0"/>
+                <a:cs typeface="Lato Heavy" panose="020F0502020204030203" pitchFamily="34" charset="0"/>
+              </a:rPr>
+              <a:t>applied the mean </a:t>
+            </a:r>
+            <a:r>
+              <a:rPr lang="en-US" sz="2400" b="1" dirty="0">
+                <a:solidFill>
+                  <a:srgbClr val="0170AD"/>
+                </a:solidFill>
+                <a:latin typeface="Lato Light"/>
+                <a:ea typeface="Lato Light"/>
+                <a:cs typeface="Lato Light"/>
+              </a:rPr>
+              <a:t>to the data.</a:t>
             </a:r>
           </a:p>
           <a:p>
@@ -5619,7 +5806,29 @@
                 <a:ea typeface="Lato Light"/>
                 <a:cs typeface="Lato Light"/>
               </a:rPr>
-              <a:t>We wrote a multi-label generator to use the data in </a:t>
+              <a:t>We wrote a </a:t>
+            </a:r>
+            <a:r>
+              <a:rPr lang="en-US" sz="2400" b="1" dirty="0">
+                <a:solidFill>
+                  <a:srgbClr val="0170AD"/>
+                </a:solidFill>
+                <a:latin typeface="Lato Heavy" panose="020F0502020204030203" pitchFamily="34" charset="0"/>
+                <a:ea typeface="Lato Heavy" panose="020F0502020204030203" pitchFamily="34" charset="0"/>
+                <a:cs typeface="Lato Heavy" panose="020F0502020204030203" pitchFamily="34" charset="0"/>
+              </a:rPr>
+              <a:t>multi-label generator </a:t>
+            </a:r>
+            <a:r>
+              <a:rPr lang="en-US" sz="2400" b="1" dirty="0">
+                <a:solidFill>
+                  <a:srgbClr val="0170AD"/>
+                </a:solidFill>
+                <a:latin typeface="Lato Light"/>
+                <a:ea typeface="Lato Light"/>
+                <a:cs typeface="Lato Light"/>
+              </a:rPr>
+              <a:t>to use the data in </a:t>
             </a:r>
             <a:r>
               <a:rPr lang="en-US" sz="2400" b="1" dirty="0" err="1">
@@ -5720,9 +5929,9 @@
                 <a:solidFill>
                   <a:srgbClr val="0170AD"/>
                 </a:solidFill>
-                <a:latin typeface="Lato Light"/>
-                <a:ea typeface="Lato Light"/>
-                <a:cs typeface="Lato Light"/>
+                <a:latin typeface="Lato Heavy" panose="020F0502020204030203" pitchFamily="34" charset="0"/>
+                <a:ea typeface="Lato Heavy" panose="020F0502020204030203" pitchFamily="34" charset="0"/>
+                <a:cs typeface="Lato Heavy" panose="020F0502020204030203" pitchFamily="34" charset="0"/>
               </a:rPr>
               <a:t>Preprocessing:</a:t>
             </a:r>
@@ -5752,7 +5961,29 @@
                 <a:ea typeface="Lato Light"/>
                 <a:cs typeface="Lato Light"/>
               </a:rPr>
-              <a:t>After importing the dataset, we created a set of all of the distinct characters in the text and then create a map of each character to a unique integer.</a:t>
+              <a:t>After importing the dataset, we created a set of all of the distinct characters in the text and then create a </a:t>
+            </a:r>
+            <a:r>
+              <a:rPr lang="en-US" sz="2400" b="1" dirty="0">
+                <a:solidFill>
+                  <a:srgbClr val="0170AD"/>
+                </a:solidFill>
+                <a:latin typeface="Lato Heavy" panose="020F0502020204030203" pitchFamily="34" charset="0"/>
+                <a:ea typeface="Lato Heavy" panose="020F0502020204030203" pitchFamily="34" charset="0"/>
+                <a:cs typeface="Lato Heavy" panose="020F0502020204030203" pitchFamily="34" charset="0"/>
+              </a:rPr>
+              <a:t>map of each character to a unique integer</a:t>
+            </a:r>
+            <a:r>
+              <a:rPr lang="en-US" sz="2400" b="1" dirty="0">
+                <a:solidFill>
+                  <a:srgbClr val="0170AD"/>
+                </a:solidFill>
+                <a:latin typeface="Lato Light"/>
+                <a:ea typeface="Lato Light"/>
+                <a:cs typeface="Lato Light"/>
+              </a:rPr>
+              <a:t>.</a:t>
             </a:r>
             <a:r>
               <a:rPr lang="en-US" sz="2400" dirty="0">
@@ -5802,7 +6033,29 @@
                 <a:ea typeface="Lato Light"/>
                 <a:cs typeface="Lato Light"/>
               </a:rPr>
-              <a:t>To define the training data, we split the text into subsequences of 100 characters.</a:t>
+              <a:t>To define the training data, we split the text into </a:t>
+            </a:r>
+            <a:r>
+              <a:rPr lang="en-US" sz="2400" b="1" dirty="0">
+                <a:solidFill>
+                  <a:srgbClr val="0170AD"/>
+                </a:solidFill>
+                <a:latin typeface="Lato Heavy" panose="020F0502020204030203" pitchFamily="34" charset="0"/>
+                <a:ea typeface="Lato Heavy" panose="020F0502020204030203" pitchFamily="34" charset="0"/>
+                <a:cs typeface="Lato Heavy" panose="020F0502020204030203" pitchFamily="34" charset="0"/>
+              </a:rPr>
+              <a:t>subsequences of 100 characters</a:t>
+            </a:r>
+            <a:r>
+              <a:rPr lang="en-US" sz="2400" b="1" dirty="0">
+                <a:solidFill>
+                  <a:srgbClr val="0170AD"/>
+                </a:solidFill>
+                <a:latin typeface="Lato Light"/>
+                <a:ea typeface="Lato Light"/>
+                <a:cs typeface="Lato Light"/>
+              </a:rPr>
+              <a:t>.</a:t>
             </a:r>
           </a:p>
           <a:p>
@@ -5886,7 +6139,29 @@
                 <a:ea typeface="Lato Light"/>
                 <a:cs typeface="Lato Light"/>
               </a:rPr>
-              <a:t>We normalized the input.</a:t>
+              <a:t>We </a:t>
+            </a:r>
+            <a:r>
+              <a:rPr lang="en-US" sz="2400" b="1" dirty="0">
+                <a:solidFill>
+                  <a:srgbClr val="0170AD"/>
+                </a:solidFill>
+                <a:latin typeface="Lato Heavy" panose="020F0502020204030203" pitchFamily="34" charset="0"/>
+                <a:ea typeface="Lato Heavy" panose="020F0502020204030203" pitchFamily="34" charset="0"/>
+                <a:cs typeface="Lato Heavy" panose="020F0502020204030203" pitchFamily="34" charset="0"/>
+              </a:rPr>
+              <a:t>normalized </a:t>
+            </a:r>
+            <a:r>
+              <a:rPr lang="en-US" sz="2400" b="1" dirty="0">
+                <a:solidFill>
+                  <a:srgbClr val="0170AD"/>
+                </a:solidFill>
+                <a:latin typeface="Lato Light"/>
+                <a:ea typeface="Lato Light"/>
+                <a:cs typeface="Lato Light"/>
+              </a:rPr>
+              <a:t>the input.</a:t>
             </a:r>
           </a:p>
           <a:p>
@@ -5914,7 +6189,51 @@
                 <a:ea typeface="Lato Light"/>
                 <a:cs typeface="Lato Light"/>
               </a:rPr>
-              <a:t>We converted the output patterns into a one hot encoded vector. That is, that the network can predict the probability of the different character in our lookup table.</a:t>
+              <a:t>We converted the </a:t>
+            </a:r>
+            <a:r>
+              <a:rPr lang="en-US" sz="2400" b="1" dirty="0">
+                <a:solidFill>
+                  <a:srgbClr val="0170AD"/>
+                </a:solidFill>
+                <a:latin typeface="Lato Heavy" panose="020F0502020204030203" pitchFamily="34" charset="0"/>
+                <a:ea typeface="Lato Heavy" panose="020F0502020204030203" pitchFamily="34" charset="0"/>
+                <a:cs typeface="Lato Heavy" panose="020F0502020204030203" pitchFamily="34" charset="0"/>
+              </a:rPr>
+              <a:t>output</a:t>
+            </a:r>
+            <a:r>
+              <a:rPr lang="en-US" sz="2400" b="1" dirty="0">
+                <a:solidFill>
+                  <a:srgbClr val="0170AD"/>
+                </a:solidFill>
+                <a:latin typeface="Lato Light"/>
+                <a:ea typeface="Lato Light"/>
+                <a:cs typeface="Lato Light"/>
+              </a:rPr>
+              <a:t> patterns into a </a:t>
+            </a:r>
+            <a:r>
+              <a:rPr lang="en-US" sz="2400" b="1" dirty="0">
+                <a:solidFill>
+                  <a:srgbClr val="0170AD"/>
+                </a:solidFill>
+                <a:latin typeface="Lato Heavy" panose="020F0502020204030203" pitchFamily="34" charset="0"/>
+                <a:ea typeface="Lato Heavy" panose="020F0502020204030203" pitchFamily="34" charset="0"/>
+                <a:cs typeface="Lato Heavy" panose="020F0502020204030203" pitchFamily="34" charset="0"/>
+              </a:rPr>
+              <a:t>one hot encoded vector</a:t>
+            </a:r>
+            <a:r>
+              <a:rPr lang="en-US" sz="2400" b="1" dirty="0">
+                <a:solidFill>
+                  <a:srgbClr val="0170AD"/>
+                </a:solidFill>
+                <a:latin typeface="Lato Light"/>
+                <a:ea typeface="Lato Light"/>
+                <a:cs typeface="Lato Light"/>
+              </a:rPr>
+              <a:t>. That is, that the network can predict the probability of the different character in our lookup table.</a:t>
             </a:r>
           </a:p>
         </p:txBody>
@@ -5975,7 +6294,7 @@
             </a:lvl1pPr>
           </a:lstStyle>
           <a:p>
-            <a:pPr lvl="0" algn="just">
+            <a:pPr algn="just">
               <a:lnSpc>
                 <a:spcPct val="100000"/>
               </a:lnSpc>
@@ -5993,9 +6312,9 @@
                 <a:solidFill>
                   <a:srgbClr val="0170AD"/>
                 </a:solidFill>
-                <a:latin typeface="Lato Light"/>
-                <a:ea typeface="Lato Light"/>
-                <a:cs typeface="Lato Light"/>
+                <a:latin typeface="Lato Heavy" panose="020F0502020204030203" pitchFamily="34" charset="0"/>
+                <a:ea typeface="Lato Heavy" panose="020F0502020204030203" pitchFamily="34" charset="0"/>
+                <a:cs typeface="Lato Heavy" panose="020F0502020204030203" pitchFamily="34" charset="0"/>
               </a:rPr>
               <a:t>Architecture:</a:t>
             </a:r>
@@ -6025,16 +6344,82 @@
                 <a:ea typeface="Lato Light"/>
                 <a:cs typeface="Lato Light"/>
               </a:rPr>
-              <a:t>To test our code we used transfer learning on a VGG16 architecture with </a:t>
+              <a:t>To </a:t>
+            </a:r>
+            <a:r>
+              <a:rPr lang="en-US" sz="2400" b="1" dirty="0">
+                <a:solidFill>
+                  <a:srgbClr val="0170AD"/>
+                </a:solidFill>
+                <a:latin typeface="Lato Heavy" panose="020F0502020204030203" pitchFamily="34" charset="0"/>
+                <a:ea typeface="Lato Heavy" panose="020F0502020204030203" pitchFamily="34" charset="0"/>
+                <a:cs typeface="Lato Heavy" panose="020F0502020204030203" pitchFamily="34" charset="0"/>
+              </a:rPr>
+              <a:t>test our code </a:t>
+            </a:r>
+            <a:r>
+              <a:rPr lang="en-US" sz="2400" b="1" dirty="0">
+                <a:solidFill>
+                  <a:srgbClr val="0170AD"/>
+                </a:solidFill>
+                <a:latin typeface="Lato Light"/>
+                <a:ea typeface="Lato Light"/>
+                <a:cs typeface="Lato Light"/>
+              </a:rPr>
+              <a:t>we used </a:t>
+            </a:r>
+            <a:r>
+              <a:rPr lang="en-US" sz="2400" b="1" dirty="0">
+                <a:solidFill>
+                  <a:srgbClr val="0170AD"/>
+                </a:solidFill>
+                <a:latin typeface="Lato Heavy" panose="020F0502020204030203" pitchFamily="34" charset="0"/>
+                <a:ea typeface="Lato Heavy" panose="020F0502020204030203" pitchFamily="34" charset="0"/>
+                <a:cs typeface="Lato Heavy" panose="020F0502020204030203" pitchFamily="34" charset="0"/>
+              </a:rPr>
+              <a:t>transfer learning</a:t>
+            </a:r>
+            <a:r>
+              <a:rPr lang="en-US" sz="2400" b="1" dirty="0">
+                <a:solidFill>
+                  <a:srgbClr val="0170AD"/>
+                </a:solidFill>
+                <a:latin typeface="Lato Light"/>
+                <a:ea typeface="Lato Light"/>
+                <a:cs typeface="Lato Light"/>
+              </a:rPr>
+              <a:t> on a </a:t>
+            </a:r>
+            <a:r>
+              <a:rPr lang="en-US" sz="2400" b="1" dirty="0">
+                <a:solidFill>
+                  <a:srgbClr val="0170AD"/>
+                </a:solidFill>
+                <a:latin typeface="Lato Heavy" panose="020F0502020204030203" pitchFamily="34" charset="0"/>
+                <a:ea typeface="Lato Heavy" panose="020F0502020204030203" pitchFamily="34" charset="0"/>
+                <a:cs typeface="Lato Heavy" panose="020F0502020204030203" pitchFamily="34" charset="0"/>
+              </a:rPr>
+              <a:t>VGG16</a:t>
+            </a:r>
+            <a:r>
+              <a:rPr lang="en-US" sz="2400" b="1" dirty="0">
+                <a:solidFill>
+                  <a:srgbClr val="0170AD"/>
+                </a:solidFill>
+                <a:latin typeface="Lato Light"/>
+                <a:ea typeface="Lato Light"/>
+                <a:cs typeface="Lato Light"/>
+              </a:rPr>
+              <a:t> architecture with </a:t>
             </a:r>
             <a:r>
               <a:rPr lang="en-US" sz="2400" b="1" dirty="0" err="1">
                 <a:solidFill>
                   <a:srgbClr val="0170AD"/>
                 </a:solidFill>
-                <a:latin typeface="Lato Light"/>
-                <a:ea typeface="Lato Light"/>
-                <a:cs typeface="Lato Light"/>
+                <a:latin typeface="Lato Heavy" panose="020F0502020204030203" pitchFamily="34" charset="0"/>
+                <a:ea typeface="Lato Heavy" panose="020F0502020204030203" pitchFamily="34" charset="0"/>
+                <a:cs typeface="Lato Heavy" panose="020F0502020204030203" pitchFamily="34" charset="0"/>
               </a:rPr>
               <a:t>pretrained</a:t>
             </a:r>
@@ -6043,11 +6428,22 @@
                 <a:solidFill>
                   <a:srgbClr val="0170AD"/>
                 </a:solidFill>
-                <a:latin typeface="Lato Light"/>
-                <a:ea typeface="Lato Light"/>
-                <a:cs typeface="Lato Light"/>
-              </a:rPr>
-              <a:t> image net weights. </a:t>
+                <a:latin typeface="Lato Heavy" panose="020F0502020204030203" pitchFamily="34" charset="0"/>
+                <a:ea typeface="Lato Heavy" panose="020F0502020204030203" pitchFamily="34" charset="0"/>
+                <a:cs typeface="Lato Heavy" panose="020F0502020204030203" pitchFamily="34" charset="0"/>
+              </a:rPr>
+              <a:t> image net weights</a:t>
+            </a:r>
+            <a:r>
+              <a:rPr lang="en-US" sz="2400" b="1" dirty="0">
+                <a:solidFill>
+                  <a:srgbClr val="0170AD"/>
+                </a:solidFill>
+                <a:latin typeface="Lato Light"/>
+                <a:ea typeface="Lato Light"/>
+                <a:cs typeface="Lato Light"/>
+              </a:rPr>
+              <a:t>. </a:t>
             </a:r>
           </a:p>
           <a:p>
@@ -6075,16 +6471,38 @@
                 <a:ea typeface="Lato Light"/>
                 <a:cs typeface="Lato Light"/>
               </a:rPr>
-              <a:t>For the Inception v3 and the </a:t>
+              <a:t>For the </a:t>
+            </a:r>
+            <a:r>
+              <a:rPr lang="en-US" sz="2400" b="1" dirty="0">
+                <a:solidFill>
+                  <a:srgbClr val="0170AD"/>
+                </a:solidFill>
+                <a:latin typeface="Lato Heavy" panose="020F0502020204030203" pitchFamily="34" charset="0"/>
+                <a:ea typeface="Lato Heavy" panose="020F0502020204030203" pitchFamily="34" charset="0"/>
+                <a:cs typeface="Lato Heavy" panose="020F0502020204030203" pitchFamily="34" charset="0"/>
+              </a:rPr>
+              <a:t>Inception v3 </a:t>
+            </a:r>
+            <a:r>
+              <a:rPr lang="en-US" sz="2400" b="1" dirty="0">
+                <a:solidFill>
+                  <a:srgbClr val="0170AD"/>
+                </a:solidFill>
+                <a:latin typeface="Lato Light"/>
+                <a:ea typeface="Lato Light"/>
+                <a:cs typeface="Lato Light"/>
+              </a:rPr>
+              <a:t>and the </a:t>
             </a:r>
             <a:r>
               <a:rPr lang="en-US" sz="2400" b="1" dirty="0" err="1">
                 <a:solidFill>
                   <a:srgbClr val="0170AD"/>
                 </a:solidFill>
-                <a:latin typeface="Lato Light"/>
-                <a:ea typeface="Lato Light"/>
-                <a:cs typeface="Lato Light"/>
+                <a:latin typeface="Lato Heavy" panose="020F0502020204030203" pitchFamily="34" charset="0"/>
+                <a:ea typeface="Lato Heavy" panose="020F0502020204030203" pitchFamily="34" charset="0"/>
+                <a:cs typeface="Lato Heavy" panose="020F0502020204030203" pitchFamily="34" charset="0"/>
               </a:rPr>
               <a:t>Xception</a:t>
             </a:r>
@@ -6104,9 +6522,9 @@
                 <a:solidFill>
                   <a:srgbClr val="0170AD"/>
                 </a:solidFill>
-                <a:latin typeface="Lato Light"/>
-                <a:ea typeface="Lato Light"/>
-                <a:cs typeface="Lato Light"/>
+                <a:latin typeface="Lato Heavy" panose="020F0502020204030203" pitchFamily="34" charset="0"/>
+                <a:ea typeface="Lato Heavy" panose="020F0502020204030203" pitchFamily="34" charset="0"/>
+                <a:cs typeface="Lato Heavy" panose="020F0502020204030203" pitchFamily="34" charset="0"/>
               </a:rPr>
               <a:t>pretrained</a:t>
             </a:r>
@@ -6141,7 +6559,29 @@
                 <a:ea typeface="Lato Light"/>
                 <a:cs typeface="Lato Light"/>
               </a:rPr>
-              <a:t> with image net weights.</a:t>
+              <a:t> with </a:t>
+            </a:r>
+            <a:r>
+              <a:rPr lang="en-US" sz="2400" b="1" dirty="0">
+                <a:solidFill>
+                  <a:srgbClr val="0170AD"/>
+                </a:solidFill>
+                <a:latin typeface="Lato Heavy" panose="020F0502020204030203" pitchFamily="34" charset="0"/>
+                <a:ea typeface="Lato Heavy" panose="020F0502020204030203" pitchFamily="34" charset="0"/>
+                <a:cs typeface="Lato Heavy" panose="020F0502020204030203" pitchFamily="34" charset="0"/>
+              </a:rPr>
+              <a:t>image net weights</a:t>
+            </a:r>
+            <a:r>
+              <a:rPr lang="en-US" sz="2400" b="1" dirty="0">
+                <a:solidFill>
+                  <a:srgbClr val="0170AD"/>
+                </a:solidFill>
+                <a:latin typeface="Lato Light"/>
+                <a:ea typeface="Lato Light"/>
+                <a:cs typeface="Lato Light"/>
+              </a:rPr>
+              <a:t>.</a:t>
             </a:r>
           </a:p>
           <a:p>
@@ -6169,7 +6609,29 @@
                 <a:ea typeface="Lato Light"/>
                 <a:cs typeface="Lato Light"/>
               </a:rPr>
-              <a:t>For all models, we replaced the top with a global average pooling layer, followed by a fully connected layer (size of 1024 and a </a:t>
+              <a:t>For all models, we </a:t>
+            </a:r>
+            <a:r>
+              <a:rPr lang="en-US" sz="2400" b="1" dirty="0">
+                <a:solidFill>
+                  <a:srgbClr val="0170AD"/>
+                </a:solidFill>
+                <a:latin typeface="Lato Heavy" panose="020F0502020204030203" pitchFamily="34" charset="0"/>
+                <a:ea typeface="Lato Heavy" panose="020F0502020204030203" pitchFamily="34" charset="0"/>
+                <a:cs typeface="Lato Heavy" panose="020F0502020204030203" pitchFamily="34" charset="0"/>
+              </a:rPr>
+              <a:t>replaced the top</a:t>
+            </a:r>
+            <a:r>
+              <a:rPr lang="en-US" sz="2400" b="1" dirty="0">
+                <a:solidFill>
+                  <a:srgbClr val="0170AD"/>
+                </a:solidFill>
+                <a:latin typeface="Lato Light"/>
+                <a:ea typeface="Lato Light"/>
+                <a:cs typeface="Lato Light"/>
+              </a:rPr>
+              <a:t> with a global average pooling layer, followed by a fully connected layer (size of 1024 and a </a:t>
             </a:r>
             <a:r>
               <a:rPr lang="en-US" sz="2400" b="1" dirty="0" err="1">
@@ -6191,7 +6653,29 @@
                 <a:ea typeface="Lato Light"/>
                 <a:cs typeface="Lato Light"/>
               </a:rPr>
-              <a:t> action function) and a prediction layer (size of 9 and a sigmoid activation function for multi-label classification).</a:t>
+              <a:t> activation function) and a prediction layer (size of 9 and a </a:t>
+            </a:r>
+            <a:r>
+              <a:rPr lang="en-US" sz="2400" b="1" dirty="0">
+                <a:solidFill>
+                  <a:srgbClr val="0170AD"/>
+                </a:solidFill>
+                <a:latin typeface="Lato Heavy" panose="020F0502020204030203" pitchFamily="34" charset="0"/>
+                <a:ea typeface="Lato Heavy" panose="020F0502020204030203" pitchFamily="34" charset="0"/>
+                <a:cs typeface="Lato Heavy" panose="020F0502020204030203" pitchFamily="34" charset="0"/>
+              </a:rPr>
+              <a:t>sigmoid activation function for multi-label classification</a:t>
+            </a:r>
+            <a:r>
+              <a:rPr lang="en-US" sz="2400" b="1" dirty="0">
+                <a:solidFill>
+                  <a:srgbClr val="0170AD"/>
+                </a:solidFill>
+                <a:latin typeface="Lato Light"/>
+                <a:ea typeface="Lato Light"/>
+                <a:cs typeface="Lato Light"/>
+              </a:rPr>
+              <a:t>).</a:t>
             </a:r>
           </a:p>
         </p:txBody>
@@ -6270,9 +6754,9 @@
                 <a:solidFill>
                   <a:srgbClr val="0170AD"/>
                 </a:solidFill>
-                <a:latin typeface="Lato Light"/>
-                <a:ea typeface="Lato Light"/>
-                <a:cs typeface="Lato Light"/>
+                <a:latin typeface="Lato Heavy" panose="020F0502020204030203" pitchFamily="34" charset="0"/>
+                <a:ea typeface="Lato Heavy" panose="020F0502020204030203" pitchFamily="34" charset="0"/>
+                <a:cs typeface="Lato Heavy" panose="020F0502020204030203" pitchFamily="34" charset="0"/>
               </a:rPr>
               <a:t>Training:</a:t>
             </a:r>
@@ -6330,7 +6814,29 @@
                 <a:ea typeface="Lato Light"/>
                 <a:cs typeface="Lato Light"/>
               </a:rPr>
-              <a:t>We used Adam as our optimizer.</a:t>
+              <a:t>We used </a:t>
+            </a:r>
+            <a:r>
+              <a:rPr lang="en-US" sz="2400" b="1" dirty="0">
+                <a:solidFill>
+                  <a:srgbClr val="0170AD"/>
+                </a:solidFill>
+                <a:latin typeface="Lato Heavy" panose="020F0502020204030203" pitchFamily="34" charset="0"/>
+                <a:ea typeface="Lato Heavy" panose="020F0502020204030203" pitchFamily="34" charset="0"/>
+                <a:cs typeface="Lato Heavy" panose="020F0502020204030203" pitchFamily="34" charset="0"/>
+              </a:rPr>
+              <a:t>Adam</a:t>
+            </a:r>
+            <a:r>
+              <a:rPr lang="en-US" sz="2400" b="1" dirty="0">
+                <a:solidFill>
+                  <a:srgbClr val="0170AD"/>
+                </a:solidFill>
+                <a:latin typeface="Lato Light"/>
+                <a:ea typeface="Lato Light"/>
+                <a:cs typeface="Lato Light"/>
+              </a:rPr>
+              <a:t> as our optimizer.</a:t>
             </a:r>
           </a:p>
           <a:p>
@@ -6358,7 +6864,73 @@
                 <a:ea typeface="Lato Light"/>
                 <a:cs typeface="Lato Light"/>
               </a:rPr>
-              <a:t>For multi-label classification, we used a binary-cross entropy loss and an F1-score as our metric.</a:t>
+              <a:t>For </a:t>
+            </a:r>
+            <a:r>
+              <a:rPr lang="en-US" sz="2400" b="1" dirty="0">
+                <a:solidFill>
+                  <a:srgbClr val="0170AD"/>
+                </a:solidFill>
+                <a:latin typeface="Lato Heavy" panose="020F0502020204030203" pitchFamily="34" charset="0"/>
+                <a:ea typeface="Lato Heavy" panose="020F0502020204030203" pitchFamily="34" charset="0"/>
+                <a:cs typeface="Lato Heavy" panose="020F0502020204030203" pitchFamily="34" charset="0"/>
+              </a:rPr>
+              <a:t>multi-label classification</a:t>
+            </a:r>
+            <a:r>
+              <a:rPr lang="en-US" sz="2400" b="1" dirty="0">
+                <a:solidFill>
+                  <a:srgbClr val="0170AD"/>
+                </a:solidFill>
+                <a:latin typeface="Lato Light"/>
+                <a:ea typeface="Lato Light"/>
+                <a:cs typeface="Lato Light"/>
+              </a:rPr>
+              <a:t>, we used a </a:t>
+            </a:r>
+            <a:r>
+              <a:rPr lang="en-US" sz="2400" b="1" dirty="0">
+                <a:solidFill>
+                  <a:srgbClr val="0170AD"/>
+                </a:solidFill>
+                <a:latin typeface="Lato Heavy" panose="020F0502020204030203" pitchFamily="34" charset="0"/>
+                <a:ea typeface="Lato Heavy" panose="020F0502020204030203" pitchFamily="34" charset="0"/>
+                <a:cs typeface="Lato Heavy" panose="020F0502020204030203" pitchFamily="34" charset="0"/>
+              </a:rPr>
+              <a:t>binary-cross entropy loss </a:t>
+            </a:r>
+            <a:r>
+              <a:rPr lang="en-US" sz="2400" b="1" dirty="0">
+                <a:solidFill>
+                  <a:srgbClr val="0170AD"/>
+                </a:solidFill>
+                <a:latin typeface="Lato Light"/>
+                <a:ea typeface="Lato Light"/>
+                <a:cs typeface="Lato Light"/>
+              </a:rPr>
+              <a:t>and an </a:t>
+            </a:r>
+            <a:r>
+              <a:rPr lang="en-US" sz="2400" b="1" dirty="0">
+                <a:solidFill>
+                  <a:srgbClr val="0170AD"/>
+                </a:solidFill>
+                <a:latin typeface="Lato Heavy" panose="020F0502020204030203" pitchFamily="34" charset="0"/>
+                <a:ea typeface="Lato Heavy" panose="020F0502020204030203" pitchFamily="34" charset="0"/>
+                <a:cs typeface="Lato Heavy" panose="020F0502020204030203" pitchFamily="34" charset="0"/>
+              </a:rPr>
+              <a:t>F1-score</a:t>
+            </a:r>
+            <a:r>
+              <a:rPr lang="en-US" sz="2400" b="1" dirty="0">
+                <a:solidFill>
+                  <a:srgbClr val="0170AD"/>
+                </a:solidFill>
+                <a:latin typeface="Lato Light"/>
+                <a:ea typeface="Lato Light"/>
+                <a:cs typeface="Lato Light"/>
+              </a:rPr>
+              <a:t> as our metric.</a:t>
             </a:r>
           </a:p>
           <a:p>
@@ -6408,7 +6980,29 @@
                 <a:ea typeface="Lato Light"/>
                 <a:cs typeface="Lato Light"/>
               </a:rPr>
-              <a:t> search, we used a grid search and tried different learning rates and number of freezed layers.</a:t>
+              <a:t> search, we used a </a:t>
+            </a:r>
+            <a:r>
+              <a:rPr lang="en-US" sz="2400" b="1" dirty="0">
+                <a:solidFill>
+                  <a:srgbClr val="0170AD"/>
+                </a:solidFill>
+                <a:latin typeface="Lato Heavy" panose="020F0502020204030203" pitchFamily="34" charset="0"/>
+                <a:ea typeface="Lato Heavy" panose="020F0502020204030203" pitchFamily="34" charset="0"/>
+                <a:cs typeface="Lato Heavy" panose="020F0502020204030203" pitchFamily="34" charset="0"/>
+              </a:rPr>
+              <a:t>grid search </a:t>
+            </a:r>
+            <a:r>
+              <a:rPr lang="en-US" sz="2400" b="1" dirty="0">
+                <a:solidFill>
+                  <a:srgbClr val="0170AD"/>
+                </a:solidFill>
+                <a:latin typeface="Lato Light"/>
+                <a:ea typeface="Lato Light"/>
+                <a:cs typeface="Lato Light"/>
+              </a:rPr>
+              <a:t>and tried different learning rates and numbers of freezed layers.</a:t>
             </a:r>
           </a:p>
           <a:p>
@@ -6497,7 +7091,7 @@
             </a:lvl1pPr>
           </a:lstStyle>
           <a:p>
-            <a:pPr lvl="0" algn="just">
+            <a:pPr algn="just">
               <a:lnSpc>
                 <a:spcPct val="100000"/>
               </a:lnSpc>
@@ -6515,9 +7109,9 @@
                 <a:solidFill>
                   <a:srgbClr val="0170AD"/>
                 </a:solidFill>
-                <a:latin typeface="Lato Light"/>
-                <a:ea typeface="Lato Light"/>
-                <a:cs typeface="Lato Light"/>
+                <a:latin typeface="Lato Heavy" panose="020F0502020204030203" pitchFamily="34" charset="0"/>
+                <a:ea typeface="Lato Heavy" panose="020F0502020204030203" pitchFamily="34" charset="0"/>
+                <a:cs typeface="Lato Heavy" panose="020F0502020204030203" pitchFamily="34" charset="0"/>
               </a:rPr>
               <a:t>Text generation:</a:t>
             </a:r>
@@ -6571,11 +7165,66 @@
                 <a:solidFill>
                   <a:srgbClr val="0170AD"/>
                 </a:solidFill>
-                <a:latin typeface="Lato Light"/>
-                <a:ea typeface="Lato Light"/>
-                <a:cs typeface="Lato Light"/>
-              </a:rPr>
-              <a:t>For every label above it, we feed a prepared seed sequence into the model as an input.</a:t>
+                <a:latin typeface="Lato Heavy" panose="020F0502020204030203" pitchFamily="34" charset="0"/>
+                <a:ea typeface="Lato Heavy" panose="020F0502020204030203" pitchFamily="34" charset="0"/>
+                <a:cs typeface="Lato Heavy" panose="020F0502020204030203" pitchFamily="34" charset="0"/>
+              </a:rPr>
+              <a:t>For every label </a:t>
+            </a:r>
+            <a:r>
+              <a:rPr lang="en-US" sz="2400" b="1" dirty="0">
+                <a:solidFill>
+                  <a:srgbClr val="0170AD"/>
+                </a:solidFill>
+                <a:latin typeface="Lato Light"/>
+                <a:ea typeface="Lato Light"/>
+                <a:cs typeface="Lato Light"/>
+              </a:rPr>
+              <a:t>above it, we feed a </a:t>
+            </a:r>
+            <a:r>
+              <a:rPr lang="en-US" sz="2400" b="1" dirty="0">
+                <a:solidFill>
+                  <a:srgbClr val="0170AD"/>
+                </a:solidFill>
+                <a:latin typeface="Lato Heavy" panose="020F0502020204030203" pitchFamily="34" charset="0"/>
+                <a:ea typeface="Lato Heavy" panose="020F0502020204030203" pitchFamily="34" charset="0"/>
+                <a:cs typeface="Lato Heavy" panose="020F0502020204030203" pitchFamily="34" charset="0"/>
+              </a:rPr>
+              <a:t>prepared</a:t>
+            </a:r>
+            <a:r>
+              <a:rPr lang="en-US" sz="2400" b="1" dirty="0">
+                <a:solidFill>
+                  <a:srgbClr val="0170AD"/>
+                </a:solidFill>
+                <a:latin typeface="Lato Light"/>
+                <a:ea typeface="Lato Light"/>
+                <a:cs typeface="Lato Light"/>
+              </a:rPr>
+              <a:t> </a:t>
+            </a:r>
+            <a:r>
+              <a:rPr lang="en-US" sz="2400" b="1" dirty="0">
+                <a:solidFill>
+                  <a:srgbClr val="0170AD"/>
+                </a:solidFill>
+                <a:latin typeface="Lato Heavy" panose="020F0502020204030203" pitchFamily="34" charset="0"/>
+                <a:ea typeface="Lato Heavy" panose="020F0502020204030203" pitchFamily="34" charset="0"/>
+                <a:cs typeface="Lato Heavy" panose="020F0502020204030203" pitchFamily="34" charset="0"/>
+              </a:rPr>
+              <a:t>seed sequence </a:t>
+            </a:r>
+            <a:r>
+              <a:rPr lang="en-US" sz="2400" b="1" dirty="0">
+                <a:solidFill>
+                  <a:srgbClr val="0170AD"/>
+                </a:solidFill>
+                <a:latin typeface="Lato Light"/>
+                <a:ea typeface="Lato Light"/>
+                <a:cs typeface="Lato Light"/>
+              </a:rPr>
+              <a:t>into the model as an input.</a:t>
             </a:r>
           </a:p>
           <a:p>
@@ -6603,7 +7252,29 @@
                 <a:ea typeface="Lato Light"/>
                 <a:cs typeface="Lato Light"/>
               </a:rPr>
-              <a:t>The model then updates the seed sequence to add the generated character on the end and trim off the first character.</a:t>
+              <a:t>The model then </a:t>
+            </a:r>
+            <a:r>
+              <a:rPr lang="en-US" sz="2400" b="1" dirty="0">
+                <a:solidFill>
+                  <a:srgbClr val="0170AD"/>
+                </a:solidFill>
+                <a:latin typeface="Lato Heavy" panose="020F0502020204030203" pitchFamily="34" charset="0"/>
+                <a:ea typeface="Lato Heavy" panose="020F0502020204030203" pitchFamily="34" charset="0"/>
+                <a:cs typeface="Lato Heavy" panose="020F0502020204030203" pitchFamily="34" charset="0"/>
+              </a:rPr>
+              <a:t>updates the seed sequence </a:t>
+            </a:r>
+            <a:r>
+              <a:rPr lang="en-US" sz="2400" b="1" dirty="0">
+                <a:solidFill>
+                  <a:srgbClr val="0170AD"/>
+                </a:solidFill>
+                <a:latin typeface="Lato Light"/>
+                <a:ea typeface="Lato Light"/>
+                <a:cs typeface="Lato Light"/>
+              </a:rPr>
+              <a:t>to add the generated character on the end and trim off the first character.</a:t>
             </a:r>
           </a:p>
           <a:p>
@@ -6631,7 +7302,29 @@
                 <a:ea typeface="Lato Light"/>
                 <a:cs typeface="Lato Light"/>
               </a:rPr>
-              <a:t>In the end, we concatenate the different generated sequences to one restaurant review.</a:t>
+              <a:t>In the end, we </a:t>
+            </a:r>
+            <a:r>
+              <a:rPr lang="en-US" sz="2400" b="1" dirty="0">
+                <a:solidFill>
+                  <a:srgbClr val="0170AD"/>
+                </a:solidFill>
+                <a:latin typeface="Lato Heavy" panose="020F0502020204030203" pitchFamily="34" charset="0"/>
+                <a:ea typeface="Lato Heavy" panose="020F0502020204030203" pitchFamily="34" charset="0"/>
+                <a:cs typeface="Lato Heavy" panose="020F0502020204030203" pitchFamily="34" charset="0"/>
+              </a:rPr>
+              <a:t>concatenate the different generated sequences </a:t>
+            </a:r>
+            <a:r>
+              <a:rPr lang="en-US" sz="2400" b="1" dirty="0">
+                <a:solidFill>
+                  <a:srgbClr val="0170AD"/>
+                </a:solidFill>
+                <a:latin typeface="Lato Light"/>
+                <a:ea typeface="Lato Light"/>
+                <a:cs typeface="Lato Light"/>
+              </a:rPr>
+              <a:t>to one restaurant review.</a:t>
             </a:r>
           </a:p>
           <a:p>
@@ -6659,7 +7352,7 @@
                 <a:ea typeface="Lato Light"/>
                 <a:cs typeface="Lato Light"/>
               </a:rPr>
-              <a:t>Notice that you have to convert the seed sequence into integers and the output into character</a:t>
+              <a:t>Notice that you have to convert the seed sequence into integers and the output into characters.</a:t>
             </a:r>
           </a:p>
           <a:p>
@@ -6745,7 +7438,7 @@
             </a:lvl1pPr>
           </a:lstStyle>
           <a:p>
-            <a:pPr lvl="0" algn="just">
+            <a:pPr algn="just">
               <a:lnSpc>
                 <a:spcPct val="100000"/>
               </a:lnSpc>
@@ -6763,9 +7456,9 @@
                 <a:solidFill>
                   <a:srgbClr val="0170AD"/>
                 </a:solidFill>
-                <a:latin typeface="Lato Light"/>
-                <a:ea typeface="Lato Light"/>
-                <a:cs typeface="Lato Light"/>
+                <a:latin typeface="Lato Heavy" panose="020F0502020204030203" pitchFamily="34" charset="0"/>
+                <a:ea typeface="Lato Heavy" panose="020F0502020204030203" pitchFamily="34" charset="0"/>
+                <a:cs typeface="Lato Heavy" panose="020F0502020204030203" pitchFamily="34" charset="0"/>
               </a:rPr>
               <a:t>Architecture:</a:t>
             </a:r>
@@ -6795,7 +7488,29 @@
                 <a:ea typeface="Lato Light"/>
                 <a:cs typeface="Lato Light"/>
               </a:rPr>
-              <a:t>For our RNN we used LSTMs with 256 memory units.</a:t>
+              <a:t>For our RNN we used </a:t>
+            </a:r>
+            <a:r>
+              <a:rPr lang="en-US" sz="2400" b="1" dirty="0">
+                <a:solidFill>
+                  <a:srgbClr val="0170AD"/>
+                </a:solidFill>
+                <a:latin typeface="Lato Heavy" panose="020F0502020204030203" pitchFamily="34" charset="0"/>
+                <a:ea typeface="Lato Heavy" panose="020F0502020204030203" pitchFamily="34" charset="0"/>
+                <a:cs typeface="Lato Heavy" panose="020F0502020204030203" pitchFamily="34" charset="0"/>
+              </a:rPr>
+              <a:t>LSTMs layers </a:t>
+            </a:r>
+            <a:r>
+              <a:rPr lang="en-US" sz="2400" b="1" dirty="0">
+                <a:solidFill>
+                  <a:srgbClr val="0170AD"/>
+                </a:solidFill>
+                <a:latin typeface="Lato Light"/>
+                <a:ea typeface="Lato Light"/>
+                <a:cs typeface="Lato Light"/>
+              </a:rPr>
+              <a:t>with 256 memory units.</a:t>
             </a:r>
           </a:p>
           <a:p>
@@ -6823,7 +7538,29 @@
                 <a:ea typeface="Lato Light"/>
                 <a:cs typeface="Lato Light"/>
               </a:rPr>
-              <a:t>Every LSTM layer is followed by a dropout layer. </a:t>
+              <a:t>Every LSTM layer is followed by a </a:t>
+            </a:r>
+            <a:r>
+              <a:rPr lang="en-US" sz="2400" b="1" dirty="0">
+                <a:solidFill>
+                  <a:srgbClr val="0170AD"/>
+                </a:solidFill>
+                <a:latin typeface="Lato Heavy" panose="020F0502020204030203" pitchFamily="34" charset="0"/>
+                <a:ea typeface="Lato Heavy" panose="020F0502020204030203" pitchFamily="34" charset="0"/>
+                <a:cs typeface="Lato Heavy" panose="020F0502020204030203" pitchFamily="34" charset="0"/>
+              </a:rPr>
+              <a:t>dropout layer</a:t>
+            </a:r>
+            <a:r>
+              <a:rPr lang="en-US" sz="2400" b="1" dirty="0">
+                <a:solidFill>
+                  <a:srgbClr val="0170AD"/>
+                </a:solidFill>
+                <a:latin typeface="Lato Light"/>
+                <a:ea typeface="Lato Light"/>
+                <a:cs typeface="Lato Light"/>
+              </a:rPr>
+              <a:t>. </a:t>
             </a:r>
           </a:p>
           <a:p>
@@ -6851,16 +7588,38 @@
                 <a:ea typeface="Lato Light"/>
                 <a:cs typeface="Lato Light"/>
               </a:rPr>
-              <a:t>The prediction layer uses </a:t>
+              <a:t>The </a:t>
+            </a:r>
+            <a:r>
+              <a:rPr lang="en-US" sz="2400" b="1" dirty="0">
+                <a:solidFill>
+                  <a:srgbClr val="0170AD"/>
+                </a:solidFill>
+                <a:latin typeface="Lato Heavy" panose="020F0502020204030203" pitchFamily="34" charset="0"/>
+                <a:ea typeface="Lato Heavy" panose="020F0502020204030203" pitchFamily="34" charset="0"/>
+                <a:cs typeface="Lato Heavy" panose="020F0502020204030203" pitchFamily="34" charset="0"/>
+              </a:rPr>
+              <a:t>prediction</a:t>
+            </a:r>
+            <a:r>
+              <a:rPr lang="en-US" sz="2400" b="1" dirty="0">
+                <a:solidFill>
+                  <a:srgbClr val="0170AD"/>
+                </a:solidFill>
+                <a:latin typeface="Lato Light"/>
+                <a:ea typeface="Lato Light"/>
+                <a:cs typeface="Lato Light"/>
+              </a:rPr>
+              <a:t> layer uses a </a:t>
             </a:r>
             <a:r>
               <a:rPr lang="en-US" sz="2400" b="1" dirty="0" err="1">
                 <a:solidFill>
                   <a:srgbClr val="0170AD"/>
                 </a:solidFill>
-                <a:latin typeface="Lato Light"/>
-                <a:ea typeface="Lato Light"/>
-                <a:cs typeface="Lato Light"/>
+                <a:latin typeface="Lato Heavy" panose="020F0502020204030203" pitchFamily="34" charset="0"/>
+                <a:ea typeface="Lato Heavy" panose="020F0502020204030203" pitchFamily="34" charset="0"/>
+                <a:cs typeface="Lato Heavy" panose="020F0502020204030203" pitchFamily="34" charset="0"/>
               </a:rPr>
               <a:t>softmax</a:t>
             </a:r>
@@ -6873,7 +7632,7 @@
                 <a:ea typeface="Lato Light"/>
                 <a:cs typeface="Lato Light"/>
               </a:rPr>
-              <a:t> function.</a:t>
+              <a:t> activation function.</a:t>
             </a:r>
           </a:p>
         </p:txBody>
@@ -6952,9 +7711,9 @@
                 <a:solidFill>
                   <a:srgbClr val="0170AD"/>
                 </a:solidFill>
-                <a:latin typeface="Lato Light"/>
-                <a:ea typeface="Lato Light"/>
-                <a:cs typeface="Lato Light"/>
+                <a:latin typeface="Lato Heavy" panose="020F0502020204030203" pitchFamily="34" charset="0"/>
+                <a:ea typeface="Lato Heavy" panose="020F0502020204030203" pitchFamily="34" charset="0"/>
+                <a:cs typeface="Lato Heavy" panose="020F0502020204030203" pitchFamily="34" charset="0"/>
               </a:rPr>
               <a:t>Training:</a:t>
             </a:r>
@@ -7006,7 +7765,29 @@
                 <a:ea typeface="Lato Light"/>
                 <a:cs typeface="Lato Light"/>
               </a:rPr>
-              <a:t> search, we used a grid search. We tried various numbers of LSTM and dropout layer pairs from 2 - 6, different dropout rates and learning rates.</a:t>
+              <a:t> search, we used a </a:t>
+            </a:r>
+            <a:r>
+              <a:rPr lang="en-US" sz="2400" b="1" dirty="0">
+                <a:solidFill>
+                  <a:srgbClr val="0170AD"/>
+                </a:solidFill>
+                <a:latin typeface="Lato Heavy" panose="020F0502020204030203" pitchFamily="34" charset="0"/>
+                <a:ea typeface="Lato Heavy" panose="020F0502020204030203" pitchFamily="34" charset="0"/>
+                <a:cs typeface="Lato Heavy" panose="020F0502020204030203" pitchFamily="34" charset="0"/>
+              </a:rPr>
+              <a:t>grid search</a:t>
+            </a:r>
+            <a:r>
+              <a:rPr lang="en-US" sz="2400" b="1" dirty="0">
+                <a:solidFill>
+                  <a:srgbClr val="0170AD"/>
+                </a:solidFill>
+                <a:latin typeface="Lato Light"/>
+                <a:ea typeface="Lato Light"/>
+                <a:cs typeface="Lato Light"/>
+              </a:rPr>
+              <a:t>. We tried various numbers of LSTM and dropout layer pairs from 2 - 6, different dropout rates and learning rates.</a:t>
             </a:r>
           </a:p>
           <a:p>
@@ -7034,7 +7815,29 @@
                 <a:ea typeface="Lato Light"/>
                 <a:cs typeface="Lato Light"/>
               </a:rPr>
-              <a:t>We used Adam as our optimizer.</a:t>
+              <a:t>We used </a:t>
+            </a:r>
+            <a:r>
+              <a:rPr lang="en-US" sz="2400" b="1" dirty="0">
+                <a:solidFill>
+                  <a:srgbClr val="0170AD"/>
+                </a:solidFill>
+                <a:latin typeface="Lato Heavy" panose="020F0502020204030203" pitchFamily="34" charset="0"/>
+                <a:ea typeface="Lato Heavy" panose="020F0502020204030203" pitchFamily="34" charset="0"/>
+                <a:cs typeface="Lato Heavy" panose="020F0502020204030203" pitchFamily="34" charset="0"/>
+              </a:rPr>
+              <a:t>Adam </a:t>
+            </a:r>
+            <a:r>
+              <a:rPr lang="en-US" sz="2400" b="1" dirty="0">
+                <a:solidFill>
+                  <a:srgbClr val="0170AD"/>
+                </a:solidFill>
+                <a:latin typeface="Lato Light"/>
+                <a:ea typeface="Lato Light"/>
+                <a:cs typeface="Lato Light"/>
+              </a:rPr>
+              <a:t>as our optimizer.</a:t>
             </a:r>
           </a:p>
           <a:p>
@@ -7062,7 +7865,29 @@
                 <a:ea typeface="Lato Light"/>
                 <a:cs typeface="Lato Light"/>
               </a:rPr>
-              <a:t>We used a categorical cross entropy loss.</a:t>
+              <a:t>We used a </a:t>
+            </a:r>
+            <a:r>
+              <a:rPr lang="en-US" sz="2400" b="1" dirty="0">
+                <a:solidFill>
+                  <a:srgbClr val="0170AD"/>
+                </a:solidFill>
+                <a:latin typeface="Lato Heavy" panose="020F0502020204030203" pitchFamily="34" charset="0"/>
+                <a:ea typeface="Lato Heavy" panose="020F0502020204030203" pitchFamily="34" charset="0"/>
+                <a:cs typeface="Lato Heavy" panose="020F0502020204030203" pitchFamily="34" charset="0"/>
+              </a:rPr>
+              <a:t>categorical cross entropy loss</a:t>
+            </a:r>
+            <a:r>
+              <a:rPr lang="en-US" sz="2400" b="1" dirty="0">
+                <a:solidFill>
+                  <a:srgbClr val="0170AD"/>
+                </a:solidFill>
+                <a:latin typeface="Lato Light"/>
+                <a:ea typeface="Lato Light"/>
+                <a:cs typeface="Lato Light"/>
+              </a:rPr>
+              <a:t>.</a:t>
             </a:r>
           </a:p>
           <a:p>
@@ -7118,7 +7943,29 @@
                 <a:ea typeface="Lato Light"/>
                 <a:cs typeface="Lato Light"/>
               </a:rPr>
-              <a:t>We used only xx% of the training set</a:t>
+              <a:t>We used only </a:t>
+            </a:r>
+            <a:r>
+              <a:rPr lang="en-US" sz="2400" b="1" dirty="0">
+                <a:solidFill>
+                  <a:srgbClr val="0170AD"/>
+                </a:solidFill>
+                <a:latin typeface="Lato Heavy" panose="020F0502020204030203" pitchFamily="34" charset="0"/>
+                <a:ea typeface="Lato Heavy" panose="020F0502020204030203" pitchFamily="34" charset="0"/>
+                <a:cs typeface="Lato Heavy" panose="020F0502020204030203" pitchFamily="34" charset="0"/>
+              </a:rPr>
+              <a:t>xx% of the training set</a:t>
+            </a:r>
+            <a:r>
+              <a:rPr lang="en-US" sz="2400" b="1" dirty="0">
+                <a:solidFill>
+                  <a:srgbClr val="0170AD"/>
+                </a:solidFill>
+                <a:latin typeface="Lato Light"/>
+                <a:ea typeface="Lato Light"/>
+                <a:cs typeface="Lato Light"/>
+              </a:rPr>
+              <a:t>.</a:t>
             </a:r>
           </a:p>
         </p:txBody>
@@ -7315,11 +8162,44 @@
                 <a:solidFill>
                   <a:srgbClr val="0170AD"/>
                 </a:solidFill>
-                <a:latin typeface="Lato Light"/>
-                <a:ea typeface="Lato Light"/>
-                <a:cs typeface="Lato Light"/>
-              </a:rPr>
-              <a:t>VGG16 is indeed great for prototyping and it was easier to achieve good results with it than with the Inception v3 architecture or the </a:t>
+                <a:latin typeface="Lato Heavy" panose="020F0502020204030203" pitchFamily="34" charset="0"/>
+                <a:ea typeface="Lato Heavy" panose="020F0502020204030203" pitchFamily="34" charset="0"/>
+                <a:cs typeface="Lato Heavy" panose="020F0502020204030203" pitchFamily="34" charset="0"/>
+              </a:rPr>
+              <a:t>VGG16</a:t>
+            </a:r>
+            <a:r>
+              <a:rPr lang="en-US" sz="2400" b="1" dirty="0">
+                <a:solidFill>
+                  <a:srgbClr val="0170AD"/>
+                </a:solidFill>
+                <a:latin typeface="Lato Light"/>
+                <a:ea typeface="Lato Light"/>
+                <a:cs typeface="Lato Light"/>
+              </a:rPr>
+              <a:t> is indeed </a:t>
+            </a:r>
+            <a:r>
+              <a:rPr lang="en-US" sz="2400" b="1" dirty="0">
+                <a:solidFill>
+                  <a:srgbClr val="0170AD"/>
+                </a:solidFill>
+                <a:latin typeface="Lato Heavy" panose="020F0502020204030203" pitchFamily="34" charset="0"/>
+                <a:ea typeface="Lato Heavy" panose="020F0502020204030203" pitchFamily="34" charset="0"/>
+                <a:cs typeface="Lato Heavy" panose="020F0502020204030203" pitchFamily="34" charset="0"/>
+              </a:rPr>
+              <a:t>great for prototyping </a:t>
+            </a:r>
+            <a:r>
+              <a:rPr lang="en-US" sz="2400" b="1" dirty="0">
+                <a:solidFill>
+                  <a:srgbClr val="0170AD"/>
+                </a:solidFill>
+                <a:latin typeface="Lato Light"/>
+                <a:ea typeface="Lato Light"/>
+                <a:cs typeface="Lato Light"/>
+              </a:rPr>
+              <a:t>and it was easier to achieve good results with it than with the Inception v3 architecture or the </a:t>
             </a:r>
             <a:r>
               <a:rPr lang="en-US" sz="2400" b="1" dirty="0" err="1">
@@ -7369,7 +8249,29 @@
                 <a:ea typeface="Lato Light"/>
                 <a:cs typeface="Lato Light"/>
               </a:rPr>
-              <a:t>Using bottlenecks can really speed up training. However, memory issues can occur and you have to fix them.</a:t>
+              <a:t>Using </a:t>
+            </a:r>
+            <a:r>
+              <a:rPr lang="en-US" sz="2400" b="1" dirty="0">
+                <a:solidFill>
+                  <a:srgbClr val="0170AD"/>
+                </a:solidFill>
+                <a:latin typeface="Lato Heavy" panose="020F0502020204030203" pitchFamily="34" charset="0"/>
+                <a:ea typeface="Lato Heavy" panose="020F0502020204030203" pitchFamily="34" charset="0"/>
+                <a:cs typeface="Lato Heavy" panose="020F0502020204030203" pitchFamily="34" charset="0"/>
+              </a:rPr>
+              <a:t>bottlenecks</a:t>
+            </a:r>
+            <a:r>
+              <a:rPr lang="en-US" sz="2400" b="1" dirty="0">
+                <a:solidFill>
+                  <a:srgbClr val="0170AD"/>
+                </a:solidFill>
+                <a:latin typeface="Lato Light"/>
+                <a:ea typeface="Lato Light"/>
+                <a:cs typeface="Lato Light"/>
+              </a:rPr>
+              <a:t> can really speed up training. However, memory issues can occur and you have to fix them.</a:t>
             </a:r>
           </a:p>
           <a:p>
@@ -7393,11 +8295,44 @@
                 <a:solidFill>
                   <a:srgbClr val="0170AD"/>
                 </a:solidFill>
-                <a:latin typeface="Lato Light"/>
-                <a:ea typeface="Lato Light"/>
-                <a:cs typeface="Lato Light"/>
-              </a:rPr>
-              <a:t>Batch size is important for training speed. We found out that a batch size of 16 works best for us when training an Inception v3 model on a K80.</a:t>
+                <a:latin typeface="Lato Heavy" panose="020F0502020204030203" pitchFamily="34" charset="0"/>
+                <a:ea typeface="Lato Heavy" panose="020F0502020204030203" pitchFamily="34" charset="0"/>
+                <a:cs typeface="Lato Heavy" panose="020F0502020204030203" pitchFamily="34" charset="0"/>
+              </a:rPr>
+              <a:t>Batch size </a:t>
+            </a:r>
+            <a:r>
+              <a:rPr lang="en-US" sz="2400" b="1" dirty="0">
+                <a:solidFill>
+                  <a:srgbClr val="0170AD"/>
+                </a:solidFill>
+                <a:latin typeface="Lato Light"/>
+                <a:ea typeface="Lato Light"/>
+                <a:cs typeface="Lato Light"/>
+              </a:rPr>
+              <a:t>is important for training speed. We found out that a batch size of </a:t>
+            </a:r>
+            <a:r>
+              <a:rPr lang="en-US" sz="2400" b="1" dirty="0">
+                <a:solidFill>
+                  <a:srgbClr val="0170AD"/>
+                </a:solidFill>
+                <a:latin typeface="Lato Heavy" panose="020F0502020204030203" pitchFamily="34" charset="0"/>
+                <a:ea typeface="Lato Heavy" panose="020F0502020204030203" pitchFamily="34" charset="0"/>
+                <a:cs typeface="Lato Heavy" panose="020F0502020204030203" pitchFamily="34" charset="0"/>
+              </a:rPr>
+              <a:t>16</a:t>
+            </a:r>
+            <a:r>
+              <a:rPr lang="en-US" sz="2400" b="1" dirty="0">
+                <a:solidFill>
+                  <a:srgbClr val="0170AD"/>
+                </a:solidFill>
+                <a:latin typeface="Lato Light"/>
+                <a:ea typeface="Lato Light"/>
+                <a:cs typeface="Lato Light"/>
+              </a:rPr>
+              <a:t> works best for us when training an Inception v3 model on a K80.</a:t>
             </a:r>
           </a:p>
           <a:p>
@@ -7440,13 +8375,13 @@
               </a:defRPr>
             </a:pPr>
             <a:r>
-              <a:rPr lang="en-US" sz="2400" b="1" dirty="0">
-                <a:solidFill>
-                  <a:srgbClr val="0170AD"/>
-                </a:solidFill>
-                <a:latin typeface="Lato Light"/>
-                <a:ea typeface="Lato Light"/>
-                <a:cs typeface="Lato Light"/>
+              <a:rPr lang="en-US" sz="2400" b="1" u="sng" dirty="0">
+                <a:solidFill>
+                  <a:srgbClr val="0170AD"/>
+                </a:solidFill>
+                <a:latin typeface="Lato Heavy" panose="020F0502020204030203" pitchFamily="34" charset="0"/>
+                <a:ea typeface="Lato Heavy" panose="020F0502020204030203" pitchFamily="34" charset="0"/>
+                <a:cs typeface="Lato Heavy" panose="020F0502020204030203" pitchFamily="34" charset="0"/>
               </a:rPr>
               <a:t>Ideas for improvement:</a:t>
             </a:r>
@@ -7476,7 +8411,29 @@
                 <a:ea typeface="Lato Light"/>
                 <a:cs typeface="Lato Light"/>
               </a:rPr>
-              <a:t>Using class weights to improve the balance of the photo dataset</a:t>
+              <a:t>Using </a:t>
+            </a:r>
+            <a:r>
+              <a:rPr lang="en-US" sz="2400" b="1" dirty="0">
+                <a:solidFill>
+                  <a:srgbClr val="0170AD"/>
+                </a:solidFill>
+                <a:latin typeface="Lato Heavy" panose="020F0502020204030203" pitchFamily="34" charset="0"/>
+                <a:ea typeface="Lato Heavy" panose="020F0502020204030203" pitchFamily="34" charset="0"/>
+                <a:cs typeface="Lato Heavy" panose="020F0502020204030203" pitchFamily="34" charset="0"/>
+              </a:rPr>
+              <a:t>class weights </a:t>
+            </a:r>
+            <a:r>
+              <a:rPr lang="en-US" sz="2400" b="1" dirty="0">
+                <a:solidFill>
+                  <a:srgbClr val="0170AD"/>
+                </a:solidFill>
+                <a:latin typeface="Lato Light"/>
+                <a:ea typeface="Lato Light"/>
+                <a:cs typeface="Lato Light"/>
+              </a:rPr>
+              <a:t>to improve the balance of the photo dataset</a:t>
             </a:r>
           </a:p>
           <a:p>
@@ -7504,7 +8461,29 @@
                 <a:ea typeface="Lato Light"/>
                 <a:cs typeface="Lato Light"/>
               </a:rPr>
-              <a:t>Filter out the few reviews which were written in other languages to further improve the RNN results.</a:t>
+              <a:t>Use the </a:t>
+            </a:r>
+            <a:r>
+              <a:rPr lang="en-US" sz="2400" b="1" dirty="0">
+                <a:solidFill>
+                  <a:srgbClr val="0170AD"/>
+                </a:solidFill>
+                <a:latin typeface="Lato Heavy" panose="020F0502020204030203" pitchFamily="34" charset="0"/>
+                <a:ea typeface="Lato Heavy" panose="020F0502020204030203" pitchFamily="34" charset="0"/>
+                <a:cs typeface="Lato Heavy" panose="020F0502020204030203" pitchFamily="34" charset="0"/>
+              </a:rPr>
+              <a:t>full datasets </a:t>
+            </a:r>
+            <a:r>
+              <a:rPr lang="en-US" sz="2400" b="1" dirty="0">
+                <a:solidFill>
+                  <a:srgbClr val="0170AD"/>
+                </a:solidFill>
+                <a:latin typeface="Lato Light"/>
+                <a:ea typeface="Lato Light"/>
+                <a:cs typeface="Lato Light"/>
+              </a:rPr>
+              <a:t>for the CNNs and the RNN.</a:t>
             </a:r>
           </a:p>
           <a:p>
@@ -7532,7 +8511,7 @@
                 <a:ea typeface="Lato Light"/>
                 <a:cs typeface="Lato Light"/>
               </a:rPr>
-              <a:t>Use better seed sequences for the RNN to write more convincing fake reviews. One idea would be to have not one but a few different seed sequences for every predicted label and then randomly choose one. Also, you could shuffle the order of the predictions for the labels, so that label 0 isn’t always the first sequence in a review.</a:t>
+              <a:t>Filter out the few reviews which were written in other languages to improve the RNN results.</a:t>
             </a:r>
           </a:p>
           <a:p>
@@ -7560,7 +8539,29 @@
                 <a:ea typeface="Lato Light"/>
                 <a:cs typeface="Lato Light"/>
               </a:rPr>
-              <a:t>Use a GAN to conditional generate text based on the predicated labels to write more natural sounding fake reviews.</a:t>
+              <a:t>Use </a:t>
+            </a:r>
+            <a:r>
+              <a:rPr lang="en-US" sz="2400" b="1" dirty="0">
+                <a:solidFill>
+                  <a:srgbClr val="0170AD"/>
+                </a:solidFill>
+                <a:latin typeface="Lato Heavy" panose="020F0502020204030203" pitchFamily="34" charset="0"/>
+                <a:ea typeface="Lato Heavy" panose="020F0502020204030203" pitchFamily="34" charset="0"/>
+                <a:cs typeface="Lato Heavy" panose="020F0502020204030203" pitchFamily="34" charset="0"/>
+              </a:rPr>
+              <a:t>better seed sequences </a:t>
+            </a:r>
+            <a:r>
+              <a:rPr lang="en-US" sz="2400" b="1" dirty="0">
+                <a:solidFill>
+                  <a:srgbClr val="0170AD"/>
+                </a:solidFill>
+                <a:latin typeface="Lato Light"/>
+                <a:ea typeface="Lato Light"/>
+                <a:cs typeface="Lato Light"/>
+              </a:rPr>
+              <a:t>for the RNN to write more convincing fake reviews. One idea would be to have not one but a few different seed sequences for every predicted label and then randomly choose one. Also, you could shuffle the order of the predictions for the labels, so that label 0 isn’t always the first sequence in a review.</a:t>
             </a:r>
           </a:p>
           <a:p>
@@ -7588,74 +8589,41 @@
                 <a:ea typeface="Lato Light"/>
                 <a:cs typeface="Lato Light"/>
               </a:rPr>
-              <a:t>(Use a more advanced approach for the multi-instance approach of this problem)</a:t>
-            </a:r>
-          </a:p>
-        </p:txBody>
-      </p:sp>
-      <p:sp>
-        <p:nvSpPr>
-          <p:cNvPr id="43" name="Shape 188">
-            <a:extLst>
-              <a:ext uri="{FF2B5EF4-FFF2-40B4-BE49-F238E27FC236}">
-                <a16:creationId xmlns:a16="http://schemas.microsoft.com/office/drawing/2014/main" id="{E78896CC-B658-A14F-808C-9425E898FCBA}"/>
-              </a:ext>
-            </a:extLst>
-          </p:cNvPr>
-          <p:cNvSpPr/>
-          <p:nvPr/>
-        </p:nvSpPr>
-        <p:spPr>
-          <a:xfrm>
-            <a:off x="919341" y="27823326"/>
-            <a:ext cx="9204371" cy="1551001"/>
-          </a:xfrm>
-          <a:prstGeom prst="rect">
-            <a:avLst/>
-          </a:prstGeom>
-          <a:noFill/>
-          <a:ln w="12700" cap="flat">
-            <a:noFill/>
-            <a:miter lim="400000"/>
-          </a:ln>
-          <a:effectLst/>
-          <a:extLst>
-            <a:ext uri="{C572A759-6A51-4108-AA02-DFA0A04FC94B}">
-              <ma14:wrappingTextBoxFlag xmlns="" xmlns:ma14="http://schemas.microsoft.com/office/mac/drawingml/2011/main" val="1"/>
-            </a:ext>
-          </a:extLst>
-        </p:spPr>
-        <p:txBody>
-          <a:bodyPr wrap="square" lIns="0" tIns="0" rIns="0" bIns="0" numCol="1" anchor="t">
-            <a:noAutofit/>
-          </a:bodyPr>
-          <a:lstStyle>
-            <a:lvl1pPr algn="l" defTabSz="584200">
-              <a:lnSpc>
-                <a:spcPct val="110000"/>
-              </a:lnSpc>
-              <a:spcBef>
-                <a:spcPts val="3000"/>
-              </a:spcBef>
-              <a:defRPr sz="2000">
-                <a:solidFill>
-                  <a:srgbClr val="4C4C4C"/>
-                </a:solidFill>
-                <a:latin typeface="Helvetica Neue Light"/>
-                <a:ea typeface="Helvetica Neue Light"/>
-                <a:cs typeface="Helvetica Neue Light"/>
-                <a:sym typeface="Helvetica Neue Light"/>
-              </a:defRPr>
-            </a:lvl1pPr>
-          </a:lstStyle>
-          <a:p>
-            <a:pPr lvl="0" algn="just">
+              <a:t>Use a </a:t>
+            </a:r>
+            <a:r>
+              <a:rPr lang="en-US" sz="2400" b="1" dirty="0">
+                <a:solidFill>
+                  <a:srgbClr val="0170AD"/>
+                </a:solidFill>
+                <a:latin typeface="Lato Heavy" panose="020F0502020204030203" pitchFamily="34" charset="0"/>
+                <a:ea typeface="Lato Heavy" panose="020F0502020204030203" pitchFamily="34" charset="0"/>
+                <a:cs typeface="Lato Heavy" panose="020F0502020204030203" pitchFamily="34" charset="0"/>
+              </a:rPr>
+              <a:t>GAN to conditional generate text </a:t>
+            </a:r>
+            <a:r>
+              <a:rPr lang="en-US" sz="2400" b="1" dirty="0">
+                <a:solidFill>
+                  <a:srgbClr val="0170AD"/>
+                </a:solidFill>
+                <a:latin typeface="Lato Light"/>
+                <a:ea typeface="Lato Light"/>
+                <a:cs typeface="Lato Light"/>
+              </a:rPr>
+              <a:t>based on the predicated labels to write more natural sounding fake reviews.</a:t>
+            </a:r>
+          </a:p>
+          <a:p>
+            <a:pPr marL="342900" lvl="0" indent="-342900" algn="just">
               <a:lnSpc>
                 <a:spcPct val="100000"/>
               </a:lnSpc>
               <a:spcBef>
                 <a:spcPts val="0"/>
               </a:spcBef>
+              <a:buFont typeface="Arial" panose="020B0604020202020204" pitchFamily="34" charset="0"/>
+              <a:buChar char="•"/>
               <a:defRPr sz="1800">
                 <a:solidFill>
                   <a:srgbClr val="000000"/>
@@ -7663,35 +8631,16 @@
               </a:defRPr>
             </a:pPr>
             <a:r>
-              <a:rPr lang="en-US" sz="2400" b="1" u="sng" dirty="0" err="1">
-                <a:solidFill>
-                  <a:srgbClr val="0170AD"/>
-                </a:solidFill>
-                <a:latin typeface="Lato Light"/>
-                <a:ea typeface="Lato Light"/>
-                <a:cs typeface="Lato Light"/>
-              </a:rPr>
-              <a:t>Haydar</a:t>
-            </a:r>
-            <a:r>
-              <a:rPr lang="en-US" sz="2400" b="1" u="sng" dirty="0">
-                <a:solidFill>
-                  <a:srgbClr val="0170AD"/>
-                </a:solidFill>
-                <a:latin typeface="Lato Light"/>
-                <a:ea typeface="Lato Light"/>
-                <a:cs typeface="Lato Light"/>
-              </a:rPr>
-              <a:t> can you please add under architecture how you have done the classification on the business level??</a:t>
-            </a:r>
-            <a:endParaRPr lang="en-US" sz="2400" b="1" dirty="0">
-              <a:solidFill>
-                <a:srgbClr val="0170AD"/>
-              </a:solidFill>
-              <a:latin typeface="Lato Light"/>
-              <a:ea typeface="Lato Light"/>
-              <a:cs typeface="Lato Light"/>
-            </a:endParaRPr>
+              <a:rPr lang="en-US" sz="2400" b="1" dirty="0">
+                <a:solidFill>
+                  <a:srgbClr val="0170AD"/>
+                </a:solidFill>
+                <a:latin typeface="Lato Light"/>
+                <a:ea typeface="Lato Light"/>
+                <a:cs typeface="Lato Light"/>
+              </a:rPr>
+              <a:t>(Use a more advanced approach for the multi-instance approach of this problem)</a:t>
+            </a:r>
           </a:p>
         </p:txBody>
       </p:sp>
@@ -8418,9 +9367,9 @@
                 <a:solidFill>
                   <a:srgbClr val="0170AD"/>
                 </a:solidFill>
-                <a:latin typeface="Lato Light"/>
-                <a:ea typeface="Lato Light"/>
-                <a:cs typeface="Lato Light"/>
+                <a:latin typeface="Lato Heavy" panose="020F0502020204030203" pitchFamily="34" charset="0"/>
+                <a:ea typeface="Lato Heavy" panose="020F0502020204030203" pitchFamily="34" charset="0"/>
+                <a:cs typeface="Lato Heavy" panose="020F0502020204030203" pitchFamily="34" charset="0"/>
               </a:rPr>
               <a:t>CNN - Photo Classification:</a:t>
             </a:r>
@@ -8446,11 +9395,33 @@
                 <a:solidFill>
                   <a:srgbClr val="0170AD"/>
                 </a:solidFill>
-                <a:latin typeface="Lato Light"/>
-                <a:ea typeface="Lato Light"/>
-                <a:cs typeface="Lato Light"/>
-              </a:rPr>
-              <a:t>Our best F1-score: 0.xx</a:t>
+                <a:latin typeface="Lato Heavy" panose="020F0502020204030203" pitchFamily="34" charset="0"/>
+                <a:ea typeface="Lato Heavy" panose="020F0502020204030203" pitchFamily="34" charset="0"/>
+                <a:cs typeface="Lato Heavy" panose="020F0502020204030203" pitchFamily="34" charset="0"/>
+              </a:rPr>
+              <a:t>Our</a:t>
+            </a:r>
+            <a:r>
+              <a:rPr lang="en-US" sz="2400" b="1" dirty="0">
+                <a:solidFill>
+                  <a:srgbClr val="0170AD"/>
+                </a:solidFill>
+                <a:latin typeface="Lato Light"/>
+                <a:ea typeface="Lato Light"/>
+                <a:cs typeface="Lato Light"/>
+              </a:rPr>
+              <a:t> best F1-score: </a:t>
+            </a:r>
+            <a:r>
+              <a:rPr lang="en-US" sz="2400" b="1" dirty="0">
+                <a:solidFill>
+                  <a:srgbClr val="0170AD"/>
+                </a:solidFill>
+                <a:latin typeface="Lato Heavy" panose="020F0502020204030203" pitchFamily="34" charset="0"/>
+                <a:ea typeface="Lato Heavy" panose="020F0502020204030203" pitchFamily="34" charset="0"/>
+                <a:cs typeface="Lato Heavy" panose="020F0502020204030203" pitchFamily="34" charset="0"/>
+              </a:rPr>
+              <a:t>0.xx</a:t>
             </a:r>
           </a:p>
           <a:p>
@@ -8474,11 +9445,44 @@
                 <a:solidFill>
                   <a:srgbClr val="0170AD"/>
                 </a:solidFill>
-                <a:latin typeface="Lato Light"/>
-                <a:ea typeface="Lato Light"/>
-                <a:cs typeface="Lato Light"/>
-              </a:rPr>
-              <a:t>Winner F1-score: 0.83 , we are place xxx of xxx</a:t>
+                <a:latin typeface="Lato Heavy" panose="020F0502020204030203" pitchFamily="34" charset="0"/>
+                <a:ea typeface="Lato Heavy" panose="020F0502020204030203" pitchFamily="34" charset="0"/>
+                <a:cs typeface="Lato Heavy" panose="020F0502020204030203" pitchFamily="34" charset="0"/>
+              </a:rPr>
+              <a:t>Winner </a:t>
+            </a:r>
+            <a:r>
+              <a:rPr lang="en-US" sz="2400" b="1" dirty="0">
+                <a:solidFill>
+                  <a:srgbClr val="0170AD"/>
+                </a:solidFill>
+                <a:latin typeface="Lato Light"/>
+                <a:ea typeface="Lato Light"/>
+                <a:cs typeface="Lato Light"/>
+              </a:rPr>
+              <a:t>F1-score: </a:t>
+            </a:r>
+            <a:r>
+              <a:rPr lang="en-US" sz="2400" b="1" dirty="0">
+                <a:solidFill>
+                  <a:srgbClr val="0170AD"/>
+                </a:solidFill>
+                <a:latin typeface="Lato Heavy" panose="020F0502020204030203" pitchFamily="34" charset="0"/>
+                <a:ea typeface="Lato Heavy" panose="020F0502020204030203" pitchFamily="34" charset="0"/>
+                <a:cs typeface="Lato Heavy" panose="020F0502020204030203" pitchFamily="34" charset="0"/>
+              </a:rPr>
+              <a:t>0.83</a:t>
+            </a:r>
+            <a:r>
+              <a:rPr lang="en-US" sz="2400" b="1" dirty="0">
+                <a:solidFill>
+                  <a:srgbClr val="0170AD"/>
+                </a:solidFill>
+                <a:latin typeface="Lato Light"/>
+                <a:ea typeface="Lato Light"/>
+                <a:cs typeface="Lato Light"/>
+              </a:rPr>
+              <a:t> , we are place xxx of xxx</a:t>
             </a:r>
           </a:p>
           <a:p>
@@ -8502,9 +9506,9 @@
                 <a:solidFill>
                   <a:srgbClr val="0170AD"/>
                 </a:solidFill>
-                <a:latin typeface="Lato Light"/>
-                <a:ea typeface="Lato Light"/>
-                <a:cs typeface="Lato Light"/>
+                <a:latin typeface="Lato Heavy" panose="020F0502020204030203" pitchFamily="34" charset="0"/>
+                <a:ea typeface="Lato Heavy" panose="020F0502020204030203" pitchFamily="34" charset="0"/>
+                <a:cs typeface="Lato Heavy" panose="020F0502020204030203" pitchFamily="34" charset="0"/>
               </a:rPr>
               <a:t>Inception v3 vs </a:t>
             </a:r>
@@ -8513,9 +9517,9 @@
                 <a:solidFill>
                   <a:srgbClr val="0170AD"/>
                 </a:solidFill>
-                <a:latin typeface="Lato Light"/>
-                <a:ea typeface="Lato Light"/>
-                <a:cs typeface="Lato Light"/>
+                <a:latin typeface="Lato Heavy" panose="020F0502020204030203" pitchFamily="34" charset="0"/>
+                <a:ea typeface="Lato Heavy" panose="020F0502020204030203" pitchFamily="34" charset="0"/>
+                <a:cs typeface="Lato Heavy" panose="020F0502020204030203" pitchFamily="34" charset="0"/>
               </a:rPr>
               <a:t>Xception</a:t>
             </a:r>
@@ -8528,7 +9532,29 @@
                 <a:ea typeface="Lato Light"/>
                 <a:cs typeface="Lato Light"/>
               </a:rPr>
-              <a:t>: In our case, both performed quite similar. Further research is necessary to find out if one of the architectures platoons as we are getting closer to a 0.83 score</a:t>
+              <a:t>: In our case, </a:t>
+            </a:r>
+            <a:r>
+              <a:rPr lang="en-US" sz="2400" b="1" dirty="0">
+                <a:solidFill>
+                  <a:srgbClr val="0170AD"/>
+                </a:solidFill>
+                <a:latin typeface="Lato Heavy" panose="020F0502020204030203" pitchFamily="34" charset="0"/>
+                <a:ea typeface="Lato Heavy" panose="020F0502020204030203" pitchFamily="34" charset="0"/>
+                <a:cs typeface="Lato Heavy" panose="020F0502020204030203" pitchFamily="34" charset="0"/>
+              </a:rPr>
+              <a:t>both performed quite similar</a:t>
+            </a:r>
+            <a:r>
+              <a:rPr lang="en-US" sz="2400" b="1" dirty="0">
+                <a:solidFill>
+                  <a:srgbClr val="0170AD"/>
+                </a:solidFill>
+                <a:latin typeface="Lato Light"/>
+                <a:ea typeface="Lato Light"/>
+                <a:cs typeface="Lato Light"/>
+              </a:rPr>
+              <a:t>. Further research is necessary to find out if one of the architectures platoons as we are getting closer to a 0.83 score</a:t>
             </a:r>
           </a:p>
           <a:p>
@@ -8557,7 +9583,7 @@
             </a:endParaRPr>
           </a:p>
           <a:p>
-            <a:pPr lvl="0" algn="just">
+            <a:pPr algn="just">
               <a:lnSpc>
                 <a:spcPct val="100000"/>
               </a:lnSpc>
@@ -8575,9 +9601,9 @@
                 <a:solidFill>
                   <a:srgbClr val="0170AD"/>
                 </a:solidFill>
-                <a:latin typeface="Lato Light"/>
-                <a:ea typeface="Lato Light"/>
-                <a:cs typeface="Lato Light"/>
+                <a:latin typeface="Lato Heavy" panose="020F0502020204030203" pitchFamily="34" charset="0"/>
+                <a:ea typeface="Lato Heavy" panose="020F0502020204030203" pitchFamily="34" charset="0"/>
+                <a:cs typeface="Lato Heavy" panose="020F0502020204030203" pitchFamily="34" charset="0"/>
               </a:rPr>
               <a:t>RNN – Fake Review Generation:</a:t>
             </a:r>
@@ -8636,6 +9662,2199 @@
                 <a:cs typeface="Lato Light"/>
               </a:rPr>
               <a:t>Xx of our fake reviews were considered to be real and xx of the real reviews were considered to be real.</a:t>
+            </a:r>
+          </a:p>
+        </p:txBody>
+      </p:sp>
+      <p:sp>
+        <p:nvSpPr>
+          <p:cNvPr id="58" name="Shape 188">
+            <a:extLst>
+              <a:ext uri="{FF2B5EF4-FFF2-40B4-BE49-F238E27FC236}">
+                <a16:creationId xmlns:a16="http://schemas.microsoft.com/office/drawing/2014/main" id="{8B05589E-1A5D-F24E-983A-9D0A69151D66}"/>
+              </a:ext>
+            </a:extLst>
+          </p:cNvPr>
+          <p:cNvSpPr/>
+          <p:nvPr/>
+        </p:nvSpPr>
+        <p:spPr>
+          <a:xfrm>
+            <a:off x="21525787" y="22901101"/>
+            <a:ext cx="3755777" cy="584576"/>
+          </a:xfrm>
+          <a:prstGeom prst="rect">
+            <a:avLst/>
+          </a:prstGeom>
+          <a:noFill/>
+          <a:ln w="12700" cap="flat">
+            <a:noFill/>
+            <a:miter lim="400000"/>
+          </a:ln>
+          <a:effectLst/>
+          <a:extLst>
+            <a:ext uri="{C572A759-6A51-4108-AA02-DFA0A04FC94B}">
+              <ma14:wrappingTextBoxFlag xmlns="" xmlns:ma14="http://schemas.microsoft.com/office/mac/drawingml/2011/main" val="1"/>
+            </a:ext>
+          </a:extLst>
+        </p:spPr>
+        <p:txBody>
+          <a:bodyPr wrap="square" lIns="0" tIns="0" rIns="0" bIns="0" numCol="1" anchor="t">
+            <a:noAutofit/>
+          </a:bodyPr>
+          <a:lstStyle>
+            <a:lvl1pPr algn="l" defTabSz="584200">
+              <a:lnSpc>
+                <a:spcPct val="110000"/>
+              </a:lnSpc>
+              <a:spcBef>
+                <a:spcPts val="3000"/>
+              </a:spcBef>
+              <a:defRPr sz="2000">
+                <a:solidFill>
+                  <a:srgbClr val="4C4C4C"/>
+                </a:solidFill>
+                <a:latin typeface="Helvetica Neue Light"/>
+                <a:ea typeface="Helvetica Neue Light"/>
+                <a:cs typeface="Helvetica Neue Light"/>
+                <a:sym typeface="Helvetica Neue Light"/>
+              </a:defRPr>
+            </a:lvl1pPr>
+          </a:lstStyle>
+          <a:p>
+            <a:pPr lvl="0" algn="ctr">
+              <a:lnSpc>
+                <a:spcPct val="100000"/>
+              </a:lnSpc>
+              <a:defRPr sz="1800">
+                <a:solidFill>
+                  <a:srgbClr val="000000"/>
+                </a:solidFill>
+              </a:defRPr>
+            </a:pPr>
+            <a:r>
+              <a:rPr lang="en-US" sz="2400" b="1" dirty="0">
+                <a:solidFill>
+                  <a:srgbClr val="0170AD"/>
+                </a:solidFill>
+                <a:latin typeface="Lato Light"/>
+                <a:ea typeface="Lato Light"/>
+                <a:cs typeface="Lato Light"/>
+              </a:rPr>
+              <a:t>Picture 1 results</a:t>
+            </a:r>
+          </a:p>
+        </p:txBody>
+      </p:sp>
+      <p:sp>
+        <p:nvSpPr>
+          <p:cNvPr id="59" name="Shape 188">
+            <a:extLst>
+              <a:ext uri="{FF2B5EF4-FFF2-40B4-BE49-F238E27FC236}">
+                <a16:creationId xmlns:a16="http://schemas.microsoft.com/office/drawing/2014/main" id="{75F723E7-1E37-DC45-875A-1C59A812E122}"/>
+              </a:ext>
+            </a:extLst>
+          </p:cNvPr>
+          <p:cNvSpPr/>
+          <p:nvPr/>
+        </p:nvSpPr>
+        <p:spPr>
+          <a:xfrm>
+            <a:off x="26506190" y="22901101"/>
+            <a:ext cx="3755777" cy="584576"/>
+          </a:xfrm>
+          <a:prstGeom prst="rect">
+            <a:avLst/>
+          </a:prstGeom>
+          <a:noFill/>
+          <a:ln w="12700" cap="flat">
+            <a:noFill/>
+            <a:miter lim="400000"/>
+          </a:ln>
+          <a:effectLst/>
+          <a:extLst>
+            <a:ext uri="{C572A759-6A51-4108-AA02-DFA0A04FC94B}">
+              <ma14:wrappingTextBoxFlag xmlns="" xmlns:ma14="http://schemas.microsoft.com/office/mac/drawingml/2011/main" val="1"/>
+            </a:ext>
+          </a:extLst>
+        </p:spPr>
+        <p:txBody>
+          <a:bodyPr wrap="square" lIns="0" tIns="0" rIns="0" bIns="0" numCol="1" anchor="t">
+            <a:noAutofit/>
+          </a:bodyPr>
+          <a:lstStyle>
+            <a:lvl1pPr algn="l" defTabSz="584200">
+              <a:lnSpc>
+                <a:spcPct val="110000"/>
+              </a:lnSpc>
+              <a:spcBef>
+                <a:spcPts val="3000"/>
+              </a:spcBef>
+              <a:defRPr sz="2000">
+                <a:solidFill>
+                  <a:srgbClr val="4C4C4C"/>
+                </a:solidFill>
+                <a:latin typeface="Helvetica Neue Light"/>
+                <a:ea typeface="Helvetica Neue Light"/>
+                <a:cs typeface="Helvetica Neue Light"/>
+                <a:sym typeface="Helvetica Neue Light"/>
+              </a:defRPr>
+            </a:lvl1pPr>
+          </a:lstStyle>
+          <a:p>
+            <a:pPr lvl="0" algn="ctr">
+              <a:lnSpc>
+                <a:spcPct val="100000"/>
+              </a:lnSpc>
+              <a:defRPr sz="1800">
+                <a:solidFill>
+                  <a:srgbClr val="000000"/>
+                </a:solidFill>
+              </a:defRPr>
+            </a:pPr>
+            <a:r>
+              <a:rPr lang="en-US" sz="2400" b="1" dirty="0">
+                <a:solidFill>
+                  <a:srgbClr val="0170AD"/>
+                </a:solidFill>
+                <a:latin typeface="Lato Light"/>
+                <a:ea typeface="Lato Light"/>
+                <a:cs typeface="Lato Light"/>
+              </a:rPr>
+              <a:t>Picture 2 results</a:t>
+            </a:r>
+          </a:p>
+        </p:txBody>
+      </p:sp>
+      <p:sp>
+        <p:nvSpPr>
+          <p:cNvPr id="60" name="Shape 188">
+            <a:extLst>
+              <a:ext uri="{FF2B5EF4-FFF2-40B4-BE49-F238E27FC236}">
+                <a16:creationId xmlns:a16="http://schemas.microsoft.com/office/drawing/2014/main" id="{379B8735-60FE-124C-A800-9DB5DB622068}"/>
+              </a:ext>
+            </a:extLst>
+          </p:cNvPr>
+          <p:cNvSpPr/>
+          <p:nvPr/>
+        </p:nvSpPr>
+        <p:spPr>
+          <a:xfrm>
+            <a:off x="21705078" y="24131659"/>
+            <a:ext cx="9901058" cy="5158681"/>
+          </a:xfrm>
+          <a:prstGeom prst="rect">
+            <a:avLst/>
+          </a:prstGeom>
+          <a:noFill/>
+          <a:ln w="12700" cap="flat">
+            <a:noFill/>
+            <a:miter lim="400000"/>
+          </a:ln>
+          <a:effectLst/>
+          <a:extLst>
+            <a:ext uri="{C572A759-6A51-4108-AA02-DFA0A04FC94B}">
+              <ma14:wrappingTextBoxFlag xmlns="" xmlns:ma14="http://schemas.microsoft.com/office/mac/drawingml/2011/main" val="1"/>
+            </a:ext>
+          </a:extLst>
+        </p:spPr>
+        <p:txBody>
+          <a:bodyPr wrap="square" lIns="0" tIns="0" rIns="0" bIns="0" numCol="1" anchor="t">
+            <a:noAutofit/>
+          </a:bodyPr>
+          <a:lstStyle>
+            <a:lvl1pPr algn="l" defTabSz="584200">
+              <a:lnSpc>
+                <a:spcPct val="110000"/>
+              </a:lnSpc>
+              <a:spcBef>
+                <a:spcPts val="3000"/>
+              </a:spcBef>
+              <a:defRPr sz="2000">
+                <a:solidFill>
+                  <a:srgbClr val="4C4C4C"/>
+                </a:solidFill>
+                <a:latin typeface="Helvetica Neue Light"/>
+                <a:ea typeface="Helvetica Neue Light"/>
+                <a:cs typeface="Helvetica Neue Light"/>
+                <a:sym typeface="Helvetica Neue Light"/>
+              </a:defRPr>
+            </a:lvl1pPr>
+          </a:lstStyle>
+          <a:p>
+            <a:pPr lvl="0" algn="just">
+              <a:lnSpc>
+                <a:spcPct val="100000"/>
+              </a:lnSpc>
+              <a:spcBef>
+                <a:spcPts val="0"/>
+              </a:spcBef>
+              <a:defRPr sz="1800">
+                <a:solidFill>
+                  <a:srgbClr val="000000"/>
+                </a:solidFill>
+              </a:defRPr>
+            </a:pPr>
+            <a:r>
+              <a:rPr lang="en-US" sz="2400" b="1" i="1" dirty="0">
+                <a:solidFill>
+                  <a:srgbClr val="0170AD"/>
+                </a:solidFill>
+                <a:latin typeface="Lato Light"/>
+                <a:ea typeface="Lato Light"/>
+                <a:cs typeface="Lato Light"/>
+              </a:rPr>
+              <a:t>"</a:t>
+            </a:r>
+            <a:r>
+              <a:rPr lang="en-US" sz="2400" b="1" i="1" dirty="0" err="1">
+                <a:solidFill>
+                  <a:srgbClr val="0170AD"/>
+                </a:solidFill>
+                <a:latin typeface="Lato Light"/>
+                <a:ea typeface="Lato Light"/>
+                <a:cs typeface="Lato Light"/>
+              </a:rPr>
+              <a:t>Th</a:t>
+            </a:r>
+            <a:r>
+              <a:rPr lang="en-US" sz="2400" b="1" i="1" dirty="0">
+                <a:solidFill>
+                  <a:srgbClr val="0170AD"/>
+                </a:solidFill>
+                <a:latin typeface="Lato Light"/>
+                <a:ea typeface="Lato Light"/>
+                <a:cs typeface="Lato Light"/>
+              </a:rPr>
+              <a:t> </a:t>
+            </a:r>
+            <a:r>
+              <a:rPr lang="en-US" sz="2400" b="1" i="1" dirty="0" err="1">
+                <a:solidFill>
+                  <a:srgbClr val="0170AD"/>
+                </a:solidFill>
+                <a:latin typeface="Lato Light"/>
+                <a:ea typeface="Lato Light"/>
+                <a:cs typeface="Lato Light"/>
+              </a:rPr>
+              <a:t>tae</a:t>
+            </a:r>
+            <a:r>
+              <a:rPr lang="en-US" sz="2400" b="1" i="1" dirty="0">
+                <a:solidFill>
+                  <a:srgbClr val="0170AD"/>
+                </a:solidFill>
+                <a:latin typeface="Lato Light"/>
+                <a:ea typeface="Lato Light"/>
+                <a:cs typeface="Lato Light"/>
+              </a:rPr>
+              <a:t> toe to the </a:t>
+            </a:r>
+            <a:r>
+              <a:rPr lang="en-US" sz="2400" b="1" i="1" dirty="0" err="1">
+                <a:solidFill>
+                  <a:srgbClr val="0170AD"/>
+                </a:solidFill>
+                <a:latin typeface="Lato Light"/>
+                <a:ea typeface="Lato Light"/>
+                <a:cs typeface="Lato Light"/>
+              </a:rPr>
+              <a:t>soee</a:t>
+            </a:r>
+            <a:r>
+              <a:rPr lang="en-US" sz="2400" b="1" i="1" dirty="0">
+                <a:solidFill>
+                  <a:srgbClr val="0170AD"/>
+                </a:solidFill>
+                <a:latin typeface="Lato Light"/>
+                <a:ea typeface="Lato Light"/>
+                <a:cs typeface="Lato Light"/>
+              </a:rPr>
+              <a:t> to the </a:t>
+            </a:r>
+            <a:r>
+              <a:rPr lang="en-US" sz="2400" b="1" i="1" dirty="0" err="1">
+                <a:solidFill>
+                  <a:srgbClr val="0170AD"/>
+                </a:solidFill>
+                <a:latin typeface="Lato Light"/>
+                <a:ea typeface="Lato Light"/>
+                <a:cs typeface="Lato Light"/>
+              </a:rPr>
+              <a:t>soe</a:t>
+            </a:r>
+            <a:r>
+              <a:rPr lang="en-US" sz="2400" b="1" i="1" dirty="0">
+                <a:solidFill>
+                  <a:srgbClr val="0170AD"/>
+                </a:solidFill>
+                <a:latin typeface="Lato Light"/>
+                <a:ea typeface="Lato Light"/>
+                <a:cs typeface="Lato Light"/>
+              </a:rPr>
+              <a:t> to the </a:t>
+            </a:r>
+            <a:r>
+              <a:rPr lang="en-US" sz="2400" b="1" i="1" dirty="0" err="1">
+                <a:solidFill>
+                  <a:srgbClr val="0170AD"/>
+                </a:solidFill>
+                <a:latin typeface="Lato Light"/>
+                <a:ea typeface="Lato Light"/>
+                <a:cs typeface="Lato Light"/>
+              </a:rPr>
+              <a:t>soee</a:t>
+            </a:r>
+            <a:r>
+              <a:rPr lang="en-US" sz="2400" b="1" i="1" dirty="0">
+                <a:solidFill>
+                  <a:srgbClr val="0170AD"/>
+                </a:solidFill>
+                <a:latin typeface="Lato Light"/>
+                <a:ea typeface="Lato Light"/>
+                <a:cs typeface="Lato Light"/>
+              </a:rPr>
+              <a:t> to the </a:t>
+            </a:r>
+            <a:r>
+              <a:rPr lang="en-US" sz="2400" b="1" i="1" dirty="0" err="1">
+                <a:solidFill>
+                  <a:srgbClr val="0170AD"/>
+                </a:solidFill>
+                <a:latin typeface="Lato Light"/>
+                <a:ea typeface="Lato Light"/>
+                <a:cs typeface="Lato Light"/>
+              </a:rPr>
+              <a:t>soee</a:t>
+            </a:r>
+            <a:r>
+              <a:rPr lang="en-US" sz="2400" b="1" i="1" dirty="0">
+                <a:solidFill>
+                  <a:srgbClr val="0170AD"/>
+                </a:solidFill>
+                <a:latin typeface="Lato Light"/>
+                <a:ea typeface="Lato Light"/>
+                <a:cs typeface="Lato Light"/>
+              </a:rPr>
+              <a:t> to the </a:t>
+            </a:r>
+            <a:r>
+              <a:rPr lang="en-US" sz="2400" b="1" i="1" dirty="0" err="1">
+                <a:solidFill>
+                  <a:srgbClr val="0170AD"/>
+                </a:solidFill>
+                <a:latin typeface="Lato Light"/>
+                <a:ea typeface="Lato Light"/>
+                <a:cs typeface="Lato Light"/>
+              </a:rPr>
+              <a:t>soee</a:t>
+            </a:r>
+            <a:r>
+              <a:rPr lang="en-US" sz="2400" b="1" i="1" dirty="0">
+                <a:solidFill>
+                  <a:srgbClr val="0170AD"/>
+                </a:solidFill>
+                <a:latin typeface="Lato Light"/>
+                <a:ea typeface="Lato Light"/>
+                <a:cs typeface="Lato Light"/>
+              </a:rPr>
+              <a:t> to the </a:t>
+            </a:r>
+            <a:r>
+              <a:rPr lang="en-US" sz="2400" b="1" i="1" dirty="0" err="1">
+                <a:solidFill>
+                  <a:srgbClr val="0170AD"/>
+                </a:solidFill>
+                <a:latin typeface="Lato Light"/>
+                <a:ea typeface="Lato Light"/>
+                <a:cs typeface="Lato Light"/>
+              </a:rPr>
+              <a:t>soee</a:t>
+            </a:r>
+            <a:r>
+              <a:rPr lang="en-US" sz="2400" b="1" i="1" dirty="0">
+                <a:solidFill>
+                  <a:srgbClr val="0170AD"/>
+                </a:solidFill>
+                <a:latin typeface="Lato Light"/>
+                <a:ea typeface="Lato Light"/>
+                <a:cs typeface="Lato Light"/>
+              </a:rPr>
+              <a:t> to the </a:t>
+            </a:r>
+            <a:r>
+              <a:rPr lang="en-US" sz="2400" b="1" i="1" dirty="0" err="1">
+                <a:solidFill>
+                  <a:srgbClr val="0170AD"/>
+                </a:solidFill>
+                <a:latin typeface="Lato Light"/>
+                <a:ea typeface="Lato Light"/>
+                <a:cs typeface="Lato Light"/>
+              </a:rPr>
+              <a:t>soee</a:t>
+            </a:r>
+            <a:r>
+              <a:rPr lang="en-US" sz="2400" b="1" i="1" dirty="0">
+                <a:solidFill>
+                  <a:srgbClr val="0170AD"/>
+                </a:solidFill>
+                <a:latin typeface="Lato Light"/>
+                <a:ea typeface="Lato Light"/>
+                <a:cs typeface="Lato Light"/>
+              </a:rPr>
+              <a:t> to the </a:t>
+            </a:r>
+            <a:r>
+              <a:rPr lang="en-US" sz="2400" b="1" i="1" dirty="0" err="1">
+                <a:solidFill>
+                  <a:srgbClr val="0170AD"/>
+                </a:solidFill>
+                <a:latin typeface="Lato Light"/>
+                <a:ea typeface="Lato Light"/>
+                <a:cs typeface="Lato Light"/>
+              </a:rPr>
+              <a:t>soee</a:t>
+            </a:r>
+            <a:r>
+              <a:rPr lang="en-US" sz="2400" b="1" i="1" dirty="0">
+                <a:solidFill>
+                  <a:srgbClr val="0170AD"/>
+                </a:solidFill>
+                <a:latin typeface="Lato Light"/>
+                <a:ea typeface="Lato Light"/>
+                <a:cs typeface="Lato Light"/>
+              </a:rPr>
+              <a:t> to the </a:t>
+            </a:r>
+            <a:r>
+              <a:rPr lang="en-US" sz="2400" b="1" i="1" dirty="0" err="1">
+                <a:solidFill>
+                  <a:srgbClr val="0170AD"/>
+                </a:solidFill>
+                <a:latin typeface="Lato Light"/>
+                <a:ea typeface="Lato Light"/>
+                <a:cs typeface="Lato Light"/>
+              </a:rPr>
+              <a:t>soee</a:t>
+            </a:r>
+            <a:r>
+              <a:rPr lang="en-US" sz="2400" b="1" i="1" dirty="0">
+                <a:solidFill>
+                  <a:srgbClr val="0170AD"/>
+                </a:solidFill>
+                <a:latin typeface="Lato Light"/>
+                <a:ea typeface="Lato Light"/>
+                <a:cs typeface="Lato Light"/>
+              </a:rPr>
+              <a:t> to the </a:t>
+            </a:r>
+            <a:r>
+              <a:rPr lang="en-US" sz="2400" b="1" i="1" dirty="0" err="1">
+                <a:solidFill>
+                  <a:srgbClr val="0170AD"/>
+                </a:solidFill>
+                <a:latin typeface="Lato Light"/>
+                <a:ea typeface="Lato Light"/>
+                <a:cs typeface="Lato Light"/>
+              </a:rPr>
+              <a:t>soee</a:t>
+            </a:r>
+            <a:r>
+              <a:rPr lang="en-US" sz="2400" b="1" i="1" dirty="0">
+                <a:solidFill>
+                  <a:srgbClr val="0170AD"/>
+                </a:solidFill>
+                <a:latin typeface="Lato Light"/>
+                <a:ea typeface="Lato Light"/>
+                <a:cs typeface="Lato Light"/>
+              </a:rPr>
+              <a:t> to the </a:t>
+            </a:r>
+            <a:r>
+              <a:rPr lang="en-US" sz="2400" b="1" i="1" dirty="0" err="1">
+                <a:solidFill>
+                  <a:srgbClr val="0170AD"/>
+                </a:solidFill>
+                <a:latin typeface="Lato Light"/>
+                <a:ea typeface="Lato Light"/>
+                <a:cs typeface="Lato Light"/>
+              </a:rPr>
+              <a:t>soe</a:t>
+            </a:r>
+            <a:r>
+              <a:rPr lang="en-US" sz="2400" b="1" i="1" dirty="0">
+                <a:solidFill>
+                  <a:srgbClr val="0170AD"/>
+                </a:solidFill>
+                <a:latin typeface="Lato Light"/>
+                <a:ea typeface="Lato Light"/>
+                <a:cs typeface="Lato Light"/>
+              </a:rPr>
+              <a:t> to the </a:t>
+            </a:r>
+            <a:r>
+              <a:rPr lang="en-US" sz="2400" b="1" i="1" dirty="0" err="1">
+                <a:solidFill>
+                  <a:srgbClr val="0170AD"/>
+                </a:solidFill>
+                <a:latin typeface="Lato Light"/>
+                <a:ea typeface="Lato Light"/>
+                <a:cs typeface="Lato Light"/>
+              </a:rPr>
+              <a:t>soee</a:t>
+            </a:r>
+            <a:r>
+              <a:rPr lang="en-US" sz="2400" b="1" i="1" dirty="0">
+                <a:solidFill>
+                  <a:srgbClr val="0170AD"/>
+                </a:solidFill>
+                <a:latin typeface="Lato Light"/>
+                <a:ea typeface="Lato Light"/>
+                <a:cs typeface="Lato Light"/>
+              </a:rPr>
+              <a:t> to the </a:t>
+            </a:r>
+            <a:r>
+              <a:rPr lang="en-US" sz="2400" b="1" i="1" dirty="0" err="1">
+                <a:solidFill>
+                  <a:srgbClr val="0170AD"/>
+                </a:solidFill>
+                <a:latin typeface="Lato Light"/>
+                <a:ea typeface="Lato Light"/>
+                <a:cs typeface="Lato Light"/>
+              </a:rPr>
+              <a:t>soee</a:t>
+            </a:r>
+            <a:r>
+              <a:rPr lang="en-US" sz="2400" b="1" i="1" dirty="0">
+                <a:solidFill>
+                  <a:srgbClr val="0170AD"/>
+                </a:solidFill>
+                <a:latin typeface="Lato Light"/>
+                <a:ea typeface="Lato Light"/>
+                <a:cs typeface="Lato Light"/>
+              </a:rPr>
+              <a:t> to the </a:t>
+            </a:r>
+            <a:r>
+              <a:rPr lang="en-US" sz="2400" b="1" i="1" dirty="0" err="1">
+                <a:solidFill>
+                  <a:srgbClr val="0170AD"/>
+                </a:solidFill>
+                <a:latin typeface="Lato Light"/>
+                <a:ea typeface="Lato Light"/>
+                <a:cs typeface="Lato Light"/>
+              </a:rPr>
+              <a:t>soee</a:t>
+            </a:r>
+            <a:r>
+              <a:rPr lang="en-US" sz="2400" b="1" i="1" dirty="0">
+                <a:solidFill>
+                  <a:srgbClr val="0170AD"/>
+                </a:solidFill>
+                <a:latin typeface="Lato Light"/>
+                <a:ea typeface="Lato Light"/>
+                <a:cs typeface="Lato Light"/>
+              </a:rPr>
+              <a:t> to the </a:t>
+            </a:r>
+            <a:r>
+              <a:rPr lang="en-US" sz="2400" b="1" i="1" dirty="0" err="1">
+                <a:solidFill>
+                  <a:srgbClr val="0170AD"/>
+                </a:solidFill>
+                <a:latin typeface="Lato Light"/>
+                <a:ea typeface="Lato Light"/>
+                <a:cs typeface="Lato Light"/>
+              </a:rPr>
+              <a:t>soee</a:t>
+            </a:r>
+            <a:r>
+              <a:rPr lang="en-US" sz="2400" b="1" i="1" dirty="0">
+                <a:solidFill>
+                  <a:srgbClr val="0170AD"/>
+                </a:solidFill>
+                <a:latin typeface="Lato Light"/>
+                <a:ea typeface="Lato Light"/>
+                <a:cs typeface="Lato Light"/>
+              </a:rPr>
+              <a:t> to the </a:t>
+            </a:r>
+            <a:r>
+              <a:rPr lang="en-US" sz="2400" b="1" i="1" dirty="0" err="1">
+                <a:solidFill>
+                  <a:srgbClr val="0170AD"/>
+                </a:solidFill>
+                <a:latin typeface="Lato Light"/>
+                <a:ea typeface="Lato Light"/>
+                <a:cs typeface="Lato Light"/>
+              </a:rPr>
+              <a:t>soee</a:t>
+            </a:r>
+            <a:r>
+              <a:rPr lang="en-US" sz="2400" b="1" i="1" dirty="0">
+                <a:solidFill>
+                  <a:srgbClr val="0170AD"/>
+                </a:solidFill>
+                <a:latin typeface="Lato Light"/>
+                <a:ea typeface="Lato Light"/>
+                <a:cs typeface="Lato Light"/>
+              </a:rPr>
+              <a:t> to the </a:t>
+            </a:r>
+            <a:r>
+              <a:rPr lang="en-US" sz="2400" b="1" i="1" dirty="0" err="1">
+                <a:solidFill>
+                  <a:srgbClr val="0170AD"/>
+                </a:solidFill>
+                <a:latin typeface="Lato Light"/>
+                <a:ea typeface="Lato Light"/>
+                <a:cs typeface="Lato Light"/>
+              </a:rPr>
+              <a:t>soee</a:t>
+            </a:r>
+            <a:r>
+              <a:rPr lang="en-US" sz="2400" b="1" i="1" dirty="0">
+                <a:solidFill>
+                  <a:srgbClr val="0170AD"/>
+                </a:solidFill>
+                <a:latin typeface="Lato Light"/>
+                <a:ea typeface="Lato Light"/>
+                <a:cs typeface="Lato Light"/>
+              </a:rPr>
+              <a:t> to the </a:t>
+            </a:r>
+            <a:r>
+              <a:rPr lang="en-US" sz="2400" b="1" i="1" dirty="0" err="1">
+                <a:solidFill>
+                  <a:srgbClr val="0170AD"/>
+                </a:solidFill>
+                <a:latin typeface="Lato Light"/>
+                <a:ea typeface="Lato Light"/>
+                <a:cs typeface="Lato Light"/>
+              </a:rPr>
+              <a:t>soee</a:t>
+            </a:r>
+            <a:r>
+              <a:rPr lang="en-US" sz="2400" b="1" i="1" dirty="0">
+                <a:solidFill>
+                  <a:srgbClr val="0170AD"/>
+                </a:solidFill>
+                <a:latin typeface="Lato Light"/>
+                <a:ea typeface="Lato Light"/>
+                <a:cs typeface="Lato Light"/>
+              </a:rPr>
+              <a:t> to the </a:t>
+            </a:r>
+            <a:r>
+              <a:rPr lang="en-US" sz="2400" b="1" i="1" dirty="0" err="1">
+                <a:solidFill>
+                  <a:srgbClr val="0170AD"/>
+                </a:solidFill>
+                <a:latin typeface="Lato Light"/>
+                <a:ea typeface="Lato Light"/>
+                <a:cs typeface="Lato Light"/>
+              </a:rPr>
+              <a:t>soee</a:t>
+            </a:r>
+            <a:r>
+              <a:rPr lang="en-US" sz="2400" b="1" i="1" dirty="0">
+                <a:solidFill>
+                  <a:srgbClr val="0170AD"/>
+                </a:solidFill>
+                <a:latin typeface="Lato Light"/>
+                <a:ea typeface="Lato Light"/>
+                <a:cs typeface="Lato Light"/>
+              </a:rPr>
+              <a:t> to the </a:t>
+            </a:r>
+            <a:r>
+              <a:rPr lang="en-US" sz="2400" b="1" i="1" dirty="0" err="1">
+                <a:solidFill>
+                  <a:srgbClr val="0170AD"/>
+                </a:solidFill>
+                <a:latin typeface="Lato Light"/>
+                <a:ea typeface="Lato Light"/>
+                <a:cs typeface="Lato Light"/>
+              </a:rPr>
+              <a:t>soe</a:t>
+            </a:r>
+            <a:r>
+              <a:rPr lang="en-US" sz="2400" b="1" i="1" dirty="0">
+                <a:solidFill>
+                  <a:srgbClr val="0170AD"/>
+                </a:solidFill>
+                <a:latin typeface="Lato Light"/>
+                <a:ea typeface="Lato Light"/>
+                <a:cs typeface="Lato Light"/>
+              </a:rPr>
+              <a:t> to the </a:t>
+            </a:r>
+            <a:r>
+              <a:rPr lang="en-US" sz="2400" b="1" i="1" dirty="0" err="1">
+                <a:solidFill>
+                  <a:srgbClr val="0170AD"/>
+                </a:solidFill>
+                <a:latin typeface="Lato Light"/>
+                <a:ea typeface="Lato Light"/>
+                <a:cs typeface="Lato Light"/>
+              </a:rPr>
+              <a:t>soee</a:t>
+            </a:r>
+            <a:r>
+              <a:rPr lang="en-US" sz="2400" b="1" i="1" dirty="0">
+                <a:solidFill>
+                  <a:srgbClr val="0170AD"/>
+                </a:solidFill>
+                <a:latin typeface="Lato Light"/>
+                <a:ea typeface="Lato Light"/>
+                <a:cs typeface="Lato Light"/>
+              </a:rPr>
+              <a:t> to the </a:t>
+            </a:r>
+            <a:r>
+              <a:rPr lang="en-US" sz="2400" b="1" i="1" dirty="0" err="1">
+                <a:solidFill>
+                  <a:srgbClr val="0170AD"/>
+                </a:solidFill>
+                <a:latin typeface="Lato Light"/>
+                <a:ea typeface="Lato Light"/>
+                <a:cs typeface="Lato Light"/>
+              </a:rPr>
+              <a:t>soee</a:t>
+            </a:r>
+            <a:r>
+              <a:rPr lang="en-US" sz="2400" b="1" i="1" dirty="0">
+                <a:solidFill>
+                  <a:srgbClr val="0170AD"/>
+                </a:solidFill>
+                <a:latin typeface="Lato Light"/>
+                <a:ea typeface="Lato Light"/>
+                <a:cs typeface="Lato Light"/>
+              </a:rPr>
+              <a:t> to the </a:t>
+            </a:r>
+            <a:r>
+              <a:rPr lang="en-US" sz="2400" b="1" i="1" dirty="0" err="1">
+                <a:solidFill>
+                  <a:srgbClr val="0170AD"/>
+                </a:solidFill>
+                <a:latin typeface="Lato Light"/>
+                <a:ea typeface="Lato Light"/>
+                <a:cs typeface="Lato Light"/>
+              </a:rPr>
+              <a:t>soee</a:t>
+            </a:r>
+            <a:r>
+              <a:rPr lang="en-US" sz="2400" b="1" i="1" dirty="0">
+                <a:solidFill>
+                  <a:srgbClr val="0170AD"/>
+                </a:solidFill>
+                <a:latin typeface="Lato Light"/>
+                <a:ea typeface="Lato Light"/>
+                <a:cs typeface="Lato Light"/>
+              </a:rPr>
+              <a:t> to the </a:t>
+            </a:r>
+            <a:r>
+              <a:rPr lang="en-US" sz="2400" b="1" i="1" dirty="0" err="1">
+                <a:solidFill>
+                  <a:srgbClr val="0170AD"/>
+                </a:solidFill>
+                <a:latin typeface="Lato Light"/>
+                <a:ea typeface="Lato Light"/>
+                <a:cs typeface="Lato Light"/>
+              </a:rPr>
+              <a:t>soee</a:t>
+            </a:r>
+            <a:r>
+              <a:rPr lang="en-US" sz="2400" b="1" i="1" dirty="0">
+                <a:solidFill>
+                  <a:srgbClr val="0170AD"/>
+                </a:solidFill>
+                <a:latin typeface="Lato Light"/>
+                <a:ea typeface="Lato Light"/>
+                <a:cs typeface="Lato Light"/>
+              </a:rPr>
+              <a:t> to the </a:t>
+            </a:r>
+            <a:r>
+              <a:rPr lang="en-US" sz="2400" b="1" i="1" dirty="0" err="1">
+                <a:solidFill>
+                  <a:srgbClr val="0170AD"/>
+                </a:solidFill>
+                <a:latin typeface="Lato Light"/>
+                <a:ea typeface="Lato Light"/>
+                <a:cs typeface="Lato Light"/>
+              </a:rPr>
+              <a:t>soee</a:t>
+            </a:r>
+            <a:r>
+              <a:rPr lang="en-US" sz="2400" b="1" i="1" dirty="0">
+                <a:solidFill>
+                  <a:srgbClr val="0170AD"/>
+                </a:solidFill>
+                <a:latin typeface="Lato Light"/>
+                <a:ea typeface="Lato Light"/>
+                <a:cs typeface="Lato Light"/>
+              </a:rPr>
+              <a:t> to the </a:t>
+            </a:r>
+            <a:r>
+              <a:rPr lang="en-US" sz="2400" b="1" i="1" dirty="0" err="1">
+                <a:solidFill>
+                  <a:srgbClr val="0170AD"/>
+                </a:solidFill>
+                <a:latin typeface="Lato Light"/>
+                <a:ea typeface="Lato Light"/>
+                <a:cs typeface="Lato Light"/>
+              </a:rPr>
+              <a:t>soee</a:t>
+            </a:r>
+            <a:r>
+              <a:rPr lang="en-US" sz="2400" b="1" i="1" dirty="0">
+                <a:solidFill>
+                  <a:srgbClr val="0170AD"/>
+                </a:solidFill>
+                <a:latin typeface="Lato Light"/>
+                <a:ea typeface="Lato Light"/>
+                <a:cs typeface="Lato Light"/>
+              </a:rPr>
+              <a:t> to the </a:t>
+            </a:r>
+            <a:r>
+              <a:rPr lang="en-US" sz="2400" b="1" i="1" dirty="0" err="1">
+                <a:solidFill>
+                  <a:srgbClr val="0170AD"/>
+                </a:solidFill>
+                <a:latin typeface="Lato Light"/>
+                <a:ea typeface="Lato Light"/>
+                <a:cs typeface="Lato Light"/>
+              </a:rPr>
+              <a:t>soee</a:t>
+            </a:r>
+            <a:r>
+              <a:rPr lang="en-US" sz="2400" b="1" i="1" dirty="0">
+                <a:solidFill>
+                  <a:srgbClr val="0170AD"/>
+                </a:solidFill>
+                <a:latin typeface="Lato Light"/>
+                <a:ea typeface="Lato Light"/>
+                <a:cs typeface="Lato Light"/>
+              </a:rPr>
+              <a:t> to the </a:t>
+            </a:r>
+            <a:r>
+              <a:rPr lang="en-US" sz="2400" b="1" i="1" dirty="0" err="1">
+                <a:solidFill>
+                  <a:srgbClr val="0170AD"/>
+                </a:solidFill>
+                <a:latin typeface="Lato Light"/>
+                <a:ea typeface="Lato Light"/>
+                <a:cs typeface="Lato Light"/>
+              </a:rPr>
+              <a:t>soee</a:t>
+            </a:r>
+            <a:r>
+              <a:rPr lang="en-US" sz="2400" b="1" i="1" dirty="0">
+                <a:solidFill>
+                  <a:srgbClr val="0170AD"/>
+                </a:solidFill>
+                <a:latin typeface="Lato Light"/>
+                <a:ea typeface="Lato Light"/>
+                <a:cs typeface="Lato Light"/>
+              </a:rPr>
+              <a:t> to the </a:t>
+            </a:r>
+            <a:r>
+              <a:rPr lang="en-US" sz="2400" b="1" i="1" dirty="0" err="1">
+                <a:solidFill>
+                  <a:srgbClr val="0170AD"/>
+                </a:solidFill>
+                <a:latin typeface="Lato Light"/>
+                <a:ea typeface="Lato Light"/>
+                <a:cs typeface="Lato Light"/>
+              </a:rPr>
+              <a:t>soe</a:t>
+            </a:r>
+            <a:r>
+              <a:rPr lang="en-US" sz="2400" b="1" i="1" dirty="0">
+                <a:solidFill>
+                  <a:srgbClr val="0170AD"/>
+                </a:solidFill>
+                <a:latin typeface="Lato Light"/>
+                <a:ea typeface="Lato Light"/>
+                <a:cs typeface="Lato Light"/>
+              </a:rPr>
+              <a:t> to the </a:t>
+            </a:r>
+            <a:r>
+              <a:rPr lang="en-US" sz="2400" b="1" i="1" dirty="0" err="1">
+                <a:solidFill>
+                  <a:srgbClr val="0170AD"/>
+                </a:solidFill>
+                <a:latin typeface="Lato Light"/>
+                <a:ea typeface="Lato Light"/>
+                <a:cs typeface="Lato Light"/>
+              </a:rPr>
+              <a:t>soee</a:t>
+            </a:r>
+            <a:r>
+              <a:rPr lang="en-US" sz="2400" b="1" i="1" dirty="0">
+                <a:solidFill>
+                  <a:srgbClr val="0170AD"/>
+                </a:solidFill>
+                <a:latin typeface="Lato Light"/>
+                <a:ea typeface="Lato Light"/>
+                <a:cs typeface="Lato Light"/>
+              </a:rPr>
+              <a:t> to the </a:t>
+            </a:r>
+            <a:r>
+              <a:rPr lang="en-US" sz="2400" b="1" i="1" dirty="0" err="1">
+                <a:solidFill>
+                  <a:srgbClr val="0170AD"/>
+                </a:solidFill>
+                <a:latin typeface="Lato Light"/>
+                <a:ea typeface="Lato Light"/>
+                <a:cs typeface="Lato Light"/>
+              </a:rPr>
+              <a:t>soee</a:t>
+            </a:r>
+            <a:r>
+              <a:rPr lang="en-US" sz="2400" b="1" i="1" dirty="0">
+                <a:solidFill>
+                  <a:srgbClr val="0170AD"/>
+                </a:solidFill>
+                <a:latin typeface="Lato Light"/>
+                <a:ea typeface="Lato Light"/>
+                <a:cs typeface="Lato Light"/>
+              </a:rPr>
+              <a:t> to the </a:t>
+            </a:r>
+            <a:r>
+              <a:rPr lang="en-US" sz="2400" b="1" i="1" dirty="0" err="1">
+                <a:solidFill>
+                  <a:srgbClr val="0170AD"/>
+                </a:solidFill>
+                <a:latin typeface="Lato Light"/>
+                <a:ea typeface="Lato Light"/>
+                <a:cs typeface="Lato Light"/>
+              </a:rPr>
+              <a:t>soee</a:t>
+            </a:r>
+            <a:r>
+              <a:rPr lang="en-US" sz="2400" b="1" i="1" dirty="0">
+                <a:solidFill>
+                  <a:srgbClr val="0170AD"/>
+                </a:solidFill>
+                <a:latin typeface="Lato Light"/>
+                <a:ea typeface="Lato Light"/>
+                <a:cs typeface="Lato Light"/>
+              </a:rPr>
+              <a:t> to the </a:t>
+            </a:r>
+            <a:r>
+              <a:rPr lang="en-US" sz="2400" b="1" i="1" dirty="0" err="1">
+                <a:solidFill>
+                  <a:srgbClr val="0170AD"/>
+                </a:solidFill>
+                <a:latin typeface="Lato Light"/>
+                <a:ea typeface="Lato Light"/>
+                <a:cs typeface="Lato Light"/>
+              </a:rPr>
+              <a:t>soee</a:t>
+            </a:r>
+            <a:r>
+              <a:rPr lang="en-US" sz="2400" b="1" i="1" dirty="0">
+                <a:solidFill>
+                  <a:srgbClr val="0170AD"/>
+                </a:solidFill>
+                <a:latin typeface="Lato Light"/>
+                <a:ea typeface="Lato Light"/>
+                <a:cs typeface="Lato Light"/>
+              </a:rPr>
+              <a:t> to the </a:t>
+            </a:r>
+            <a:r>
+              <a:rPr lang="en-US" sz="2400" b="1" i="1" dirty="0" err="1">
+                <a:solidFill>
+                  <a:srgbClr val="0170AD"/>
+                </a:solidFill>
+                <a:latin typeface="Lato Light"/>
+                <a:ea typeface="Lato Light"/>
+                <a:cs typeface="Lato Light"/>
+              </a:rPr>
+              <a:t>soee</a:t>
+            </a:r>
+            <a:r>
+              <a:rPr lang="en-US" sz="2400" b="1" i="1" dirty="0">
+                <a:solidFill>
+                  <a:srgbClr val="0170AD"/>
+                </a:solidFill>
+                <a:latin typeface="Lato Light"/>
+                <a:ea typeface="Lato Light"/>
+                <a:cs typeface="Lato Light"/>
+              </a:rPr>
+              <a:t> to the </a:t>
+            </a:r>
+            <a:r>
+              <a:rPr lang="en-US" sz="2400" b="1" i="1" dirty="0" err="1">
+                <a:solidFill>
+                  <a:srgbClr val="0170AD"/>
+                </a:solidFill>
+                <a:latin typeface="Lato Light"/>
+                <a:ea typeface="Lato Light"/>
+                <a:cs typeface="Lato Light"/>
+              </a:rPr>
+              <a:t>soee</a:t>
+            </a:r>
+            <a:r>
+              <a:rPr lang="en-US" sz="2400" b="1" i="1" dirty="0">
+                <a:solidFill>
+                  <a:srgbClr val="0170AD"/>
+                </a:solidFill>
+                <a:latin typeface="Lato Light"/>
+                <a:ea typeface="Lato Light"/>
+                <a:cs typeface="Lato Light"/>
+              </a:rPr>
+              <a:t> to the </a:t>
+            </a:r>
+            <a:r>
+              <a:rPr lang="en-US" sz="2400" b="1" i="1" dirty="0" err="1">
+                <a:solidFill>
+                  <a:srgbClr val="0170AD"/>
+                </a:solidFill>
+                <a:latin typeface="Lato Light"/>
+                <a:ea typeface="Lato Light"/>
+                <a:cs typeface="Lato Light"/>
+              </a:rPr>
+              <a:t>soee</a:t>
+            </a:r>
+            <a:r>
+              <a:rPr lang="en-US" sz="2400" b="1" i="1" dirty="0">
+                <a:solidFill>
+                  <a:srgbClr val="0170AD"/>
+                </a:solidFill>
+                <a:latin typeface="Lato Light"/>
+                <a:ea typeface="Lato Light"/>
+                <a:cs typeface="Lato Light"/>
+              </a:rPr>
+              <a:t> to the </a:t>
+            </a:r>
+            <a:r>
+              <a:rPr lang="en-US" sz="2400" b="1" i="1" dirty="0" err="1">
+                <a:solidFill>
+                  <a:srgbClr val="0170AD"/>
+                </a:solidFill>
+                <a:latin typeface="Lato Light"/>
+                <a:ea typeface="Lato Light"/>
+                <a:cs typeface="Lato Light"/>
+              </a:rPr>
+              <a:t>soee</a:t>
+            </a:r>
+            <a:r>
+              <a:rPr lang="en-US" sz="2400" b="1" i="1" dirty="0">
+                <a:solidFill>
+                  <a:srgbClr val="0170AD"/>
+                </a:solidFill>
+                <a:latin typeface="Lato Light"/>
+                <a:ea typeface="Lato Light"/>
+                <a:cs typeface="Lato Light"/>
+              </a:rPr>
+              <a:t> to the </a:t>
+            </a:r>
+            <a:r>
+              <a:rPr lang="en-US" sz="2400" b="1" i="1" dirty="0" err="1">
+                <a:solidFill>
+                  <a:srgbClr val="0170AD"/>
+                </a:solidFill>
+                <a:latin typeface="Lato Light"/>
+                <a:ea typeface="Lato Light"/>
+                <a:cs typeface="Lato Light"/>
+              </a:rPr>
+              <a:t>soe</a:t>
+            </a:r>
+            <a:r>
+              <a:rPr lang="en-US" sz="2400" b="1" i="1" dirty="0">
+                <a:solidFill>
+                  <a:srgbClr val="0170AD"/>
+                </a:solidFill>
+                <a:latin typeface="Lato Light"/>
+                <a:ea typeface="Lato Light"/>
+                <a:cs typeface="Lato Light"/>
+              </a:rPr>
+              <a:t> to the </a:t>
+            </a:r>
+            <a:r>
+              <a:rPr lang="en-US" sz="2400" b="1" i="1" dirty="0" err="1">
+                <a:solidFill>
+                  <a:srgbClr val="0170AD"/>
+                </a:solidFill>
+                <a:latin typeface="Lato Light"/>
+                <a:ea typeface="Lato Light"/>
+                <a:cs typeface="Lato Light"/>
+              </a:rPr>
+              <a:t>soee</a:t>
+            </a:r>
+            <a:r>
+              <a:rPr lang="en-US" sz="2400" b="1" i="1" dirty="0">
+                <a:solidFill>
+                  <a:srgbClr val="0170AD"/>
+                </a:solidFill>
+                <a:latin typeface="Lato Light"/>
+                <a:ea typeface="Lato Light"/>
+                <a:cs typeface="Lato Light"/>
+              </a:rPr>
+              <a:t> to the </a:t>
+            </a:r>
+            <a:r>
+              <a:rPr lang="en-US" sz="2400" b="1" i="1" dirty="0" err="1">
+                <a:solidFill>
+                  <a:srgbClr val="0170AD"/>
+                </a:solidFill>
+                <a:latin typeface="Lato Light"/>
+                <a:ea typeface="Lato Light"/>
+                <a:cs typeface="Lato Light"/>
+              </a:rPr>
+              <a:t>soee</a:t>
+            </a:r>
+            <a:r>
+              <a:rPr lang="en-US" sz="2400" b="1" i="1" dirty="0">
+                <a:solidFill>
+                  <a:srgbClr val="0170AD"/>
+                </a:solidFill>
+                <a:latin typeface="Lato Light"/>
+                <a:ea typeface="Lato Light"/>
+                <a:cs typeface="Lato Light"/>
+              </a:rPr>
+              <a:t> to the </a:t>
+            </a:r>
+            <a:r>
+              <a:rPr lang="en-US" sz="2400" b="1" i="1" dirty="0" err="1">
+                <a:solidFill>
+                  <a:srgbClr val="0170AD"/>
+                </a:solidFill>
+                <a:latin typeface="Lato Light"/>
+                <a:ea typeface="Lato Light"/>
+                <a:cs typeface="Lato Light"/>
+              </a:rPr>
+              <a:t>soee</a:t>
+            </a:r>
+            <a:r>
+              <a:rPr lang="en-US" sz="2400" b="1" i="1" dirty="0">
+                <a:solidFill>
+                  <a:srgbClr val="0170AD"/>
+                </a:solidFill>
+                <a:latin typeface="Lato Light"/>
+                <a:ea typeface="Lato Light"/>
+                <a:cs typeface="Lato Light"/>
+              </a:rPr>
+              <a:t> to the </a:t>
+            </a:r>
+            <a:r>
+              <a:rPr lang="en-US" sz="2400" b="1" i="1" dirty="0" err="1">
+                <a:solidFill>
+                  <a:srgbClr val="0170AD"/>
+                </a:solidFill>
+                <a:latin typeface="Lato Light"/>
+                <a:ea typeface="Lato Light"/>
+                <a:cs typeface="Lato Light"/>
+              </a:rPr>
+              <a:t>soee</a:t>
+            </a:r>
+            <a:r>
+              <a:rPr lang="en-US" sz="2400" b="1" i="1" dirty="0">
+                <a:solidFill>
+                  <a:srgbClr val="0170AD"/>
+                </a:solidFill>
+                <a:latin typeface="Lato Light"/>
+                <a:ea typeface="Lato Light"/>
+                <a:cs typeface="Lato Light"/>
+              </a:rPr>
+              <a:t> to the </a:t>
+            </a:r>
+            <a:r>
+              <a:rPr lang="en-US" sz="2400" b="1" i="1" dirty="0" err="1">
+                <a:solidFill>
+                  <a:srgbClr val="0170AD"/>
+                </a:solidFill>
+                <a:latin typeface="Lato Light"/>
+                <a:ea typeface="Lato Light"/>
+                <a:cs typeface="Lato Light"/>
+              </a:rPr>
+              <a:t>soee</a:t>
+            </a:r>
+            <a:r>
+              <a:rPr lang="en-US" sz="2400" b="1" i="1" dirty="0">
+                <a:solidFill>
+                  <a:srgbClr val="0170AD"/>
+                </a:solidFill>
+                <a:latin typeface="Lato Light"/>
+                <a:ea typeface="Lato Light"/>
+                <a:cs typeface="Lato Light"/>
+              </a:rPr>
+              <a:t> to the </a:t>
+            </a:r>
+            <a:r>
+              <a:rPr lang="en-US" sz="2400" b="1" i="1" dirty="0" err="1">
+                <a:solidFill>
+                  <a:srgbClr val="0170AD"/>
+                </a:solidFill>
+                <a:latin typeface="Lato Light"/>
+                <a:ea typeface="Lato Light"/>
+                <a:cs typeface="Lato Light"/>
+              </a:rPr>
+              <a:t>soee</a:t>
+            </a:r>
+            <a:r>
+              <a:rPr lang="en-US" sz="2400" b="1" i="1" dirty="0">
+                <a:solidFill>
+                  <a:srgbClr val="0170AD"/>
+                </a:solidFill>
+                <a:latin typeface="Lato Light"/>
+                <a:ea typeface="Lato Light"/>
+                <a:cs typeface="Lato Light"/>
+              </a:rPr>
+              <a:t> to the </a:t>
+            </a:r>
+            <a:r>
+              <a:rPr lang="en-US" sz="2400" b="1" i="1" dirty="0" err="1">
+                <a:solidFill>
+                  <a:srgbClr val="0170AD"/>
+                </a:solidFill>
+                <a:latin typeface="Lato Light"/>
+                <a:ea typeface="Lato Light"/>
+                <a:cs typeface="Lato Light"/>
+              </a:rPr>
+              <a:t>soee</a:t>
+            </a:r>
+            <a:r>
+              <a:rPr lang="en-US" sz="2400" b="1" i="1" dirty="0">
+                <a:solidFill>
+                  <a:srgbClr val="0170AD"/>
+                </a:solidFill>
+                <a:latin typeface="Lato Light"/>
+                <a:ea typeface="Lato Light"/>
+                <a:cs typeface="Lato Light"/>
+              </a:rPr>
+              <a:t> to the </a:t>
+            </a:r>
+            <a:r>
+              <a:rPr lang="en-US" sz="2400" b="1" i="1" dirty="0" err="1">
+                <a:solidFill>
+                  <a:srgbClr val="0170AD"/>
+                </a:solidFill>
+                <a:latin typeface="Lato Light"/>
+                <a:ea typeface="Lato Light"/>
+                <a:cs typeface="Lato Light"/>
+              </a:rPr>
+              <a:t>soee</a:t>
+            </a:r>
+            <a:r>
+              <a:rPr lang="en-US" sz="2400" b="1" i="1" dirty="0">
+                <a:solidFill>
+                  <a:srgbClr val="0170AD"/>
+                </a:solidFill>
+                <a:latin typeface="Lato Light"/>
+                <a:ea typeface="Lato Light"/>
+                <a:cs typeface="Lato Light"/>
+              </a:rPr>
+              <a:t> to the </a:t>
+            </a:r>
+            <a:r>
+              <a:rPr lang="en-US" sz="2400" b="1" i="1" dirty="0" err="1">
+                <a:solidFill>
+                  <a:srgbClr val="0170AD"/>
+                </a:solidFill>
+                <a:latin typeface="Lato Light"/>
+                <a:ea typeface="Lato Light"/>
+                <a:cs typeface="Lato Light"/>
+              </a:rPr>
+              <a:t>soe</a:t>
+            </a:r>
+            <a:r>
+              <a:rPr lang="en-US" sz="2400" b="1" i="1" dirty="0">
+                <a:solidFill>
+                  <a:srgbClr val="0170AD"/>
+                </a:solidFill>
+                <a:latin typeface="Lato Light"/>
+                <a:ea typeface="Lato Light"/>
+                <a:cs typeface="Lato Light"/>
+              </a:rPr>
+              <a:t> to the </a:t>
+            </a:r>
+            <a:r>
+              <a:rPr lang="en-US" sz="2400" b="1" i="1" dirty="0" err="1">
+                <a:solidFill>
+                  <a:srgbClr val="0170AD"/>
+                </a:solidFill>
+                <a:latin typeface="Lato Light"/>
+                <a:ea typeface="Lato Light"/>
+                <a:cs typeface="Lato Light"/>
+              </a:rPr>
+              <a:t>soee</a:t>
+            </a:r>
+            <a:r>
+              <a:rPr lang="en-US" sz="2400" b="1" i="1" dirty="0">
+                <a:solidFill>
+                  <a:srgbClr val="0170AD"/>
+                </a:solidFill>
+                <a:latin typeface="Lato Light"/>
+                <a:ea typeface="Lato Light"/>
+                <a:cs typeface="Lato Light"/>
+              </a:rPr>
+              <a:t> to the </a:t>
+            </a:r>
+            <a:r>
+              <a:rPr lang="en-US" sz="2400" b="1" i="1" dirty="0" err="1">
+                <a:solidFill>
+                  <a:srgbClr val="0170AD"/>
+                </a:solidFill>
+                <a:latin typeface="Lato Light"/>
+                <a:ea typeface="Lato Light"/>
+                <a:cs typeface="Lato Light"/>
+              </a:rPr>
+              <a:t>soee</a:t>
+            </a:r>
+            <a:r>
+              <a:rPr lang="en-US" sz="2400" b="1" i="1" dirty="0">
+                <a:solidFill>
+                  <a:srgbClr val="0170AD"/>
+                </a:solidFill>
+                <a:latin typeface="Lato Light"/>
+                <a:ea typeface="Lato Light"/>
+                <a:cs typeface="Lato Light"/>
+              </a:rPr>
+              <a:t> to the </a:t>
+            </a:r>
+            <a:r>
+              <a:rPr lang="en-US" sz="2400" b="1" i="1" dirty="0" err="1">
+                <a:solidFill>
+                  <a:srgbClr val="0170AD"/>
+                </a:solidFill>
+                <a:latin typeface="Lato Light"/>
+                <a:ea typeface="Lato Light"/>
+                <a:cs typeface="Lato Light"/>
+              </a:rPr>
+              <a:t>soee</a:t>
+            </a:r>
+            <a:r>
+              <a:rPr lang="en-US" sz="2400" b="1" i="1" dirty="0">
+                <a:solidFill>
+                  <a:srgbClr val="0170AD"/>
+                </a:solidFill>
+                <a:latin typeface="Lato Light"/>
+                <a:ea typeface="Lato Light"/>
+                <a:cs typeface="Lato Light"/>
+              </a:rPr>
+              <a:t> to the </a:t>
+            </a:r>
+            <a:r>
+              <a:rPr lang="en-US" sz="2400" b="1" i="1" dirty="0" err="1">
+                <a:solidFill>
+                  <a:srgbClr val="0170AD"/>
+                </a:solidFill>
+                <a:latin typeface="Lato Light"/>
+                <a:ea typeface="Lato Light"/>
+                <a:cs typeface="Lato Light"/>
+              </a:rPr>
+              <a:t>soee</a:t>
+            </a:r>
+            <a:r>
+              <a:rPr lang="en-US" sz="2400" b="1" i="1" dirty="0">
+                <a:solidFill>
+                  <a:srgbClr val="0170AD"/>
+                </a:solidFill>
+                <a:latin typeface="Lato Light"/>
+                <a:ea typeface="Lato Light"/>
+                <a:cs typeface="Lato Light"/>
+              </a:rPr>
+              <a:t> to the </a:t>
+            </a:r>
+            <a:r>
+              <a:rPr lang="en-US" sz="2400" b="1" i="1" dirty="0" err="1">
+                <a:solidFill>
+                  <a:srgbClr val="0170AD"/>
+                </a:solidFill>
+                <a:latin typeface="Lato Light"/>
+                <a:ea typeface="Lato Light"/>
+                <a:cs typeface="Lato Light"/>
+              </a:rPr>
+              <a:t>soee</a:t>
+            </a:r>
+            <a:r>
+              <a:rPr lang="en-US" sz="2400" b="1" i="1" dirty="0">
+                <a:solidFill>
+                  <a:srgbClr val="0170AD"/>
+                </a:solidFill>
+                <a:latin typeface="Lato Light"/>
+                <a:ea typeface="Lato Light"/>
+                <a:cs typeface="Lato Light"/>
+              </a:rPr>
+              <a:t> to the </a:t>
+            </a:r>
+            <a:r>
+              <a:rPr lang="en-US" sz="2400" b="1" i="1" dirty="0" err="1">
+                <a:solidFill>
+                  <a:srgbClr val="0170AD"/>
+                </a:solidFill>
+                <a:latin typeface="Lato Light"/>
+                <a:ea typeface="Lato Light"/>
+                <a:cs typeface="Lato Light"/>
+              </a:rPr>
+              <a:t>soee</a:t>
+            </a:r>
+            <a:r>
+              <a:rPr lang="en-US" sz="2400" b="1" i="1" dirty="0">
+                <a:solidFill>
+                  <a:srgbClr val="0170AD"/>
+                </a:solidFill>
+                <a:latin typeface="Lato Light"/>
+                <a:ea typeface="Lato Light"/>
+                <a:cs typeface="Lato Light"/>
+              </a:rPr>
+              <a:t> to the </a:t>
+            </a:r>
+            <a:r>
+              <a:rPr lang="en-US" sz="2400" b="1" i="1" dirty="0" err="1">
+                <a:solidFill>
+                  <a:srgbClr val="0170AD"/>
+                </a:solidFill>
+                <a:latin typeface="Lato Light"/>
+                <a:ea typeface="Lato Light"/>
+                <a:cs typeface="Lato Light"/>
+              </a:rPr>
+              <a:t>soee</a:t>
+            </a:r>
+            <a:r>
+              <a:rPr lang="en-US" sz="2400" b="1" i="1" dirty="0">
+                <a:solidFill>
+                  <a:srgbClr val="0170AD"/>
+                </a:solidFill>
+                <a:latin typeface="Lato Light"/>
+                <a:ea typeface="Lato Light"/>
+                <a:cs typeface="Lato Light"/>
+              </a:rPr>
+              <a:t> to the </a:t>
+            </a:r>
+            <a:r>
+              <a:rPr lang="en-US" sz="2400" b="1" i="1" dirty="0" err="1">
+                <a:solidFill>
+                  <a:srgbClr val="0170AD"/>
+                </a:solidFill>
+                <a:latin typeface="Lato Light"/>
+                <a:ea typeface="Lato Light"/>
+                <a:cs typeface="Lato Light"/>
+              </a:rPr>
+              <a:t>soee</a:t>
+            </a:r>
+            <a:r>
+              <a:rPr lang="en-US" sz="2400" b="1" i="1" dirty="0">
+                <a:solidFill>
+                  <a:srgbClr val="0170AD"/>
+                </a:solidFill>
+                <a:latin typeface="Lato Light"/>
+                <a:ea typeface="Lato Light"/>
+                <a:cs typeface="Lato Light"/>
+              </a:rPr>
+              <a:t> to the </a:t>
+            </a:r>
+            <a:r>
+              <a:rPr lang="en-US" sz="2400" b="1" i="1" dirty="0" err="1">
+                <a:solidFill>
+                  <a:srgbClr val="0170AD"/>
+                </a:solidFill>
+                <a:latin typeface="Lato Light"/>
+                <a:ea typeface="Lato Light"/>
+                <a:cs typeface="Lato Light"/>
+              </a:rPr>
+              <a:t>soe</a:t>
+            </a:r>
+            <a:r>
+              <a:rPr lang="en-US" sz="2400" b="1" i="1" dirty="0">
+                <a:solidFill>
+                  <a:srgbClr val="0170AD"/>
+                </a:solidFill>
+                <a:latin typeface="Lato Light"/>
+                <a:ea typeface="Lato Light"/>
+                <a:cs typeface="Lato Light"/>
+              </a:rPr>
+              <a:t> to the </a:t>
+            </a:r>
+            <a:r>
+              <a:rPr lang="en-US" sz="2400" b="1" i="1" dirty="0" err="1">
+                <a:solidFill>
+                  <a:srgbClr val="0170AD"/>
+                </a:solidFill>
+                <a:latin typeface="Lato Light"/>
+                <a:ea typeface="Lato Light"/>
+                <a:cs typeface="Lato Light"/>
+              </a:rPr>
+              <a:t>soee</a:t>
+            </a:r>
+            <a:r>
+              <a:rPr lang="en-US" sz="2400" b="1" i="1" dirty="0">
+                <a:solidFill>
+                  <a:srgbClr val="0170AD"/>
+                </a:solidFill>
+                <a:latin typeface="Lato Light"/>
+                <a:ea typeface="Lato Light"/>
+                <a:cs typeface="Lato Light"/>
+              </a:rPr>
+              <a:t> to the </a:t>
+            </a:r>
+            <a:r>
+              <a:rPr lang="en-US" sz="2400" b="1" i="1" dirty="0" err="1">
+                <a:solidFill>
+                  <a:srgbClr val="0170AD"/>
+                </a:solidFill>
+                <a:latin typeface="Lato Light"/>
+                <a:ea typeface="Lato Light"/>
+                <a:cs typeface="Lato Light"/>
+              </a:rPr>
+              <a:t>soee</a:t>
+            </a:r>
+            <a:r>
+              <a:rPr lang="en-US" sz="2400" b="1" i="1" dirty="0">
+                <a:solidFill>
+                  <a:srgbClr val="0170AD"/>
+                </a:solidFill>
+                <a:latin typeface="Lato Light"/>
+                <a:ea typeface="Lato Light"/>
+                <a:cs typeface="Lato Light"/>
+              </a:rPr>
+              <a:t> to the </a:t>
+            </a:r>
+            <a:r>
+              <a:rPr lang="en-US" sz="2400" b="1" i="1" dirty="0" err="1">
+                <a:solidFill>
+                  <a:srgbClr val="0170AD"/>
+                </a:solidFill>
+                <a:latin typeface="Lato Light"/>
+                <a:ea typeface="Lato Light"/>
+                <a:cs typeface="Lato Light"/>
+              </a:rPr>
+              <a:t>soee</a:t>
+            </a:r>
+            <a:r>
+              <a:rPr lang="en-US" sz="2400" b="1" i="1" dirty="0">
+                <a:solidFill>
+                  <a:srgbClr val="0170AD"/>
+                </a:solidFill>
+                <a:latin typeface="Lato Light"/>
+                <a:ea typeface="Lato Light"/>
+                <a:cs typeface="Lato Light"/>
+              </a:rPr>
+              <a:t> to the </a:t>
+            </a:r>
+            <a:r>
+              <a:rPr lang="en-US" sz="2400" b="1" i="1" dirty="0" err="1">
+                <a:solidFill>
+                  <a:srgbClr val="0170AD"/>
+                </a:solidFill>
+                <a:latin typeface="Lato Light"/>
+                <a:ea typeface="Lato Light"/>
+                <a:cs typeface="Lato Light"/>
+              </a:rPr>
+              <a:t>soee</a:t>
+            </a:r>
+            <a:r>
+              <a:rPr lang="en-US" sz="2400" b="1" i="1" dirty="0">
+                <a:solidFill>
+                  <a:srgbClr val="0170AD"/>
+                </a:solidFill>
+                <a:latin typeface="Lato Light"/>
+                <a:ea typeface="Lato Light"/>
+                <a:cs typeface="Lato Light"/>
+              </a:rPr>
+              <a:t> to the </a:t>
+            </a:r>
+            <a:r>
+              <a:rPr lang="en-US" sz="2400" b="1" i="1" dirty="0" err="1">
+                <a:solidFill>
+                  <a:srgbClr val="0170AD"/>
+                </a:solidFill>
+                <a:latin typeface="Lato Light"/>
+                <a:ea typeface="Lato Light"/>
+                <a:cs typeface="Lato Light"/>
+              </a:rPr>
+              <a:t>soee</a:t>
+            </a:r>
+            <a:r>
+              <a:rPr lang="en-US" sz="2400" b="1" i="1" dirty="0">
+                <a:solidFill>
+                  <a:srgbClr val="0170AD"/>
+                </a:solidFill>
+                <a:latin typeface="Lato Light"/>
+                <a:ea typeface="Lato Light"/>
+                <a:cs typeface="Lato Light"/>
+              </a:rPr>
+              <a:t> to the </a:t>
+            </a:r>
+            <a:r>
+              <a:rPr lang="en-US" sz="2400" b="1" i="1" dirty="0" err="1">
+                <a:solidFill>
+                  <a:srgbClr val="0170AD"/>
+                </a:solidFill>
+                <a:latin typeface="Lato Light"/>
+                <a:ea typeface="Lato Light"/>
+                <a:cs typeface="Lato Light"/>
+              </a:rPr>
+              <a:t>soee</a:t>
+            </a:r>
+            <a:r>
+              <a:rPr lang="en-US" sz="2400" b="1" i="1" dirty="0">
+                <a:solidFill>
+                  <a:srgbClr val="0170AD"/>
+                </a:solidFill>
+                <a:latin typeface="Lato Light"/>
+                <a:ea typeface="Lato Light"/>
+                <a:cs typeface="Lato Light"/>
+              </a:rPr>
+              <a:t> to the </a:t>
+            </a:r>
+            <a:r>
+              <a:rPr lang="en-US" sz="2400" b="1" i="1" dirty="0" err="1">
+                <a:solidFill>
+                  <a:srgbClr val="0170AD"/>
+                </a:solidFill>
+                <a:latin typeface="Lato Light"/>
+                <a:ea typeface="Lato Light"/>
+                <a:cs typeface="Lato Light"/>
+              </a:rPr>
+              <a:t>soee</a:t>
+            </a:r>
+            <a:r>
+              <a:rPr lang="en-US" sz="2400" b="1" i="1" dirty="0">
+                <a:solidFill>
+                  <a:srgbClr val="0170AD"/>
+                </a:solidFill>
+                <a:latin typeface="Lato Light"/>
+                <a:ea typeface="Lato Light"/>
+                <a:cs typeface="Lato Light"/>
+              </a:rPr>
+              <a:t> to the </a:t>
+            </a:r>
+            <a:r>
+              <a:rPr lang="en-US" sz="2400" b="1" i="1" dirty="0" err="1">
+                <a:solidFill>
+                  <a:srgbClr val="0170AD"/>
+                </a:solidFill>
+                <a:latin typeface="Lato Light"/>
+                <a:ea typeface="Lato Light"/>
+                <a:cs typeface="Lato Light"/>
+              </a:rPr>
+              <a:t>soee</a:t>
+            </a:r>
+            <a:r>
+              <a:rPr lang="en-US" sz="2400" b="1" i="1" dirty="0">
+                <a:solidFill>
+                  <a:srgbClr val="0170AD"/>
+                </a:solidFill>
+                <a:latin typeface="Lato Light"/>
+                <a:ea typeface="Lato Light"/>
+                <a:cs typeface="Lato Light"/>
+              </a:rPr>
+              <a:t> to the </a:t>
+            </a:r>
+            <a:r>
+              <a:rPr lang="en-US" sz="2400" b="1" i="1" dirty="0" err="1">
+                <a:solidFill>
+                  <a:srgbClr val="0170AD"/>
+                </a:solidFill>
+                <a:latin typeface="Lato Light"/>
+                <a:ea typeface="Lato Light"/>
+                <a:cs typeface="Lato Light"/>
+              </a:rPr>
+              <a:t>soe</a:t>
+            </a:r>
+            <a:r>
+              <a:rPr lang="en-US" sz="2400" b="1" i="1" dirty="0">
+                <a:solidFill>
+                  <a:srgbClr val="0170AD"/>
+                </a:solidFill>
+                <a:latin typeface="Lato Light"/>
+                <a:ea typeface="Lato Light"/>
+                <a:cs typeface="Lato Light"/>
+              </a:rPr>
+              <a:t> to the </a:t>
+            </a:r>
+            <a:r>
+              <a:rPr lang="en-US" sz="2400" b="1" i="1" dirty="0" err="1">
+                <a:solidFill>
+                  <a:srgbClr val="0170AD"/>
+                </a:solidFill>
+                <a:latin typeface="Lato Light"/>
+                <a:ea typeface="Lato Light"/>
+                <a:cs typeface="Lato Light"/>
+              </a:rPr>
+              <a:t>soee</a:t>
+            </a:r>
+            <a:r>
+              <a:rPr lang="en-US" sz="2400" b="1" i="1" dirty="0">
+                <a:solidFill>
+                  <a:srgbClr val="0170AD"/>
+                </a:solidFill>
+                <a:latin typeface="Lato Light"/>
+                <a:ea typeface="Lato Light"/>
+                <a:cs typeface="Lato Light"/>
+              </a:rPr>
+              <a:t> to the </a:t>
+            </a:r>
+            <a:r>
+              <a:rPr lang="en-US" sz="2400" b="1" i="1" dirty="0" err="1">
+                <a:solidFill>
+                  <a:srgbClr val="0170AD"/>
+                </a:solidFill>
+                <a:latin typeface="Lato Light"/>
+                <a:ea typeface="Lato Light"/>
+                <a:cs typeface="Lato Light"/>
+              </a:rPr>
+              <a:t>soee</a:t>
+            </a:r>
+            <a:r>
+              <a:rPr lang="en-US" sz="2400" b="1" i="1" dirty="0">
+                <a:solidFill>
+                  <a:srgbClr val="0170AD"/>
+                </a:solidFill>
+                <a:latin typeface="Lato Light"/>
+                <a:ea typeface="Lato Light"/>
+                <a:cs typeface="Lato Light"/>
+              </a:rPr>
+              <a:t> to the </a:t>
+            </a:r>
+            <a:r>
+              <a:rPr lang="en-US" sz="2400" b="1" i="1" dirty="0" err="1">
+                <a:solidFill>
+                  <a:srgbClr val="0170AD"/>
+                </a:solidFill>
+                <a:latin typeface="Lato Light"/>
+                <a:ea typeface="Lato Light"/>
+                <a:cs typeface="Lato Light"/>
+              </a:rPr>
+              <a:t>soee</a:t>
+            </a:r>
+            <a:r>
+              <a:rPr lang="en-US" sz="2400" b="1" i="1" dirty="0">
+                <a:solidFill>
+                  <a:srgbClr val="0170AD"/>
+                </a:solidFill>
+                <a:latin typeface="Lato Light"/>
+                <a:ea typeface="Lato Light"/>
+                <a:cs typeface="Lato Light"/>
+              </a:rPr>
+              <a:t> to the </a:t>
+            </a:r>
+            <a:r>
+              <a:rPr lang="en-US" sz="2400" b="1" i="1" dirty="0" err="1">
+                <a:solidFill>
+                  <a:srgbClr val="0170AD"/>
+                </a:solidFill>
+                <a:latin typeface="Lato Light"/>
+                <a:ea typeface="Lato Light"/>
+                <a:cs typeface="Lato Light"/>
+              </a:rPr>
+              <a:t>soee</a:t>
+            </a:r>
+            <a:r>
+              <a:rPr lang="en-US" sz="2400" b="1" i="1" dirty="0">
+                <a:solidFill>
+                  <a:srgbClr val="0170AD"/>
+                </a:solidFill>
+                <a:latin typeface="Lato Light"/>
+                <a:ea typeface="Lato Light"/>
+                <a:cs typeface="Lato Light"/>
+              </a:rPr>
+              <a:t> to the </a:t>
+            </a:r>
+            <a:r>
+              <a:rPr lang="en-US" sz="2400" b="1" i="1" dirty="0" err="1">
+                <a:solidFill>
+                  <a:srgbClr val="0170AD"/>
+                </a:solidFill>
+                <a:latin typeface="Lato Light"/>
+                <a:ea typeface="Lato Light"/>
+                <a:cs typeface="Lato Light"/>
+              </a:rPr>
+              <a:t>soee</a:t>
+            </a:r>
+            <a:r>
+              <a:rPr lang="en-US" sz="2400" b="1" i="1" dirty="0">
+                <a:solidFill>
+                  <a:srgbClr val="0170AD"/>
+                </a:solidFill>
+                <a:latin typeface="Lato Light"/>
+                <a:ea typeface="Lato Light"/>
+                <a:cs typeface="Lato Light"/>
+              </a:rPr>
+              <a:t> to the </a:t>
+            </a:r>
+            <a:r>
+              <a:rPr lang="en-US" sz="2400" b="1" i="1" dirty="0" err="1">
+                <a:solidFill>
+                  <a:srgbClr val="0170AD"/>
+                </a:solidFill>
+                <a:latin typeface="Lato Light"/>
+                <a:ea typeface="Lato Light"/>
+                <a:cs typeface="Lato Light"/>
+              </a:rPr>
+              <a:t>soee</a:t>
+            </a:r>
+            <a:r>
+              <a:rPr lang="en-US" sz="2400" b="1" i="1" dirty="0">
+                <a:solidFill>
+                  <a:srgbClr val="0170AD"/>
+                </a:solidFill>
+                <a:latin typeface="Lato Light"/>
+                <a:ea typeface="Lato Light"/>
+                <a:cs typeface="Lato Light"/>
+              </a:rPr>
+              <a:t> to the </a:t>
+            </a:r>
+            <a:r>
+              <a:rPr lang="en-US" sz="2400" b="1" i="1" dirty="0" err="1">
+                <a:solidFill>
+                  <a:srgbClr val="0170AD"/>
+                </a:solidFill>
+                <a:latin typeface="Lato Light"/>
+                <a:ea typeface="Lato Light"/>
+                <a:cs typeface="Lato Light"/>
+              </a:rPr>
+              <a:t>soee</a:t>
+            </a:r>
+            <a:r>
+              <a:rPr lang="en-US" sz="2400" b="1" i="1" dirty="0">
+                <a:solidFill>
+                  <a:srgbClr val="0170AD"/>
+                </a:solidFill>
+                <a:latin typeface="Lato Light"/>
+                <a:ea typeface="Lato Light"/>
+                <a:cs typeface="Lato Light"/>
+              </a:rPr>
+              <a:t> to the </a:t>
+            </a:r>
+            <a:r>
+              <a:rPr lang="en-US" sz="2400" b="1" i="1" dirty="0" err="1">
+                <a:solidFill>
+                  <a:srgbClr val="0170AD"/>
+                </a:solidFill>
+                <a:latin typeface="Lato Light"/>
+                <a:ea typeface="Lato Light"/>
+                <a:cs typeface="Lato Light"/>
+              </a:rPr>
+              <a:t>soee</a:t>
+            </a:r>
+            <a:r>
+              <a:rPr lang="en-US" sz="2400" b="1" i="1" dirty="0">
+                <a:solidFill>
+                  <a:srgbClr val="0170AD"/>
+                </a:solidFill>
+                <a:latin typeface="Lato Light"/>
+                <a:ea typeface="Lato Light"/>
+                <a:cs typeface="Lato Light"/>
+              </a:rPr>
+              <a:t> to the </a:t>
+            </a:r>
+            <a:r>
+              <a:rPr lang="en-US" sz="2400" b="1" i="1" dirty="0" err="1">
+                <a:solidFill>
+                  <a:srgbClr val="0170AD"/>
+                </a:solidFill>
+                <a:latin typeface="Lato Light"/>
+                <a:ea typeface="Lato Light"/>
+                <a:cs typeface="Lato Light"/>
+              </a:rPr>
+              <a:t>soe</a:t>
+            </a:r>
+            <a:r>
+              <a:rPr lang="en-US" sz="2400" b="1" i="1" dirty="0">
+                <a:solidFill>
+                  <a:srgbClr val="0170AD"/>
+                </a:solidFill>
+                <a:latin typeface="Lato Light"/>
+                <a:ea typeface="Lato Light"/>
+                <a:cs typeface="Lato Light"/>
+              </a:rPr>
+              <a:t> to the </a:t>
+            </a:r>
+            <a:r>
+              <a:rPr lang="en-US" sz="2400" b="1" i="1" dirty="0" err="1">
+                <a:solidFill>
+                  <a:srgbClr val="0170AD"/>
+                </a:solidFill>
+                <a:latin typeface="Lato Light"/>
+                <a:ea typeface="Lato Light"/>
+                <a:cs typeface="Lato Light"/>
+              </a:rPr>
+              <a:t>soee</a:t>
+            </a:r>
+            <a:r>
+              <a:rPr lang="en-US" sz="2400" b="1" i="1" dirty="0">
+                <a:solidFill>
+                  <a:srgbClr val="0170AD"/>
+                </a:solidFill>
+                <a:latin typeface="Lato Light"/>
+                <a:ea typeface="Lato Light"/>
+                <a:cs typeface="Lato Light"/>
+              </a:rPr>
+              <a:t> to the </a:t>
+            </a:r>
+            <a:r>
+              <a:rPr lang="en-US" sz="2400" b="1" i="1" dirty="0" err="1">
+                <a:solidFill>
+                  <a:srgbClr val="0170AD"/>
+                </a:solidFill>
+                <a:latin typeface="Lato Light"/>
+                <a:ea typeface="Lato Light"/>
+                <a:cs typeface="Lato Light"/>
+              </a:rPr>
+              <a:t>soee</a:t>
+            </a:r>
+            <a:r>
+              <a:rPr lang="en-US" sz="2400" b="1" i="1" dirty="0">
+                <a:solidFill>
+                  <a:srgbClr val="0170AD"/>
+                </a:solidFill>
+                <a:latin typeface="Lato Light"/>
+                <a:ea typeface="Lato Light"/>
+                <a:cs typeface="Lato Light"/>
+              </a:rPr>
+              <a:t> to the </a:t>
+            </a:r>
+            <a:r>
+              <a:rPr lang="en-US" sz="2400" b="1" i="1" dirty="0" err="1">
+                <a:solidFill>
+                  <a:srgbClr val="0170AD"/>
+                </a:solidFill>
+                <a:latin typeface="Lato Light"/>
+                <a:ea typeface="Lato Light"/>
+                <a:cs typeface="Lato Light"/>
+              </a:rPr>
+              <a:t>soee</a:t>
+            </a:r>
+            <a:r>
+              <a:rPr lang="en-US" sz="2400" b="1" i="1" dirty="0">
+                <a:solidFill>
+                  <a:srgbClr val="0170AD"/>
+                </a:solidFill>
+                <a:latin typeface="Lato Light"/>
+                <a:ea typeface="Lato Light"/>
+                <a:cs typeface="Lato Light"/>
+              </a:rPr>
+              <a:t> to the </a:t>
+            </a:r>
+            <a:r>
+              <a:rPr lang="en-US" sz="2400" b="1" i="1" dirty="0" err="1">
+                <a:solidFill>
+                  <a:srgbClr val="0170AD"/>
+                </a:solidFill>
+                <a:latin typeface="Lato Light"/>
+                <a:ea typeface="Lato Light"/>
+                <a:cs typeface="Lato Light"/>
+              </a:rPr>
+              <a:t>soee</a:t>
+            </a:r>
+            <a:r>
+              <a:rPr lang="en-US" sz="2400" b="1" i="1" dirty="0">
+                <a:solidFill>
+                  <a:srgbClr val="0170AD"/>
+                </a:solidFill>
+                <a:latin typeface="Lato Light"/>
+                <a:ea typeface="Lato Light"/>
+                <a:cs typeface="Lato Light"/>
+              </a:rPr>
+              <a:t> to the </a:t>
+            </a:r>
+            <a:r>
+              <a:rPr lang="en-US" sz="2400" b="1" i="1" dirty="0" err="1">
+                <a:solidFill>
+                  <a:srgbClr val="0170AD"/>
+                </a:solidFill>
+                <a:latin typeface="Lato Light"/>
+                <a:ea typeface="Lato Light"/>
+                <a:cs typeface="Lato Light"/>
+              </a:rPr>
+              <a:t>soee</a:t>
+            </a:r>
+            <a:r>
+              <a:rPr lang="en-US" sz="2400" b="1" i="1" dirty="0">
+                <a:solidFill>
+                  <a:srgbClr val="0170AD"/>
+                </a:solidFill>
+                <a:latin typeface="Lato Light"/>
+                <a:ea typeface="Lato Light"/>
+                <a:cs typeface="Lato Light"/>
+              </a:rPr>
+              <a:t> to the </a:t>
+            </a:r>
+            <a:r>
+              <a:rPr lang="en-US" sz="2400" b="1" i="1" dirty="0" err="1">
+                <a:solidFill>
+                  <a:srgbClr val="0170AD"/>
+                </a:solidFill>
+                <a:latin typeface="Lato Light"/>
+                <a:ea typeface="Lato Light"/>
+                <a:cs typeface="Lato Light"/>
+              </a:rPr>
+              <a:t>soee</a:t>
+            </a:r>
+            <a:r>
+              <a:rPr lang="en-US" sz="2400" b="1" i="1" dirty="0">
+                <a:solidFill>
+                  <a:srgbClr val="0170AD"/>
+                </a:solidFill>
+                <a:latin typeface="Lato Light"/>
+                <a:ea typeface="Lato Light"/>
+                <a:cs typeface="Lato Light"/>
+              </a:rPr>
+              <a:t> to the </a:t>
+            </a:r>
+            <a:r>
+              <a:rPr lang="en-US" sz="2400" b="1" i="1" dirty="0" err="1">
+                <a:solidFill>
+                  <a:srgbClr val="0170AD"/>
+                </a:solidFill>
+                <a:latin typeface="Lato Light"/>
+                <a:ea typeface="Lato Light"/>
+                <a:cs typeface="Lato Light"/>
+              </a:rPr>
+              <a:t>soee</a:t>
+            </a:r>
+            <a:r>
+              <a:rPr lang="en-US" sz="2400" b="1" i="1" dirty="0">
+                <a:solidFill>
+                  <a:srgbClr val="0170AD"/>
+                </a:solidFill>
+                <a:latin typeface="Lato Light"/>
+                <a:ea typeface="Lato Light"/>
+                <a:cs typeface="Lato Light"/>
+              </a:rPr>
+              <a:t> to the </a:t>
+            </a:r>
+            <a:r>
+              <a:rPr lang="en-US" sz="2400" b="1" i="1" dirty="0" err="1">
+                <a:solidFill>
+                  <a:srgbClr val="0170AD"/>
+                </a:solidFill>
+                <a:latin typeface="Lato Light"/>
+                <a:ea typeface="Lato Light"/>
+                <a:cs typeface="Lato Light"/>
+              </a:rPr>
+              <a:t>soee</a:t>
+            </a:r>
+            <a:r>
+              <a:rPr lang="en-US" sz="2400" b="1" i="1" dirty="0">
+                <a:solidFill>
+                  <a:srgbClr val="0170AD"/>
+                </a:solidFill>
+                <a:latin typeface="Lato Light"/>
+                <a:ea typeface="Lato Light"/>
+                <a:cs typeface="Lato Light"/>
+              </a:rPr>
+              <a:t> to the </a:t>
+            </a:r>
+            <a:r>
+              <a:rPr lang="en-US" sz="2400" b="1" i="1" dirty="0" err="1">
+                <a:solidFill>
+                  <a:srgbClr val="0170AD"/>
+                </a:solidFill>
+                <a:latin typeface="Lato Light"/>
+                <a:ea typeface="Lato Light"/>
+                <a:cs typeface="Lato Light"/>
+              </a:rPr>
+              <a:t>soe</a:t>
+            </a:r>
+            <a:r>
+              <a:rPr lang="en-US" sz="2400" b="1" i="1" dirty="0">
+                <a:solidFill>
+                  <a:srgbClr val="0170AD"/>
+                </a:solidFill>
+                <a:latin typeface="Lato Light"/>
+                <a:ea typeface="Lato Light"/>
+                <a:cs typeface="Lato Light"/>
+              </a:rPr>
+              <a:t> t"</a:t>
+            </a:r>
+          </a:p>
+        </p:txBody>
+      </p:sp>
+      <p:sp>
+        <p:nvSpPr>
+          <p:cNvPr id="61" name="Shape 188">
+            <a:extLst>
+              <a:ext uri="{FF2B5EF4-FFF2-40B4-BE49-F238E27FC236}">
+                <a16:creationId xmlns:a16="http://schemas.microsoft.com/office/drawing/2014/main" id="{2B32377F-0FE8-1741-92BF-33798E6B7A9E}"/>
+              </a:ext>
+            </a:extLst>
+          </p:cNvPr>
+          <p:cNvSpPr/>
+          <p:nvPr/>
+        </p:nvSpPr>
+        <p:spPr>
+          <a:xfrm>
+            <a:off x="24777718" y="29242167"/>
+            <a:ext cx="3755777" cy="584576"/>
+          </a:xfrm>
+          <a:prstGeom prst="rect">
+            <a:avLst/>
+          </a:prstGeom>
+          <a:noFill/>
+          <a:ln w="12700" cap="flat">
+            <a:noFill/>
+            <a:miter lim="400000"/>
+          </a:ln>
+          <a:effectLst/>
+          <a:extLst>
+            <a:ext uri="{C572A759-6A51-4108-AA02-DFA0A04FC94B}">
+              <ma14:wrappingTextBoxFlag xmlns="" xmlns:ma14="http://schemas.microsoft.com/office/mac/drawingml/2011/main" val="1"/>
+            </a:ext>
+          </a:extLst>
+        </p:spPr>
+        <p:txBody>
+          <a:bodyPr wrap="square" lIns="0" tIns="0" rIns="0" bIns="0" numCol="1" anchor="t">
+            <a:noAutofit/>
+          </a:bodyPr>
+          <a:lstStyle>
+            <a:lvl1pPr algn="l" defTabSz="584200">
+              <a:lnSpc>
+                <a:spcPct val="110000"/>
+              </a:lnSpc>
+              <a:spcBef>
+                <a:spcPts val="3000"/>
+              </a:spcBef>
+              <a:defRPr sz="2000">
+                <a:solidFill>
+                  <a:srgbClr val="4C4C4C"/>
+                </a:solidFill>
+                <a:latin typeface="Helvetica Neue Light"/>
+                <a:ea typeface="Helvetica Neue Light"/>
+                <a:cs typeface="Helvetica Neue Light"/>
+                <a:sym typeface="Helvetica Neue Light"/>
+              </a:defRPr>
+            </a:lvl1pPr>
+          </a:lstStyle>
+          <a:p>
+            <a:pPr lvl="0" algn="ctr">
+              <a:lnSpc>
+                <a:spcPct val="100000"/>
+              </a:lnSpc>
+              <a:defRPr sz="1800">
+                <a:solidFill>
+                  <a:srgbClr val="000000"/>
+                </a:solidFill>
+              </a:defRPr>
+            </a:pPr>
+            <a:r>
+              <a:rPr lang="en-US" sz="2400" b="1" dirty="0">
+                <a:solidFill>
+                  <a:srgbClr val="0170AD"/>
+                </a:solidFill>
+                <a:latin typeface="Lato Light"/>
+                <a:ea typeface="Lato Light"/>
+                <a:cs typeface="Lato Light"/>
+              </a:rPr>
+              <a:t>RNN result</a:t>
             </a:r>
           </a:p>
         </p:txBody>

</xml_diff>

<commit_message>
Fixed a couple of typos.
</commit_message>
<xml_diff>
--- a/Poster/Poster_Team_55.pptx
+++ b/Poster/Poster_Team_55.pptx
@@ -324,7 +324,7 @@
           <a:p>
             <a:fld id="{B080005E-6FBA-574A-8FE4-9107E485CAF7}" type="datetimeFigureOut">
               <a:rPr lang="en-US" smtClean="0"/>
-              <a:t>2/4/18</a:t>
+              <a:t>2/4/2018</a:t>
             </a:fld>
             <a:endParaRPr lang="en-US"/>
           </a:p>
@@ -366,7 +366,7 @@
           <a:p>
             <a:fld id="{CB3AF7B0-A4D4-1F41-A937-6DE6C06B179B}" type="slidenum">
               <a:rPr lang="en-US" smtClean="0"/>
-              <a:t>‹Nr.›</a:t>
+              <a:t>‹#›</a:t>
             </a:fld>
             <a:endParaRPr lang="en-US"/>
           </a:p>
@@ -494,7 +494,7 @@
           <a:p>
             <a:fld id="{B080005E-6FBA-574A-8FE4-9107E485CAF7}" type="datetimeFigureOut">
               <a:rPr lang="en-US" smtClean="0"/>
-              <a:t>2/4/18</a:t>
+              <a:t>2/4/2018</a:t>
             </a:fld>
             <a:endParaRPr lang="en-US"/>
           </a:p>
@@ -536,7 +536,7 @@
           <a:p>
             <a:fld id="{CB3AF7B0-A4D4-1F41-A937-6DE6C06B179B}" type="slidenum">
               <a:rPr lang="en-US" smtClean="0"/>
-              <a:t>‹Nr.›</a:t>
+              <a:t>‹#›</a:t>
             </a:fld>
             <a:endParaRPr lang="en-US"/>
           </a:p>
@@ -674,7 +674,7 @@
           <a:p>
             <a:fld id="{B080005E-6FBA-574A-8FE4-9107E485CAF7}" type="datetimeFigureOut">
               <a:rPr lang="en-US" smtClean="0"/>
-              <a:t>2/4/18</a:t>
+              <a:t>2/4/2018</a:t>
             </a:fld>
             <a:endParaRPr lang="en-US"/>
           </a:p>
@@ -716,7 +716,7 @@
           <a:p>
             <a:fld id="{CB3AF7B0-A4D4-1F41-A937-6DE6C06B179B}" type="slidenum">
               <a:rPr lang="en-US" smtClean="0"/>
-              <a:t>‹Nr.›</a:t>
+              <a:t>‹#›</a:t>
             </a:fld>
             <a:endParaRPr lang="en-US"/>
           </a:p>
@@ -1120,7 +1120,7 @@
           <a:p>
             <a:fld id="{B080005E-6FBA-574A-8FE4-9107E485CAF7}" type="datetimeFigureOut">
               <a:rPr lang="en-US" smtClean="0"/>
-              <a:t>2/4/18</a:t>
+              <a:t>2/4/2018</a:t>
             </a:fld>
             <a:endParaRPr lang="en-US"/>
           </a:p>
@@ -1162,7 +1162,7 @@
           <a:p>
             <a:fld id="{CB3AF7B0-A4D4-1F41-A937-6DE6C06B179B}" type="slidenum">
               <a:rPr lang="en-US" smtClean="0"/>
-              <a:t>‹Nr.›</a:t>
+              <a:t>‹#›</a:t>
             </a:fld>
             <a:endParaRPr lang="en-US"/>
           </a:p>
@@ -1364,7 +1364,7 @@
           <a:p>
             <a:fld id="{B080005E-6FBA-574A-8FE4-9107E485CAF7}" type="datetimeFigureOut">
               <a:rPr lang="en-US" smtClean="0"/>
-              <a:t>2/4/18</a:t>
+              <a:t>2/4/2018</a:t>
             </a:fld>
             <a:endParaRPr lang="en-US"/>
           </a:p>
@@ -1406,7 +1406,7 @@
           <a:p>
             <a:fld id="{CB3AF7B0-A4D4-1F41-A937-6DE6C06B179B}" type="slidenum">
               <a:rPr lang="en-US" smtClean="0"/>
-              <a:t>‹Nr.›</a:t>
+              <a:t>‹#›</a:t>
             </a:fld>
             <a:endParaRPr lang="en-US"/>
           </a:p>
@@ -1596,7 +1596,7 @@
           <a:p>
             <a:fld id="{B080005E-6FBA-574A-8FE4-9107E485CAF7}" type="datetimeFigureOut">
               <a:rPr lang="en-US" smtClean="0"/>
-              <a:t>2/4/18</a:t>
+              <a:t>2/4/2018</a:t>
             </a:fld>
             <a:endParaRPr lang="en-US"/>
           </a:p>
@@ -1638,7 +1638,7 @@
           <a:p>
             <a:fld id="{CB3AF7B0-A4D4-1F41-A937-6DE6C06B179B}" type="slidenum">
               <a:rPr lang="en-US" smtClean="0"/>
-              <a:t>‹Nr.›</a:t>
+              <a:t>‹#›</a:t>
             </a:fld>
             <a:endParaRPr lang="en-US"/>
           </a:p>
@@ -1963,7 +1963,7 @@
           <a:p>
             <a:fld id="{B080005E-6FBA-574A-8FE4-9107E485CAF7}" type="datetimeFigureOut">
               <a:rPr lang="en-US" smtClean="0"/>
-              <a:t>2/4/18</a:t>
+              <a:t>2/4/2018</a:t>
             </a:fld>
             <a:endParaRPr lang="en-US"/>
           </a:p>
@@ -2005,7 +2005,7 @@
           <a:p>
             <a:fld id="{CB3AF7B0-A4D4-1F41-A937-6DE6C06B179B}" type="slidenum">
               <a:rPr lang="en-US" smtClean="0"/>
-              <a:t>‹Nr.›</a:t>
+              <a:t>‹#›</a:t>
             </a:fld>
             <a:endParaRPr lang="en-US"/>
           </a:p>
@@ -2081,7 +2081,7 @@
           <a:p>
             <a:fld id="{B080005E-6FBA-574A-8FE4-9107E485CAF7}" type="datetimeFigureOut">
               <a:rPr lang="en-US" smtClean="0"/>
-              <a:t>2/4/18</a:t>
+              <a:t>2/4/2018</a:t>
             </a:fld>
             <a:endParaRPr lang="en-US"/>
           </a:p>
@@ -2123,7 +2123,7 @@
           <a:p>
             <a:fld id="{CB3AF7B0-A4D4-1F41-A937-6DE6C06B179B}" type="slidenum">
               <a:rPr lang="en-US" smtClean="0"/>
-              <a:t>‹Nr.›</a:t>
+              <a:t>‹#›</a:t>
             </a:fld>
             <a:endParaRPr lang="en-US"/>
           </a:p>
@@ -2176,7 +2176,7 @@
           <a:p>
             <a:fld id="{B080005E-6FBA-574A-8FE4-9107E485CAF7}" type="datetimeFigureOut">
               <a:rPr lang="en-US" smtClean="0"/>
-              <a:t>2/4/18</a:t>
+              <a:t>2/4/2018</a:t>
             </a:fld>
             <a:endParaRPr lang="en-US"/>
           </a:p>
@@ -2218,7 +2218,7 @@
           <a:p>
             <a:fld id="{CB3AF7B0-A4D4-1F41-A937-6DE6C06B179B}" type="slidenum">
               <a:rPr lang="en-US" smtClean="0"/>
-              <a:t>‹Nr.›</a:t>
+              <a:t>‹#›</a:t>
             </a:fld>
             <a:endParaRPr lang="en-US"/>
           </a:p>
@@ -2453,7 +2453,7 @@
           <a:p>
             <a:fld id="{B080005E-6FBA-574A-8FE4-9107E485CAF7}" type="datetimeFigureOut">
               <a:rPr lang="en-US" smtClean="0"/>
-              <a:t>2/4/18</a:t>
+              <a:t>2/4/2018</a:t>
             </a:fld>
             <a:endParaRPr lang="en-US"/>
           </a:p>
@@ -2495,7 +2495,7 @@
           <a:p>
             <a:fld id="{CB3AF7B0-A4D4-1F41-A937-6DE6C06B179B}" type="slidenum">
               <a:rPr lang="en-US" smtClean="0"/>
-              <a:t>‹Nr.›</a:t>
+              <a:t>‹#›</a:t>
             </a:fld>
             <a:endParaRPr lang="en-US"/>
           </a:p>
@@ -2710,7 +2710,7 @@
           <a:p>
             <a:fld id="{B080005E-6FBA-574A-8FE4-9107E485CAF7}" type="datetimeFigureOut">
               <a:rPr lang="en-US" smtClean="0"/>
-              <a:t>2/4/18</a:t>
+              <a:t>2/4/2018</a:t>
             </a:fld>
             <a:endParaRPr lang="en-US"/>
           </a:p>
@@ -2752,7 +2752,7 @@
           <a:p>
             <a:fld id="{CB3AF7B0-A4D4-1F41-A937-6DE6C06B179B}" type="slidenum">
               <a:rPr lang="en-US" smtClean="0"/>
-              <a:t>‹Nr.›</a:t>
+              <a:t>‹#›</a:t>
             </a:fld>
             <a:endParaRPr lang="en-US"/>
           </a:p>
@@ -2923,7 +2923,7 @@
           <a:p>
             <a:fld id="{B080005E-6FBA-574A-8FE4-9107E485CAF7}" type="datetimeFigureOut">
               <a:rPr lang="en-US" smtClean="0"/>
-              <a:t>2/4/18</a:t>
+              <a:t>2/4/2018</a:t>
             </a:fld>
             <a:endParaRPr lang="en-US"/>
           </a:p>
@@ -3001,7 +3001,7 @@
           <a:p>
             <a:fld id="{CB3AF7B0-A4D4-1F41-A937-6DE6C06B179B}" type="slidenum">
               <a:rPr lang="en-US" smtClean="0"/>
-              <a:t>‹Nr.›</a:t>
+              <a:t>‹#›</a:t>
             </a:fld>
             <a:endParaRPr lang="en-US"/>
           </a:p>
@@ -3337,8 +3337,8 @@
         </p:nvSpPr>
         <p:spPr>
           <a:xfrm>
-            <a:off x="7549847" y="420730"/>
-            <a:ext cx="27951883" cy="2395015"/>
+            <a:off x="6216148" y="420730"/>
+            <a:ext cx="30619281" cy="2395015"/>
           </a:xfrm>
           <a:prstGeom prst="rect">
             <a:avLst/>
@@ -3388,16 +3388,6 @@
               </a:lnSpc>
             </a:pPr>
             <a:r>
-              <a:rPr lang="en-US" sz="2800" b="1" dirty="0" err="1">
-                <a:solidFill>
-                  <a:srgbClr val="0170AD"/>
-                </a:solidFill>
-                <a:latin typeface="Lato Light"/>
-                <a:cs typeface="Lato Light"/>
-              </a:rPr>
-              <a:t>Arda</a:t>
-            </a:r>
-            <a:r>
               <a:rPr lang="en-US" sz="2800" b="1" dirty="0">
                 <a:solidFill>
                   <a:srgbClr val="0170AD"/>
@@ -3405,17 +3395,47 @@
                 <a:latin typeface="Lato Light"/>
                 <a:cs typeface="Lato Light"/>
               </a:rPr>
+              <a:t>Arda Özdere     </a:t>
+            </a:r>
+            <a:r>
+              <a:rPr lang="en-US" sz="2800" b="1" dirty="0" err="1" smtClean="0">
+                <a:solidFill>
+                  <a:srgbClr val="0170AD"/>
+                </a:solidFill>
+                <a:latin typeface="Lato Light"/>
+                <a:cs typeface="Lato Light"/>
+              </a:rPr>
+              <a:t>Haydar</a:t>
+            </a:r>
+            <a:r>
+              <a:rPr lang="en-US" sz="2800" b="1" dirty="0" smtClean="0">
+                <a:solidFill>
+                  <a:srgbClr val="0170AD"/>
+                </a:solidFill>
+                <a:latin typeface="Lato Light"/>
+                <a:cs typeface="Lato Light"/>
+              </a:rPr>
               <a:t> </a:t>
             </a:r>
             <a:r>
-              <a:rPr lang="en-US" sz="2800" b="1" dirty="0" err="1">
-                <a:solidFill>
-                  <a:srgbClr val="0170AD"/>
-                </a:solidFill>
-                <a:latin typeface="Lato Light"/>
-                <a:cs typeface="Lato Light"/>
-              </a:rPr>
-              <a:t>Özdere</a:t>
+              <a:rPr lang="en-US" sz="2800" b="1" dirty="0" err="1" smtClean="0">
+                <a:solidFill>
+                  <a:srgbClr val="0170AD"/>
+                </a:solidFill>
+                <a:latin typeface="Lato Light"/>
+                <a:cs typeface="Lato Light"/>
+              </a:rPr>
+              <a:t>Şahin</a:t>
+            </a:r>
+            <a:r>
+              <a:rPr lang="en-US" sz="2800" b="1" dirty="0" smtClean="0">
+                <a:solidFill>
+                  <a:srgbClr val="0170AD"/>
+                </a:solidFill>
+                <a:latin typeface="Lato Light"/>
+                <a:cs typeface="Lato Light"/>
+              </a:rPr>
+              <a:t>     </a:t>
             </a:r>
             <a:r>
               <a:rPr lang="en-US" sz="2800" b="1" dirty="0">
@@ -3425,47 +3445,7 @@
                 <a:latin typeface="Lato Light"/>
                 <a:cs typeface="Lato Light"/>
               </a:rPr>
-              <a:t>     </a:t>
-            </a:r>
-            <a:r>
-              <a:rPr lang="en-US" sz="2800" b="1" dirty="0" err="1">
-                <a:solidFill>
-                  <a:srgbClr val="0170AD"/>
-                </a:solidFill>
-                <a:latin typeface="Lato Light"/>
-                <a:cs typeface="Lato Light"/>
-              </a:rPr>
-              <a:t>Sahin</a:t>
-            </a:r>
-            <a:r>
-              <a:rPr lang="en-US" sz="2800" b="1" dirty="0">
-                <a:solidFill>
-                  <a:srgbClr val="0170AD"/>
-                </a:solidFill>
-                <a:latin typeface="Lato Light"/>
-                <a:cs typeface="Lato Light"/>
-              </a:rPr>
-              <a:t> </a:t>
-            </a:r>
-            <a:r>
-              <a:rPr lang="en-US" sz="2800" b="1" dirty="0" err="1">
-                <a:solidFill>
-                  <a:srgbClr val="0170AD"/>
-                </a:solidFill>
-                <a:latin typeface="Lato Light"/>
-                <a:cs typeface="Lato Light"/>
-              </a:rPr>
-              <a:t>Haydar</a:t>
-            </a:r>
-            <a:r>
-              <a:rPr lang="en-US" sz="2800" b="1" dirty="0">
-                <a:solidFill>
-                  <a:srgbClr val="0170AD"/>
-                </a:solidFill>
-                <a:latin typeface="Lato Light"/>
-                <a:cs typeface="Lato Light"/>
-              </a:rPr>
-              <a:t>     Sebastian Muhle</a:t>
+              <a:t>Sebastian Muhle</a:t>
             </a:r>
           </a:p>
         </p:txBody>
@@ -8726,8 +8706,8 @@
           </a:p>
         </p:txBody>
       </p:sp>
-      <mc:AlternateContent xmlns:mc="http://schemas.openxmlformats.org/markup-compatibility/2006">
-        <mc:Choice xmlns:a14="http://schemas.microsoft.com/office/drawing/2010/main" Requires="a14">
+      <mc:AlternateContent xmlns:mc="http://schemas.openxmlformats.org/markup-compatibility/2006" xmlns:a14="http://schemas.microsoft.com/office/drawing/2010/main">
+        <mc:Choice Requires="a14">
           <p:sp>
             <p:nvSpPr>
               <p:cNvPr id="54" name="Shape 188">
@@ -9158,7 +9138,7 @@
             </p:txBody>
           </p:sp>
         </mc:Choice>
-        <mc:Fallback>
+        <mc:Fallback xmlns="">
           <p:sp>
             <p:nvSpPr>
               <p:cNvPr id="54" name="Shape 188">
@@ -9554,7 +9534,7 @@
                 <a:ea typeface="Lato Light"/>
                 <a:cs typeface="Lato Light"/>
               </a:rPr>
-              <a:t>. Further research is necessary to find out if one of the architectures platoons as we are getting closer to a 0.83 score</a:t>
+              <a:t>. Further research is necessary to find out if one of the architectures plateaus as we are getting closer to a 0.83 score</a:t>
             </a:r>
           </a:p>
           <a:p>

</xml_diff>

<commit_message>
Added the sampling part
</commit_message>
<xml_diff>
--- a/Poster/Poster_Team_55.pptx
+++ b/Poster/Poster_Team_55.pptx
@@ -320,7 +320,7 @@
           <a:p>
             <a:fld id="{B080005E-6FBA-574A-8FE4-9107E485CAF7}" type="datetimeFigureOut">
               <a:rPr lang="en-US" smtClean="0"/>
-              <a:t>2/4/18</a:t>
+              <a:t>2/5/18</a:t>
             </a:fld>
             <a:endParaRPr lang="en-US"/>
           </a:p>
@@ -362,7 +362,7 @@
           <a:p>
             <a:fld id="{CB3AF7B0-A4D4-1F41-A937-6DE6C06B179B}" type="slidenum">
               <a:rPr lang="en-US" smtClean="0"/>
-              <a:t>‹#›</a:t>
+              <a:t>‹Nr.›</a:t>
             </a:fld>
             <a:endParaRPr lang="en-US"/>
           </a:p>
@@ -490,7 +490,7 @@
           <a:p>
             <a:fld id="{B080005E-6FBA-574A-8FE4-9107E485CAF7}" type="datetimeFigureOut">
               <a:rPr lang="en-US" smtClean="0"/>
-              <a:t>2/4/18</a:t>
+              <a:t>2/5/18</a:t>
             </a:fld>
             <a:endParaRPr lang="en-US"/>
           </a:p>
@@ -532,7 +532,7 @@
           <a:p>
             <a:fld id="{CB3AF7B0-A4D4-1F41-A937-6DE6C06B179B}" type="slidenum">
               <a:rPr lang="en-US" smtClean="0"/>
-              <a:t>‹#›</a:t>
+              <a:t>‹Nr.›</a:t>
             </a:fld>
             <a:endParaRPr lang="en-US"/>
           </a:p>
@@ -670,7 +670,7 @@
           <a:p>
             <a:fld id="{B080005E-6FBA-574A-8FE4-9107E485CAF7}" type="datetimeFigureOut">
               <a:rPr lang="en-US" smtClean="0"/>
-              <a:t>2/4/18</a:t>
+              <a:t>2/5/18</a:t>
             </a:fld>
             <a:endParaRPr lang="en-US"/>
           </a:p>
@@ -712,7 +712,7 @@
           <a:p>
             <a:fld id="{CB3AF7B0-A4D4-1F41-A937-6DE6C06B179B}" type="slidenum">
               <a:rPr lang="en-US" smtClean="0"/>
-              <a:t>‹#›</a:t>
+              <a:t>‹Nr.›</a:t>
             </a:fld>
             <a:endParaRPr lang="en-US"/>
           </a:p>
@@ -1116,7 +1116,7 @@
           <a:p>
             <a:fld id="{B080005E-6FBA-574A-8FE4-9107E485CAF7}" type="datetimeFigureOut">
               <a:rPr lang="en-US" smtClean="0"/>
-              <a:t>2/4/18</a:t>
+              <a:t>2/5/18</a:t>
             </a:fld>
             <a:endParaRPr lang="en-US"/>
           </a:p>
@@ -1158,7 +1158,7 @@
           <a:p>
             <a:fld id="{CB3AF7B0-A4D4-1F41-A937-6DE6C06B179B}" type="slidenum">
               <a:rPr lang="en-US" smtClean="0"/>
-              <a:t>‹#›</a:t>
+              <a:t>‹Nr.›</a:t>
             </a:fld>
             <a:endParaRPr lang="en-US"/>
           </a:p>
@@ -1360,7 +1360,7 @@
           <a:p>
             <a:fld id="{B080005E-6FBA-574A-8FE4-9107E485CAF7}" type="datetimeFigureOut">
               <a:rPr lang="en-US" smtClean="0"/>
-              <a:t>2/4/18</a:t>
+              <a:t>2/5/18</a:t>
             </a:fld>
             <a:endParaRPr lang="en-US"/>
           </a:p>
@@ -1402,7 +1402,7 @@
           <a:p>
             <a:fld id="{CB3AF7B0-A4D4-1F41-A937-6DE6C06B179B}" type="slidenum">
               <a:rPr lang="en-US" smtClean="0"/>
-              <a:t>‹#›</a:t>
+              <a:t>‹Nr.›</a:t>
             </a:fld>
             <a:endParaRPr lang="en-US"/>
           </a:p>
@@ -1592,7 +1592,7 @@
           <a:p>
             <a:fld id="{B080005E-6FBA-574A-8FE4-9107E485CAF7}" type="datetimeFigureOut">
               <a:rPr lang="en-US" smtClean="0"/>
-              <a:t>2/4/18</a:t>
+              <a:t>2/5/18</a:t>
             </a:fld>
             <a:endParaRPr lang="en-US"/>
           </a:p>
@@ -1634,7 +1634,7 @@
           <a:p>
             <a:fld id="{CB3AF7B0-A4D4-1F41-A937-6DE6C06B179B}" type="slidenum">
               <a:rPr lang="en-US" smtClean="0"/>
-              <a:t>‹#›</a:t>
+              <a:t>‹Nr.›</a:t>
             </a:fld>
             <a:endParaRPr lang="en-US"/>
           </a:p>
@@ -1959,7 +1959,7 @@
           <a:p>
             <a:fld id="{B080005E-6FBA-574A-8FE4-9107E485CAF7}" type="datetimeFigureOut">
               <a:rPr lang="en-US" smtClean="0"/>
-              <a:t>2/4/18</a:t>
+              <a:t>2/5/18</a:t>
             </a:fld>
             <a:endParaRPr lang="en-US"/>
           </a:p>
@@ -2001,7 +2001,7 @@
           <a:p>
             <a:fld id="{CB3AF7B0-A4D4-1F41-A937-6DE6C06B179B}" type="slidenum">
               <a:rPr lang="en-US" smtClean="0"/>
-              <a:t>‹#›</a:t>
+              <a:t>‹Nr.›</a:t>
             </a:fld>
             <a:endParaRPr lang="en-US"/>
           </a:p>
@@ -2077,7 +2077,7 @@
           <a:p>
             <a:fld id="{B080005E-6FBA-574A-8FE4-9107E485CAF7}" type="datetimeFigureOut">
               <a:rPr lang="en-US" smtClean="0"/>
-              <a:t>2/4/18</a:t>
+              <a:t>2/5/18</a:t>
             </a:fld>
             <a:endParaRPr lang="en-US"/>
           </a:p>
@@ -2119,7 +2119,7 @@
           <a:p>
             <a:fld id="{CB3AF7B0-A4D4-1F41-A937-6DE6C06B179B}" type="slidenum">
               <a:rPr lang="en-US" smtClean="0"/>
-              <a:t>‹#›</a:t>
+              <a:t>‹Nr.›</a:t>
             </a:fld>
             <a:endParaRPr lang="en-US"/>
           </a:p>
@@ -2172,7 +2172,7 @@
           <a:p>
             <a:fld id="{B080005E-6FBA-574A-8FE4-9107E485CAF7}" type="datetimeFigureOut">
               <a:rPr lang="en-US" smtClean="0"/>
-              <a:t>2/4/18</a:t>
+              <a:t>2/5/18</a:t>
             </a:fld>
             <a:endParaRPr lang="en-US"/>
           </a:p>
@@ -2214,7 +2214,7 @@
           <a:p>
             <a:fld id="{CB3AF7B0-A4D4-1F41-A937-6DE6C06B179B}" type="slidenum">
               <a:rPr lang="en-US" smtClean="0"/>
-              <a:t>‹#›</a:t>
+              <a:t>‹Nr.›</a:t>
             </a:fld>
             <a:endParaRPr lang="en-US"/>
           </a:p>
@@ -2449,7 +2449,7 @@
           <a:p>
             <a:fld id="{B080005E-6FBA-574A-8FE4-9107E485CAF7}" type="datetimeFigureOut">
               <a:rPr lang="en-US" smtClean="0"/>
-              <a:t>2/4/18</a:t>
+              <a:t>2/5/18</a:t>
             </a:fld>
             <a:endParaRPr lang="en-US"/>
           </a:p>
@@ -2491,7 +2491,7 @@
           <a:p>
             <a:fld id="{CB3AF7B0-A4D4-1F41-A937-6DE6C06B179B}" type="slidenum">
               <a:rPr lang="en-US" smtClean="0"/>
-              <a:t>‹#›</a:t>
+              <a:t>‹Nr.›</a:t>
             </a:fld>
             <a:endParaRPr lang="en-US"/>
           </a:p>
@@ -2706,7 +2706,7 @@
           <a:p>
             <a:fld id="{B080005E-6FBA-574A-8FE4-9107E485CAF7}" type="datetimeFigureOut">
               <a:rPr lang="en-US" smtClean="0"/>
-              <a:t>2/4/18</a:t>
+              <a:t>2/5/18</a:t>
             </a:fld>
             <a:endParaRPr lang="en-US"/>
           </a:p>
@@ -2748,7 +2748,7 @@
           <a:p>
             <a:fld id="{CB3AF7B0-A4D4-1F41-A937-6DE6C06B179B}" type="slidenum">
               <a:rPr lang="en-US" smtClean="0"/>
-              <a:t>‹#›</a:t>
+              <a:t>‹Nr.›</a:t>
             </a:fld>
             <a:endParaRPr lang="en-US"/>
           </a:p>
@@ -2919,7 +2919,7 @@
           <a:p>
             <a:fld id="{B080005E-6FBA-574A-8FE4-9107E485CAF7}" type="datetimeFigureOut">
               <a:rPr lang="en-US" smtClean="0"/>
-              <a:t>2/4/18</a:t>
+              <a:t>2/5/18</a:t>
             </a:fld>
             <a:endParaRPr lang="en-US"/>
           </a:p>
@@ -2997,7 +2997,7 @@
           <a:p>
             <a:fld id="{CB3AF7B0-A4D4-1F41-A937-6DE6C06B179B}" type="slidenum">
               <a:rPr lang="en-US" smtClean="0"/>
-              <a:t>‹#›</a:t>
+              <a:t>‹Nr.›</a:t>
             </a:fld>
             <a:endParaRPr lang="en-US"/>
           </a:p>
@@ -3394,7 +3394,7 @@
               <a:t>Arda Özdere     </a:t>
             </a:r>
             <a:r>
-              <a:rPr lang="en-US" sz="2800" b="1" dirty="0" err="1" smtClean="0">
+              <a:rPr lang="en-US" sz="2800" b="1" dirty="0" err="1">
                 <a:solidFill>
                   <a:srgbClr val="0170AD"/>
                 </a:solidFill>
@@ -3404,7 +3404,7 @@
               <a:t>Haydar</a:t>
             </a:r>
             <a:r>
-              <a:rPr lang="en-US" sz="2800" b="1" dirty="0" smtClean="0">
+              <a:rPr lang="en-US" sz="2800" b="1" dirty="0">
                 <a:solidFill>
                   <a:srgbClr val="0170AD"/>
                 </a:solidFill>
@@ -3414,7 +3414,7 @@
               <a:t> </a:t>
             </a:r>
             <a:r>
-              <a:rPr lang="en-US" sz="2800" b="1" dirty="0" err="1" smtClean="0">
+              <a:rPr lang="en-US" sz="2800" b="1" dirty="0" err="1">
                 <a:solidFill>
                   <a:srgbClr val="0170AD"/>
                 </a:solidFill>
@@ -3424,16 +3424,6 @@
               <a:t>Şahin</a:t>
             </a:r>
             <a:r>
-              <a:rPr lang="en-US" sz="2800" b="1" dirty="0" smtClean="0">
-                <a:solidFill>
-                  <a:srgbClr val="0170AD"/>
-                </a:solidFill>
-                <a:latin typeface="Lato Light"/>
-                <a:cs typeface="Lato Light"/>
-              </a:rPr>
-              <a:t>     </a:t>
-            </a:r>
-            <a:r>
               <a:rPr lang="en-US" sz="2800" b="1" dirty="0">
                 <a:solidFill>
                   <a:srgbClr val="0170AD"/>
@@ -3441,7 +3431,7 @@
                 <a:latin typeface="Lato Light"/>
                 <a:cs typeface="Lato Light"/>
               </a:rPr>
-              <a:t>Sebastian Muhle</a:t>
+              <a:t>     Sebastian Muhle</a:t>
             </a:r>
           </a:p>
         </p:txBody>
@@ -3451,7 +3441,7 @@
           <p:cNvPr id="10" name="Rectangle 11">
             <a:extLst>
               <a:ext uri="{FF2B5EF4-FFF2-40B4-BE49-F238E27FC236}">
-                <a16:creationId xmlns:a16="http://schemas.microsoft.com/office/drawing/2014/main" xmlns="" id="{0431C963-9173-404D-B59D-5057E6AB0E81}"/>
+                <a16:creationId xmlns:a16="http://schemas.microsoft.com/office/drawing/2014/main" id="{0431C963-9173-404D-B59D-5057E6AB0E81}"/>
               </a:ext>
             </a:extLst>
           </p:cNvPr>
@@ -3511,7 +3501,7 @@
           <p:cNvPr id="9" name="Grafik 8">
             <a:extLst>
               <a:ext uri="{FF2B5EF4-FFF2-40B4-BE49-F238E27FC236}">
-                <a16:creationId xmlns:a16="http://schemas.microsoft.com/office/drawing/2014/main" xmlns="" id="{D79127DC-152A-4642-92EC-9900EEDF9A17}"/>
+                <a16:creationId xmlns:a16="http://schemas.microsoft.com/office/drawing/2014/main" id="{D79127DC-152A-4642-92EC-9900EEDF9A17}"/>
               </a:ext>
             </a:extLst>
           </p:cNvPr>
@@ -3547,7 +3537,7 @@
           <p:cNvPr id="14" name="Rectangle 11">
             <a:extLst>
               <a:ext uri="{FF2B5EF4-FFF2-40B4-BE49-F238E27FC236}">
-                <a16:creationId xmlns:a16="http://schemas.microsoft.com/office/drawing/2014/main" xmlns="" id="{E0823B2F-1851-1B47-9D9F-1AB036AEF07D}"/>
+                <a16:creationId xmlns:a16="http://schemas.microsoft.com/office/drawing/2014/main" id="{E0823B2F-1851-1B47-9D9F-1AB036AEF07D}"/>
               </a:ext>
             </a:extLst>
           </p:cNvPr>
@@ -3607,7 +3597,7 @@
           <p:cNvPr id="15" name="Rectangle 11">
             <a:extLst>
               <a:ext uri="{FF2B5EF4-FFF2-40B4-BE49-F238E27FC236}">
-                <a16:creationId xmlns:a16="http://schemas.microsoft.com/office/drawing/2014/main" xmlns="" id="{A1447456-217B-154B-A431-AE64D02CBF20}"/>
+                <a16:creationId xmlns:a16="http://schemas.microsoft.com/office/drawing/2014/main" id="{A1447456-217B-154B-A431-AE64D02CBF20}"/>
               </a:ext>
             </a:extLst>
           </p:cNvPr>
@@ -3667,7 +3657,7 @@
           <p:cNvPr id="16" name="Rectangle 11">
             <a:extLst>
               <a:ext uri="{FF2B5EF4-FFF2-40B4-BE49-F238E27FC236}">
-                <a16:creationId xmlns:a16="http://schemas.microsoft.com/office/drawing/2014/main" xmlns="" id="{EB0E2462-ABD5-874A-A109-24FE85DDAE13}"/>
+                <a16:creationId xmlns:a16="http://schemas.microsoft.com/office/drawing/2014/main" id="{EB0E2462-ABD5-874A-A109-24FE85DDAE13}"/>
               </a:ext>
             </a:extLst>
           </p:cNvPr>
@@ -3727,7 +3717,7 @@
           <p:cNvPr id="17" name="Rectangle 11">
             <a:extLst>
               <a:ext uri="{FF2B5EF4-FFF2-40B4-BE49-F238E27FC236}">
-                <a16:creationId xmlns:a16="http://schemas.microsoft.com/office/drawing/2014/main" xmlns="" id="{680317AF-DA48-FA43-98F8-57C8AB19B6D7}"/>
+                <a16:creationId xmlns:a16="http://schemas.microsoft.com/office/drawing/2014/main" id="{680317AF-DA48-FA43-98F8-57C8AB19B6D7}"/>
               </a:ext>
             </a:extLst>
           </p:cNvPr>
@@ -3787,7 +3777,7 @@
           <p:cNvPr id="18" name="Rectangle 11">
             <a:extLst>
               <a:ext uri="{FF2B5EF4-FFF2-40B4-BE49-F238E27FC236}">
-                <a16:creationId xmlns:a16="http://schemas.microsoft.com/office/drawing/2014/main" xmlns="" id="{E0078958-4A97-0C40-9233-EB4C3A568278}"/>
+                <a16:creationId xmlns:a16="http://schemas.microsoft.com/office/drawing/2014/main" id="{E0078958-4A97-0C40-9233-EB4C3A568278}"/>
               </a:ext>
             </a:extLst>
           </p:cNvPr>
@@ -3847,7 +3837,7 @@
           <p:cNvPr id="20" name="Shape 188">
             <a:extLst>
               <a:ext uri="{FF2B5EF4-FFF2-40B4-BE49-F238E27FC236}">
-                <a16:creationId xmlns:a16="http://schemas.microsoft.com/office/drawing/2014/main" xmlns="" id="{AC43EF38-6279-D54E-BDC6-7D0DB4CF6D81}"/>
+                <a16:creationId xmlns:a16="http://schemas.microsoft.com/office/drawing/2014/main" id="{AC43EF38-6279-D54E-BDC6-7D0DB4CF6D81}"/>
               </a:ext>
             </a:extLst>
           </p:cNvPr>
@@ -3870,7 +3860,7 @@
           <a:effectLst/>
           <a:extLst>
             <a:ext uri="{C572A759-6A51-4108-AA02-DFA0A04FC94B}">
-              <ma14:wrappingTextBoxFlag xmlns:ma14="http://schemas.microsoft.com/office/mac/drawingml/2011/main" val="1"/>
+              <ma14:wrappingTextBoxFlag xmlns:ma14="http://schemas.microsoft.com/office/mac/drawingml/2011/main" xmlns="" val="1"/>
             </a:ext>
           </a:extLst>
         </p:spPr>
@@ -4040,7 +4030,7 @@
           <p:cNvPr id="21" name="Shape 188">
             <a:extLst>
               <a:ext uri="{FF2B5EF4-FFF2-40B4-BE49-F238E27FC236}">
-                <a16:creationId xmlns:a16="http://schemas.microsoft.com/office/drawing/2014/main" xmlns="" id="{89D05E88-365F-BB42-BEFA-DBC27AFDC25C}"/>
+                <a16:creationId xmlns:a16="http://schemas.microsoft.com/office/drawing/2014/main" id="{89D05E88-365F-BB42-BEFA-DBC27AFDC25C}"/>
               </a:ext>
             </a:extLst>
           </p:cNvPr>
@@ -4063,7 +4053,7 @@
           <a:effectLst/>
           <a:extLst>
             <a:ext uri="{C572A759-6A51-4108-AA02-DFA0A04FC94B}">
-              <ma14:wrappingTextBoxFlag xmlns:ma14="http://schemas.microsoft.com/office/mac/drawingml/2011/main" val="1"/>
+              <ma14:wrappingTextBoxFlag xmlns:ma14="http://schemas.microsoft.com/office/mac/drawingml/2011/main" xmlns="" val="1"/>
             </a:ext>
           </a:extLst>
         </p:spPr>
@@ -4234,7 +4224,7 @@
           <p:cNvPr id="19" name="Shape 188">
             <a:extLst>
               <a:ext uri="{FF2B5EF4-FFF2-40B4-BE49-F238E27FC236}">
-                <a16:creationId xmlns:a16="http://schemas.microsoft.com/office/drawing/2014/main" xmlns="" id="{8E0224FA-7916-2C4C-9512-133BC4A692B1}"/>
+                <a16:creationId xmlns:a16="http://schemas.microsoft.com/office/drawing/2014/main" id="{8E0224FA-7916-2C4C-9512-133BC4A692B1}"/>
               </a:ext>
             </a:extLst>
           </p:cNvPr>
@@ -4257,7 +4247,7 @@
           <a:effectLst/>
           <a:extLst>
             <a:ext uri="{C572A759-6A51-4108-AA02-DFA0A04FC94B}">
-              <ma14:wrappingTextBoxFlag xmlns:ma14="http://schemas.microsoft.com/office/mac/drawingml/2011/main" val="1"/>
+              <ma14:wrappingTextBoxFlag xmlns:ma14="http://schemas.microsoft.com/office/mac/drawingml/2011/main" xmlns="" val="1"/>
             </a:ext>
           </a:extLst>
         </p:spPr>
@@ -4600,7 +4590,7 @@
           <p:cNvPr id="7" name="Grafik 6">
             <a:extLst>
               <a:ext uri="{FF2B5EF4-FFF2-40B4-BE49-F238E27FC236}">
-                <a16:creationId xmlns:a16="http://schemas.microsoft.com/office/drawing/2014/main" xmlns="" id="{FA491ECD-CAA5-414B-9469-EBBD02424E0C}"/>
+                <a16:creationId xmlns:a16="http://schemas.microsoft.com/office/drawing/2014/main" id="{FA491ECD-CAA5-414B-9469-EBBD02424E0C}"/>
               </a:ext>
             </a:extLst>
           </p:cNvPr>
@@ -4636,7 +4626,7 @@
           <p:cNvPr id="11" name="Grafik 10">
             <a:extLst>
               <a:ext uri="{FF2B5EF4-FFF2-40B4-BE49-F238E27FC236}">
-                <a16:creationId xmlns:a16="http://schemas.microsoft.com/office/drawing/2014/main" xmlns="" id="{34728E59-1FB1-9045-8256-441CCD51C19A}"/>
+                <a16:creationId xmlns:a16="http://schemas.microsoft.com/office/drawing/2014/main" id="{34728E59-1FB1-9045-8256-441CCD51C19A}"/>
               </a:ext>
             </a:extLst>
           </p:cNvPr>
@@ -4672,7 +4662,7 @@
           <p:cNvPr id="23" name="Grafik 22">
             <a:extLst>
               <a:ext uri="{FF2B5EF4-FFF2-40B4-BE49-F238E27FC236}">
-                <a16:creationId xmlns:a16="http://schemas.microsoft.com/office/drawing/2014/main" xmlns="" id="{C4854C0F-608A-C84B-95F8-2A96CF060A3B}"/>
+                <a16:creationId xmlns:a16="http://schemas.microsoft.com/office/drawing/2014/main" id="{C4854C0F-608A-C84B-95F8-2A96CF060A3B}"/>
               </a:ext>
             </a:extLst>
           </p:cNvPr>
@@ -4708,7 +4698,7 @@
           <p:cNvPr id="25" name="Grafik 24">
             <a:extLst>
               <a:ext uri="{FF2B5EF4-FFF2-40B4-BE49-F238E27FC236}">
-                <a16:creationId xmlns:a16="http://schemas.microsoft.com/office/drawing/2014/main" xmlns="" id="{440B2301-0954-974B-876B-BA6AFC9AEA55}"/>
+                <a16:creationId xmlns:a16="http://schemas.microsoft.com/office/drawing/2014/main" id="{440B2301-0954-974B-876B-BA6AFC9AEA55}"/>
               </a:ext>
             </a:extLst>
           </p:cNvPr>
@@ -4744,7 +4734,7 @@
           <p:cNvPr id="26" name="Shape 188">
             <a:extLst>
               <a:ext uri="{FF2B5EF4-FFF2-40B4-BE49-F238E27FC236}">
-                <a16:creationId xmlns:a16="http://schemas.microsoft.com/office/drawing/2014/main" xmlns="" id="{E4233908-0CCE-EA43-BDAC-517FA70DBE68}"/>
+                <a16:creationId xmlns:a16="http://schemas.microsoft.com/office/drawing/2014/main" id="{E4233908-0CCE-EA43-BDAC-517FA70DBE68}"/>
               </a:ext>
             </a:extLst>
           </p:cNvPr>
@@ -4767,7 +4757,7 @@
           <a:effectLst/>
           <a:extLst>
             <a:ext uri="{C572A759-6A51-4108-AA02-DFA0A04FC94B}">
-              <ma14:wrappingTextBoxFlag xmlns:ma14="http://schemas.microsoft.com/office/mac/drawingml/2011/main" val="1"/>
+              <ma14:wrappingTextBoxFlag xmlns:ma14="http://schemas.microsoft.com/office/mac/drawingml/2011/main" xmlns="" val="1"/>
             </a:ext>
           </a:extLst>
         </p:spPr>
@@ -4824,7 +4814,7 @@
           <p:cNvPr id="28" name="Grafik 27">
             <a:extLst>
               <a:ext uri="{FF2B5EF4-FFF2-40B4-BE49-F238E27FC236}">
-                <a16:creationId xmlns:a16="http://schemas.microsoft.com/office/drawing/2014/main" xmlns="" id="{255E3A66-594E-554E-8716-DA267F5EAA5D}"/>
+                <a16:creationId xmlns:a16="http://schemas.microsoft.com/office/drawing/2014/main" id="{255E3A66-594E-554E-8716-DA267F5EAA5D}"/>
               </a:ext>
             </a:extLst>
           </p:cNvPr>
@@ -4860,7 +4850,7 @@
           <p:cNvPr id="30" name="Grafik 29">
             <a:extLst>
               <a:ext uri="{FF2B5EF4-FFF2-40B4-BE49-F238E27FC236}">
-                <a16:creationId xmlns:a16="http://schemas.microsoft.com/office/drawing/2014/main" xmlns="" id="{7F8214CE-83CB-4A4E-9D61-D6D8B656866E}"/>
+                <a16:creationId xmlns:a16="http://schemas.microsoft.com/office/drawing/2014/main" id="{7F8214CE-83CB-4A4E-9D61-D6D8B656866E}"/>
               </a:ext>
             </a:extLst>
           </p:cNvPr>
@@ -4896,7 +4886,7 @@
           <p:cNvPr id="32" name="Grafik 31">
             <a:extLst>
               <a:ext uri="{FF2B5EF4-FFF2-40B4-BE49-F238E27FC236}">
-                <a16:creationId xmlns:a16="http://schemas.microsoft.com/office/drawing/2014/main" xmlns="" id="{C5B661F8-84DA-6A41-AA1A-A8F7075F75EE}"/>
+                <a16:creationId xmlns:a16="http://schemas.microsoft.com/office/drawing/2014/main" id="{C5B661F8-84DA-6A41-AA1A-A8F7075F75EE}"/>
               </a:ext>
             </a:extLst>
           </p:cNvPr>
@@ -4932,7 +4922,7 @@
           <p:cNvPr id="33" name="Shape 188">
             <a:extLst>
               <a:ext uri="{FF2B5EF4-FFF2-40B4-BE49-F238E27FC236}">
-                <a16:creationId xmlns:a16="http://schemas.microsoft.com/office/drawing/2014/main" xmlns="" id="{EDF06DD5-9FD2-5940-818E-D1093E04983D}"/>
+                <a16:creationId xmlns:a16="http://schemas.microsoft.com/office/drawing/2014/main" id="{EDF06DD5-9FD2-5940-818E-D1093E04983D}"/>
               </a:ext>
             </a:extLst>
           </p:cNvPr>
@@ -4955,7 +4945,7 @@
           <a:effectLst/>
           <a:extLst>
             <a:ext uri="{C572A759-6A51-4108-AA02-DFA0A04FC94B}">
-              <ma14:wrappingTextBoxFlag xmlns:ma14="http://schemas.microsoft.com/office/mac/drawingml/2011/main" val="1"/>
+              <ma14:wrappingTextBoxFlag xmlns:ma14="http://schemas.microsoft.com/office/mac/drawingml/2011/main" xmlns="" val="1"/>
             </a:ext>
           </a:extLst>
         </p:spPr>
@@ -5012,7 +5002,7 @@
           <p:cNvPr id="35" name="Shape 188">
             <a:extLst>
               <a:ext uri="{FF2B5EF4-FFF2-40B4-BE49-F238E27FC236}">
-                <a16:creationId xmlns:a16="http://schemas.microsoft.com/office/drawing/2014/main" xmlns="" id="{57E391D6-1F9B-E94E-A224-0D597E2FCEB5}"/>
+                <a16:creationId xmlns:a16="http://schemas.microsoft.com/office/drawing/2014/main" id="{57E391D6-1F9B-E94E-A224-0D597E2FCEB5}"/>
               </a:ext>
             </a:extLst>
           </p:cNvPr>
@@ -5035,7 +5025,7 @@
           <a:effectLst/>
           <a:extLst>
             <a:ext uri="{C572A759-6A51-4108-AA02-DFA0A04FC94B}">
-              <ma14:wrappingTextBoxFlag xmlns:ma14="http://schemas.microsoft.com/office/mac/drawingml/2011/main" val="1"/>
+              <ma14:wrappingTextBoxFlag xmlns:ma14="http://schemas.microsoft.com/office/mac/drawingml/2011/main" xmlns="" val="1"/>
             </a:ext>
           </a:extLst>
         </p:spPr>
@@ -5139,7 +5129,7 @@
           <p:cNvPr id="36" name="Shape 188">
             <a:extLst>
               <a:ext uri="{FF2B5EF4-FFF2-40B4-BE49-F238E27FC236}">
-                <a16:creationId xmlns:a16="http://schemas.microsoft.com/office/drawing/2014/main" xmlns="" id="{18B4394C-D960-5F45-A89E-517815FB1821}"/>
+                <a16:creationId xmlns:a16="http://schemas.microsoft.com/office/drawing/2014/main" id="{18B4394C-D960-5F45-A89E-517815FB1821}"/>
               </a:ext>
             </a:extLst>
           </p:cNvPr>
@@ -5162,7 +5152,7 @@
           <a:effectLst/>
           <a:extLst>
             <a:ext uri="{C572A759-6A51-4108-AA02-DFA0A04FC94B}">
-              <ma14:wrappingTextBoxFlag xmlns:ma14="http://schemas.microsoft.com/office/mac/drawingml/2011/main" val="1"/>
+              <ma14:wrappingTextBoxFlag xmlns:ma14="http://schemas.microsoft.com/office/mac/drawingml/2011/main" xmlns="" val="1"/>
             </a:ext>
           </a:extLst>
         </p:spPr>
@@ -5222,7 +5212,7 @@
           <p:cNvPr id="37" name="Shape 188">
             <a:extLst>
               <a:ext uri="{FF2B5EF4-FFF2-40B4-BE49-F238E27FC236}">
-                <a16:creationId xmlns:a16="http://schemas.microsoft.com/office/drawing/2014/main" xmlns="" id="{B5B2C976-8AC6-5D4D-B704-EFD2BE4DA265}"/>
+                <a16:creationId xmlns:a16="http://schemas.microsoft.com/office/drawing/2014/main" id="{B5B2C976-8AC6-5D4D-B704-EFD2BE4DA265}"/>
               </a:ext>
             </a:extLst>
           </p:cNvPr>
@@ -5245,7 +5235,7 @@
           <a:effectLst/>
           <a:extLst>
             <a:ext uri="{C572A759-6A51-4108-AA02-DFA0A04FC94B}">
-              <ma14:wrappingTextBoxFlag xmlns:ma14="http://schemas.microsoft.com/office/mac/drawingml/2011/main" val="1"/>
+              <ma14:wrappingTextBoxFlag xmlns:ma14="http://schemas.microsoft.com/office/mac/drawingml/2011/main" xmlns="" val="1"/>
             </a:ext>
           </a:extLst>
         </p:spPr>
@@ -5305,7 +5295,7 @@
           <p:cNvPr id="45" name="Shape 188">
             <a:extLst>
               <a:ext uri="{FF2B5EF4-FFF2-40B4-BE49-F238E27FC236}">
-                <a16:creationId xmlns:a16="http://schemas.microsoft.com/office/drawing/2014/main" xmlns="" id="{2B66D671-13B7-7243-AE53-A86986A52895}"/>
+                <a16:creationId xmlns:a16="http://schemas.microsoft.com/office/drawing/2014/main" id="{2B66D671-13B7-7243-AE53-A86986A52895}"/>
               </a:ext>
             </a:extLst>
           </p:cNvPr>
@@ -5328,7 +5318,7 @@
           <a:effectLst/>
           <a:extLst>
             <a:ext uri="{C572A759-6A51-4108-AA02-DFA0A04FC94B}">
-              <ma14:wrappingTextBoxFlag xmlns:ma14="http://schemas.microsoft.com/office/mac/drawingml/2011/main" val="1"/>
+              <ma14:wrappingTextBoxFlag xmlns:ma14="http://schemas.microsoft.com/office/mac/drawingml/2011/main" xmlns="" val="1"/>
             </a:ext>
           </a:extLst>
         </p:spPr>
@@ -5385,7 +5375,7 @@
           <p:cNvPr id="46" name="Shape 188">
             <a:extLst>
               <a:ext uri="{FF2B5EF4-FFF2-40B4-BE49-F238E27FC236}">
-                <a16:creationId xmlns:a16="http://schemas.microsoft.com/office/drawing/2014/main" xmlns="" id="{03672BFA-9B86-1443-A9BD-B48A64905BA0}"/>
+                <a16:creationId xmlns:a16="http://schemas.microsoft.com/office/drawing/2014/main" id="{03672BFA-9B86-1443-A9BD-B48A64905BA0}"/>
               </a:ext>
             </a:extLst>
           </p:cNvPr>
@@ -5408,7 +5398,7 @@
           <a:effectLst/>
           <a:extLst>
             <a:ext uri="{C572A759-6A51-4108-AA02-DFA0A04FC94B}">
-              <ma14:wrappingTextBoxFlag xmlns:ma14="http://schemas.microsoft.com/office/mac/drawingml/2011/main" val="1"/>
+              <ma14:wrappingTextBoxFlag xmlns:ma14="http://schemas.microsoft.com/office/mac/drawingml/2011/main" xmlns="" val="1"/>
             </a:ext>
           </a:extLst>
         </p:spPr>
@@ -5465,7 +5455,7 @@
           <p:cNvPr id="47" name="Shape 188">
             <a:extLst>
               <a:ext uri="{FF2B5EF4-FFF2-40B4-BE49-F238E27FC236}">
-                <a16:creationId xmlns:a16="http://schemas.microsoft.com/office/drawing/2014/main" xmlns="" id="{E9E581CD-DA3C-044C-8747-3E226A2EDC0B}"/>
+                <a16:creationId xmlns:a16="http://schemas.microsoft.com/office/drawing/2014/main" id="{E9E581CD-DA3C-044C-8747-3E226A2EDC0B}"/>
               </a:ext>
             </a:extLst>
           </p:cNvPr>
@@ -5488,7 +5478,7 @@
           <a:effectLst/>
           <a:extLst>
             <a:ext uri="{C572A759-6A51-4108-AA02-DFA0A04FC94B}">
-              <ma14:wrappingTextBoxFlag xmlns:ma14="http://schemas.microsoft.com/office/mac/drawingml/2011/main" val="1"/>
+              <ma14:wrappingTextBoxFlag xmlns:ma14="http://schemas.microsoft.com/office/mac/drawingml/2011/main" xmlns="" val="1"/>
             </a:ext>
           </a:extLst>
         </p:spPr>
@@ -5586,7 +5576,7 @@
               </a:defRPr>
             </a:pPr>
             <a:r>
-              <a:rPr lang="en-US" sz="2400" b="1" dirty="0" smtClean="0">
+              <a:rPr lang="en-US" sz="2400" b="1" dirty="0">
                 <a:solidFill>
                   <a:srgbClr val="0170AD"/>
                 </a:solidFill>
@@ -5597,7 +5587,7 @@
               <a:t>For </a:t>
             </a:r>
             <a:r>
-              <a:rPr lang="en-US" sz="2400" b="1" dirty="0" err="1" smtClean="0">
+              <a:rPr lang="en-US" sz="2400" b="1" dirty="0" err="1">
                 <a:solidFill>
                   <a:srgbClr val="0170AD"/>
                 </a:solidFill>
@@ -5608,26 +5598,15 @@
               <a:t>hyperparameter</a:t>
             </a:r>
             <a:r>
-              <a:rPr lang="en-US" sz="2400" b="1" dirty="0" smtClean="0">
-                <a:solidFill>
-                  <a:srgbClr val="0170AD"/>
-                </a:solidFill>
-                <a:latin typeface="Lato Light"/>
-                <a:ea typeface="Lato Light"/>
-                <a:cs typeface="Lato Light"/>
-              </a:rPr>
-              <a:t> research, we </a:t>
-            </a:r>
-            <a:r>
-              <a:rPr lang="en-US" sz="2400" b="1" dirty="0">
-                <a:solidFill>
-                  <a:srgbClr val="0170AD"/>
-                </a:solidFill>
-                <a:latin typeface="Lato Light"/>
-                <a:ea typeface="Lato Light"/>
-                <a:cs typeface="Lato Light"/>
-              </a:rPr>
-              <a:t>used a </a:t>
+              <a:rPr lang="en-US" sz="2400" b="1" dirty="0">
+                <a:solidFill>
+                  <a:srgbClr val="0170AD"/>
+                </a:solidFill>
+                <a:latin typeface="Lato Light"/>
+                <a:ea typeface="Lato Light"/>
+                <a:cs typeface="Lato Light"/>
+              </a:rPr>
+              <a:t> research, we used a </a:t>
             </a:r>
             <a:r>
               <a:rPr lang="en-US" sz="2400" b="1" dirty="0">
@@ -5652,7 +5631,7 @@
               <a:t> of </a:t>
             </a:r>
             <a:r>
-              <a:rPr lang="en-US" sz="2400" b="1" dirty="0" smtClean="0">
+              <a:rPr lang="en-US" sz="2400" b="1" dirty="0">
                 <a:solidFill>
                   <a:srgbClr val="0170AD"/>
                 </a:solidFill>
@@ -5660,73 +5639,7 @@
                 <a:ea typeface="Lato Heavy" panose="020F0502020204030203" pitchFamily="34" charset="0"/>
                 <a:cs typeface="Lato Heavy" panose="020F0502020204030203" pitchFamily="34" charset="0"/>
               </a:rPr>
-              <a:t>60</a:t>
-            </a:r>
-            <a:r>
-              <a:rPr lang="en-US" sz="2400" b="1" dirty="0" smtClean="0">
-                <a:solidFill>
-                  <a:srgbClr val="0170AD"/>
-                </a:solidFill>
-                <a:latin typeface="Lato Heavy" panose="020F0502020204030203" pitchFamily="34" charset="0"/>
-                <a:ea typeface="Lato Heavy" panose="020F0502020204030203" pitchFamily="34" charset="0"/>
-                <a:cs typeface="Lato Heavy" panose="020F0502020204030203" pitchFamily="34" charset="0"/>
-              </a:rPr>
-              <a:t>k </a:t>
-            </a:r>
-            <a:r>
-              <a:rPr lang="en-US" sz="2400" b="1" dirty="0">
-                <a:solidFill>
-                  <a:srgbClr val="0170AD"/>
-                </a:solidFill>
-                <a:latin typeface="Lato Heavy" panose="020F0502020204030203" pitchFamily="34" charset="0"/>
-                <a:ea typeface="Lato Heavy" panose="020F0502020204030203" pitchFamily="34" charset="0"/>
-                <a:cs typeface="Lato Heavy" panose="020F0502020204030203" pitchFamily="34" charset="0"/>
-              </a:rPr>
-              <a:t>training images, </a:t>
-            </a:r>
-            <a:r>
-              <a:rPr lang="en-US" sz="2400" b="1" dirty="0" smtClean="0">
-                <a:solidFill>
-                  <a:srgbClr val="0170AD"/>
-                </a:solidFill>
-                <a:latin typeface="Lato Heavy" panose="020F0502020204030203" pitchFamily="34" charset="0"/>
-                <a:ea typeface="Lato Heavy" panose="020F0502020204030203" pitchFamily="34" charset="0"/>
-                <a:cs typeface="Lato Heavy" panose="020F0502020204030203" pitchFamily="34" charset="0"/>
-              </a:rPr>
-              <a:t>10</a:t>
-            </a:r>
-            <a:r>
-              <a:rPr lang="en-US" sz="2400" b="1" dirty="0" smtClean="0">
-                <a:solidFill>
-                  <a:srgbClr val="0170AD"/>
-                </a:solidFill>
-                <a:latin typeface="Lato Heavy" panose="020F0502020204030203" pitchFamily="34" charset="0"/>
-                <a:ea typeface="Lato Heavy" panose="020F0502020204030203" pitchFamily="34" charset="0"/>
-                <a:cs typeface="Lato Heavy" panose="020F0502020204030203" pitchFamily="34" charset="0"/>
-              </a:rPr>
-              <a:t>k </a:t>
-            </a:r>
-            <a:r>
-              <a:rPr lang="en-US" sz="2400" b="1" dirty="0">
-                <a:solidFill>
-                  <a:srgbClr val="0170AD"/>
-                </a:solidFill>
-                <a:latin typeface="Lato Heavy" panose="020F0502020204030203" pitchFamily="34" charset="0"/>
-                <a:ea typeface="Lato Heavy" panose="020F0502020204030203" pitchFamily="34" charset="0"/>
-                <a:cs typeface="Lato Heavy" panose="020F0502020204030203" pitchFamily="34" charset="0"/>
-              </a:rPr>
-              <a:t>validation </a:t>
-            </a:r>
-            <a:r>
-              <a:rPr lang="en-US" sz="2400" b="1" dirty="0">
-                <a:solidFill>
-                  <a:srgbClr val="0170AD"/>
-                </a:solidFill>
-                <a:latin typeface="Lato Heavy" panose="020F0502020204030203" pitchFamily="34" charset="0"/>
-                <a:ea typeface="Lato Heavy" panose="020F0502020204030203" pitchFamily="34" charset="0"/>
-                <a:cs typeface="Lato Heavy" panose="020F0502020204030203" pitchFamily="34" charset="0"/>
-              </a:rPr>
-              <a:t>images </a:t>
+              <a:t>60k training images, 10k validation images </a:t>
             </a:r>
             <a:r>
               <a:rPr lang="en-US" sz="2400" b="1" dirty="0">
@@ -5739,7 +5652,7 @@
               </a:rPr>
               <a:t>-&gt; saved in an HDF5 file</a:t>
             </a:r>
-            <a:endParaRPr lang="en-US" sz="2400" b="1" dirty="0" smtClean="0">
+            <a:endParaRPr lang="en-US" sz="2400" b="1" dirty="0">
               <a:solidFill>
                 <a:srgbClr val="0170AD"/>
               </a:solidFill>
@@ -5765,7 +5678,7 @@
               </a:defRPr>
             </a:pPr>
             <a:r>
-              <a:rPr lang="en-US" sz="2400" b="1" dirty="0" smtClean="0">
+              <a:rPr lang="en-US" sz="2400" b="1" dirty="0">
                 <a:solidFill>
                   <a:srgbClr val="0170AD"/>
                 </a:solidFill>
@@ -5773,40 +5686,7 @@
                 <a:ea typeface="Lato Heavy" panose="020F0502020204030203" pitchFamily="34" charset="0"/>
                 <a:cs typeface="Lato Heavy" panose="020F0502020204030203" pitchFamily="34" charset="0"/>
               </a:rPr>
-              <a:t>Used 70k learning images &amp; 235</a:t>
-            </a:r>
-            <a:r>
-              <a:rPr lang="en-US" sz="2400" b="1" dirty="0" smtClean="0">
-                <a:solidFill>
-                  <a:srgbClr val="0170AD"/>
-                </a:solidFill>
-                <a:latin typeface="Lato Heavy" panose="020F0502020204030203" pitchFamily="34" charset="0"/>
-                <a:ea typeface="Lato Heavy" panose="020F0502020204030203" pitchFamily="34" charset="0"/>
-                <a:cs typeface="Lato Heavy" panose="020F0502020204030203" pitchFamily="34" charset="0"/>
-              </a:rPr>
-              <a:t>k </a:t>
-            </a:r>
-            <a:r>
-              <a:rPr lang="en-US" sz="2400" b="1" dirty="0">
-                <a:solidFill>
-                  <a:srgbClr val="0170AD"/>
-                </a:solidFill>
-                <a:latin typeface="Lato Heavy" panose="020F0502020204030203" pitchFamily="34" charset="0"/>
-                <a:ea typeface="Lato Heavy" panose="020F0502020204030203" pitchFamily="34" charset="0"/>
-                <a:cs typeface="Lato Heavy" panose="020F0502020204030203" pitchFamily="34" charset="0"/>
-              </a:rPr>
-              <a:t>test </a:t>
-            </a:r>
-            <a:r>
-              <a:rPr lang="en-US" sz="2400" b="1" dirty="0" smtClean="0">
-                <a:solidFill>
-                  <a:srgbClr val="0170AD"/>
-                </a:solidFill>
-                <a:latin typeface="Lato Heavy" panose="020F0502020204030203" pitchFamily="34" charset="0"/>
-                <a:ea typeface="Lato Heavy" panose="020F0502020204030203" pitchFamily="34" charset="0"/>
-                <a:cs typeface="Lato Heavy" panose="020F0502020204030203" pitchFamily="34" charset="0"/>
-              </a:rPr>
-              <a:t>images</a:t>
+              <a:t>Used 70k learning images &amp; 235k test images</a:t>
             </a:r>
             <a:endParaRPr lang="en-US" sz="2400" b="1" dirty="0">
               <a:solidFill>
@@ -5968,7 +5848,7 @@
           <p:cNvPr id="48" name="Shape 188">
             <a:extLst>
               <a:ext uri="{FF2B5EF4-FFF2-40B4-BE49-F238E27FC236}">
-                <a16:creationId xmlns:a16="http://schemas.microsoft.com/office/drawing/2014/main" xmlns="" id="{491EB432-A5E3-F146-A049-69AB4D3465EB}"/>
+                <a16:creationId xmlns:a16="http://schemas.microsoft.com/office/drawing/2014/main" id="{491EB432-A5E3-F146-A049-69AB4D3465EB}"/>
               </a:ext>
             </a:extLst>
           </p:cNvPr>
@@ -5991,7 +5871,7 @@
           <a:effectLst/>
           <a:extLst>
             <a:ext uri="{C572A759-6A51-4108-AA02-DFA0A04FC94B}">
-              <ma14:wrappingTextBoxFlag xmlns:ma14="http://schemas.microsoft.com/office/mac/drawingml/2011/main" val="1"/>
+              <ma14:wrappingTextBoxFlag xmlns:ma14="http://schemas.microsoft.com/office/mac/drawingml/2011/main" xmlns="" val="1"/>
             </a:ext>
           </a:extLst>
         </p:spPr>
@@ -6351,7 +6231,7 @@
           <p:cNvPr id="50" name="Shape 188">
             <a:extLst>
               <a:ext uri="{FF2B5EF4-FFF2-40B4-BE49-F238E27FC236}">
-                <a16:creationId xmlns:a16="http://schemas.microsoft.com/office/drawing/2014/main" xmlns="" id="{BA477D95-0956-BF47-9070-91C2FBC84006}"/>
+                <a16:creationId xmlns:a16="http://schemas.microsoft.com/office/drawing/2014/main" id="{BA477D95-0956-BF47-9070-91C2FBC84006}"/>
               </a:ext>
             </a:extLst>
           </p:cNvPr>
@@ -6374,7 +6254,7 @@
           <a:effectLst/>
           <a:extLst>
             <a:ext uri="{C572A759-6A51-4108-AA02-DFA0A04FC94B}">
-              <ma14:wrappingTextBoxFlag xmlns:ma14="http://schemas.microsoft.com/office/mac/drawingml/2011/main" val="1"/>
+              <ma14:wrappingTextBoxFlag xmlns:ma14="http://schemas.microsoft.com/office/mac/drawingml/2011/main" xmlns="" val="1"/>
             </a:ext>
           </a:extLst>
         </p:spPr>
@@ -6775,7 +6655,7 @@
               <a:t>sigmoid activation function for multi-label classification</a:t>
             </a:r>
             <a:r>
-              <a:rPr lang="en-US" sz="2400" b="1" dirty="0" smtClean="0">
+              <a:rPr lang="en-US" sz="2400" b="1" dirty="0">
                 <a:solidFill>
                   <a:srgbClr val="0170AD"/>
                 </a:solidFill>
@@ -6803,7 +6683,7 @@
               </a:defRPr>
             </a:pPr>
             <a:r>
-              <a:rPr lang="en-US" sz="2400" b="1" dirty="0" smtClean="0">
+              <a:rPr lang="en-US" sz="2400" b="1" dirty="0">
                 <a:solidFill>
                   <a:srgbClr val="0170AD"/>
                 </a:solidFill>
@@ -6813,14 +6693,6 @@
               </a:rPr>
               <a:t>To classify businesses, we have averaged predictions of the images of business</a:t>
             </a:r>
-            <a:endParaRPr lang="en-US" sz="2400" b="1" dirty="0">
-              <a:solidFill>
-                <a:srgbClr val="0170AD"/>
-              </a:solidFill>
-              <a:latin typeface="Lato Light"/>
-              <a:ea typeface="Lato Light"/>
-              <a:cs typeface="Lato Light"/>
-            </a:endParaRPr>
           </a:p>
         </p:txBody>
       </p:sp>
@@ -6829,7 +6701,7 @@
           <p:cNvPr id="51" name="Shape 188">
             <a:extLst>
               <a:ext uri="{FF2B5EF4-FFF2-40B4-BE49-F238E27FC236}">
-                <a16:creationId xmlns:a16="http://schemas.microsoft.com/office/drawing/2014/main" xmlns="" id="{44E098BF-EAFD-2147-9E33-14CEFA65FC86}"/>
+                <a16:creationId xmlns:a16="http://schemas.microsoft.com/office/drawing/2014/main" id="{44E098BF-EAFD-2147-9E33-14CEFA65FC86}"/>
               </a:ext>
             </a:extLst>
           </p:cNvPr>
@@ -6852,7 +6724,7 @@
           <a:effectLst/>
           <a:extLst>
             <a:ext uri="{C572A759-6A51-4108-AA02-DFA0A04FC94B}">
-              <ma14:wrappingTextBoxFlag xmlns:ma14="http://schemas.microsoft.com/office/mac/drawingml/2011/main" val="1"/>
+              <ma14:wrappingTextBoxFlag xmlns:ma14="http://schemas.microsoft.com/office/mac/drawingml/2011/main" xmlns="" val="1"/>
             </a:ext>
           </a:extLst>
         </p:spPr>
@@ -7184,7 +7056,7 @@
           <p:cNvPr id="34" name="Shape 188">
             <a:extLst>
               <a:ext uri="{FF2B5EF4-FFF2-40B4-BE49-F238E27FC236}">
-                <a16:creationId xmlns:a16="http://schemas.microsoft.com/office/drawing/2014/main" xmlns="" id="{53005AED-E506-4C46-8ECE-031E75F77FB1}"/>
+                <a16:creationId xmlns:a16="http://schemas.microsoft.com/office/drawing/2014/main" id="{53005AED-E506-4C46-8ECE-031E75F77FB1}"/>
               </a:ext>
             </a:extLst>
           </p:cNvPr>
@@ -7207,7 +7079,7 @@
           <a:effectLst/>
           <a:extLst>
             <a:ext uri="{C572A759-6A51-4108-AA02-DFA0A04FC94B}">
-              <ma14:wrappingTextBoxFlag xmlns:ma14="http://schemas.microsoft.com/office/mac/drawingml/2011/main" val="1"/>
+              <ma14:wrappingTextBoxFlag xmlns:ma14="http://schemas.microsoft.com/office/mac/drawingml/2011/main" xmlns="" val="1"/>
             </a:ext>
           </a:extLst>
         </p:spPr>
@@ -7531,7 +7403,7 @@
           <p:cNvPr id="39" name="Shape 188">
             <a:extLst>
               <a:ext uri="{FF2B5EF4-FFF2-40B4-BE49-F238E27FC236}">
-                <a16:creationId xmlns:a16="http://schemas.microsoft.com/office/drawing/2014/main" xmlns="" id="{7D94EF4D-1967-F64C-ADA0-BB2C71B5E243}"/>
+                <a16:creationId xmlns:a16="http://schemas.microsoft.com/office/drawing/2014/main" id="{7D94EF4D-1967-F64C-ADA0-BB2C71B5E243}"/>
               </a:ext>
             </a:extLst>
           </p:cNvPr>
@@ -7554,7 +7426,7 @@
           <a:effectLst/>
           <a:extLst>
             <a:ext uri="{C572A759-6A51-4108-AA02-DFA0A04FC94B}">
-              <ma14:wrappingTextBoxFlag xmlns:ma14="http://schemas.microsoft.com/office/mac/drawingml/2011/main" val="1"/>
+              <ma14:wrappingTextBoxFlag xmlns:ma14="http://schemas.microsoft.com/office/mac/drawingml/2011/main" xmlns="" val="1"/>
             </a:ext>
           </a:extLst>
         </p:spPr>
@@ -7786,7 +7658,7 @@
           <p:cNvPr id="40" name="Shape 188">
             <a:extLst>
               <a:ext uri="{FF2B5EF4-FFF2-40B4-BE49-F238E27FC236}">
-                <a16:creationId xmlns:a16="http://schemas.microsoft.com/office/drawing/2014/main" xmlns="" id="{60B2218C-2F1F-E540-8C8F-A0713AF24158}"/>
+                <a16:creationId xmlns:a16="http://schemas.microsoft.com/office/drawing/2014/main" id="{60B2218C-2F1F-E540-8C8F-A0713AF24158}"/>
               </a:ext>
             </a:extLst>
           </p:cNvPr>
@@ -7809,7 +7681,7 @@
           <a:effectLst/>
           <a:extLst>
             <a:ext uri="{C572A759-6A51-4108-AA02-DFA0A04FC94B}">
-              <ma14:wrappingTextBoxFlag xmlns:ma14="http://schemas.microsoft.com/office/mac/drawingml/2011/main" val="1"/>
+              <ma14:wrappingTextBoxFlag xmlns:ma14="http://schemas.microsoft.com/office/mac/drawingml/2011/main" xmlns="" val="1"/>
             </a:ext>
           </a:extLst>
         </p:spPr>
@@ -8119,7 +7991,7 @@
           <p:cNvPr id="6" name="Grafik 5">
             <a:extLst>
               <a:ext uri="{FF2B5EF4-FFF2-40B4-BE49-F238E27FC236}">
-                <a16:creationId xmlns:a16="http://schemas.microsoft.com/office/drawing/2014/main" xmlns="" id="{809724DC-F5BF-BE4B-9B5D-4CF1E601A8E4}"/>
+                <a16:creationId xmlns:a16="http://schemas.microsoft.com/office/drawing/2014/main" id="{809724DC-F5BF-BE4B-9B5D-4CF1E601A8E4}"/>
               </a:ext>
             </a:extLst>
           </p:cNvPr>
@@ -8155,7 +8027,7 @@
           <p:cNvPr id="41" name="Shape 188">
             <a:extLst>
               <a:ext uri="{FF2B5EF4-FFF2-40B4-BE49-F238E27FC236}">
-                <a16:creationId xmlns:a16="http://schemas.microsoft.com/office/drawing/2014/main" xmlns="" id="{0AC7E769-5067-514F-9DDE-5769FC222785}"/>
+                <a16:creationId xmlns:a16="http://schemas.microsoft.com/office/drawing/2014/main" id="{0AC7E769-5067-514F-9DDE-5769FC222785}"/>
               </a:ext>
             </a:extLst>
           </p:cNvPr>
@@ -8178,7 +8050,7 @@
           <a:effectLst/>
           <a:extLst>
             <a:ext uri="{C572A759-6A51-4108-AA02-DFA0A04FC94B}">
-              <ma14:wrappingTextBoxFlag xmlns:ma14="http://schemas.microsoft.com/office/mac/drawingml/2011/main" val="1"/>
+              <ma14:wrappingTextBoxFlag xmlns:ma14="http://schemas.microsoft.com/office/mac/drawingml/2011/main" xmlns="" val="1"/>
             </a:ext>
           </a:extLst>
         </p:spPr>
@@ -8235,7 +8107,7 @@
           <p:cNvPr id="42" name="Shape 188">
             <a:extLst>
               <a:ext uri="{FF2B5EF4-FFF2-40B4-BE49-F238E27FC236}">
-                <a16:creationId xmlns:a16="http://schemas.microsoft.com/office/drawing/2014/main" xmlns="" id="{29A27DEB-B8E9-744B-A1EA-7458FB93FC93}"/>
+                <a16:creationId xmlns:a16="http://schemas.microsoft.com/office/drawing/2014/main" id="{29A27DEB-B8E9-744B-A1EA-7458FB93FC93}"/>
               </a:ext>
             </a:extLst>
           </p:cNvPr>
@@ -8258,7 +8130,7 @@
           <a:effectLst/>
           <a:extLst>
             <a:ext uri="{C572A759-6A51-4108-AA02-DFA0A04FC94B}">
-              <ma14:wrappingTextBoxFlag xmlns:ma14="http://schemas.microsoft.com/office/mac/drawingml/2011/main" val="1"/>
+              <ma14:wrappingTextBoxFlag xmlns:ma14="http://schemas.microsoft.com/office/mac/drawingml/2011/main" xmlns="" val="1"/>
             </a:ext>
           </a:extLst>
         </p:spPr>
@@ -8683,30 +8555,27 @@
                 <a:ea typeface="Lato Light"/>
                 <a:cs typeface="Lato Light"/>
               </a:rPr>
-              <a:t>Use </a:t>
-            </a:r>
-            <a:r>
-              <a:rPr lang="en-US" sz="2400" b="1" dirty="0">
-                <a:solidFill>
-                  <a:srgbClr val="0170AD"/>
-                </a:solidFill>
-                <a:latin typeface="Lato Heavy" panose="020F0502020204030203" pitchFamily="34" charset="0"/>
-                <a:ea typeface="Lato Heavy" panose="020F0502020204030203" pitchFamily="34" charset="0"/>
-                <a:cs typeface="Lato Heavy" panose="020F0502020204030203" pitchFamily="34" charset="0"/>
-              </a:rPr>
-              <a:t>better seed sequences </a:t>
-            </a:r>
-            <a:r>
-              <a:rPr lang="en-US" sz="2400" b="1" dirty="0">
-                <a:solidFill>
-                  <a:srgbClr val="0170AD"/>
-                </a:solidFill>
-                <a:latin typeface="Lato Light"/>
-                <a:ea typeface="Lato Light"/>
-                <a:cs typeface="Lato Light"/>
-              </a:rPr>
-              <a:t>for the RNN to write more convincing fake reviews. One idea would be to have not one but a few different seed sequences for every predicted label and then randomly choose one. Also, you could shuffle the order of the predictions for the labels, so that label 0 isn’t always the first sequence in a review.</a:t>
-            </a:r>
+              <a:t>Sample the characters in the text generation instead of using the one with the max. probability to get </a:t>
+            </a:r>
+            <a:r>
+              <a:rPr lang="en-US" sz="2400" b="1">
+                <a:solidFill>
+                  <a:srgbClr val="0170AD"/>
+                </a:solidFill>
+                <a:latin typeface="Lato Light"/>
+                <a:ea typeface="Lato Light"/>
+                <a:cs typeface="Lato Light"/>
+              </a:rPr>
+              <a:t>more diversity.</a:t>
+            </a:r>
+            <a:endParaRPr lang="en-US" sz="2400" b="1" dirty="0">
+              <a:solidFill>
+                <a:srgbClr val="0170AD"/>
+              </a:solidFill>
+              <a:latin typeface="Lato Light"/>
+              <a:ea typeface="Lato Light"/>
+              <a:cs typeface="Lato Light"/>
+            </a:endParaRPr>
           </a:p>
           <a:p>
             <a:pPr marL="342900" lvl="0" indent="-342900" algn="just">
@@ -8733,7 +8602,7 @@
                 <a:ea typeface="Lato Light"/>
                 <a:cs typeface="Lato Light"/>
               </a:rPr>
-              <a:t>Use a </a:t>
+              <a:t>Use </a:t>
             </a:r>
             <a:r>
               <a:rPr lang="en-US" sz="2400" b="1" dirty="0">
@@ -8744,18 +8613,18 @@
                 <a:ea typeface="Lato Heavy" panose="020F0502020204030203" pitchFamily="34" charset="0"/>
                 <a:cs typeface="Lato Heavy" panose="020F0502020204030203" pitchFamily="34" charset="0"/>
               </a:rPr>
-              <a:t>GAN to conditional generate text </a:t>
-            </a:r>
-            <a:r>
-              <a:rPr lang="en-US" sz="2400" b="1" dirty="0">
-                <a:solidFill>
-                  <a:srgbClr val="0170AD"/>
-                </a:solidFill>
-                <a:latin typeface="Lato Light"/>
-                <a:ea typeface="Lato Light"/>
-                <a:cs typeface="Lato Light"/>
-              </a:rPr>
-              <a:t>based on the predicated labels to write more natural sounding fake reviews.</a:t>
+              <a:t>better seed sequences </a:t>
+            </a:r>
+            <a:r>
+              <a:rPr lang="en-US" sz="2400" b="1" dirty="0">
+                <a:solidFill>
+                  <a:srgbClr val="0170AD"/>
+                </a:solidFill>
+                <a:latin typeface="Lato Light"/>
+                <a:ea typeface="Lato Light"/>
+                <a:cs typeface="Lato Light"/>
+              </a:rPr>
+              <a:t>for the RNN to write more convincing fake reviews. One idea would be to have not one but a few different seed sequences for every predicted label and then randomly choose one. Also, you could shuffle the order of the predictions for the labels, so that label 0 isn’t always the first sequence in a review.</a:t>
             </a:r>
           </a:p>
           <a:p>
@@ -8783,7 +8652,57 @@
                 <a:ea typeface="Lato Light"/>
                 <a:cs typeface="Lato Light"/>
               </a:rPr>
-              <a:t>(Use a more advanced approach for the multi-instance approach of this problem)</a:t>
+              <a:t>Use a </a:t>
+            </a:r>
+            <a:r>
+              <a:rPr lang="en-US" sz="2400" b="1" dirty="0">
+                <a:solidFill>
+                  <a:srgbClr val="0170AD"/>
+                </a:solidFill>
+                <a:latin typeface="Lato Heavy" panose="020F0502020204030203" pitchFamily="34" charset="0"/>
+                <a:ea typeface="Lato Heavy" panose="020F0502020204030203" pitchFamily="34" charset="0"/>
+                <a:cs typeface="Lato Heavy" panose="020F0502020204030203" pitchFamily="34" charset="0"/>
+              </a:rPr>
+              <a:t>GAN to conditional generate text </a:t>
+            </a:r>
+            <a:r>
+              <a:rPr lang="en-US" sz="2400" b="1" dirty="0">
+                <a:solidFill>
+                  <a:srgbClr val="0170AD"/>
+                </a:solidFill>
+                <a:latin typeface="Lato Light"/>
+                <a:ea typeface="Lato Light"/>
+                <a:cs typeface="Lato Light"/>
+              </a:rPr>
+              <a:t>based on the predicated labels to write more natural sounding fake reviews.</a:t>
+            </a:r>
+          </a:p>
+          <a:p>
+            <a:pPr marL="342900" lvl="0" indent="-342900" algn="just">
+              <a:lnSpc>
+                <a:spcPct val="100000"/>
+              </a:lnSpc>
+              <a:spcBef>
+                <a:spcPts val="0"/>
+              </a:spcBef>
+              <a:buFont typeface="Arial" panose="020B0604020202020204" pitchFamily="34" charset="0"/>
+              <a:buChar char="•"/>
+              <a:defRPr sz="1800">
+                <a:solidFill>
+                  <a:srgbClr val="000000"/>
+                </a:solidFill>
+              </a:defRPr>
+            </a:pPr>
+            <a:r>
+              <a:rPr lang="en-US" sz="2400" b="1" dirty="0">
+                <a:solidFill>
+                  <a:srgbClr val="0170AD"/>
+                </a:solidFill>
+                <a:latin typeface="Lato Light"/>
+                <a:ea typeface="Lato Light"/>
+                <a:cs typeface="Lato Light"/>
+              </a:rPr>
+              <a:t>Use a more advanced approach for the multi-instance approach of this problem</a:t>
             </a:r>
           </a:p>
         </p:txBody>
@@ -8793,7 +8712,7 @@
           <p:cNvPr id="53" name="Shape 188">
             <a:extLst>
               <a:ext uri="{FF2B5EF4-FFF2-40B4-BE49-F238E27FC236}">
-                <a16:creationId xmlns:a16="http://schemas.microsoft.com/office/drawing/2014/main" xmlns="" id="{D9008FA4-6C55-4349-B8EB-CAF713A75C51}"/>
+                <a16:creationId xmlns:a16="http://schemas.microsoft.com/office/drawing/2014/main" id="{D9008FA4-6C55-4349-B8EB-CAF713A75C51}"/>
               </a:ext>
             </a:extLst>
           </p:cNvPr>
@@ -8816,7 +8735,7 @@
           <a:effectLst/>
           <a:extLst>
             <a:ext uri="{C572A759-6A51-4108-AA02-DFA0A04FC94B}">
-              <ma14:wrappingTextBoxFlag xmlns:ma14="http://schemas.microsoft.com/office/mac/drawingml/2011/main" val="1"/>
+              <ma14:wrappingTextBoxFlag xmlns:ma14="http://schemas.microsoft.com/office/mac/drawingml/2011/main" xmlns="" val="1"/>
             </a:ext>
           </a:extLst>
         </p:spPr>
@@ -8870,14 +8789,14 @@
           </a:p>
         </p:txBody>
       </p:sp>
-      <mc:AlternateContent xmlns:mc="http://schemas.openxmlformats.org/markup-compatibility/2006">
-        <mc:Choice xmlns:a14="http://schemas.microsoft.com/office/drawing/2010/main" Requires="a14">
+      <mc:AlternateContent xmlns:mc="http://schemas.openxmlformats.org/markup-compatibility/2006" xmlns:a14="http://schemas.microsoft.com/office/drawing/2010/main">
+        <mc:Choice Requires="a14">
           <p:sp>
             <p:nvSpPr>
               <p:cNvPr id="54" name="Shape 188">
                 <a:extLst>
                   <a:ext uri="{FF2B5EF4-FFF2-40B4-BE49-F238E27FC236}">
-                    <a16:creationId xmlns:a16="http://schemas.microsoft.com/office/drawing/2014/main" xmlns="" id="{600886FA-A6C3-EA4B-A501-9D8287AD722B}"/>
+                    <a16:creationId xmlns:a16="http://schemas.microsoft.com/office/drawing/2014/main" id="{600886FA-A6C3-EA4B-A501-9D8287AD722B}"/>
                   </a:ext>
                 </a:extLst>
               </p:cNvPr>
@@ -8900,7 +8819,7 @@
               <a:effectLst/>
               <a:extLst>
                 <a:ext uri="{C572A759-6A51-4108-AA02-DFA0A04FC94B}">
-                  <ma14:wrappingTextBoxFlag xmlns:ma14="http://schemas.microsoft.com/office/mac/drawingml/2011/main" val="1"/>
+                  <ma14:wrappingTextBoxFlag xmlns:ma14="http://schemas.microsoft.com/office/mac/drawingml/2011/main" xmlns="" val="1"/>
                 </a:ext>
               </a:extLst>
             </p:spPr>
@@ -8998,7 +8917,7 @@
                               <a:solidFill>
                                 <a:srgbClr val="0170AD"/>
                               </a:solidFill>
-                              <a:latin typeface="Cambria Math" charset="0"/>
+                              <a:latin typeface="Cambria Math" panose="02040503050406030204" pitchFamily="18" charset="0"/>
                               <a:ea typeface="Lato Light"/>
                               <a:cs typeface="Lato Light"/>
                             </a:rPr>
@@ -9137,7 +9056,7 @@
                               <a:solidFill>
                                 <a:srgbClr val="0170AD"/>
                               </a:solidFill>
-                              <a:latin typeface="Cambria Math" charset="0"/>
+                              <a:latin typeface="Cambria Math" panose="02040503050406030204" pitchFamily="18" charset="0"/>
                               <a:ea typeface="Lato Light"/>
                               <a:cs typeface="Lato Light"/>
                             </a:rPr>
@@ -9232,7 +9151,7 @@
                               <a:solidFill>
                                 <a:srgbClr val="0170AD"/>
                               </a:solidFill>
-                              <a:latin typeface="Cambria Math" charset="0"/>
+                              <a:latin typeface="Cambria Math" panose="02040503050406030204" pitchFamily="18" charset="0"/>
                               <a:ea typeface="Lato Light"/>
                               <a:cs typeface="Lato Light"/>
                             </a:rPr>
@@ -9302,7 +9221,7 @@
             </p:txBody>
           </p:sp>
         </mc:Choice>
-        <mc:Fallback>
+        <mc:Fallback xmlns="">
           <p:sp>
             <p:nvSpPr>
               <p:cNvPr id="54" name="Shape 188">
@@ -9362,7 +9281,7 @@
           <p:cNvPr id="55" name="Shape 188">
             <a:extLst>
               <a:ext uri="{FF2B5EF4-FFF2-40B4-BE49-F238E27FC236}">
-                <a16:creationId xmlns:a16="http://schemas.microsoft.com/office/drawing/2014/main" xmlns="" id="{4BE11666-7530-094D-97F6-37BEECE48F36}"/>
+                <a16:creationId xmlns:a16="http://schemas.microsoft.com/office/drawing/2014/main" id="{4BE11666-7530-094D-97F6-37BEECE48F36}"/>
               </a:ext>
             </a:extLst>
           </p:cNvPr>
@@ -9385,7 +9304,7 @@
           <a:effectLst/>
           <a:extLst>
             <a:ext uri="{C572A759-6A51-4108-AA02-DFA0A04FC94B}">
-              <ma14:wrappingTextBoxFlag xmlns:ma14="http://schemas.microsoft.com/office/mac/drawingml/2011/main" val="1"/>
+              <ma14:wrappingTextBoxFlag xmlns:ma14="http://schemas.microsoft.com/office/mac/drawingml/2011/main" xmlns="" val="1"/>
             </a:ext>
           </a:extLst>
         </p:spPr>
@@ -9442,7 +9361,7 @@
           <p:cNvPr id="56" name="Shape 188">
             <a:extLst>
               <a:ext uri="{FF2B5EF4-FFF2-40B4-BE49-F238E27FC236}">
-                <a16:creationId xmlns:a16="http://schemas.microsoft.com/office/drawing/2014/main" xmlns="" id="{178C1D35-91F6-7947-878F-82208958A5A3}"/>
+                <a16:creationId xmlns:a16="http://schemas.microsoft.com/office/drawing/2014/main" id="{178C1D35-91F6-7947-878F-82208958A5A3}"/>
               </a:ext>
             </a:extLst>
           </p:cNvPr>
@@ -9465,7 +9384,7 @@
           <a:effectLst/>
           <a:extLst>
             <a:ext uri="{C572A759-6A51-4108-AA02-DFA0A04FC94B}">
-              <ma14:wrappingTextBoxFlag xmlns:ma14="http://schemas.microsoft.com/office/mac/drawingml/2011/main" val="1"/>
+              <ma14:wrappingTextBoxFlag xmlns:ma14="http://schemas.microsoft.com/office/mac/drawingml/2011/main" xmlns="" val="1"/>
             </a:ext>
           </a:extLst>
         </p:spPr>
@@ -9557,7 +9476,7 @@
               <a:t> best F1-score: </a:t>
             </a:r>
             <a:r>
-              <a:rPr lang="en-US" sz="2400" b="1" dirty="0" smtClean="0">
+              <a:rPr lang="en-US" sz="2400" b="1" dirty="0">
                 <a:solidFill>
                   <a:srgbClr val="0170AD"/>
                 </a:solidFill>
@@ -9567,14 +9486,6 @@
               </a:rPr>
               <a:t>0.69</a:t>
             </a:r>
-            <a:endParaRPr lang="en-US" sz="2400" b="1" dirty="0">
-              <a:solidFill>
-                <a:srgbClr val="0170AD"/>
-              </a:solidFill>
-              <a:latin typeface="Lato Heavy" panose="020F0502020204030203" pitchFamily="34" charset="0"/>
-              <a:ea typeface="Lato Heavy" panose="020F0502020204030203" pitchFamily="34" charset="0"/>
-              <a:cs typeface="Lato Heavy" panose="020F0502020204030203" pitchFamily="34" charset="0"/>
-            </a:endParaRPr>
           </a:p>
           <a:p>
             <a:pPr marL="342900" lvl="0" indent="-342900" algn="just">
@@ -9634,27 +9545,8 @@
                 <a:ea typeface="Lato Light"/>
                 <a:cs typeface="Lato Light"/>
               </a:rPr>
-              <a:t> , we are place </a:t>
-            </a:r>
-            <a:r>
-              <a:rPr lang="en-US" sz="2400" b="1" dirty="0" smtClean="0">
-                <a:solidFill>
-                  <a:srgbClr val="0170AD"/>
-                </a:solidFill>
-                <a:latin typeface="Lato Light"/>
-                <a:ea typeface="Lato Light"/>
-                <a:cs typeface="Lato Light"/>
-              </a:rPr>
-              <a:t>155 of 355</a:t>
-            </a:r>
-            <a:endParaRPr lang="en-US" sz="2400" b="1" dirty="0">
-              <a:solidFill>
-                <a:srgbClr val="0170AD"/>
-              </a:solidFill>
-              <a:latin typeface="Lato Light"/>
-              <a:ea typeface="Lato Light"/>
-              <a:cs typeface="Lato Light"/>
-            </a:endParaRPr>
+              <a:t> , we are place 155 of 355</a:t>
+            </a:r>
           </a:p>
           <a:p>
             <a:pPr marL="342900" lvl="0" indent="-342900" algn="just">
@@ -9842,7 +9734,7 @@
           <p:cNvPr id="58" name="Shape 188">
             <a:extLst>
               <a:ext uri="{FF2B5EF4-FFF2-40B4-BE49-F238E27FC236}">
-                <a16:creationId xmlns:a16="http://schemas.microsoft.com/office/drawing/2014/main" xmlns="" id="{8B05589E-1A5D-F24E-983A-9D0A69151D66}"/>
+                <a16:creationId xmlns:a16="http://schemas.microsoft.com/office/drawing/2014/main" id="{8B05589E-1A5D-F24E-983A-9D0A69151D66}"/>
               </a:ext>
             </a:extLst>
           </p:cNvPr>
@@ -9865,7 +9757,7 @@
           <a:effectLst/>
           <a:extLst>
             <a:ext uri="{C572A759-6A51-4108-AA02-DFA0A04FC94B}">
-              <ma14:wrappingTextBoxFlag xmlns:ma14="http://schemas.microsoft.com/office/mac/drawingml/2011/main" val="1"/>
+              <ma14:wrappingTextBoxFlag xmlns:ma14="http://schemas.microsoft.com/office/mac/drawingml/2011/main" xmlns="" val="1"/>
             </a:ext>
           </a:extLst>
         </p:spPr>
@@ -9922,7 +9814,7 @@
           <p:cNvPr id="59" name="Shape 188">
             <a:extLst>
               <a:ext uri="{FF2B5EF4-FFF2-40B4-BE49-F238E27FC236}">
-                <a16:creationId xmlns:a16="http://schemas.microsoft.com/office/drawing/2014/main" xmlns="" id="{75F723E7-1E37-DC45-875A-1C59A812E122}"/>
+                <a16:creationId xmlns:a16="http://schemas.microsoft.com/office/drawing/2014/main" id="{75F723E7-1E37-DC45-875A-1C59A812E122}"/>
               </a:ext>
             </a:extLst>
           </p:cNvPr>
@@ -9945,7 +9837,7 @@
           <a:effectLst/>
           <a:extLst>
             <a:ext uri="{C572A759-6A51-4108-AA02-DFA0A04FC94B}">
-              <ma14:wrappingTextBoxFlag xmlns:ma14="http://schemas.microsoft.com/office/mac/drawingml/2011/main" val="1"/>
+              <ma14:wrappingTextBoxFlag xmlns:ma14="http://schemas.microsoft.com/office/mac/drawingml/2011/main" xmlns="" val="1"/>
             </a:ext>
           </a:extLst>
         </p:spPr>
@@ -10002,7 +9894,7 @@
           <p:cNvPr id="60" name="Shape 188">
             <a:extLst>
               <a:ext uri="{FF2B5EF4-FFF2-40B4-BE49-F238E27FC236}">
-                <a16:creationId xmlns:a16="http://schemas.microsoft.com/office/drawing/2014/main" xmlns="" id="{379B8735-60FE-124C-A800-9DB5DB622068}"/>
+                <a16:creationId xmlns:a16="http://schemas.microsoft.com/office/drawing/2014/main" id="{379B8735-60FE-124C-A800-9DB5DB622068}"/>
               </a:ext>
             </a:extLst>
           </p:cNvPr>
@@ -10025,7 +9917,7 @@
           <a:effectLst/>
           <a:extLst>
             <a:ext uri="{C572A759-6A51-4108-AA02-DFA0A04FC94B}">
-              <ma14:wrappingTextBoxFlag xmlns:ma14="http://schemas.microsoft.com/office/mac/drawingml/2011/main" val="1"/>
+              <ma14:wrappingTextBoxFlag xmlns:ma14="http://schemas.microsoft.com/office/mac/drawingml/2011/main" xmlns="" val="1"/>
             </a:ext>
           </a:extLst>
         </p:spPr>
@@ -11551,14 +11443,6 @@
               </a:rPr>
               <a:t> the service was a little of the"</a:t>
             </a:r>
-            <a:endParaRPr lang="en-US" sz="2400" b="1" i="1" dirty="0">
-              <a:solidFill>
-                <a:srgbClr val="0170AD"/>
-              </a:solidFill>
-              <a:latin typeface="Lato Light"/>
-              <a:ea typeface="Lato Light"/>
-              <a:cs typeface="Lato Light"/>
-            </a:endParaRPr>
           </a:p>
         </p:txBody>
       </p:sp>
@@ -11567,7 +11451,7 @@
           <p:cNvPr id="61" name="Shape 188">
             <a:extLst>
               <a:ext uri="{FF2B5EF4-FFF2-40B4-BE49-F238E27FC236}">
-                <a16:creationId xmlns:a16="http://schemas.microsoft.com/office/drawing/2014/main" xmlns="" id="{2B32377F-0FE8-1741-92BF-33798E6B7A9E}"/>
+                <a16:creationId xmlns:a16="http://schemas.microsoft.com/office/drawing/2014/main" id="{2B32377F-0FE8-1741-92BF-33798E6B7A9E}"/>
               </a:ext>
             </a:extLst>
           </p:cNvPr>
@@ -11590,7 +11474,7 @@
           <a:effectLst/>
           <a:extLst>
             <a:ext uri="{C572A759-6A51-4108-AA02-DFA0A04FC94B}">
-              <ma14:wrappingTextBoxFlag xmlns:ma14="http://schemas.microsoft.com/office/mac/drawingml/2011/main" val="1"/>
+              <ma14:wrappingTextBoxFlag xmlns:ma14="http://schemas.microsoft.com/office/mac/drawingml/2011/main" xmlns="" val="1"/>
             </a:ext>
           </a:extLst>
         </p:spPr>

</xml_diff>

<commit_message>
added test image and their labels to poster
</commit_message>
<xml_diff>
--- a/Poster/Poster_Team_55.pptx
+++ b/Poster/Poster_Team_55.pptx
@@ -362,7 +362,7 @@
           <a:p>
             <a:fld id="{CB3AF7B0-A4D4-1F41-A937-6DE6C06B179B}" type="slidenum">
               <a:rPr lang="en-US" smtClean="0"/>
-              <a:t>‹Nr.›</a:t>
+              <a:t>‹#›</a:t>
             </a:fld>
             <a:endParaRPr lang="en-US"/>
           </a:p>
@@ -532,7 +532,7 @@
           <a:p>
             <a:fld id="{CB3AF7B0-A4D4-1F41-A937-6DE6C06B179B}" type="slidenum">
               <a:rPr lang="en-US" smtClean="0"/>
-              <a:t>‹Nr.›</a:t>
+              <a:t>‹#›</a:t>
             </a:fld>
             <a:endParaRPr lang="en-US"/>
           </a:p>
@@ -712,7 +712,7 @@
           <a:p>
             <a:fld id="{CB3AF7B0-A4D4-1F41-A937-6DE6C06B179B}" type="slidenum">
               <a:rPr lang="en-US" smtClean="0"/>
-              <a:t>‹Nr.›</a:t>
+              <a:t>‹#›</a:t>
             </a:fld>
             <a:endParaRPr lang="en-US"/>
           </a:p>
@@ -1158,7 +1158,7 @@
           <a:p>
             <a:fld id="{CB3AF7B0-A4D4-1F41-A937-6DE6C06B179B}" type="slidenum">
               <a:rPr lang="en-US" smtClean="0"/>
-              <a:t>‹Nr.›</a:t>
+              <a:t>‹#›</a:t>
             </a:fld>
             <a:endParaRPr lang="en-US"/>
           </a:p>
@@ -1402,7 +1402,7 @@
           <a:p>
             <a:fld id="{CB3AF7B0-A4D4-1F41-A937-6DE6C06B179B}" type="slidenum">
               <a:rPr lang="en-US" smtClean="0"/>
-              <a:t>‹Nr.›</a:t>
+              <a:t>‹#›</a:t>
             </a:fld>
             <a:endParaRPr lang="en-US"/>
           </a:p>
@@ -1634,7 +1634,7 @@
           <a:p>
             <a:fld id="{CB3AF7B0-A4D4-1F41-A937-6DE6C06B179B}" type="slidenum">
               <a:rPr lang="en-US" smtClean="0"/>
-              <a:t>‹Nr.›</a:t>
+              <a:t>‹#›</a:t>
             </a:fld>
             <a:endParaRPr lang="en-US"/>
           </a:p>
@@ -2001,7 +2001,7 @@
           <a:p>
             <a:fld id="{CB3AF7B0-A4D4-1F41-A937-6DE6C06B179B}" type="slidenum">
               <a:rPr lang="en-US" smtClean="0"/>
-              <a:t>‹Nr.›</a:t>
+              <a:t>‹#›</a:t>
             </a:fld>
             <a:endParaRPr lang="en-US"/>
           </a:p>
@@ -2119,7 +2119,7 @@
           <a:p>
             <a:fld id="{CB3AF7B0-A4D4-1F41-A937-6DE6C06B179B}" type="slidenum">
               <a:rPr lang="en-US" smtClean="0"/>
-              <a:t>‹Nr.›</a:t>
+              <a:t>‹#›</a:t>
             </a:fld>
             <a:endParaRPr lang="en-US"/>
           </a:p>
@@ -2214,7 +2214,7 @@
           <a:p>
             <a:fld id="{CB3AF7B0-A4D4-1F41-A937-6DE6C06B179B}" type="slidenum">
               <a:rPr lang="en-US" smtClean="0"/>
-              <a:t>‹Nr.›</a:t>
+              <a:t>‹#›</a:t>
             </a:fld>
             <a:endParaRPr lang="en-US"/>
           </a:p>
@@ -2491,7 +2491,7 @@
           <a:p>
             <a:fld id="{CB3AF7B0-A4D4-1F41-A937-6DE6C06B179B}" type="slidenum">
               <a:rPr lang="en-US" smtClean="0"/>
-              <a:t>‹Nr.›</a:t>
+              <a:t>‹#›</a:t>
             </a:fld>
             <a:endParaRPr lang="en-US"/>
           </a:p>
@@ -2748,7 +2748,7 @@
           <a:p>
             <a:fld id="{CB3AF7B0-A4D4-1F41-A937-6DE6C06B179B}" type="slidenum">
               <a:rPr lang="en-US" smtClean="0"/>
-              <a:t>‹Nr.›</a:t>
+              <a:t>‹#›</a:t>
             </a:fld>
             <a:endParaRPr lang="en-US"/>
           </a:p>
@@ -2997,7 +2997,7 @@
           <a:p>
             <a:fld id="{CB3AF7B0-A4D4-1F41-A937-6DE6C06B179B}" type="slidenum">
               <a:rPr lang="en-US" smtClean="0"/>
-              <a:t>‹Nr.›</a:t>
+              <a:t>‹#›</a:t>
             </a:fld>
             <a:endParaRPr lang="en-US"/>
           </a:p>
@@ -3441,7 +3441,7 @@
           <p:cNvPr id="10" name="Rectangle 11">
             <a:extLst>
               <a:ext uri="{FF2B5EF4-FFF2-40B4-BE49-F238E27FC236}">
-                <a16:creationId xmlns:a16="http://schemas.microsoft.com/office/drawing/2014/main" id="{0431C963-9173-404D-B59D-5057E6AB0E81}"/>
+                <a16:creationId xmlns:a16="http://schemas.microsoft.com/office/drawing/2014/main" xmlns="" id="{0431C963-9173-404D-B59D-5057E6AB0E81}"/>
               </a:ext>
             </a:extLst>
           </p:cNvPr>
@@ -3501,7 +3501,7 @@
           <p:cNvPr id="9" name="Grafik 8">
             <a:extLst>
               <a:ext uri="{FF2B5EF4-FFF2-40B4-BE49-F238E27FC236}">
-                <a16:creationId xmlns:a16="http://schemas.microsoft.com/office/drawing/2014/main" id="{D79127DC-152A-4642-92EC-9900EEDF9A17}"/>
+                <a16:creationId xmlns:a16="http://schemas.microsoft.com/office/drawing/2014/main" xmlns="" id="{D79127DC-152A-4642-92EC-9900EEDF9A17}"/>
               </a:ext>
             </a:extLst>
           </p:cNvPr>
@@ -3537,7 +3537,7 @@
           <p:cNvPr id="14" name="Rectangle 11">
             <a:extLst>
               <a:ext uri="{FF2B5EF4-FFF2-40B4-BE49-F238E27FC236}">
-                <a16:creationId xmlns:a16="http://schemas.microsoft.com/office/drawing/2014/main" id="{E0823B2F-1851-1B47-9D9F-1AB036AEF07D}"/>
+                <a16:creationId xmlns:a16="http://schemas.microsoft.com/office/drawing/2014/main" xmlns="" id="{E0823B2F-1851-1B47-9D9F-1AB036AEF07D}"/>
               </a:ext>
             </a:extLst>
           </p:cNvPr>
@@ -3597,7 +3597,7 @@
           <p:cNvPr id="15" name="Rectangle 11">
             <a:extLst>
               <a:ext uri="{FF2B5EF4-FFF2-40B4-BE49-F238E27FC236}">
-                <a16:creationId xmlns:a16="http://schemas.microsoft.com/office/drawing/2014/main" id="{A1447456-217B-154B-A431-AE64D02CBF20}"/>
+                <a16:creationId xmlns:a16="http://schemas.microsoft.com/office/drawing/2014/main" xmlns="" id="{A1447456-217B-154B-A431-AE64D02CBF20}"/>
               </a:ext>
             </a:extLst>
           </p:cNvPr>
@@ -3657,7 +3657,7 @@
           <p:cNvPr id="16" name="Rectangle 11">
             <a:extLst>
               <a:ext uri="{FF2B5EF4-FFF2-40B4-BE49-F238E27FC236}">
-                <a16:creationId xmlns:a16="http://schemas.microsoft.com/office/drawing/2014/main" id="{EB0E2462-ABD5-874A-A109-24FE85DDAE13}"/>
+                <a16:creationId xmlns:a16="http://schemas.microsoft.com/office/drawing/2014/main" xmlns="" id="{EB0E2462-ABD5-874A-A109-24FE85DDAE13}"/>
               </a:ext>
             </a:extLst>
           </p:cNvPr>
@@ -3717,7 +3717,7 @@
           <p:cNvPr id="17" name="Rectangle 11">
             <a:extLst>
               <a:ext uri="{FF2B5EF4-FFF2-40B4-BE49-F238E27FC236}">
-                <a16:creationId xmlns:a16="http://schemas.microsoft.com/office/drawing/2014/main" id="{680317AF-DA48-FA43-98F8-57C8AB19B6D7}"/>
+                <a16:creationId xmlns:a16="http://schemas.microsoft.com/office/drawing/2014/main" xmlns="" id="{680317AF-DA48-FA43-98F8-57C8AB19B6D7}"/>
               </a:ext>
             </a:extLst>
           </p:cNvPr>
@@ -3777,7 +3777,7 @@
           <p:cNvPr id="18" name="Rectangle 11">
             <a:extLst>
               <a:ext uri="{FF2B5EF4-FFF2-40B4-BE49-F238E27FC236}">
-                <a16:creationId xmlns:a16="http://schemas.microsoft.com/office/drawing/2014/main" id="{E0078958-4A97-0C40-9233-EB4C3A568278}"/>
+                <a16:creationId xmlns:a16="http://schemas.microsoft.com/office/drawing/2014/main" xmlns="" id="{E0078958-4A97-0C40-9233-EB4C3A568278}"/>
               </a:ext>
             </a:extLst>
           </p:cNvPr>
@@ -3837,7 +3837,7 @@
           <p:cNvPr id="20" name="Shape 188">
             <a:extLst>
               <a:ext uri="{FF2B5EF4-FFF2-40B4-BE49-F238E27FC236}">
-                <a16:creationId xmlns:a16="http://schemas.microsoft.com/office/drawing/2014/main" id="{AC43EF38-6279-D54E-BDC6-7D0DB4CF6D81}"/>
+                <a16:creationId xmlns:a16="http://schemas.microsoft.com/office/drawing/2014/main" xmlns="" id="{AC43EF38-6279-D54E-BDC6-7D0DB4CF6D81}"/>
               </a:ext>
             </a:extLst>
           </p:cNvPr>
@@ -3860,7 +3860,7 @@
           <a:effectLst/>
           <a:extLst>
             <a:ext uri="{C572A759-6A51-4108-AA02-DFA0A04FC94B}">
-              <ma14:wrappingTextBoxFlag xmlns:ma14="http://schemas.microsoft.com/office/mac/drawingml/2011/main" xmlns="" val="1"/>
+              <ma14:wrappingTextBoxFlag xmlns:ma14="http://schemas.microsoft.com/office/mac/drawingml/2011/main" val="1"/>
             </a:ext>
           </a:extLst>
         </p:spPr>
@@ -4030,7 +4030,7 @@
           <p:cNvPr id="21" name="Shape 188">
             <a:extLst>
               <a:ext uri="{FF2B5EF4-FFF2-40B4-BE49-F238E27FC236}">
-                <a16:creationId xmlns:a16="http://schemas.microsoft.com/office/drawing/2014/main" id="{89D05E88-365F-BB42-BEFA-DBC27AFDC25C}"/>
+                <a16:creationId xmlns:a16="http://schemas.microsoft.com/office/drawing/2014/main" xmlns="" id="{89D05E88-365F-BB42-BEFA-DBC27AFDC25C}"/>
               </a:ext>
             </a:extLst>
           </p:cNvPr>
@@ -4053,7 +4053,7 @@
           <a:effectLst/>
           <a:extLst>
             <a:ext uri="{C572A759-6A51-4108-AA02-DFA0A04FC94B}">
-              <ma14:wrappingTextBoxFlag xmlns:ma14="http://schemas.microsoft.com/office/mac/drawingml/2011/main" xmlns="" val="1"/>
+              <ma14:wrappingTextBoxFlag xmlns:ma14="http://schemas.microsoft.com/office/mac/drawingml/2011/main" val="1"/>
             </a:ext>
           </a:extLst>
         </p:spPr>
@@ -4224,7 +4224,7 @@
           <p:cNvPr id="19" name="Shape 188">
             <a:extLst>
               <a:ext uri="{FF2B5EF4-FFF2-40B4-BE49-F238E27FC236}">
-                <a16:creationId xmlns:a16="http://schemas.microsoft.com/office/drawing/2014/main" id="{8E0224FA-7916-2C4C-9512-133BC4A692B1}"/>
+                <a16:creationId xmlns:a16="http://schemas.microsoft.com/office/drawing/2014/main" xmlns="" id="{8E0224FA-7916-2C4C-9512-133BC4A692B1}"/>
               </a:ext>
             </a:extLst>
           </p:cNvPr>
@@ -4247,7 +4247,7 @@
           <a:effectLst/>
           <a:extLst>
             <a:ext uri="{C572A759-6A51-4108-AA02-DFA0A04FC94B}">
-              <ma14:wrappingTextBoxFlag xmlns:ma14="http://schemas.microsoft.com/office/mac/drawingml/2011/main" xmlns="" val="1"/>
+              <ma14:wrappingTextBoxFlag xmlns:ma14="http://schemas.microsoft.com/office/mac/drawingml/2011/main" val="1"/>
             </a:ext>
           </a:extLst>
         </p:spPr>
@@ -4590,7 +4590,7 @@
           <p:cNvPr id="7" name="Grafik 6">
             <a:extLst>
               <a:ext uri="{FF2B5EF4-FFF2-40B4-BE49-F238E27FC236}">
-                <a16:creationId xmlns:a16="http://schemas.microsoft.com/office/drawing/2014/main" id="{FA491ECD-CAA5-414B-9469-EBBD02424E0C}"/>
+                <a16:creationId xmlns:a16="http://schemas.microsoft.com/office/drawing/2014/main" xmlns="" id="{FA491ECD-CAA5-414B-9469-EBBD02424E0C}"/>
               </a:ext>
             </a:extLst>
           </p:cNvPr>
@@ -4626,7 +4626,7 @@
           <p:cNvPr id="11" name="Grafik 10">
             <a:extLst>
               <a:ext uri="{FF2B5EF4-FFF2-40B4-BE49-F238E27FC236}">
-                <a16:creationId xmlns:a16="http://schemas.microsoft.com/office/drawing/2014/main" id="{34728E59-1FB1-9045-8256-441CCD51C19A}"/>
+                <a16:creationId xmlns:a16="http://schemas.microsoft.com/office/drawing/2014/main" xmlns="" id="{34728E59-1FB1-9045-8256-441CCD51C19A}"/>
               </a:ext>
             </a:extLst>
           </p:cNvPr>
@@ -4662,7 +4662,7 @@
           <p:cNvPr id="23" name="Grafik 22">
             <a:extLst>
               <a:ext uri="{FF2B5EF4-FFF2-40B4-BE49-F238E27FC236}">
-                <a16:creationId xmlns:a16="http://schemas.microsoft.com/office/drawing/2014/main" id="{C4854C0F-608A-C84B-95F8-2A96CF060A3B}"/>
+                <a16:creationId xmlns:a16="http://schemas.microsoft.com/office/drawing/2014/main" xmlns="" id="{C4854C0F-608A-C84B-95F8-2A96CF060A3B}"/>
               </a:ext>
             </a:extLst>
           </p:cNvPr>
@@ -4698,7 +4698,7 @@
           <p:cNvPr id="25" name="Grafik 24">
             <a:extLst>
               <a:ext uri="{FF2B5EF4-FFF2-40B4-BE49-F238E27FC236}">
-                <a16:creationId xmlns:a16="http://schemas.microsoft.com/office/drawing/2014/main" id="{440B2301-0954-974B-876B-BA6AFC9AEA55}"/>
+                <a16:creationId xmlns:a16="http://schemas.microsoft.com/office/drawing/2014/main" xmlns="" id="{440B2301-0954-974B-876B-BA6AFC9AEA55}"/>
               </a:ext>
             </a:extLst>
           </p:cNvPr>
@@ -4734,7 +4734,7 @@
           <p:cNvPr id="26" name="Shape 188">
             <a:extLst>
               <a:ext uri="{FF2B5EF4-FFF2-40B4-BE49-F238E27FC236}">
-                <a16:creationId xmlns:a16="http://schemas.microsoft.com/office/drawing/2014/main" id="{E4233908-0CCE-EA43-BDAC-517FA70DBE68}"/>
+                <a16:creationId xmlns:a16="http://schemas.microsoft.com/office/drawing/2014/main" xmlns="" id="{E4233908-0CCE-EA43-BDAC-517FA70DBE68}"/>
               </a:ext>
             </a:extLst>
           </p:cNvPr>
@@ -4757,7 +4757,7 @@
           <a:effectLst/>
           <a:extLst>
             <a:ext uri="{C572A759-6A51-4108-AA02-DFA0A04FC94B}">
-              <ma14:wrappingTextBoxFlag xmlns:ma14="http://schemas.microsoft.com/office/mac/drawingml/2011/main" xmlns="" val="1"/>
+              <ma14:wrappingTextBoxFlag xmlns:ma14="http://schemas.microsoft.com/office/mac/drawingml/2011/main" val="1"/>
             </a:ext>
           </a:extLst>
         </p:spPr>
@@ -4814,7 +4814,7 @@
           <p:cNvPr id="28" name="Grafik 27">
             <a:extLst>
               <a:ext uri="{FF2B5EF4-FFF2-40B4-BE49-F238E27FC236}">
-                <a16:creationId xmlns:a16="http://schemas.microsoft.com/office/drawing/2014/main" id="{255E3A66-594E-554E-8716-DA267F5EAA5D}"/>
+                <a16:creationId xmlns:a16="http://schemas.microsoft.com/office/drawing/2014/main" xmlns="" id="{255E3A66-594E-554E-8716-DA267F5EAA5D}"/>
               </a:ext>
             </a:extLst>
           </p:cNvPr>
@@ -4850,7 +4850,7 @@
           <p:cNvPr id="30" name="Grafik 29">
             <a:extLst>
               <a:ext uri="{FF2B5EF4-FFF2-40B4-BE49-F238E27FC236}">
-                <a16:creationId xmlns:a16="http://schemas.microsoft.com/office/drawing/2014/main" id="{7F8214CE-83CB-4A4E-9D61-D6D8B656866E}"/>
+                <a16:creationId xmlns:a16="http://schemas.microsoft.com/office/drawing/2014/main" xmlns="" id="{7F8214CE-83CB-4A4E-9D61-D6D8B656866E}"/>
               </a:ext>
             </a:extLst>
           </p:cNvPr>
@@ -4886,7 +4886,7 @@
           <p:cNvPr id="32" name="Grafik 31">
             <a:extLst>
               <a:ext uri="{FF2B5EF4-FFF2-40B4-BE49-F238E27FC236}">
-                <a16:creationId xmlns:a16="http://schemas.microsoft.com/office/drawing/2014/main" id="{C5B661F8-84DA-6A41-AA1A-A8F7075F75EE}"/>
+                <a16:creationId xmlns:a16="http://schemas.microsoft.com/office/drawing/2014/main" xmlns="" id="{C5B661F8-84DA-6A41-AA1A-A8F7075F75EE}"/>
               </a:ext>
             </a:extLst>
           </p:cNvPr>
@@ -4922,7 +4922,7 @@
           <p:cNvPr id="33" name="Shape 188">
             <a:extLst>
               <a:ext uri="{FF2B5EF4-FFF2-40B4-BE49-F238E27FC236}">
-                <a16:creationId xmlns:a16="http://schemas.microsoft.com/office/drawing/2014/main" id="{EDF06DD5-9FD2-5940-818E-D1093E04983D}"/>
+                <a16:creationId xmlns:a16="http://schemas.microsoft.com/office/drawing/2014/main" xmlns="" id="{EDF06DD5-9FD2-5940-818E-D1093E04983D}"/>
               </a:ext>
             </a:extLst>
           </p:cNvPr>
@@ -4945,7 +4945,7 @@
           <a:effectLst/>
           <a:extLst>
             <a:ext uri="{C572A759-6A51-4108-AA02-DFA0A04FC94B}">
-              <ma14:wrappingTextBoxFlag xmlns:ma14="http://schemas.microsoft.com/office/mac/drawingml/2011/main" xmlns="" val="1"/>
+              <ma14:wrappingTextBoxFlag xmlns:ma14="http://schemas.microsoft.com/office/mac/drawingml/2011/main" val="1"/>
             </a:ext>
           </a:extLst>
         </p:spPr>
@@ -5002,7 +5002,7 @@
           <p:cNvPr id="35" name="Shape 188">
             <a:extLst>
               <a:ext uri="{FF2B5EF4-FFF2-40B4-BE49-F238E27FC236}">
-                <a16:creationId xmlns:a16="http://schemas.microsoft.com/office/drawing/2014/main" id="{57E391D6-1F9B-E94E-A224-0D597E2FCEB5}"/>
+                <a16:creationId xmlns:a16="http://schemas.microsoft.com/office/drawing/2014/main" xmlns="" id="{57E391D6-1F9B-E94E-A224-0D597E2FCEB5}"/>
               </a:ext>
             </a:extLst>
           </p:cNvPr>
@@ -5025,7 +5025,7 @@
           <a:effectLst/>
           <a:extLst>
             <a:ext uri="{C572A759-6A51-4108-AA02-DFA0A04FC94B}">
-              <ma14:wrappingTextBoxFlag xmlns:ma14="http://schemas.microsoft.com/office/mac/drawingml/2011/main" xmlns="" val="1"/>
+              <ma14:wrappingTextBoxFlag xmlns:ma14="http://schemas.microsoft.com/office/mac/drawingml/2011/main" val="1"/>
             </a:ext>
           </a:extLst>
         </p:spPr>
@@ -5129,7 +5129,7 @@
           <p:cNvPr id="36" name="Shape 188">
             <a:extLst>
               <a:ext uri="{FF2B5EF4-FFF2-40B4-BE49-F238E27FC236}">
-                <a16:creationId xmlns:a16="http://schemas.microsoft.com/office/drawing/2014/main" id="{18B4394C-D960-5F45-A89E-517815FB1821}"/>
+                <a16:creationId xmlns:a16="http://schemas.microsoft.com/office/drawing/2014/main" xmlns="" id="{18B4394C-D960-5F45-A89E-517815FB1821}"/>
               </a:ext>
             </a:extLst>
           </p:cNvPr>
@@ -5152,7 +5152,7 @@
           <a:effectLst/>
           <a:extLst>
             <a:ext uri="{C572A759-6A51-4108-AA02-DFA0A04FC94B}">
-              <ma14:wrappingTextBoxFlag xmlns:ma14="http://schemas.microsoft.com/office/mac/drawingml/2011/main" xmlns="" val="1"/>
+              <ma14:wrappingTextBoxFlag xmlns:ma14="http://schemas.microsoft.com/office/mac/drawingml/2011/main" val="1"/>
             </a:ext>
           </a:extLst>
         </p:spPr>
@@ -5212,7 +5212,7 @@
           <p:cNvPr id="37" name="Shape 188">
             <a:extLst>
               <a:ext uri="{FF2B5EF4-FFF2-40B4-BE49-F238E27FC236}">
-                <a16:creationId xmlns:a16="http://schemas.microsoft.com/office/drawing/2014/main" id="{B5B2C976-8AC6-5D4D-B704-EFD2BE4DA265}"/>
+                <a16:creationId xmlns:a16="http://schemas.microsoft.com/office/drawing/2014/main" xmlns="" id="{B5B2C976-8AC6-5D4D-B704-EFD2BE4DA265}"/>
               </a:ext>
             </a:extLst>
           </p:cNvPr>
@@ -5235,7 +5235,7 @@
           <a:effectLst/>
           <a:extLst>
             <a:ext uri="{C572A759-6A51-4108-AA02-DFA0A04FC94B}">
-              <ma14:wrappingTextBoxFlag xmlns:ma14="http://schemas.microsoft.com/office/mac/drawingml/2011/main" xmlns="" val="1"/>
+              <ma14:wrappingTextBoxFlag xmlns:ma14="http://schemas.microsoft.com/office/mac/drawingml/2011/main" val="1"/>
             </a:ext>
           </a:extLst>
         </p:spPr>
@@ -5295,7 +5295,7 @@
           <p:cNvPr id="45" name="Shape 188">
             <a:extLst>
               <a:ext uri="{FF2B5EF4-FFF2-40B4-BE49-F238E27FC236}">
-                <a16:creationId xmlns:a16="http://schemas.microsoft.com/office/drawing/2014/main" id="{2B66D671-13B7-7243-AE53-A86986A52895}"/>
+                <a16:creationId xmlns:a16="http://schemas.microsoft.com/office/drawing/2014/main" xmlns="" id="{2B66D671-13B7-7243-AE53-A86986A52895}"/>
               </a:ext>
             </a:extLst>
           </p:cNvPr>
@@ -5318,7 +5318,7 @@
           <a:effectLst/>
           <a:extLst>
             <a:ext uri="{C572A759-6A51-4108-AA02-DFA0A04FC94B}">
-              <ma14:wrappingTextBoxFlag xmlns:ma14="http://schemas.microsoft.com/office/mac/drawingml/2011/main" xmlns="" val="1"/>
+              <ma14:wrappingTextBoxFlag xmlns:ma14="http://schemas.microsoft.com/office/mac/drawingml/2011/main" val="1"/>
             </a:ext>
           </a:extLst>
         </p:spPr>
@@ -5375,7 +5375,7 @@
           <p:cNvPr id="46" name="Shape 188">
             <a:extLst>
               <a:ext uri="{FF2B5EF4-FFF2-40B4-BE49-F238E27FC236}">
-                <a16:creationId xmlns:a16="http://schemas.microsoft.com/office/drawing/2014/main" id="{03672BFA-9B86-1443-A9BD-B48A64905BA0}"/>
+                <a16:creationId xmlns:a16="http://schemas.microsoft.com/office/drawing/2014/main" xmlns="" id="{03672BFA-9B86-1443-A9BD-B48A64905BA0}"/>
               </a:ext>
             </a:extLst>
           </p:cNvPr>
@@ -5398,7 +5398,7 @@
           <a:effectLst/>
           <a:extLst>
             <a:ext uri="{C572A759-6A51-4108-AA02-DFA0A04FC94B}">
-              <ma14:wrappingTextBoxFlag xmlns:ma14="http://schemas.microsoft.com/office/mac/drawingml/2011/main" xmlns="" val="1"/>
+              <ma14:wrappingTextBoxFlag xmlns:ma14="http://schemas.microsoft.com/office/mac/drawingml/2011/main" val="1"/>
             </a:ext>
           </a:extLst>
         </p:spPr>
@@ -5455,7 +5455,7 @@
           <p:cNvPr id="47" name="Shape 188">
             <a:extLst>
               <a:ext uri="{FF2B5EF4-FFF2-40B4-BE49-F238E27FC236}">
-                <a16:creationId xmlns:a16="http://schemas.microsoft.com/office/drawing/2014/main" id="{E9E581CD-DA3C-044C-8747-3E226A2EDC0B}"/>
+                <a16:creationId xmlns:a16="http://schemas.microsoft.com/office/drawing/2014/main" xmlns="" id="{E9E581CD-DA3C-044C-8747-3E226A2EDC0B}"/>
               </a:ext>
             </a:extLst>
           </p:cNvPr>
@@ -5478,7 +5478,7 @@
           <a:effectLst/>
           <a:extLst>
             <a:ext uri="{C572A759-6A51-4108-AA02-DFA0A04FC94B}">
-              <ma14:wrappingTextBoxFlag xmlns:ma14="http://schemas.microsoft.com/office/mac/drawingml/2011/main" xmlns="" val="1"/>
+              <ma14:wrappingTextBoxFlag xmlns:ma14="http://schemas.microsoft.com/office/mac/drawingml/2011/main" val="1"/>
             </a:ext>
           </a:extLst>
         </p:spPr>
@@ -5848,7 +5848,7 @@
           <p:cNvPr id="48" name="Shape 188">
             <a:extLst>
               <a:ext uri="{FF2B5EF4-FFF2-40B4-BE49-F238E27FC236}">
-                <a16:creationId xmlns:a16="http://schemas.microsoft.com/office/drawing/2014/main" id="{491EB432-A5E3-F146-A049-69AB4D3465EB}"/>
+                <a16:creationId xmlns:a16="http://schemas.microsoft.com/office/drawing/2014/main" xmlns="" id="{491EB432-A5E3-F146-A049-69AB4D3465EB}"/>
               </a:ext>
             </a:extLst>
           </p:cNvPr>
@@ -5871,7 +5871,7 @@
           <a:effectLst/>
           <a:extLst>
             <a:ext uri="{C572A759-6A51-4108-AA02-DFA0A04FC94B}">
-              <ma14:wrappingTextBoxFlag xmlns:ma14="http://schemas.microsoft.com/office/mac/drawingml/2011/main" xmlns="" val="1"/>
+              <ma14:wrappingTextBoxFlag xmlns:ma14="http://schemas.microsoft.com/office/mac/drawingml/2011/main" val="1"/>
             </a:ext>
           </a:extLst>
         </p:spPr>
@@ -6231,7 +6231,7 @@
           <p:cNvPr id="50" name="Shape 188">
             <a:extLst>
               <a:ext uri="{FF2B5EF4-FFF2-40B4-BE49-F238E27FC236}">
-                <a16:creationId xmlns:a16="http://schemas.microsoft.com/office/drawing/2014/main" id="{BA477D95-0956-BF47-9070-91C2FBC84006}"/>
+                <a16:creationId xmlns:a16="http://schemas.microsoft.com/office/drawing/2014/main" xmlns="" id="{BA477D95-0956-BF47-9070-91C2FBC84006}"/>
               </a:ext>
             </a:extLst>
           </p:cNvPr>
@@ -6254,7 +6254,7 @@
           <a:effectLst/>
           <a:extLst>
             <a:ext uri="{C572A759-6A51-4108-AA02-DFA0A04FC94B}">
-              <ma14:wrappingTextBoxFlag xmlns:ma14="http://schemas.microsoft.com/office/mac/drawingml/2011/main" xmlns="" val="1"/>
+              <ma14:wrappingTextBoxFlag xmlns:ma14="http://schemas.microsoft.com/office/mac/drawingml/2011/main" val="1"/>
             </a:ext>
           </a:extLst>
         </p:spPr>
@@ -6701,7 +6701,7 @@
           <p:cNvPr id="51" name="Shape 188">
             <a:extLst>
               <a:ext uri="{FF2B5EF4-FFF2-40B4-BE49-F238E27FC236}">
-                <a16:creationId xmlns:a16="http://schemas.microsoft.com/office/drawing/2014/main" id="{44E098BF-EAFD-2147-9E33-14CEFA65FC86}"/>
+                <a16:creationId xmlns:a16="http://schemas.microsoft.com/office/drawing/2014/main" xmlns="" id="{44E098BF-EAFD-2147-9E33-14CEFA65FC86}"/>
               </a:ext>
             </a:extLst>
           </p:cNvPr>
@@ -6724,7 +6724,7 @@
           <a:effectLst/>
           <a:extLst>
             <a:ext uri="{C572A759-6A51-4108-AA02-DFA0A04FC94B}">
-              <ma14:wrappingTextBoxFlag xmlns:ma14="http://schemas.microsoft.com/office/mac/drawingml/2011/main" xmlns="" val="1"/>
+              <ma14:wrappingTextBoxFlag xmlns:ma14="http://schemas.microsoft.com/office/mac/drawingml/2011/main" val="1"/>
             </a:ext>
           </a:extLst>
         </p:spPr>
@@ -7056,7 +7056,7 @@
           <p:cNvPr id="34" name="Shape 188">
             <a:extLst>
               <a:ext uri="{FF2B5EF4-FFF2-40B4-BE49-F238E27FC236}">
-                <a16:creationId xmlns:a16="http://schemas.microsoft.com/office/drawing/2014/main" id="{53005AED-E506-4C46-8ECE-031E75F77FB1}"/>
+                <a16:creationId xmlns:a16="http://schemas.microsoft.com/office/drawing/2014/main" xmlns="" id="{53005AED-E506-4C46-8ECE-031E75F77FB1}"/>
               </a:ext>
             </a:extLst>
           </p:cNvPr>
@@ -7079,7 +7079,7 @@
           <a:effectLst/>
           <a:extLst>
             <a:ext uri="{C572A759-6A51-4108-AA02-DFA0A04FC94B}">
-              <ma14:wrappingTextBoxFlag xmlns:ma14="http://schemas.microsoft.com/office/mac/drawingml/2011/main" xmlns="" val="1"/>
+              <ma14:wrappingTextBoxFlag xmlns:ma14="http://schemas.microsoft.com/office/mac/drawingml/2011/main" val="1"/>
             </a:ext>
           </a:extLst>
         </p:spPr>
@@ -7403,7 +7403,7 @@
           <p:cNvPr id="39" name="Shape 188">
             <a:extLst>
               <a:ext uri="{FF2B5EF4-FFF2-40B4-BE49-F238E27FC236}">
-                <a16:creationId xmlns:a16="http://schemas.microsoft.com/office/drawing/2014/main" id="{7D94EF4D-1967-F64C-ADA0-BB2C71B5E243}"/>
+                <a16:creationId xmlns:a16="http://schemas.microsoft.com/office/drawing/2014/main" xmlns="" id="{7D94EF4D-1967-F64C-ADA0-BB2C71B5E243}"/>
               </a:ext>
             </a:extLst>
           </p:cNvPr>
@@ -7426,7 +7426,7 @@
           <a:effectLst/>
           <a:extLst>
             <a:ext uri="{C572A759-6A51-4108-AA02-DFA0A04FC94B}">
-              <ma14:wrappingTextBoxFlag xmlns:ma14="http://schemas.microsoft.com/office/mac/drawingml/2011/main" xmlns="" val="1"/>
+              <ma14:wrappingTextBoxFlag xmlns:ma14="http://schemas.microsoft.com/office/mac/drawingml/2011/main" val="1"/>
             </a:ext>
           </a:extLst>
         </p:spPr>
@@ -7658,7 +7658,7 @@
           <p:cNvPr id="40" name="Shape 188">
             <a:extLst>
               <a:ext uri="{FF2B5EF4-FFF2-40B4-BE49-F238E27FC236}">
-                <a16:creationId xmlns:a16="http://schemas.microsoft.com/office/drawing/2014/main" id="{60B2218C-2F1F-E540-8C8F-A0713AF24158}"/>
+                <a16:creationId xmlns:a16="http://schemas.microsoft.com/office/drawing/2014/main" xmlns="" id="{60B2218C-2F1F-E540-8C8F-A0713AF24158}"/>
               </a:ext>
             </a:extLst>
           </p:cNvPr>
@@ -7681,7 +7681,7 @@
           <a:effectLst/>
           <a:extLst>
             <a:ext uri="{C572A759-6A51-4108-AA02-DFA0A04FC94B}">
-              <ma14:wrappingTextBoxFlag xmlns:ma14="http://schemas.microsoft.com/office/mac/drawingml/2011/main" xmlns="" val="1"/>
+              <ma14:wrappingTextBoxFlag xmlns:ma14="http://schemas.microsoft.com/office/mac/drawingml/2011/main" val="1"/>
             </a:ext>
           </a:extLst>
         </p:spPr>
@@ -7991,7 +7991,7 @@
           <p:cNvPr id="6" name="Grafik 5">
             <a:extLst>
               <a:ext uri="{FF2B5EF4-FFF2-40B4-BE49-F238E27FC236}">
-                <a16:creationId xmlns:a16="http://schemas.microsoft.com/office/drawing/2014/main" id="{809724DC-F5BF-BE4B-9B5D-4CF1E601A8E4}"/>
+                <a16:creationId xmlns:a16="http://schemas.microsoft.com/office/drawing/2014/main" xmlns="" id="{809724DC-F5BF-BE4B-9B5D-4CF1E601A8E4}"/>
               </a:ext>
             </a:extLst>
           </p:cNvPr>
@@ -8027,7 +8027,7 @@
           <p:cNvPr id="41" name="Shape 188">
             <a:extLst>
               <a:ext uri="{FF2B5EF4-FFF2-40B4-BE49-F238E27FC236}">
-                <a16:creationId xmlns:a16="http://schemas.microsoft.com/office/drawing/2014/main" id="{0AC7E769-5067-514F-9DDE-5769FC222785}"/>
+                <a16:creationId xmlns:a16="http://schemas.microsoft.com/office/drawing/2014/main" xmlns="" id="{0AC7E769-5067-514F-9DDE-5769FC222785}"/>
               </a:ext>
             </a:extLst>
           </p:cNvPr>
@@ -8050,7 +8050,7 @@
           <a:effectLst/>
           <a:extLst>
             <a:ext uri="{C572A759-6A51-4108-AA02-DFA0A04FC94B}">
-              <ma14:wrappingTextBoxFlag xmlns:ma14="http://schemas.microsoft.com/office/mac/drawingml/2011/main" xmlns="" val="1"/>
+              <ma14:wrappingTextBoxFlag xmlns:ma14="http://schemas.microsoft.com/office/mac/drawingml/2011/main" val="1"/>
             </a:ext>
           </a:extLst>
         </p:spPr>
@@ -8107,7 +8107,7 @@
           <p:cNvPr id="42" name="Shape 188">
             <a:extLst>
               <a:ext uri="{FF2B5EF4-FFF2-40B4-BE49-F238E27FC236}">
-                <a16:creationId xmlns:a16="http://schemas.microsoft.com/office/drawing/2014/main" id="{29A27DEB-B8E9-744B-A1EA-7458FB93FC93}"/>
+                <a16:creationId xmlns:a16="http://schemas.microsoft.com/office/drawing/2014/main" xmlns="" id="{29A27DEB-B8E9-744B-A1EA-7458FB93FC93}"/>
               </a:ext>
             </a:extLst>
           </p:cNvPr>
@@ -8130,7 +8130,7 @@
           <a:effectLst/>
           <a:extLst>
             <a:ext uri="{C572A759-6A51-4108-AA02-DFA0A04FC94B}">
-              <ma14:wrappingTextBoxFlag xmlns:ma14="http://schemas.microsoft.com/office/mac/drawingml/2011/main" xmlns="" val="1"/>
+              <ma14:wrappingTextBoxFlag xmlns:ma14="http://schemas.microsoft.com/office/mac/drawingml/2011/main" val="1"/>
             </a:ext>
           </a:extLst>
         </p:spPr>
@@ -8712,7 +8712,7 @@
           <p:cNvPr id="53" name="Shape 188">
             <a:extLst>
               <a:ext uri="{FF2B5EF4-FFF2-40B4-BE49-F238E27FC236}">
-                <a16:creationId xmlns:a16="http://schemas.microsoft.com/office/drawing/2014/main" id="{D9008FA4-6C55-4349-B8EB-CAF713A75C51}"/>
+                <a16:creationId xmlns:a16="http://schemas.microsoft.com/office/drawing/2014/main" xmlns="" id="{D9008FA4-6C55-4349-B8EB-CAF713A75C51}"/>
               </a:ext>
             </a:extLst>
           </p:cNvPr>
@@ -8735,7 +8735,7 @@
           <a:effectLst/>
           <a:extLst>
             <a:ext uri="{C572A759-6A51-4108-AA02-DFA0A04FC94B}">
-              <ma14:wrappingTextBoxFlag xmlns:ma14="http://schemas.microsoft.com/office/mac/drawingml/2011/main" xmlns="" val="1"/>
+              <ma14:wrappingTextBoxFlag xmlns:ma14="http://schemas.microsoft.com/office/mac/drawingml/2011/main" val="1"/>
             </a:ext>
           </a:extLst>
         </p:spPr>
@@ -8796,7 +8796,7 @@
               <p:cNvPr id="54" name="Shape 188">
                 <a:extLst>
                   <a:ext uri="{FF2B5EF4-FFF2-40B4-BE49-F238E27FC236}">
-                    <a16:creationId xmlns:a16="http://schemas.microsoft.com/office/drawing/2014/main" id="{600886FA-A6C3-EA4B-A501-9D8287AD722B}"/>
+                    <a16:creationId xmlns:a16="http://schemas.microsoft.com/office/drawing/2014/main" xmlns="" id="{600886FA-A6C3-EA4B-A501-9D8287AD722B}"/>
                   </a:ext>
                 </a:extLst>
               </p:cNvPr>
@@ -8819,7 +8819,7 @@
               <a:effectLst/>
               <a:extLst>
                 <a:ext uri="{C572A759-6A51-4108-AA02-DFA0A04FC94B}">
-                  <ma14:wrappingTextBoxFlag xmlns:ma14="http://schemas.microsoft.com/office/mac/drawingml/2011/main" xmlns="" val="1"/>
+                  <ma14:wrappingTextBoxFlag xmlns:ma14="http://schemas.microsoft.com/office/mac/drawingml/2011/main" val="1"/>
                 </a:ext>
               </a:extLst>
             </p:spPr>
@@ -8917,7 +8917,7 @@
                               <a:solidFill>
                                 <a:srgbClr val="0170AD"/>
                               </a:solidFill>
-                              <a:latin typeface="Cambria Math" panose="02040503050406030204" pitchFamily="18" charset="0"/>
+                              <a:latin typeface="Cambria Math" charset="0"/>
                               <a:ea typeface="Lato Light"/>
                               <a:cs typeface="Lato Light"/>
                             </a:rPr>
@@ -9056,7 +9056,7 @@
                               <a:solidFill>
                                 <a:srgbClr val="0170AD"/>
                               </a:solidFill>
-                              <a:latin typeface="Cambria Math" panose="02040503050406030204" pitchFamily="18" charset="0"/>
+                              <a:latin typeface="Cambria Math" charset="0"/>
                               <a:ea typeface="Lato Light"/>
                               <a:cs typeface="Lato Light"/>
                             </a:rPr>
@@ -9151,7 +9151,7 @@
                               <a:solidFill>
                                 <a:srgbClr val="0170AD"/>
                               </a:solidFill>
-                              <a:latin typeface="Cambria Math" panose="02040503050406030204" pitchFamily="18" charset="0"/>
+                              <a:latin typeface="Cambria Math" charset="0"/>
                               <a:ea typeface="Lato Light"/>
                               <a:cs typeface="Lato Light"/>
                             </a:rPr>
@@ -9281,7 +9281,7 @@
           <p:cNvPr id="55" name="Shape 188">
             <a:extLst>
               <a:ext uri="{FF2B5EF4-FFF2-40B4-BE49-F238E27FC236}">
-                <a16:creationId xmlns:a16="http://schemas.microsoft.com/office/drawing/2014/main" id="{4BE11666-7530-094D-97F6-37BEECE48F36}"/>
+                <a16:creationId xmlns:a16="http://schemas.microsoft.com/office/drawing/2014/main" xmlns="" id="{4BE11666-7530-094D-97F6-37BEECE48F36}"/>
               </a:ext>
             </a:extLst>
           </p:cNvPr>
@@ -9304,7 +9304,7 @@
           <a:effectLst/>
           <a:extLst>
             <a:ext uri="{C572A759-6A51-4108-AA02-DFA0A04FC94B}">
-              <ma14:wrappingTextBoxFlag xmlns:ma14="http://schemas.microsoft.com/office/mac/drawingml/2011/main" xmlns="" val="1"/>
+              <ma14:wrappingTextBoxFlag xmlns:ma14="http://schemas.microsoft.com/office/mac/drawingml/2011/main" val="1"/>
             </a:ext>
           </a:extLst>
         </p:spPr>
@@ -9361,7 +9361,7 @@
           <p:cNvPr id="56" name="Shape 188">
             <a:extLst>
               <a:ext uri="{FF2B5EF4-FFF2-40B4-BE49-F238E27FC236}">
-                <a16:creationId xmlns:a16="http://schemas.microsoft.com/office/drawing/2014/main" id="{178C1D35-91F6-7947-878F-82208958A5A3}"/>
+                <a16:creationId xmlns:a16="http://schemas.microsoft.com/office/drawing/2014/main" xmlns="" id="{178C1D35-91F6-7947-878F-82208958A5A3}"/>
               </a:ext>
             </a:extLst>
           </p:cNvPr>
@@ -9384,7 +9384,7 @@
           <a:effectLst/>
           <a:extLst>
             <a:ext uri="{C572A759-6A51-4108-AA02-DFA0A04FC94B}">
-              <ma14:wrappingTextBoxFlag xmlns:ma14="http://schemas.microsoft.com/office/mac/drawingml/2011/main" xmlns="" val="1"/>
+              <ma14:wrappingTextBoxFlag xmlns:ma14="http://schemas.microsoft.com/office/mac/drawingml/2011/main" val="1"/>
             </a:ext>
           </a:extLst>
         </p:spPr>
@@ -9731,170 +9731,10 @@
       </p:sp>
       <p:sp>
         <p:nvSpPr>
-          <p:cNvPr id="58" name="Shape 188">
-            <a:extLst>
-              <a:ext uri="{FF2B5EF4-FFF2-40B4-BE49-F238E27FC236}">
-                <a16:creationId xmlns:a16="http://schemas.microsoft.com/office/drawing/2014/main" id="{8B05589E-1A5D-F24E-983A-9D0A69151D66}"/>
-              </a:ext>
-            </a:extLst>
-          </p:cNvPr>
-          <p:cNvSpPr/>
-          <p:nvPr/>
-        </p:nvSpPr>
-        <p:spPr>
-          <a:xfrm>
-            <a:off x="21525787" y="22901101"/>
-            <a:ext cx="3755777" cy="584576"/>
-          </a:xfrm>
-          <a:prstGeom prst="rect">
-            <a:avLst/>
-          </a:prstGeom>
-          <a:noFill/>
-          <a:ln w="12700" cap="flat">
-            <a:noFill/>
-            <a:miter lim="400000"/>
-          </a:ln>
-          <a:effectLst/>
-          <a:extLst>
-            <a:ext uri="{C572A759-6A51-4108-AA02-DFA0A04FC94B}">
-              <ma14:wrappingTextBoxFlag xmlns:ma14="http://schemas.microsoft.com/office/mac/drawingml/2011/main" xmlns="" val="1"/>
-            </a:ext>
-          </a:extLst>
-        </p:spPr>
-        <p:txBody>
-          <a:bodyPr wrap="square" lIns="0" tIns="0" rIns="0" bIns="0" numCol="1" anchor="t">
-            <a:noAutofit/>
-          </a:bodyPr>
-          <a:lstStyle>
-            <a:lvl1pPr algn="l" defTabSz="584200">
-              <a:lnSpc>
-                <a:spcPct val="110000"/>
-              </a:lnSpc>
-              <a:spcBef>
-                <a:spcPts val="3000"/>
-              </a:spcBef>
-              <a:defRPr sz="2000">
-                <a:solidFill>
-                  <a:srgbClr val="4C4C4C"/>
-                </a:solidFill>
-                <a:latin typeface="Helvetica Neue Light"/>
-                <a:ea typeface="Helvetica Neue Light"/>
-                <a:cs typeface="Helvetica Neue Light"/>
-                <a:sym typeface="Helvetica Neue Light"/>
-              </a:defRPr>
-            </a:lvl1pPr>
-          </a:lstStyle>
-          <a:p>
-            <a:pPr lvl="0" algn="ctr">
-              <a:lnSpc>
-                <a:spcPct val="100000"/>
-              </a:lnSpc>
-              <a:defRPr sz="1800">
-                <a:solidFill>
-                  <a:srgbClr val="000000"/>
-                </a:solidFill>
-              </a:defRPr>
-            </a:pPr>
-            <a:r>
-              <a:rPr lang="en-US" sz="2400" b="1" dirty="0">
-                <a:solidFill>
-                  <a:srgbClr val="0170AD"/>
-                </a:solidFill>
-                <a:latin typeface="Lato Light"/>
-                <a:ea typeface="Lato Light"/>
-                <a:cs typeface="Lato Light"/>
-              </a:rPr>
-              <a:t>Picture 1 results</a:t>
-            </a:r>
-          </a:p>
-        </p:txBody>
-      </p:sp>
-      <p:sp>
-        <p:nvSpPr>
-          <p:cNvPr id="59" name="Shape 188">
-            <a:extLst>
-              <a:ext uri="{FF2B5EF4-FFF2-40B4-BE49-F238E27FC236}">
-                <a16:creationId xmlns:a16="http://schemas.microsoft.com/office/drawing/2014/main" id="{75F723E7-1E37-DC45-875A-1C59A812E122}"/>
-              </a:ext>
-            </a:extLst>
-          </p:cNvPr>
-          <p:cNvSpPr/>
-          <p:nvPr/>
-        </p:nvSpPr>
-        <p:spPr>
-          <a:xfrm>
-            <a:off x="26506190" y="22901101"/>
-            <a:ext cx="3755777" cy="584576"/>
-          </a:xfrm>
-          <a:prstGeom prst="rect">
-            <a:avLst/>
-          </a:prstGeom>
-          <a:noFill/>
-          <a:ln w="12700" cap="flat">
-            <a:noFill/>
-            <a:miter lim="400000"/>
-          </a:ln>
-          <a:effectLst/>
-          <a:extLst>
-            <a:ext uri="{C572A759-6A51-4108-AA02-DFA0A04FC94B}">
-              <ma14:wrappingTextBoxFlag xmlns:ma14="http://schemas.microsoft.com/office/mac/drawingml/2011/main" xmlns="" val="1"/>
-            </a:ext>
-          </a:extLst>
-        </p:spPr>
-        <p:txBody>
-          <a:bodyPr wrap="square" lIns="0" tIns="0" rIns="0" bIns="0" numCol="1" anchor="t">
-            <a:noAutofit/>
-          </a:bodyPr>
-          <a:lstStyle>
-            <a:lvl1pPr algn="l" defTabSz="584200">
-              <a:lnSpc>
-                <a:spcPct val="110000"/>
-              </a:lnSpc>
-              <a:spcBef>
-                <a:spcPts val="3000"/>
-              </a:spcBef>
-              <a:defRPr sz="2000">
-                <a:solidFill>
-                  <a:srgbClr val="4C4C4C"/>
-                </a:solidFill>
-                <a:latin typeface="Helvetica Neue Light"/>
-                <a:ea typeface="Helvetica Neue Light"/>
-                <a:cs typeface="Helvetica Neue Light"/>
-                <a:sym typeface="Helvetica Neue Light"/>
-              </a:defRPr>
-            </a:lvl1pPr>
-          </a:lstStyle>
-          <a:p>
-            <a:pPr lvl="0" algn="ctr">
-              <a:lnSpc>
-                <a:spcPct val="100000"/>
-              </a:lnSpc>
-              <a:defRPr sz="1800">
-                <a:solidFill>
-                  <a:srgbClr val="000000"/>
-                </a:solidFill>
-              </a:defRPr>
-            </a:pPr>
-            <a:r>
-              <a:rPr lang="en-US" sz="2400" b="1" dirty="0">
-                <a:solidFill>
-                  <a:srgbClr val="0170AD"/>
-                </a:solidFill>
-                <a:latin typeface="Lato Light"/>
-                <a:ea typeface="Lato Light"/>
-                <a:cs typeface="Lato Light"/>
-              </a:rPr>
-              <a:t>Picture 2 results</a:t>
-            </a:r>
-          </a:p>
-        </p:txBody>
-      </p:sp>
-      <p:sp>
-        <p:nvSpPr>
           <p:cNvPr id="60" name="Shape 188">
             <a:extLst>
               <a:ext uri="{FF2B5EF4-FFF2-40B4-BE49-F238E27FC236}">
-                <a16:creationId xmlns:a16="http://schemas.microsoft.com/office/drawing/2014/main" id="{379B8735-60FE-124C-A800-9DB5DB622068}"/>
+                <a16:creationId xmlns:a16="http://schemas.microsoft.com/office/drawing/2014/main" xmlns="" id="{379B8735-60FE-124C-A800-9DB5DB622068}"/>
               </a:ext>
             </a:extLst>
           </p:cNvPr>
@@ -9917,7 +9757,7 @@
           <a:effectLst/>
           <a:extLst>
             <a:ext uri="{C572A759-6A51-4108-AA02-DFA0A04FC94B}">
-              <ma14:wrappingTextBoxFlag xmlns:ma14="http://schemas.microsoft.com/office/mac/drawingml/2011/main" xmlns="" val="1"/>
+              <ma14:wrappingTextBoxFlag xmlns:ma14="http://schemas.microsoft.com/office/mac/drawingml/2011/main" val="1"/>
             </a:ext>
           </a:extLst>
         </p:spPr>
@@ -11451,7 +11291,7 @@
           <p:cNvPr id="61" name="Shape 188">
             <a:extLst>
               <a:ext uri="{FF2B5EF4-FFF2-40B4-BE49-F238E27FC236}">
-                <a16:creationId xmlns:a16="http://schemas.microsoft.com/office/drawing/2014/main" id="{2B32377F-0FE8-1741-92BF-33798E6B7A9E}"/>
+                <a16:creationId xmlns:a16="http://schemas.microsoft.com/office/drawing/2014/main" xmlns="" id="{2B32377F-0FE8-1741-92BF-33798E6B7A9E}"/>
               </a:ext>
             </a:extLst>
           </p:cNvPr>
@@ -11474,7 +11314,7 @@
           <a:effectLst/>
           <a:extLst>
             <a:ext uri="{C572A759-6A51-4108-AA02-DFA0A04FC94B}">
-              <ma14:wrappingTextBoxFlag xmlns:ma14="http://schemas.microsoft.com/office/mac/drawingml/2011/main" xmlns="" val="1"/>
+              <ma14:wrappingTextBoxFlag xmlns:ma14="http://schemas.microsoft.com/office/mac/drawingml/2011/main" val="1"/>
             </a:ext>
           </a:extLst>
         </p:spPr>
@@ -11526,6 +11366,458 @@
           </a:p>
         </p:txBody>
       </p:sp>
+      <p:sp>
+        <p:nvSpPr>
+          <p:cNvPr id="49" name="Shape 188">
+            <a:extLst>
+              <a:ext uri="{FF2B5EF4-FFF2-40B4-BE49-F238E27FC236}">
+                <a16:creationId xmlns="" xmlns:a16="http://schemas.microsoft.com/office/drawing/2014/main" xmlns:lc="http://schemas.openxmlformats.org/drawingml/2006/lockedCanvas" id="{8B05589E-1A5D-F24E-983A-9D0A69151D66}"/>
+              </a:ext>
+            </a:extLst>
+          </p:cNvPr>
+          <p:cNvSpPr/>
+          <p:nvPr/>
+        </p:nvSpPr>
+        <p:spPr>
+          <a:xfrm>
+            <a:off x="22734064" y="23383556"/>
+            <a:ext cx="3491277" cy="643719"/>
+          </a:xfrm>
+          <a:prstGeom prst="rect">
+            <a:avLst/>
+          </a:prstGeom>
+          <a:noFill/>
+          <a:ln w="12700" cap="flat">
+            <a:noFill/>
+            <a:miter lim="400000"/>
+          </a:ln>
+          <a:effectLst/>
+          <a:extLst>
+            <a:ext uri="{C572A759-6A51-4108-AA02-DFA0A04FC94B}">
+              <ma14:wrappingTextBoxFlag xmlns:ma14="http://schemas.microsoft.com/office/mac/drawingml/2011/main" val="1"/>
+            </a:ext>
+          </a:extLst>
+        </p:spPr>
+        <p:txBody>
+          <a:bodyPr wrap="square" lIns="0" tIns="0" rIns="0" bIns="0" numCol="1" anchor="t">
+            <a:noAutofit/>
+          </a:bodyPr>
+          <a:lstStyle>
+            <a:defPPr>
+              <a:defRPr lang="de-DE"/>
+            </a:defPPr>
+            <a:lvl1pPr marL="0" algn="l" defTabSz="3507730" rtl="0" eaLnBrk="1" latinLnBrk="0" hangingPunct="1">
+              <a:defRPr sz="6905" kern="1200">
+                <a:solidFill>
+                  <a:schemeClr val="tx1"/>
+                </a:solidFill>
+                <a:latin typeface="+mn-lt"/>
+                <a:ea typeface="+mn-ea"/>
+                <a:cs typeface="+mn-cs"/>
+              </a:defRPr>
+            </a:lvl1pPr>
+            <a:lvl2pPr marL="1753865" algn="l" defTabSz="3507730" rtl="0" eaLnBrk="1" latinLnBrk="0" hangingPunct="1">
+              <a:defRPr sz="6905" kern="1200">
+                <a:solidFill>
+                  <a:schemeClr val="tx1"/>
+                </a:solidFill>
+                <a:latin typeface="+mn-lt"/>
+                <a:ea typeface="+mn-ea"/>
+                <a:cs typeface="+mn-cs"/>
+              </a:defRPr>
+            </a:lvl2pPr>
+            <a:lvl3pPr marL="3507730" algn="l" defTabSz="3507730" rtl="0" eaLnBrk="1" latinLnBrk="0" hangingPunct="1">
+              <a:defRPr sz="6905" kern="1200">
+                <a:solidFill>
+                  <a:schemeClr val="tx1"/>
+                </a:solidFill>
+                <a:latin typeface="+mn-lt"/>
+                <a:ea typeface="+mn-ea"/>
+                <a:cs typeface="+mn-cs"/>
+              </a:defRPr>
+            </a:lvl3pPr>
+            <a:lvl4pPr marL="5261595" algn="l" defTabSz="3507730" rtl="0" eaLnBrk="1" latinLnBrk="0" hangingPunct="1">
+              <a:defRPr sz="6905" kern="1200">
+                <a:solidFill>
+                  <a:schemeClr val="tx1"/>
+                </a:solidFill>
+                <a:latin typeface="+mn-lt"/>
+                <a:ea typeface="+mn-ea"/>
+                <a:cs typeface="+mn-cs"/>
+              </a:defRPr>
+            </a:lvl4pPr>
+            <a:lvl5pPr marL="7015460" algn="l" defTabSz="3507730" rtl="0" eaLnBrk="1" latinLnBrk="0" hangingPunct="1">
+              <a:defRPr sz="6905" kern="1200">
+                <a:solidFill>
+                  <a:schemeClr val="tx1"/>
+                </a:solidFill>
+                <a:latin typeface="+mn-lt"/>
+                <a:ea typeface="+mn-ea"/>
+                <a:cs typeface="+mn-cs"/>
+              </a:defRPr>
+            </a:lvl5pPr>
+            <a:lvl6pPr marL="8769325" algn="l" defTabSz="3507730" rtl="0" eaLnBrk="1" latinLnBrk="0" hangingPunct="1">
+              <a:defRPr sz="6905" kern="1200">
+                <a:solidFill>
+                  <a:schemeClr val="tx1"/>
+                </a:solidFill>
+                <a:latin typeface="+mn-lt"/>
+                <a:ea typeface="+mn-ea"/>
+                <a:cs typeface="+mn-cs"/>
+              </a:defRPr>
+            </a:lvl6pPr>
+            <a:lvl7pPr marL="10523190" algn="l" defTabSz="3507730" rtl="0" eaLnBrk="1" latinLnBrk="0" hangingPunct="1">
+              <a:defRPr sz="6905" kern="1200">
+                <a:solidFill>
+                  <a:schemeClr val="tx1"/>
+                </a:solidFill>
+                <a:latin typeface="+mn-lt"/>
+                <a:ea typeface="+mn-ea"/>
+                <a:cs typeface="+mn-cs"/>
+              </a:defRPr>
+            </a:lvl7pPr>
+            <a:lvl8pPr marL="12277054" algn="l" defTabSz="3507730" rtl="0" eaLnBrk="1" latinLnBrk="0" hangingPunct="1">
+              <a:defRPr sz="6905" kern="1200">
+                <a:solidFill>
+                  <a:schemeClr val="tx1"/>
+                </a:solidFill>
+                <a:latin typeface="+mn-lt"/>
+                <a:ea typeface="+mn-ea"/>
+                <a:cs typeface="+mn-cs"/>
+              </a:defRPr>
+            </a:lvl8pPr>
+            <a:lvl9pPr marL="14030919" algn="l" defTabSz="3507730" rtl="0" eaLnBrk="1" latinLnBrk="0" hangingPunct="1">
+              <a:defRPr sz="6905" kern="1200">
+                <a:solidFill>
+                  <a:schemeClr val="tx1"/>
+                </a:solidFill>
+                <a:latin typeface="+mn-lt"/>
+                <a:ea typeface="+mn-ea"/>
+                <a:cs typeface="+mn-cs"/>
+              </a:defRPr>
+            </a:lvl9pPr>
+          </a:lstStyle>
+          <a:p>
+            <a:pPr lvl="0" algn="ctr">
+              <a:lnSpc>
+                <a:spcPct val="100000"/>
+              </a:lnSpc>
+              <a:spcBef>
+                <a:spcPts val="600"/>
+              </a:spcBef>
+              <a:defRPr sz="1800">
+                <a:solidFill>
+                  <a:srgbClr val="000000"/>
+                </a:solidFill>
+              </a:defRPr>
+            </a:pPr>
+            <a:r>
+              <a:rPr lang="en-US" sz="2400" b="1" dirty="0" smtClean="0">
+                <a:solidFill>
+                  <a:srgbClr val="0170AD"/>
+                </a:solidFill>
+                <a:latin typeface="Lato Light"/>
+                <a:ea typeface="Lato Light"/>
+                <a:cs typeface="Lato Light"/>
+              </a:rPr>
+              <a:t>Labels: </a:t>
+            </a:r>
+            <a:r>
+              <a:rPr lang="cs-CZ" sz="2400" b="1" dirty="0" smtClean="0">
+                <a:solidFill>
+                  <a:srgbClr val="0170AD"/>
+                </a:solidFill>
+                <a:latin typeface="Lato Light"/>
+                <a:ea typeface="Lato Light"/>
+                <a:cs typeface="Lato Light"/>
+              </a:rPr>
+              <a:t>1 </a:t>
+            </a:r>
+            <a:r>
+              <a:rPr lang="cs-CZ" sz="2400" b="1" dirty="0">
+                <a:solidFill>
+                  <a:srgbClr val="0170AD"/>
+                </a:solidFill>
+                <a:latin typeface="Lato Light"/>
+                <a:ea typeface="Lato Light"/>
+                <a:cs typeface="Lato Light"/>
+              </a:rPr>
+              <a:t>2 4 5 6 </a:t>
+            </a:r>
+            <a:r>
+              <a:rPr lang="cs-CZ" sz="2400" b="1" dirty="0" smtClean="0">
+                <a:solidFill>
+                  <a:srgbClr val="0170AD"/>
+                </a:solidFill>
+                <a:latin typeface="Lato Light"/>
+                <a:ea typeface="Lato Light"/>
+                <a:cs typeface="Lato Light"/>
+              </a:rPr>
+              <a:t>7</a:t>
+            </a:r>
+          </a:p>
+        </p:txBody>
+      </p:sp>
+      <p:sp>
+        <p:nvSpPr>
+          <p:cNvPr id="52" name="Shape 188">
+            <a:extLst>
+              <a:ext uri="{FF2B5EF4-FFF2-40B4-BE49-F238E27FC236}">
+                <a16:creationId xmlns="" xmlns:a16="http://schemas.microsoft.com/office/drawing/2014/main" xmlns:lc="http://schemas.openxmlformats.org/drawingml/2006/lockedCanvas" id="{75F723E7-1E37-DC45-875A-1C59A812E122}"/>
+              </a:ext>
+            </a:extLst>
+          </p:cNvPr>
+          <p:cNvSpPr/>
+          <p:nvPr/>
+        </p:nvSpPr>
+        <p:spPr>
+          <a:xfrm>
+            <a:off x="27306290" y="23383556"/>
+            <a:ext cx="3522097" cy="530318"/>
+          </a:xfrm>
+          <a:prstGeom prst="rect">
+            <a:avLst/>
+          </a:prstGeom>
+          <a:noFill/>
+          <a:ln w="12700" cap="flat">
+            <a:noFill/>
+            <a:miter lim="400000"/>
+          </a:ln>
+          <a:effectLst/>
+          <a:extLst>
+            <a:ext uri="{C572A759-6A51-4108-AA02-DFA0A04FC94B}">
+              <ma14:wrappingTextBoxFlag xmlns:ma14="http://schemas.microsoft.com/office/mac/drawingml/2011/main" val="1"/>
+            </a:ext>
+          </a:extLst>
+        </p:spPr>
+        <p:txBody>
+          <a:bodyPr wrap="square" lIns="0" tIns="0" rIns="0" bIns="0" numCol="1" anchor="t">
+            <a:noAutofit/>
+          </a:bodyPr>
+          <a:lstStyle>
+            <a:defPPr>
+              <a:defRPr lang="de-DE"/>
+            </a:defPPr>
+            <a:lvl1pPr marL="0" algn="l" defTabSz="3507730" rtl="0" eaLnBrk="1" latinLnBrk="0" hangingPunct="1">
+              <a:defRPr sz="6905" kern="1200">
+                <a:solidFill>
+                  <a:schemeClr val="tx1"/>
+                </a:solidFill>
+                <a:latin typeface="+mn-lt"/>
+                <a:ea typeface="+mn-ea"/>
+                <a:cs typeface="+mn-cs"/>
+              </a:defRPr>
+            </a:lvl1pPr>
+            <a:lvl2pPr marL="1753865" algn="l" defTabSz="3507730" rtl="0" eaLnBrk="1" latinLnBrk="0" hangingPunct="1">
+              <a:defRPr sz="6905" kern="1200">
+                <a:solidFill>
+                  <a:schemeClr val="tx1"/>
+                </a:solidFill>
+                <a:latin typeface="+mn-lt"/>
+                <a:ea typeface="+mn-ea"/>
+                <a:cs typeface="+mn-cs"/>
+              </a:defRPr>
+            </a:lvl2pPr>
+            <a:lvl3pPr marL="3507730" algn="l" defTabSz="3507730" rtl="0" eaLnBrk="1" latinLnBrk="0" hangingPunct="1">
+              <a:defRPr sz="6905" kern="1200">
+                <a:solidFill>
+                  <a:schemeClr val="tx1"/>
+                </a:solidFill>
+                <a:latin typeface="+mn-lt"/>
+                <a:ea typeface="+mn-ea"/>
+                <a:cs typeface="+mn-cs"/>
+              </a:defRPr>
+            </a:lvl3pPr>
+            <a:lvl4pPr marL="5261595" algn="l" defTabSz="3507730" rtl="0" eaLnBrk="1" latinLnBrk="0" hangingPunct="1">
+              <a:defRPr sz="6905" kern="1200">
+                <a:solidFill>
+                  <a:schemeClr val="tx1"/>
+                </a:solidFill>
+                <a:latin typeface="+mn-lt"/>
+                <a:ea typeface="+mn-ea"/>
+                <a:cs typeface="+mn-cs"/>
+              </a:defRPr>
+            </a:lvl4pPr>
+            <a:lvl5pPr marL="7015460" algn="l" defTabSz="3507730" rtl="0" eaLnBrk="1" latinLnBrk="0" hangingPunct="1">
+              <a:defRPr sz="6905" kern="1200">
+                <a:solidFill>
+                  <a:schemeClr val="tx1"/>
+                </a:solidFill>
+                <a:latin typeface="+mn-lt"/>
+                <a:ea typeface="+mn-ea"/>
+                <a:cs typeface="+mn-cs"/>
+              </a:defRPr>
+            </a:lvl5pPr>
+            <a:lvl6pPr marL="8769325" algn="l" defTabSz="3507730" rtl="0" eaLnBrk="1" latinLnBrk="0" hangingPunct="1">
+              <a:defRPr sz="6905" kern="1200">
+                <a:solidFill>
+                  <a:schemeClr val="tx1"/>
+                </a:solidFill>
+                <a:latin typeface="+mn-lt"/>
+                <a:ea typeface="+mn-ea"/>
+                <a:cs typeface="+mn-cs"/>
+              </a:defRPr>
+            </a:lvl6pPr>
+            <a:lvl7pPr marL="10523190" algn="l" defTabSz="3507730" rtl="0" eaLnBrk="1" latinLnBrk="0" hangingPunct="1">
+              <a:defRPr sz="6905" kern="1200">
+                <a:solidFill>
+                  <a:schemeClr val="tx1"/>
+                </a:solidFill>
+                <a:latin typeface="+mn-lt"/>
+                <a:ea typeface="+mn-ea"/>
+                <a:cs typeface="+mn-cs"/>
+              </a:defRPr>
+            </a:lvl7pPr>
+            <a:lvl8pPr marL="12277054" algn="l" defTabSz="3507730" rtl="0" eaLnBrk="1" latinLnBrk="0" hangingPunct="1">
+              <a:defRPr sz="6905" kern="1200">
+                <a:solidFill>
+                  <a:schemeClr val="tx1"/>
+                </a:solidFill>
+                <a:latin typeface="+mn-lt"/>
+                <a:ea typeface="+mn-ea"/>
+                <a:cs typeface="+mn-cs"/>
+              </a:defRPr>
+            </a:lvl8pPr>
+            <a:lvl9pPr marL="14030919" algn="l" defTabSz="3507730" rtl="0" eaLnBrk="1" latinLnBrk="0" hangingPunct="1">
+              <a:defRPr sz="6905" kern="1200">
+                <a:solidFill>
+                  <a:schemeClr val="tx1"/>
+                </a:solidFill>
+                <a:latin typeface="+mn-lt"/>
+                <a:ea typeface="+mn-ea"/>
+                <a:cs typeface="+mn-cs"/>
+              </a:defRPr>
+            </a:lvl9pPr>
+          </a:lstStyle>
+          <a:p>
+            <a:pPr lvl="0" algn="ctr">
+              <a:lnSpc>
+                <a:spcPct val="100000"/>
+              </a:lnSpc>
+              <a:spcBef>
+                <a:spcPts val="600"/>
+              </a:spcBef>
+              <a:defRPr sz="1800">
+                <a:solidFill>
+                  <a:srgbClr val="000000"/>
+                </a:solidFill>
+              </a:defRPr>
+            </a:pPr>
+            <a:r>
+              <a:rPr lang="en-US" sz="2400" b="1" dirty="0" smtClean="0">
+                <a:solidFill>
+                  <a:srgbClr val="0170AD"/>
+                </a:solidFill>
+                <a:latin typeface="Lato Light"/>
+                <a:ea typeface="Lato Light"/>
+                <a:cs typeface="Lato Light"/>
+              </a:rPr>
+              <a:t>Labels: </a:t>
+            </a:r>
+            <a:r>
+              <a:rPr lang="en-US" sz="2400" b="1" dirty="0">
+                <a:solidFill>
+                  <a:srgbClr val="0170AD"/>
+                </a:solidFill>
+                <a:latin typeface="Lato Light"/>
+                <a:ea typeface="Lato Light"/>
+                <a:cs typeface="Lato Light"/>
+              </a:rPr>
+              <a:t>0 3 5 </a:t>
+            </a:r>
+            <a:r>
+              <a:rPr lang="en-US" sz="2400" b="1">
+                <a:solidFill>
+                  <a:srgbClr val="0170AD"/>
+                </a:solidFill>
+                <a:latin typeface="Lato Light"/>
+                <a:ea typeface="Lato Light"/>
+                <a:cs typeface="Lato Light"/>
+              </a:rPr>
+              <a:t>6 </a:t>
+            </a:r>
+            <a:r>
+              <a:rPr lang="en-US" sz="2400" b="1" smtClean="0">
+                <a:solidFill>
+                  <a:srgbClr val="0170AD"/>
+                </a:solidFill>
+                <a:latin typeface="Lato Light"/>
+                <a:ea typeface="Lato Light"/>
+                <a:cs typeface="Lato Light"/>
+              </a:rPr>
+              <a:t>8</a:t>
+            </a:r>
+            <a:endParaRPr lang="en-US" sz="2400" b="1" dirty="0" smtClean="0">
+              <a:solidFill>
+                <a:srgbClr val="0170AD"/>
+              </a:solidFill>
+              <a:latin typeface="Lato Light"/>
+              <a:ea typeface="Lato Light"/>
+              <a:cs typeface="Lato Light"/>
+            </a:endParaRPr>
+          </a:p>
+        </p:txBody>
+      </p:sp>
+      <p:pic>
+        <p:nvPicPr>
+          <p:cNvPr id="57" name="Picture 56"/>
+          <p:cNvPicPr>
+            <a:picLocks noChangeAspect="1"/>
+          </p:cNvPicPr>
+          <p:nvPr/>
+        </p:nvPicPr>
+        <p:blipFill>
+          <a:blip r:embed="rId12">
+            <a:extLst>
+              <a:ext uri="{28A0092B-C50C-407E-A947-70E740481C1C}">
+                <a14:useLocalDpi xmlns:a14="http://schemas.microsoft.com/office/drawing/2010/main" val="0"/>
+              </a:ext>
+            </a:extLst>
+          </a:blip>
+          <a:stretch>
+            <a:fillRect/>
+          </a:stretch>
+        </p:blipFill>
+        <p:spPr>
+          <a:xfrm>
+            <a:off x="22734067" y="20450349"/>
+            <a:ext cx="3491274" cy="2618456"/>
+          </a:xfrm>
+          <a:prstGeom prst="rect">
+            <a:avLst/>
+          </a:prstGeom>
+        </p:spPr>
+      </p:pic>
+      <p:pic>
+        <p:nvPicPr>
+          <p:cNvPr id="62" name="Picture 61"/>
+          <p:cNvPicPr>
+            <a:picLocks noChangeAspect="1"/>
+          </p:cNvPicPr>
+          <p:nvPr/>
+        </p:nvPicPr>
+        <p:blipFill>
+          <a:blip r:embed="rId13">
+            <a:extLst>
+              <a:ext uri="{28A0092B-C50C-407E-A947-70E740481C1C}">
+                <a14:useLocalDpi xmlns:a14="http://schemas.microsoft.com/office/drawing/2010/main" val="0"/>
+              </a:ext>
+            </a:extLst>
+          </a:blip>
+          <a:stretch>
+            <a:fillRect/>
+          </a:stretch>
+        </p:blipFill>
+        <p:spPr>
+          <a:xfrm>
+            <a:off x="27306290" y="20448056"/>
+            <a:ext cx="3522097" cy="2620749"/>
+          </a:xfrm>
+          <a:prstGeom prst="rect">
+            <a:avLst/>
+          </a:prstGeom>
+        </p:spPr>
+      </p:pic>
     </p:spTree>
     <p:extLst>
       <p:ext uri="{BB962C8B-B14F-4D97-AF65-F5344CB8AC3E}">

</xml_diff>

<commit_message>
Changed the RNN part
</commit_message>
<xml_diff>
--- a/Poster/Poster_Team_55.pptx
+++ b/Poster/Poster_Team_55.pptx
@@ -3860,7 +3860,7 @@
           <a:effectLst/>
           <a:extLst>
             <a:ext uri="{C572A759-6A51-4108-AA02-DFA0A04FC94B}">
-              <ma14:wrappingTextBoxFlag xmlns:ma14="http://schemas.microsoft.com/office/mac/drawingml/2011/main" xmlns="" val="1"/>
+              <ma14:wrappingTextBoxFlag xmlns="" xmlns:ma14="http://schemas.microsoft.com/office/mac/drawingml/2011/main" val="1"/>
             </a:ext>
           </a:extLst>
         </p:spPr>
@@ -4053,7 +4053,7 @@
           <a:effectLst/>
           <a:extLst>
             <a:ext uri="{C572A759-6A51-4108-AA02-DFA0A04FC94B}">
-              <ma14:wrappingTextBoxFlag xmlns:ma14="http://schemas.microsoft.com/office/mac/drawingml/2011/main" xmlns="" val="1"/>
+              <ma14:wrappingTextBoxFlag xmlns="" xmlns:ma14="http://schemas.microsoft.com/office/mac/drawingml/2011/main" val="1"/>
             </a:ext>
           </a:extLst>
         </p:spPr>
@@ -4247,7 +4247,7 @@
           <a:effectLst/>
           <a:extLst>
             <a:ext uri="{C572A759-6A51-4108-AA02-DFA0A04FC94B}">
-              <ma14:wrappingTextBoxFlag xmlns:ma14="http://schemas.microsoft.com/office/mac/drawingml/2011/main" xmlns="" val="1"/>
+              <ma14:wrappingTextBoxFlag xmlns="" xmlns:ma14="http://schemas.microsoft.com/office/mac/drawingml/2011/main" val="1"/>
             </a:ext>
           </a:extLst>
         </p:spPr>
@@ -4757,7 +4757,7 @@
           <a:effectLst/>
           <a:extLst>
             <a:ext uri="{C572A759-6A51-4108-AA02-DFA0A04FC94B}">
-              <ma14:wrappingTextBoxFlag xmlns:ma14="http://schemas.microsoft.com/office/mac/drawingml/2011/main" xmlns="" val="1"/>
+              <ma14:wrappingTextBoxFlag xmlns="" xmlns:ma14="http://schemas.microsoft.com/office/mac/drawingml/2011/main" val="1"/>
             </a:ext>
           </a:extLst>
         </p:spPr>
@@ -4945,7 +4945,7 @@
           <a:effectLst/>
           <a:extLst>
             <a:ext uri="{C572A759-6A51-4108-AA02-DFA0A04FC94B}">
-              <ma14:wrappingTextBoxFlag xmlns:ma14="http://schemas.microsoft.com/office/mac/drawingml/2011/main" xmlns="" val="1"/>
+              <ma14:wrappingTextBoxFlag xmlns="" xmlns:ma14="http://schemas.microsoft.com/office/mac/drawingml/2011/main" val="1"/>
             </a:ext>
           </a:extLst>
         </p:spPr>
@@ -5025,7 +5025,7 @@
           <a:effectLst/>
           <a:extLst>
             <a:ext uri="{C572A759-6A51-4108-AA02-DFA0A04FC94B}">
-              <ma14:wrappingTextBoxFlag xmlns:ma14="http://schemas.microsoft.com/office/mac/drawingml/2011/main" xmlns="" val="1"/>
+              <ma14:wrappingTextBoxFlag xmlns="" xmlns:ma14="http://schemas.microsoft.com/office/mac/drawingml/2011/main" val="1"/>
             </a:ext>
           </a:extLst>
         </p:spPr>
@@ -5152,7 +5152,7 @@
           <a:effectLst/>
           <a:extLst>
             <a:ext uri="{C572A759-6A51-4108-AA02-DFA0A04FC94B}">
-              <ma14:wrappingTextBoxFlag xmlns:ma14="http://schemas.microsoft.com/office/mac/drawingml/2011/main" xmlns="" val="1"/>
+              <ma14:wrappingTextBoxFlag xmlns="" xmlns:ma14="http://schemas.microsoft.com/office/mac/drawingml/2011/main" val="1"/>
             </a:ext>
           </a:extLst>
         </p:spPr>
@@ -5235,7 +5235,7 @@
           <a:effectLst/>
           <a:extLst>
             <a:ext uri="{C572A759-6A51-4108-AA02-DFA0A04FC94B}">
-              <ma14:wrappingTextBoxFlag xmlns:ma14="http://schemas.microsoft.com/office/mac/drawingml/2011/main" xmlns="" val="1"/>
+              <ma14:wrappingTextBoxFlag xmlns="" xmlns:ma14="http://schemas.microsoft.com/office/mac/drawingml/2011/main" val="1"/>
             </a:ext>
           </a:extLst>
         </p:spPr>
@@ -5318,7 +5318,7 @@
           <a:effectLst/>
           <a:extLst>
             <a:ext uri="{C572A759-6A51-4108-AA02-DFA0A04FC94B}">
-              <ma14:wrappingTextBoxFlag xmlns:ma14="http://schemas.microsoft.com/office/mac/drawingml/2011/main" xmlns="" val="1"/>
+              <ma14:wrappingTextBoxFlag xmlns="" xmlns:ma14="http://schemas.microsoft.com/office/mac/drawingml/2011/main" val="1"/>
             </a:ext>
           </a:extLst>
         </p:spPr>
@@ -5398,7 +5398,7 @@
           <a:effectLst/>
           <a:extLst>
             <a:ext uri="{C572A759-6A51-4108-AA02-DFA0A04FC94B}">
-              <ma14:wrappingTextBoxFlag xmlns:ma14="http://schemas.microsoft.com/office/mac/drawingml/2011/main" xmlns="" val="1"/>
+              <ma14:wrappingTextBoxFlag xmlns="" xmlns:ma14="http://schemas.microsoft.com/office/mac/drawingml/2011/main" val="1"/>
             </a:ext>
           </a:extLst>
         </p:spPr>
@@ -5478,7 +5478,7 @@
           <a:effectLst/>
           <a:extLst>
             <a:ext uri="{C572A759-6A51-4108-AA02-DFA0A04FC94B}">
-              <ma14:wrappingTextBoxFlag xmlns:ma14="http://schemas.microsoft.com/office/mac/drawingml/2011/main" xmlns="" val="1"/>
+              <ma14:wrappingTextBoxFlag xmlns="" xmlns:ma14="http://schemas.microsoft.com/office/mac/drawingml/2011/main" val="1"/>
             </a:ext>
           </a:extLst>
         </p:spPr>
@@ -5871,7 +5871,7 @@
           <a:effectLst/>
           <a:extLst>
             <a:ext uri="{C572A759-6A51-4108-AA02-DFA0A04FC94B}">
-              <ma14:wrappingTextBoxFlag xmlns:ma14="http://schemas.microsoft.com/office/mac/drawingml/2011/main" xmlns="" val="1"/>
+              <ma14:wrappingTextBoxFlag xmlns="" xmlns:ma14="http://schemas.microsoft.com/office/mac/drawingml/2011/main" val="1"/>
             </a:ext>
           </a:extLst>
         </p:spPr>
@@ -6254,7 +6254,7 @@
           <a:effectLst/>
           <a:extLst>
             <a:ext uri="{C572A759-6A51-4108-AA02-DFA0A04FC94B}">
-              <ma14:wrappingTextBoxFlag xmlns:ma14="http://schemas.microsoft.com/office/mac/drawingml/2011/main" xmlns="" val="1"/>
+              <ma14:wrappingTextBoxFlag xmlns="" xmlns:ma14="http://schemas.microsoft.com/office/mac/drawingml/2011/main" val="1"/>
             </a:ext>
           </a:extLst>
         </p:spPr>
@@ -6724,7 +6724,7 @@
           <a:effectLst/>
           <a:extLst>
             <a:ext uri="{C572A759-6A51-4108-AA02-DFA0A04FC94B}">
-              <ma14:wrappingTextBoxFlag xmlns:ma14="http://schemas.microsoft.com/office/mac/drawingml/2011/main" xmlns="" val="1"/>
+              <ma14:wrappingTextBoxFlag xmlns="" xmlns:ma14="http://schemas.microsoft.com/office/mac/drawingml/2011/main" val="1"/>
             </a:ext>
           </a:extLst>
         </p:spPr>
@@ -7079,7 +7079,7 @@
           <a:effectLst/>
           <a:extLst>
             <a:ext uri="{C572A759-6A51-4108-AA02-DFA0A04FC94B}">
-              <ma14:wrappingTextBoxFlag xmlns:ma14="http://schemas.microsoft.com/office/mac/drawingml/2011/main" xmlns="" val="1"/>
+              <ma14:wrappingTextBoxFlag xmlns="" xmlns:ma14="http://schemas.microsoft.com/office/mac/drawingml/2011/main" val="1"/>
             </a:ext>
           </a:extLst>
         </p:spPr>
@@ -7426,7 +7426,7 @@
           <a:effectLst/>
           <a:extLst>
             <a:ext uri="{C572A759-6A51-4108-AA02-DFA0A04FC94B}">
-              <ma14:wrappingTextBoxFlag xmlns:ma14="http://schemas.microsoft.com/office/mac/drawingml/2011/main" xmlns="" val="1"/>
+              <ma14:wrappingTextBoxFlag xmlns="" xmlns:ma14="http://schemas.microsoft.com/office/mac/drawingml/2011/main" val="1"/>
             </a:ext>
           </a:extLst>
         </p:spPr>
@@ -7681,7 +7681,7 @@
           <a:effectLst/>
           <a:extLst>
             <a:ext uri="{C572A759-6A51-4108-AA02-DFA0A04FC94B}">
-              <ma14:wrappingTextBoxFlag xmlns:ma14="http://schemas.microsoft.com/office/mac/drawingml/2011/main" xmlns="" val="1"/>
+              <ma14:wrappingTextBoxFlag xmlns="" xmlns:ma14="http://schemas.microsoft.com/office/mac/drawingml/2011/main" val="1"/>
             </a:ext>
           </a:extLst>
         </p:spPr>
@@ -7970,7 +7970,7 @@
                 <a:ea typeface="Lato Heavy" panose="020F0502020204030203" pitchFamily="34" charset="0"/>
                 <a:cs typeface="Lato Heavy" panose="020F0502020204030203" pitchFamily="34" charset="0"/>
               </a:rPr>
-              <a:t>xx% of the training set</a:t>
+              <a:t>20% of the training set</a:t>
             </a:r>
             <a:r>
               <a:rPr lang="en-US" sz="2400" b="1" dirty="0">
@@ -8050,7 +8050,7 @@
           <a:effectLst/>
           <a:extLst>
             <a:ext uri="{C572A759-6A51-4108-AA02-DFA0A04FC94B}">
-              <ma14:wrappingTextBoxFlag xmlns:ma14="http://schemas.microsoft.com/office/mac/drawingml/2011/main" xmlns="" val="1"/>
+              <ma14:wrappingTextBoxFlag xmlns="" xmlns:ma14="http://schemas.microsoft.com/office/mac/drawingml/2011/main" val="1"/>
             </a:ext>
           </a:extLst>
         </p:spPr>
@@ -8130,7 +8130,7 @@
           <a:effectLst/>
           <a:extLst>
             <a:ext uri="{C572A759-6A51-4108-AA02-DFA0A04FC94B}">
-              <ma14:wrappingTextBoxFlag xmlns:ma14="http://schemas.microsoft.com/office/mac/drawingml/2011/main" xmlns="" val="1"/>
+              <ma14:wrappingTextBoxFlag xmlns="" xmlns:ma14="http://schemas.microsoft.com/office/mac/drawingml/2011/main" val="1"/>
             </a:ext>
           </a:extLst>
         </p:spPr>
@@ -8735,7 +8735,7 @@
           <a:effectLst/>
           <a:extLst>
             <a:ext uri="{C572A759-6A51-4108-AA02-DFA0A04FC94B}">
-              <ma14:wrappingTextBoxFlag xmlns:ma14="http://schemas.microsoft.com/office/mac/drawingml/2011/main" xmlns="" val="1"/>
+              <ma14:wrappingTextBoxFlag xmlns="" xmlns:ma14="http://schemas.microsoft.com/office/mac/drawingml/2011/main" val="1"/>
             </a:ext>
           </a:extLst>
         </p:spPr>
@@ -8819,7 +8819,7 @@
               <a:effectLst/>
               <a:extLst>
                 <a:ext uri="{C572A759-6A51-4108-AA02-DFA0A04FC94B}">
-                  <ma14:wrappingTextBoxFlag xmlns:ma14="http://schemas.microsoft.com/office/mac/drawingml/2011/main" xmlns="" val="1"/>
+                  <ma14:wrappingTextBoxFlag xmlns="" xmlns:ma14="http://schemas.microsoft.com/office/mac/drawingml/2011/main" val="1"/>
                 </a:ext>
               </a:extLst>
             </p:spPr>
@@ -9304,7 +9304,7 @@
           <a:effectLst/>
           <a:extLst>
             <a:ext uri="{C572A759-6A51-4108-AA02-DFA0A04FC94B}">
-              <ma14:wrappingTextBoxFlag xmlns:ma14="http://schemas.microsoft.com/office/mac/drawingml/2011/main" xmlns="" val="1"/>
+              <ma14:wrappingTextBoxFlag xmlns="" xmlns:ma14="http://schemas.microsoft.com/office/mac/drawingml/2011/main" val="1"/>
             </a:ext>
           </a:extLst>
         </p:spPr>
@@ -9384,7 +9384,7 @@
           <a:effectLst/>
           <a:extLst>
             <a:ext uri="{C572A759-6A51-4108-AA02-DFA0A04FC94B}">
-              <ma14:wrappingTextBoxFlag xmlns:ma14="http://schemas.microsoft.com/office/mac/drawingml/2011/main" xmlns="" val="1"/>
+              <ma14:wrappingTextBoxFlag xmlns="" xmlns:ma14="http://schemas.microsoft.com/office/mac/drawingml/2011/main" val="1"/>
             </a:ext>
           </a:extLst>
         </p:spPr>
@@ -9696,35 +9696,7 @@
                 <a:ea typeface="Lato Light"/>
                 <a:cs typeface="Lato Light"/>
               </a:rPr>
-              <a:t>As a metric, some of our friends classified 20 reviews. 10 were real 10 were fake. </a:t>
-            </a:r>
-          </a:p>
-          <a:p>
-            <a:pPr marL="342900" lvl="0" indent="-342900" algn="just">
-              <a:lnSpc>
-                <a:spcPct val="100000"/>
-              </a:lnSpc>
-              <a:spcBef>
-                <a:spcPts val="0"/>
-              </a:spcBef>
-              <a:buFont typeface="Arial" panose="020B0604020202020204" pitchFamily="34" charset="0"/>
-              <a:buChar char="•"/>
-              <a:defRPr sz="1800">
-                <a:solidFill>
-                  <a:srgbClr val="000000"/>
-                </a:solidFill>
-              </a:defRPr>
-            </a:pPr>
-            <a:r>
-              <a:rPr lang="en-US" sz="2400" b="1" dirty="0">
-                <a:solidFill>
-                  <a:srgbClr val="0170AD"/>
-                </a:solidFill>
-                <a:latin typeface="Lato Light"/>
-                <a:ea typeface="Lato Light"/>
-                <a:cs typeface="Lato Light"/>
-              </a:rPr>
-              <a:t>Xx of our fake reviews were considered to be real and xx of the real reviews were considered to be real.</a:t>
+              <a:t>As a metric, we suggest to mix real reviews with fake reviews and let humans decide which of them are real.</a:t>
             </a:r>
           </a:p>
         </p:txBody>
@@ -9757,7 +9729,7 @@
           <a:effectLst/>
           <a:extLst>
             <a:ext uri="{C572A759-6A51-4108-AA02-DFA0A04FC94B}">
-              <ma14:wrappingTextBoxFlag xmlns:ma14="http://schemas.microsoft.com/office/mac/drawingml/2011/main" xmlns="" val="1"/>
+              <ma14:wrappingTextBoxFlag xmlns="" xmlns:ma14="http://schemas.microsoft.com/office/mac/drawingml/2011/main" val="1"/>
             </a:ext>
           </a:extLst>
         </p:spPr>
@@ -11314,7 +11286,7 @@
           <a:effectLst/>
           <a:extLst>
             <a:ext uri="{C572A759-6A51-4108-AA02-DFA0A04FC94B}">
-              <ma14:wrappingTextBoxFlag xmlns:ma14="http://schemas.microsoft.com/office/mac/drawingml/2011/main" xmlns="" val="1"/>
+              <ma14:wrappingTextBoxFlag xmlns="" xmlns:ma14="http://schemas.microsoft.com/office/mac/drawingml/2011/main" val="1"/>
             </a:ext>
           </a:extLst>
         </p:spPr>
@@ -11394,7 +11366,7 @@
           <a:effectLst/>
           <a:extLst>
             <a:ext uri="{C572A759-6A51-4108-AA02-DFA0A04FC94B}">
-              <ma14:wrappingTextBoxFlag xmlns:ma14="http://schemas.microsoft.com/office/mac/drawingml/2011/main" xmlns="" val="1"/>
+              <ma14:wrappingTextBoxFlag xmlns="" xmlns:ma14="http://schemas.microsoft.com/office/mac/drawingml/2011/main" val="1"/>
             </a:ext>
           </a:extLst>
         </p:spPr>
@@ -11564,7 +11536,7 @@
           <a:effectLst/>
           <a:extLst>
             <a:ext uri="{C572A759-6A51-4108-AA02-DFA0A04FC94B}">
-              <ma14:wrappingTextBoxFlag xmlns:ma14="http://schemas.microsoft.com/office/mac/drawingml/2011/main" xmlns="" val="1"/>
+              <ma14:wrappingTextBoxFlag xmlns="" xmlns:ma14="http://schemas.microsoft.com/office/mac/drawingml/2011/main" val="1"/>
             </a:ext>
           </a:extLst>
         </p:spPr>

</xml_diff>